<commit_message>
Added Lesson Modules in Deck
</commit_message>
<xml_diff>
--- a/01-intro/C# Lessons.pptx
+++ b/01-intro/C# Lessons.pptx
@@ -13,6 +13,28 @@
     <p:sldId id="257" r:id="rId7"/>
     <p:sldId id="258" r:id="rId8"/>
     <p:sldId id="259" r:id="rId9"/>
+    <p:sldId id="260" r:id="rId10"/>
+    <p:sldId id="261" r:id="rId11"/>
+    <p:sldId id="262" r:id="rId12"/>
+    <p:sldId id="263" r:id="rId13"/>
+    <p:sldId id="264" r:id="rId14"/>
+    <p:sldId id="265" r:id="rId15"/>
+    <p:sldId id="266" r:id="rId16"/>
+    <p:sldId id="267" r:id="rId17"/>
+    <p:sldId id="268" r:id="rId18"/>
+    <p:sldId id="269" r:id="rId19"/>
+    <p:sldId id="270" r:id="rId20"/>
+    <p:sldId id="271" r:id="rId21"/>
+    <p:sldId id="272" r:id="rId22"/>
+    <p:sldId id="273" r:id="rId23"/>
+    <p:sldId id="274" r:id="rId24"/>
+    <p:sldId id="275" r:id="rId25"/>
+    <p:sldId id="276" r:id="rId26"/>
+    <p:sldId id="277" r:id="rId27"/>
+    <p:sldId id="278" r:id="rId28"/>
+    <p:sldId id="279" r:id="rId29"/>
+    <p:sldId id="280" r:id="rId30"/>
+    <p:sldId id="281" r:id="rId31"/>
   </p:sldIdLst>
   <p:sldSz cx="12192000" cy="6858000"/>
   <p:notesSz cx="6858000" cy="9144000"/>
@@ -120,30 +142,33 @@
             <p14:sldId id="257"/>
           </p14:sldIdLst>
         </p14:section>
-        <p14:section name="Lesson 01" id="{B9D9F39F-9444-4EFE-B408-98DBF3828EB7}">
+        <p14:section name="Lessons" id="{B9D9F39F-9444-4EFE-B408-98DBF3828EB7}">
           <p14:sldIdLst>
             <p14:sldId id="258"/>
+            <p14:sldId id="259"/>
+            <p14:sldId id="260"/>
+            <p14:sldId id="261"/>
+            <p14:sldId id="262"/>
+            <p14:sldId id="263"/>
+            <p14:sldId id="264"/>
+            <p14:sldId id="265"/>
+            <p14:sldId id="266"/>
+            <p14:sldId id="267"/>
+            <p14:sldId id="268"/>
+            <p14:sldId id="269"/>
+            <p14:sldId id="270"/>
+            <p14:sldId id="271"/>
+            <p14:sldId id="272"/>
+            <p14:sldId id="273"/>
+            <p14:sldId id="274"/>
+            <p14:sldId id="275"/>
+            <p14:sldId id="276"/>
+            <p14:sldId id="277"/>
+            <p14:sldId id="278"/>
+            <p14:sldId id="279"/>
+            <p14:sldId id="280"/>
+            <p14:sldId id="281"/>
           </p14:sldIdLst>
-        </p14:section>
-        <p14:section name="Lesson 02" id="{DAFEBD70-9901-4412-9505-6FC915E5E62C}">
-          <p14:sldIdLst>
-            <p14:sldId id="259"/>
-          </p14:sldIdLst>
-        </p14:section>
-        <p14:section name="Lesson 03" id="{4D273D50-F9FA-4C1F-939C-C55D2F19F854}">
-          <p14:sldIdLst/>
-        </p14:section>
-        <p14:section name="Lesson 04" id="{597598E7-AE9B-4CFF-B112-1B476D54B896}">
-          <p14:sldIdLst/>
-        </p14:section>
-        <p14:section name="Lesson 05" id="{30822E26-5482-4F97-902F-FE4038ED5AF6}">
-          <p14:sldIdLst/>
-        </p14:section>
-        <p14:section name="Lesson 06" id="{AB5C55FD-4502-41CD-9057-903A04795DFC}">
-          <p14:sldIdLst/>
-        </p14:section>
-        <p14:section name="Lesson 007" id="{F9E60C73-F9AB-4F57-A410-14A008A10AD2}">
-          <p14:sldIdLst/>
         </p14:section>
       </p14:sectionLst>
     </p:ext>
@@ -19112,6 +19137,1316 @@
 </p:sld>
 </file>
 
+<file path=ppt/slides/slide10.xml><?xml version="1.0" encoding="utf-8"?>
+<p:sld xmlns:a="http://schemas.openxmlformats.org/drawingml/2006/main" xmlns:r="http://schemas.openxmlformats.org/officeDocument/2006/relationships" xmlns:p="http://schemas.openxmlformats.org/presentationml/2006/main">
+  <p:cSld>
+    <p:spTree>
+      <p:nvGrpSpPr>
+        <p:cNvPr id="1" name=""/>
+        <p:cNvGrpSpPr/>
+        <p:nvPr/>
+      </p:nvGrpSpPr>
+      <p:grpSpPr>
+        <a:xfrm>
+          <a:off x="0" y="0"/>
+          <a:ext cx="0" cy="0"/>
+          <a:chOff x="0" y="0"/>
+          <a:chExt cx="0" cy="0"/>
+        </a:xfrm>
+      </p:grpSpPr>
+      <p:sp>
+        <p:nvSpPr>
+          <p:cNvPr id="7" name="Picture Placeholder 6">
+            <a:extLst>
+              <a:ext uri="{FF2B5EF4-FFF2-40B4-BE49-F238E27FC236}">
+                <a16:creationId xmlns:a16="http://schemas.microsoft.com/office/drawing/2014/main" id="{AC1BA873-815F-4E72-9BD9-93769C1DA7C7}"/>
+              </a:ext>
+            </a:extLst>
+          </p:cNvPr>
+          <p:cNvSpPr>
+            <a:spLocks noGrp="1"/>
+          </p:cNvSpPr>
+          <p:nvPr>
+            <p:ph type="pic" sz="quarter" idx="10"/>
+          </p:nvPr>
+        </p:nvSpPr>
+        <p:spPr/>
+      </p:sp>
+      <p:sp>
+        <p:nvSpPr>
+          <p:cNvPr id="2" name="Title 1">
+            <a:extLst>
+              <a:ext uri="{FF2B5EF4-FFF2-40B4-BE49-F238E27FC236}">
+                <a16:creationId xmlns:a16="http://schemas.microsoft.com/office/drawing/2014/main" id="{B2A8B21D-766A-4354-B054-43C814C7440B}"/>
+              </a:ext>
+            </a:extLst>
+          </p:cNvPr>
+          <p:cNvSpPr>
+            <a:spLocks noGrp="1"/>
+          </p:cNvSpPr>
+          <p:nvPr>
+            <p:ph type="title" idx="4294967295"/>
+          </p:nvPr>
+        </p:nvSpPr>
+        <p:spPr>
+          <a:xfrm>
+            <a:off x="0" y="1709738"/>
+            <a:ext cx="10515600" cy="2852737"/>
+          </a:xfrm>
+        </p:spPr>
+        <p:txBody>
+          <a:bodyPr/>
+          <a:lstStyle/>
+          <a:p>
+            <a:r>
+              <a:rPr lang="en-US" dirty="0"/>
+              <a:t>Lesson 8</a:t>
+            </a:r>
+          </a:p>
+        </p:txBody>
+      </p:sp>
+      <p:sp>
+        <p:nvSpPr>
+          <p:cNvPr id="3" name="Text Placeholder 2">
+            <a:extLst>
+              <a:ext uri="{FF2B5EF4-FFF2-40B4-BE49-F238E27FC236}">
+                <a16:creationId xmlns:a16="http://schemas.microsoft.com/office/drawing/2014/main" id="{551AA14F-63AB-40DA-A2E5-77B9ECBA8D3C}"/>
+              </a:ext>
+            </a:extLst>
+          </p:cNvPr>
+          <p:cNvSpPr>
+            <a:spLocks noGrp="1"/>
+          </p:cNvSpPr>
+          <p:nvPr>
+            <p:ph type="body" idx="4294967295"/>
+          </p:nvPr>
+        </p:nvSpPr>
+        <p:spPr>
+          <a:xfrm>
+            <a:off x="0" y="4589463"/>
+            <a:ext cx="7014368" cy="1500187"/>
+          </a:xfrm>
+        </p:spPr>
+        <p:txBody>
+          <a:bodyPr>
+            <a:normAutofit/>
+          </a:bodyPr>
+          <a:lstStyle/>
+          <a:p>
+            <a:pPr marL="0" indent="0">
+              <a:buNone/>
+            </a:pPr>
+            <a:r>
+              <a:rPr lang="en-US" dirty="0"/>
+              <a:t>Enumerations and Structures</a:t>
+            </a:r>
+          </a:p>
+        </p:txBody>
+      </p:sp>
+    </p:spTree>
+    <p:extLst>
+      <p:ext uri="{BB962C8B-B14F-4D97-AF65-F5344CB8AC3E}">
+        <p14:creationId xmlns:p14="http://schemas.microsoft.com/office/powerpoint/2010/main" val="2122467810"/>
+      </p:ext>
+    </p:extLst>
+  </p:cSld>
+  <p:clrMapOvr>
+    <a:masterClrMapping/>
+  </p:clrMapOvr>
+  <mc:AlternateContent xmlns:mc="http://schemas.openxmlformats.org/markup-compatibility/2006" xmlns:p14="http://schemas.microsoft.com/office/powerpoint/2010/main">
+    <mc:Choice Requires="p14">
+      <p:transition spd="slow" p14:dur="1250" advTm="2000">
+        <p14:flip dir="r"/>
+      </p:transition>
+    </mc:Choice>
+    <mc:Fallback xmlns="">
+      <p:transition spd="slow" advTm="2000">
+        <p:fade/>
+      </p:transition>
+    </mc:Fallback>
+  </mc:AlternateContent>
+</p:sld>
+</file>
+
+<file path=ppt/slides/slide11.xml><?xml version="1.0" encoding="utf-8"?>
+<p:sld xmlns:a="http://schemas.openxmlformats.org/drawingml/2006/main" xmlns:r="http://schemas.openxmlformats.org/officeDocument/2006/relationships" xmlns:p="http://schemas.openxmlformats.org/presentationml/2006/main">
+  <p:cSld>
+    <p:spTree>
+      <p:nvGrpSpPr>
+        <p:cNvPr id="1" name=""/>
+        <p:cNvGrpSpPr/>
+        <p:nvPr/>
+      </p:nvGrpSpPr>
+      <p:grpSpPr>
+        <a:xfrm>
+          <a:off x="0" y="0"/>
+          <a:ext cx="0" cy="0"/>
+          <a:chOff x="0" y="0"/>
+          <a:chExt cx="0" cy="0"/>
+        </a:xfrm>
+      </p:grpSpPr>
+      <p:sp>
+        <p:nvSpPr>
+          <p:cNvPr id="7" name="Picture Placeholder 6">
+            <a:extLst>
+              <a:ext uri="{FF2B5EF4-FFF2-40B4-BE49-F238E27FC236}">
+                <a16:creationId xmlns:a16="http://schemas.microsoft.com/office/drawing/2014/main" id="{AC1BA873-815F-4E72-9BD9-93769C1DA7C7}"/>
+              </a:ext>
+            </a:extLst>
+          </p:cNvPr>
+          <p:cNvSpPr>
+            <a:spLocks noGrp="1"/>
+          </p:cNvSpPr>
+          <p:nvPr>
+            <p:ph type="pic" sz="quarter" idx="10"/>
+          </p:nvPr>
+        </p:nvSpPr>
+        <p:spPr/>
+      </p:sp>
+      <p:sp>
+        <p:nvSpPr>
+          <p:cNvPr id="2" name="Title 1">
+            <a:extLst>
+              <a:ext uri="{FF2B5EF4-FFF2-40B4-BE49-F238E27FC236}">
+                <a16:creationId xmlns:a16="http://schemas.microsoft.com/office/drawing/2014/main" id="{B2A8B21D-766A-4354-B054-43C814C7440B}"/>
+              </a:ext>
+            </a:extLst>
+          </p:cNvPr>
+          <p:cNvSpPr>
+            <a:spLocks noGrp="1"/>
+          </p:cNvSpPr>
+          <p:nvPr>
+            <p:ph type="title" idx="4294967295"/>
+          </p:nvPr>
+        </p:nvSpPr>
+        <p:spPr>
+          <a:xfrm>
+            <a:off x="0" y="1709738"/>
+            <a:ext cx="10515600" cy="2852737"/>
+          </a:xfrm>
+        </p:spPr>
+        <p:txBody>
+          <a:bodyPr/>
+          <a:lstStyle/>
+          <a:p>
+            <a:r>
+              <a:rPr lang="en-US" dirty="0"/>
+              <a:t>Lesson 9</a:t>
+            </a:r>
+          </a:p>
+        </p:txBody>
+      </p:sp>
+      <p:sp>
+        <p:nvSpPr>
+          <p:cNvPr id="3" name="Text Placeholder 2">
+            <a:extLst>
+              <a:ext uri="{FF2B5EF4-FFF2-40B4-BE49-F238E27FC236}">
+                <a16:creationId xmlns:a16="http://schemas.microsoft.com/office/drawing/2014/main" id="{551AA14F-63AB-40DA-A2E5-77B9ECBA8D3C}"/>
+              </a:ext>
+            </a:extLst>
+          </p:cNvPr>
+          <p:cNvSpPr>
+            <a:spLocks noGrp="1"/>
+          </p:cNvSpPr>
+          <p:nvPr>
+            <p:ph type="body" idx="4294967295"/>
+          </p:nvPr>
+        </p:nvSpPr>
+        <p:spPr>
+          <a:xfrm>
+            <a:off x="0" y="4589463"/>
+            <a:ext cx="7014368" cy="1500187"/>
+          </a:xfrm>
+        </p:spPr>
+        <p:txBody>
+          <a:bodyPr>
+            <a:normAutofit/>
+          </a:bodyPr>
+          <a:lstStyle/>
+          <a:p>
+            <a:pPr marL="0" indent="0">
+              <a:buNone/>
+            </a:pPr>
+            <a:r>
+              <a:rPr lang="en-US" dirty="0"/>
+              <a:t>Making Choices</a:t>
+            </a:r>
+          </a:p>
+        </p:txBody>
+      </p:sp>
+    </p:spTree>
+    <p:extLst>
+      <p:ext uri="{BB962C8B-B14F-4D97-AF65-F5344CB8AC3E}">
+        <p14:creationId xmlns:p14="http://schemas.microsoft.com/office/powerpoint/2010/main" val="2722297980"/>
+      </p:ext>
+    </p:extLst>
+  </p:cSld>
+  <p:clrMapOvr>
+    <a:masterClrMapping/>
+  </p:clrMapOvr>
+  <mc:AlternateContent xmlns:mc="http://schemas.openxmlformats.org/markup-compatibility/2006" xmlns:p14="http://schemas.microsoft.com/office/powerpoint/2010/main">
+    <mc:Choice Requires="p14">
+      <p:transition spd="slow" p14:dur="1250" advTm="2000">
+        <p14:flip dir="r"/>
+      </p:transition>
+    </mc:Choice>
+    <mc:Fallback xmlns="">
+      <p:transition spd="slow" advTm="2000">
+        <p:fade/>
+      </p:transition>
+    </mc:Fallback>
+  </mc:AlternateContent>
+</p:sld>
+</file>
+
+<file path=ppt/slides/slide12.xml><?xml version="1.0" encoding="utf-8"?>
+<p:sld xmlns:a="http://schemas.openxmlformats.org/drawingml/2006/main" xmlns:r="http://schemas.openxmlformats.org/officeDocument/2006/relationships" xmlns:p="http://schemas.openxmlformats.org/presentationml/2006/main">
+  <p:cSld>
+    <p:spTree>
+      <p:nvGrpSpPr>
+        <p:cNvPr id="1" name=""/>
+        <p:cNvGrpSpPr/>
+        <p:nvPr/>
+      </p:nvGrpSpPr>
+      <p:grpSpPr>
+        <a:xfrm>
+          <a:off x="0" y="0"/>
+          <a:ext cx="0" cy="0"/>
+          <a:chOff x="0" y="0"/>
+          <a:chExt cx="0" cy="0"/>
+        </a:xfrm>
+      </p:grpSpPr>
+      <p:sp>
+        <p:nvSpPr>
+          <p:cNvPr id="7" name="Picture Placeholder 6">
+            <a:extLst>
+              <a:ext uri="{FF2B5EF4-FFF2-40B4-BE49-F238E27FC236}">
+                <a16:creationId xmlns:a16="http://schemas.microsoft.com/office/drawing/2014/main" id="{AC1BA873-815F-4E72-9BD9-93769C1DA7C7}"/>
+              </a:ext>
+            </a:extLst>
+          </p:cNvPr>
+          <p:cNvSpPr>
+            <a:spLocks noGrp="1"/>
+          </p:cNvSpPr>
+          <p:nvPr>
+            <p:ph type="pic" sz="quarter" idx="10"/>
+          </p:nvPr>
+        </p:nvSpPr>
+        <p:spPr/>
+      </p:sp>
+      <p:sp>
+        <p:nvSpPr>
+          <p:cNvPr id="2" name="Title 1">
+            <a:extLst>
+              <a:ext uri="{FF2B5EF4-FFF2-40B4-BE49-F238E27FC236}">
+                <a16:creationId xmlns:a16="http://schemas.microsoft.com/office/drawing/2014/main" id="{B2A8B21D-766A-4354-B054-43C814C7440B}"/>
+              </a:ext>
+            </a:extLst>
+          </p:cNvPr>
+          <p:cNvSpPr>
+            <a:spLocks noGrp="1"/>
+          </p:cNvSpPr>
+          <p:nvPr>
+            <p:ph type="title" idx="4294967295"/>
+          </p:nvPr>
+        </p:nvSpPr>
+        <p:spPr>
+          <a:xfrm>
+            <a:off x="0" y="1709738"/>
+            <a:ext cx="10515600" cy="2852737"/>
+          </a:xfrm>
+        </p:spPr>
+        <p:txBody>
+          <a:bodyPr/>
+          <a:lstStyle/>
+          <a:p>
+            <a:r>
+              <a:rPr lang="en-US" dirty="0"/>
+              <a:t>Lesson 10</a:t>
+            </a:r>
+          </a:p>
+        </p:txBody>
+      </p:sp>
+      <p:sp>
+        <p:nvSpPr>
+          <p:cNvPr id="3" name="Text Placeholder 2">
+            <a:extLst>
+              <a:ext uri="{FF2B5EF4-FFF2-40B4-BE49-F238E27FC236}">
+                <a16:creationId xmlns:a16="http://schemas.microsoft.com/office/drawing/2014/main" id="{551AA14F-63AB-40DA-A2E5-77B9ECBA8D3C}"/>
+              </a:ext>
+            </a:extLst>
+          </p:cNvPr>
+          <p:cNvSpPr>
+            <a:spLocks noGrp="1"/>
+          </p:cNvSpPr>
+          <p:nvPr>
+            <p:ph type="body" idx="4294967295"/>
+          </p:nvPr>
+        </p:nvSpPr>
+        <p:spPr>
+          <a:xfrm>
+            <a:off x="0" y="4589463"/>
+            <a:ext cx="7014368" cy="1500187"/>
+          </a:xfrm>
+        </p:spPr>
+        <p:txBody>
+          <a:bodyPr>
+            <a:normAutofit/>
+          </a:bodyPr>
+          <a:lstStyle/>
+          <a:p>
+            <a:pPr marL="0" indent="0">
+              <a:buNone/>
+            </a:pPr>
+            <a:r>
+              <a:rPr lang="en-US" dirty="0"/>
+              <a:t>Repeating Program Steps</a:t>
+            </a:r>
+          </a:p>
+        </p:txBody>
+      </p:sp>
+    </p:spTree>
+    <p:extLst>
+      <p:ext uri="{BB962C8B-B14F-4D97-AF65-F5344CB8AC3E}">
+        <p14:creationId xmlns:p14="http://schemas.microsoft.com/office/powerpoint/2010/main" val="2385190478"/>
+      </p:ext>
+    </p:extLst>
+  </p:cSld>
+  <p:clrMapOvr>
+    <a:masterClrMapping/>
+  </p:clrMapOvr>
+  <mc:AlternateContent xmlns:mc="http://schemas.openxmlformats.org/markup-compatibility/2006" xmlns:p14="http://schemas.microsoft.com/office/powerpoint/2010/main">
+    <mc:Choice Requires="p14">
+      <p:transition spd="slow" p14:dur="1250" advTm="2000">
+        <p14:flip dir="r"/>
+      </p:transition>
+    </mc:Choice>
+    <mc:Fallback xmlns="">
+      <p:transition spd="slow" advTm="2000">
+        <p:fade/>
+      </p:transition>
+    </mc:Fallback>
+  </mc:AlternateContent>
+</p:sld>
+</file>
+
+<file path=ppt/slides/slide13.xml><?xml version="1.0" encoding="utf-8"?>
+<p:sld xmlns:a="http://schemas.openxmlformats.org/drawingml/2006/main" xmlns:r="http://schemas.openxmlformats.org/officeDocument/2006/relationships" xmlns:p="http://schemas.openxmlformats.org/presentationml/2006/main">
+  <p:cSld>
+    <p:spTree>
+      <p:nvGrpSpPr>
+        <p:cNvPr id="1" name=""/>
+        <p:cNvGrpSpPr/>
+        <p:nvPr/>
+      </p:nvGrpSpPr>
+      <p:grpSpPr>
+        <a:xfrm>
+          <a:off x="0" y="0"/>
+          <a:ext cx="0" cy="0"/>
+          <a:chOff x="0" y="0"/>
+          <a:chExt cx="0" cy="0"/>
+        </a:xfrm>
+      </p:grpSpPr>
+      <p:sp>
+        <p:nvSpPr>
+          <p:cNvPr id="7" name="Picture Placeholder 6">
+            <a:extLst>
+              <a:ext uri="{FF2B5EF4-FFF2-40B4-BE49-F238E27FC236}">
+                <a16:creationId xmlns:a16="http://schemas.microsoft.com/office/drawing/2014/main" id="{AC1BA873-815F-4E72-9BD9-93769C1DA7C7}"/>
+              </a:ext>
+            </a:extLst>
+          </p:cNvPr>
+          <p:cNvSpPr>
+            <a:spLocks noGrp="1"/>
+          </p:cNvSpPr>
+          <p:nvPr>
+            <p:ph type="pic" sz="quarter" idx="10"/>
+          </p:nvPr>
+        </p:nvSpPr>
+        <p:spPr/>
+      </p:sp>
+      <p:sp>
+        <p:nvSpPr>
+          <p:cNvPr id="2" name="Title 1">
+            <a:extLst>
+              <a:ext uri="{FF2B5EF4-FFF2-40B4-BE49-F238E27FC236}">
+                <a16:creationId xmlns:a16="http://schemas.microsoft.com/office/drawing/2014/main" id="{B2A8B21D-766A-4354-B054-43C814C7440B}"/>
+              </a:ext>
+            </a:extLst>
+          </p:cNvPr>
+          <p:cNvSpPr>
+            <a:spLocks noGrp="1"/>
+          </p:cNvSpPr>
+          <p:nvPr>
+            <p:ph type="title" idx="4294967295"/>
+          </p:nvPr>
+        </p:nvSpPr>
+        <p:spPr>
+          <a:xfrm>
+            <a:off x="0" y="1709738"/>
+            <a:ext cx="10515600" cy="2852737"/>
+          </a:xfrm>
+        </p:spPr>
+        <p:txBody>
+          <a:bodyPr/>
+          <a:lstStyle/>
+          <a:p>
+            <a:r>
+              <a:rPr lang="en-US" dirty="0"/>
+              <a:t>Lesson 11</a:t>
+            </a:r>
+          </a:p>
+        </p:txBody>
+      </p:sp>
+      <p:sp>
+        <p:nvSpPr>
+          <p:cNvPr id="3" name="Text Placeholder 2">
+            <a:extLst>
+              <a:ext uri="{FF2B5EF4-FFF2-40B4-BE49-F238E27FC236}">
+                <a16:creationId xmlns:a16="http://schemas.microsoft.com/office/drawing/2014/main" id="{551AA14F-63AB-40DA-A2E5-77B9ECBA8D3C}"/>
+              </a:ext>
+            </a:extLst>
+          </p:cNvPr>
+          <p:cNvSpPr>
+            <a:spLocks noGrp="1"/>
+          </p:cNvSpPr>
+          <p:nvPr>
+            <p:ph type="body" idx="4294967295"/>
+          </p:nvPr>
+        </p:nvSpPr>
+        <p:spPr>
+          <a:xfrm>
+            <a:off x="0" y="4589463"/>
+            <a:ext cx="7014368" cy="1500187"/>
+          </a:xfrm>
+        </p:spPr>
+        <p:txBody>
+          <a:bodyPr>
+            <a:normAutofit/>
+          </a:bodyPr>
+          <a:lstStyle/>
+          <a:p>
+            <a:pPr marL="0" indent="0">
+              <a:buNone/>
+            </a:pPr>
+            <a:r>
+              <a:rPr lang="en-US" dirty="0"/>
+              <a:t>Reusing Code with Methods</a:t>
+            </a:r>
+          </a:p>
+        </p:txBody>
+      </p:sp>
+    </p:spTree>
+    <p:extLst>
+      <p:ext uri="{BB962C8B-B14F-4D97-AF65-F5344CB8AC3E}">
+        <p14:creationId xmlns:p14="http://schemas.microsoft.com/office/powerpoint/2010/main" val="1420352367"/>
+      </p:ext>
+    </p:extLst>
+  </p:cSld>
+  <p:clrMapOvr>
+    <a:masterClrMapping/>
+  </p:clrMapOvr>
+  <mc:AlternateContent xmlns:mc="http://schemas.openxmlformats.org/markup-compatibility/2006" xmlns:p14="http://schemas.microsoft.com/office/powerpoint/2010/main">
+    <mc:Choice Requires="p14">
+      <p:transition spd="slow" p14:dur="1250" advTm="2000">
+        <p14:flip dir="r"/>
+      </p:transition>
+    </mc:Choice>
+    <mc:Fallback xmlns="">
+      <p:transition spd="slow" advTm="2000">
+        <p:fade/>
+      </p:transition>
+    </mc:Fallback>
+  </mc:AlternateContent>
+</p:sld>
+</file>
+
+<file path=ppt/slides/slide14.xml><?xml version="1.0" encoding="utf-8"?>
+<p:sld xmlns:a="http://schemas.openxmlformats.org/drawingml/2006/main" xmlns:r="http://schemas.openxmlformats.org/officeDocument/2006/relationships" xmlns:p="http://schemas.openxmlformats.org/presentationml/2006/main">
+  <p:cSld>
+    <p:spTree>
+      <p:nvGrpSpPr>
+        <p:cNvPr id="1" name=""/>
+        <p:cNvGrpSpPr/>
+        <p:nvPr/>
+      </p:nvGrpSpPr>
+      <p:grpSpPr>
+        <a:xfrm>
+          <a:off x="0" y="0"/>
+          <a:ext cx="0" cy="0"/>
+          <a:chOff x="0" y="0"/>
+          <a:chExt cx="0" cy="0"/>
+        </a:xfrm>
+      </p:grpSpPr>
+      <p:sp>
+        <p:nvSpPr>
+          <p:cNvPr id="7" name="Picture Placeholder 6">
+            <a:extLst>
+              <a:ext uri="{FF2B5EF4-FFF2-40B4-BE49-F238E27FC236}">
+                <a16:creationId xmlns:a16="http://schemas.microsoft.com/office/drawing/2014/main" id="{AC1BA873-815F-4E72-9BD9-93769C1DA7C7}"/>
+              </a:ext>
+            </a:extLst>
+          </p:cNvPr>
+          <p:cNvSpPr>
+            <a:spLocks noGrp="1"/>
+          </p:cNvSpPr>
+          <p:nvPr>
+            <p:ph type="pic" sz="quarter" idx="10"/>
+          </p:nvPr>
+        </p:nvSpPr>
+        <p:spPr/>
+      </p:sp>
+      <p:sp>
+        <p:nvSpPr>
+          <p:cNvPr id="2" name="Title 1">
+            <a:extLst>
+              <a:ext uri="{FF2B5EF4-FFF2-40B4-BE49-F238E27FC236}">
+                <a16:creationId xmlns:a16="http://schemas.microsoft.com/office/drawing/2014/main" id="{B2A8B21D-766A-4354-B054-43C814C7440B}"/>
+              </a:ext>
+            </a:extLst>
+          </p:cNvPr>
+          <p:cNvSpPr>
+            <a:spLocks noGrp="1"/>
+          </p:cNvSpPr>
+          <p:nvPr>
+            <p:ph type="title" idx="4294967295"/>
+          </p:nvPr>
+        </p:nvSpPr>
+        <p:spPr>
+          <a:xfrm>
+            <a:off x="0" y="1709738"/>
+            <a:ext cx="10515600" cy="2852737"/>
+          </a:xfrm>
+        </p:spPr>
+        <p:txBody>
+          <a:bodyPr/>
+          <a:lstStyle/>
+          <a:p>
+            <a:r>
+              <a:rPr lang="en-US" dirty="0"/>
+              <a:t>Lesson 12</a:t>
+            </a:r>
+          </a:p>
+        </p:txBody>
+      </p:sp>
+      <p:sp>
+        <p:nvSpPr>
+          <p:cNvPr id="3" name="Text Placeholder 2">
+            <a:extLst>
+              <a:ext uri="{FF2B5EF4-FFF2-40B4-BE49-F238E27FC236}">
+                <a16:creationId xmlns:a16="http://schemas.microsoft.com/office/drawing/2014/main" id="{551AA14F-63AB-40DA-A2E5-77B9ECBA8D3C}"/>
+              </a:ext>
+            </a:extLst>
+          </p:cNvPr>
+          <p:cNvSpPr>
+            <a:spLocks noGrp="1"/>
+          </p:cNvSpPr>
+          <p:nvPr>
+            <p:ph type="body" idx="4294967295"/>
+          </p:nvPr>
+        </p:nvSpPr>
+        <p:spPr>
+          <a:xfrm>
+            <a:off x="0" y="4589463"/>
+            <a:ext cx="7014368" cy="1500187"/>
+          </a:xfrm>
+        </p:spPr>
+        <p:txBody>
+          <a:bodyPr>
+            <a:normAutofit/>
+          </a:bodyPr>
+          <a:lstStyle/>
+          <a:p>
+            <a:pPr marL="0" indent="0">
+              <a:buNone/>
+            </a:pPr>
+            <a:r>
+              <a:rPr lang="en-US" dirty="0"/>
+              <a:t>Handling Errors</a:t>
+            </a:r>
+          </a:p>
+        </p:txBody>
+      </p:sp>
+    </p:spTree>
+    <p:extLst>
+      <p:ext uri="{BB962C8B-B14F-4D97-AF65-F5344CB8AC3E}">
+        <p14:creationId xmlns:p14="http://schemas.microsoft.com/office/powerpoint/2010/main" val="837109256"/>
+      </p:ext>
+    </p:extLst>
+  </p:cSld>
+  <p:clrMapOvr>
+    <a:masterClrMapping/>
+  </p:clrMapOvr>
+  <mc:AlternateContent xmlns:mc="http://schemas.openxmlformats.org/markup-compatibility/2006" xmlns:p14="http://schemas.microsoft.com/office/powerpoint/2010/main">
+    <mc:Choice Requires="p14">
+      <p:transition spd="slow" p14:dur="1250" advTm="2000">
+        <p14:flip dir="r"/>
+      </p:transition>
+    </mc:Choice>
+    <mc:Fallback xmlns="">
+      <p:transition spd="slow" advTm="2000">
+        <p:fade/>
+      </p:transition>
+    </mc:Fallback>
+  </mc:AlternateContent>
+</p:sld>
+</file>
+
+<file path=ppt/slides/slide15.xml><?xml version="1.0" encoding="utf-8"?>
+<p:sld xmlns:a="http://schemas.openxmlformats.org/drawingml/2006/main" xmlns:r="http://schemas.openxmlformats.org/officeDocument/2006/relationships" xmlns:p="http://schemas.openxmlformats.org/presentationml/2006/main">
+  <p:cSld>
+    <p:spTree>
+      <p:nvGrpSpPr>
+        <p:cNvPr id="1" name=""/>
+        <p:cNvGrpSpPr/>
+        <p:nvPr/>
+      </p:nvGrpSpPr>
+      <p:grpSpPr>
+        <a:xfrm>
+          <a:off x="0" y="0"/>
+          <a:ext cx="0" cy="0"/>
+          <a:chOff x="0" y="0"/>
+          <a:chExt cx="0" cy="0"/>
+        </a:xfrm>
+      </p:grpSpPr>
+      <p:sp>
+        <p:nvSpPr>
+          <p:cNvPr id="7" name="Picture Placeholder 6">
+            <a:extLst>
+              <a:ext uri="{FF2B5EF4-FFF2-40B4-BE49-F238E27FC236}">
+                <a16:creationId xmlns:a16="http://schemas.microsoft.com/office/drawing/2014/main" id="{AC1BA873-815F-4E72-9BD9-93769C1DA7C7}"/>
+              </a:ext>
+            </a:extLst>
+          </p:cNvPr>
+          <p:cNvSpPr>
+            <a:spLocks noGrp="1"/>
+          </p:cNvSpPr>
+          <p:nvPr>
+            <p:ph type="pic" sz="quarter" idx="10"/>
+          </p:nvPr>
+        </p:nvSpPr>
+        <p:spPr/>
+      </p:sp>
+      <p:sp>
+        <p:nvSpPr>
+          <p:cNvPr id="2" name="Title 1">
+            <a:extLst>
+              <a:ext uri="{FF2B5EF4-FFF2-40B4-BE49-F238E27FC236}">
+                <a16:creationId xmlns:a16="http://schemas.microsoft.com/office/drawing/2014/main" id="{B2A8B21D-766A-4354-B054-43C814C7440B}"/>
+              </a:ext>
+            </a:extLst>
+          </p:cNvPr>
+          <p:cNvSpPr>
+            <a:spLocks noGrp="1"/>
+          </p:cNvSpPr>
+          <p:nvPr>
+            <p:ph type="title" idx="4294967295"/>
+          </p:nvPr>
+        </p:nvSpPr>
+        <p:spPr>
+          <a:xfrm>
+            <a:off x="0" y="1709738"/>
+            <a:ext cx="10515600" cy="2852737"/>
+          </a:xfrm>
+        </p:spPr>
+        <p:txBody>
+          <a:bodyPr/>
+          <a:lstStyle/>
+          <a:p>
+            <a:r>
+              <a:rPr lang="en-US" dirty="0"/>
+              <a:t>Lesson 13</a:t>
+            </a:r>
+          </a:p>
+        </p:txBody>
+      </p:sp>
+      <p:sp>
+        <p:nvSpPr>
+          <p:cNvPr id="3" name="Text Placeholder 2">
+            <a:extLst>
+              <a:ext uri="{FF2B5EF4-FFF2-40B4-BE49-F238E27FC236}">
+                <a16:creationId xmlns:a16="http://schemas.microsoft.com/office/drawing/2014/main" id="{551AA14F-63AB-40DA-A2E5-77B9ECBA8D3C}"/>
+              </a:ext>
+            </a:extLst>
+          </p:cNvPr>
+          <p:cNvSpPr>
+            <a:spLocks noGrp="1"/>
+          </p:cNvSpPr>
+          <p:nvPr>
+            <p:ph type="body" idx="4294967295"/>
+          </p:nvPr>
+        </p:nvSpPr>
+        <p:spPr>
+          <a:xfrm>
+            <a:off x="0" y="4589463"/>
+            <a:ext cx="7014368" cy="1500187"/>
+          </a:xfrm>
+        </p:spPr>
+        <p:txBody>
+          <a:bodyPr>
+            <a:normAutofit/>
+          </a:bodyPr>
+          <a:lstStyle/>
+          <a:p>
+            <a:pPr marL="0" indent="0">
+              <a:buNone/>
+            </a:pPr>
+            <a:r>
+              <a:rPr lang="en-US" dirty="0"/>
+              <a:t>Preventing Bugs</a:t>
+            </a:r>
+          </a:p>
+        </p:txBody>
+      </p:sp>
+    </p:spTree>
+    <p:extLst>
+      <p:ext uri="{BB962C8B-B14F-4D97-AF65-F5344CB8AC3E}">
+        <p14:creationId xmlns:p14="http://schemas.microsoft.com/office/powerpoint/2010/main" val="479623129"/>
+      </p:ext>
+    </p:extLst>
+  </p:cSld>
+  <p:clrMapOvr>
+    <a:masterClrMapping/>
+  </p:clrMapOvr>
+  <mc:AlternateContent xmlns:mc="http://schemas.openxmlformats.org/markup-compatibility/2006" xmlns:p14="http://schemas.microsoft.com/office/powerpoint/2010/main">
+    <mc:Choice Requires="p14">
+      <p:transition spd="slow" p14:dur="1250" advTm="2000">
+        <p14:flip dir="r"/>
+      </p:transition>
+    </mc:Choice>
+    <mc:Fallback xmlns="">
+      <p:transition spd="slow" advTm="2000">
+        <p:fade/>
+      </p:transition>
+    </mc:Fallback>
+  </mc:AlternateContent>
+</p:sld>
+</file>
+
+<file path=ppt/slides/slide16.xml><?xml version="1.0" encoding="utf-8"?>
+<p:sld xmlns:a="http://schemas.openxmlformats.org/drawingml/2006/main" xmlns:r="http://schemas.openxmlformats.org/officeDocument/2006/relationships" xmlns:p="http://schemas.openxmlformats.org/presentationml/2006/main">
+  <p:cSld>
+    <p:spTree>
+      <p:nvGrpSpPr>
+        <p:cNvPr id="1" name=""/>
+        <p:cNvGrpSpPr/>
+        <p:nvPr/>
+      </p:nvGrpSpPr>
+      <p:grpSpPr>
+        <a:xfrm>
+          <a:off x="0" y="0"/>
+          <a:ext cx="0" cy="0"/>
+          <a:chOff x="0" y="0"/>
+          <a:chExt cx="0" cy="0"/>
+        </a:xfrm>
+      </p:grpSpPr>
+      <p:sp>
+        <p:nvSpPr>
+          <p:cNvPr id="7" name="Picture Placeholder 6">
+            <a:extLst>
+              <a:ext uri="{FF2B5EF4-FFF2-40B4-BE49-F238E27FC236}">
+                <a16:creationId xmlns:a16="http://schemas.microsoft.com/office/drawing/2014/main" id="{AC1BA873-815F-4E72-9BD9-93769C1DA7C7}"/>
+              </a:ext>
+            </a:extLst>
+          </p:cNvPr>
+          <p:cNvSpPr>
+            <a:spLocks noGrp="1"/>
+          </p:cNvSpPr>
+          <p:nvPr>
+            <p:ph type="pic" sz="quarter" idx="10"/>
+          </p:nvPr>
+        </p:nvSpPr>
+        <p:spPr/>
+      </p:sp>
+      <p:sp>
+        <p:nvSpPr>
+          <p:cNvPr id="2" name="Title 1">
+            <a:extLst>
+              <a:ext uri="{FF2B5EF4-FFF2-40B4-BE49-F238E27FC236}">
+                <a16:creationId xmlns:a16="http://schemas.microsoft.com/office/drawing/2014/main" id="{B2A8B21D-766A-4354-B054-43C814C7440B}"/>
+              </a:ext>
+            </a:extLst>
+          </p:cNvPr>
+          <p:cNvSpPr>
+            <a:spLocks noGrp="1"/>
+          </p:cNvSpPr>
+          <p:nvPr>
+            <p:ph type="title" idx="4294967295"/>
+          </p:nvPr>
+        </p:nvSpPr>
+        <p:spPr>
+          <a:xfrm>
+            <a:off x="0" y="1709738"/>
+            <a:ext cx="10515600" cy="2852737"/>
+          </a:xfrm>
+        </p:spPr>
+        <p:txBody>
+          <a:bodyPr/>
+          <a:lstStyle/>
+          <a:p>
+            <a:r>
+              <a:rPr lang="en-US" dirty="0"/>
+              <a:t>Lesson 14</a:t>
+            </a:r>
+          </a:p>
+        </p:txBody>
+      </p:sp>
+      <p:sp>
+        <p:nvSpPr>
+          <p:cNvPr id="3" name="Text Placeholder 2">
+            <a:extLst>
+              <a:ext uri="{FF2B5EF4-FFF2-40B4-BE49-F238E27FC236}">
+                <a16:creationId xmlns:a16="http://schemas.microsoft.com/office/drawing/2014/main" id="{551AA14F-63AB-40DA-A2E5-77B9ECBA8D3C}"/>
+              </a:ext>
+            </a:extLst>
+          </p:cNvPr>
+          <p:cNvSpPr>
+            <a:spLocks noGrp="1"/>
+          </p:cNvSpPr>
+          <p:nvPr>
+            <p:ph type="body" idx="4294967295"/>
+          </p:nvPr>
+        </p:nvSpPr>
+        <p:spPr>
+          <a:xfrm>
+            <a:off x="0" y="4589463"/>
+            <a:ext cx="7014368" cy="1500187"/>
+          </a:xfrm>
+        </p:spPr>
+        <p:txBody>
+          <a:bodyPr>
+            <a:normAutofit/>
+          </a:bodyPr>
+          <a:lstStyle/>
+          <a:p>
+            <a:pPr marL="0" indent="0">
+              <a:buNone/>
+            </a:pPr>
+            <a:r>
+              <a:rPr lang="en-US" dirty="0"/>
+              <a:t>Defining Classes</a:t>
+            </a:r>
+          </a:p>
+        </p:txBody>
+      </p:sp>
+    </p:spTree>
+    <p:extLst>
+      <p:ext uri="{BB962C8B-B14F-4D97-AF65-F5344CB8AC3E}">
+        <p14:creationId xmlns:p14="http://schemas.microsoft.com/office/powerpoint/2010/main" val="187124869"/>
+      </p:ext>
+    </p:extLst>
+  </p:cSld>
+  <p:clrMapOvr>
+    <a:masterClrMapping/>
+  </p:clrMapOvr>
+  <mc:AlternateContent xmlns:mc="http://schemas.openxmlformats.org/markup-compatibility/2006" xmlns:p14="http://schemas.microsoft.com/office/powerpoint/2010/main">
+    <mc:Choice Requires="p14">
+      <p:transition spd="slow" p14:dur="1250" advTm="2000">
+        <p14:flip dir="r"/>
+      </p:transition>
+    </mc:Choice>
+    <mc:Fallback xmlns="">
+      <p:transition spd="slow" advTm="2000">
+        <p:fade/>
+      </p:transition>
+    </mc:Fallback>
+  </mc:AlternateContent>
+</p:sld>
+</file>
+
+<file path=ppt/slides/slide17.xml><?xml version="1.0" encoding="utf-8"?>
+<p:sld xmlns:a="http://schemas.openxmlformats.org/drawingml/2006/main" xmlns:r="http://schemas.openxmlformats.org/officeDocument/2006/relationships" xmlns:p="http://schemas.openxmlformats.org/presentationml/2006/main">
+  <p:cSld>
+    <p:spTree>
+      <p:nvGrpSpPr>
+        <p:cNvPr id="1" name=""/>
+        <p:cNvGrpSpPr/>
+        <p:nvPr/>
+      </p:nvGrpSpPr>
+      <p:grpSpPr>
+        <a:xfrm>
+          <a:off x="0" y="0"/>
+          <a:ext cx="0" cy="0"/>
+          <a:chOff x="0" y="0"/>
+          <a:chExt cx="0" cy="0"/>
+        </a:xfrm>
+      </p:grpSpPr>
+      <p:sp>
+        <p:nvSpPr>
+          <p:cNvPr id="7" name="Picture Placeholder 6">
+            <a:extLst>
+              <a:ext uri="{FF2B5EF4-FFF2-40B4-BE49-F238E27FC236}">
+                <a16:creationId xmlns:a16="http://schemas.microsoft.com/office/drawing/2014/main" id="{AC1BA873-815F-4E72-9BD9-93769C1DA7C7}"/>
+              </a:ext>
+            </a:extLst>
+          </p:cNvPr>
+          <p:cNvSpPr>
+            <a:spLocks noGrp="1"/>
+          </p:cNvSpPr>
+          <p:nvPr>
+            <p:ph type="pic" sz="quarter" idx="10"/>
+          </p:nvPr>
+        </p:nvSpPr>
+        <p:spPr/>
+      </p:sp>
+      <p:sp>
+        <p:nvSpPr>
+          <p:cNvPr id="2" name="Title 1">
+            <a:extLst>
+              <a:ext uri="{FF2B5EF4-FFF2-40B4-BE49-F238E27FC236}">
+                <a16:creationId xmlns:a16="http://schemas.microsoft.com/office/drawing/2014/main" id="{B2A8B21D-766A-4354-B054-43C814C7440B}"/>
+              </a:ext>
+            </a:extLst>
+          </p:cNvPr>
+          <p:cNvSpPr>
+            <a:spLocks noGrp="1"/>
+          </p:cNvSpPr>
+          <p:nvPr>
+            <p:ph type="title" idx="4294967295"/>
+          </p:nvPr>
+        </p:nvSpPr>
+        <p:spPr>
+          <a:xfrm>
+            <a:off x="0" y="1709738"/>
+            <a:ext cx="10515600" cy="2852737"/>
+          </a:xfrm>
+        </p:spPr>
+        <p:txBody>
+          <a:bodyPr/>
+          <a:lstStyle/>
+          <a:p>
+            <a:r>
+              <a:rPr lang="en-US" dirty="0"/>
+              <a:t>Lesson 15</a:t>
+            </a:r>
+          </a:p>
+        </p:txBody>
+      </p:sp>
+      <p:sp>
+        <p:nvSpPr>
+          <p:cNvPr id="3" name="Text Placeholder 2">
+            <a:extLst>
+              <a:ext uri="{FF2B5EF4-FFF2-40B4-BE49-F238E27FC236}">
+                <a16:creationId xmlns:a16="http://schemas.microsoft.com/office/drawing/2014/main" id="{551AA14F-63AB-40DA-A2E5-77B9ECBA8D3C}"/>
+              </a:ext>
+            </a:extLst>
+          </p:cNvPr>
+          <p:cNvSpPr>
+            <a:spLocks noGrp="1"/>
+          </p:cNvSpPr>
+          <p:nvPr>
+            <p:ph type="body" idx="4294967295"/>
+          </p:nvPr>
+        </p:nvSpPr>
+        <p:spPr>
+          <a:xfrm>
+            <a:off x="0" y="4589463"/>
+            <a:ext cx="7014368" cy="1500187"/>
+          </a:xfrm>
+        </p:spPr>
+        <p:txBody>
+          <a:bodyPr>
+            <a:normAutofit/>
+          </a:bodyPr>
+          <a:lstStyle/>
+          <a:p>
+            <a:pPr marL="0" indent="0">
+              <a:buNone/>
+            </a:pPr>
+            <a:r>
+              <a:rPr lang="en-US" dirty="0"/>
+              <a:t>Initializing Objects</a:t>
+            </a:r>
+          </a:p>
+        </p:txBody>
+      </p:sp>
+    </p:spTree>
+    <p:extLst>
+      <p:ext uri="{BB962C8B-B14F-4D97-AF65-F5344CB8AC3E}">
+        <p14:creationId xmlns:p14="http://schemas.microsoft.com/office/powerpoint/2010/main" val="593587069"/>
+      </p:ext>
+    </p:extLst>
+  </p:cSld>
+  <p:clrMapOvr>
+    <a:masterClrMapping/>
+  </p:clrMapOvr>
+  <mc:AlternateContent xmlns:mc="http://schemas.openxmlformats.org/markup-compatibility/2006" xmlns:p14="http://schemas.microsoft.com/office/powerpoint/2010/main">
+    <mc:Choice Requires="p14">
+      <p:transition spd="slow" p14:dur="1250" advTm="2000">
+        <p14:flip dir="r"/>
+      </p:transition>
+    </mc:Choice>
+    <mc:Fallback xmlns="">
+      <p:transition spd="slow" advTm="2000">
+        <p:fade/>
+      </p:transition>
+    </mc:Fallback>
+  </mc:AlternateContent>
+</p:sld>
+</file>
+
+<file path=ppt/slides/slide18.xml><?xml version="1.0" encoding="utf-8"?>
+<p:sld xmlns:a="http://schemas.openxmlformats.org/drawingml/2006/main" xmlns:r="http://schemas.openxmlformats.org/officeDocument/2006/relationships" xmlns:p="http://schemas.openxmlformats.org/presentationml/2006/main">
+  <p:cSld>
+    <p:spTree>
+      <p:nvGrpSpPr>
+        <p:cNvPr id="1" name=""/>
+        <p:cNvGrpSpPr/>
+        <p:nvPr/>
+      </p:nvGrpSpPr>
+      <p:grpSpPr>
+        <a:xfrm>
+          <a:off x="0" y="0"/>
+          <a:ext cx="0" cy="0"/>
+          <a:chOff x="0" y="0"/>
+          <a:chExt cx="0" cy="0"/>
+        </a:xfrm>
+      </p:grpSpPr>
+      <p:sp>
+        <p:nvSpPr>
+          <p:cNvPr id="7" name="Picture Placeholder 6">
+            <a:extLst>
+              <a:ext uri="{FF2B5EF4-FFF2-40B4-BE49-F238E27FC236}">
+                <a16:creationId xmlns:a16="http://schemas.microsoft.com/office/drawing/2014/main" id="{AC1BA873-815F-4E72-9BD9-93769C1DA7C7}"/>
+              </a:ext>
+            </a:extLst>
+          </p:cNvPr>
+          <p:cNvSpPr>
+            <a:spLocks noGrp="1"/>
+          </p:cNvSpPr>
+          <p:nvPr>
+            <p:ph type="pic" sz="quarter" idx="10"/>
+          </p:nvPr>
+        </p:nvSpPr>
+        <p:spPr/>
+      </p:sp>
+      <p:sp>
+        <p:nvSpPr>
+          <p:cNvPr id="2" name="Title 1">
+            <a:extLst>
+              <a:ext uri="{FF2B5EF4-FFF2-40B4-BE49-F238E27FC236}">
+                <a16:creationId xmlns:a16="http://schemas.microsoft.com/office/drawing/2014/main" id="{B2A8B21D-766A-4354-B054-43C814C7440B}"/>
+              </a:ext>
+            </a:extLst>
+          </p:cNvPr>
+          <p:cNvSpPr>
+            <a:spLocks noGrp="1"/>
+          </p:cNvSpPr>
+          <p:nvPr>
+            <p:ph type="title" idx="4294967295"/>
+          </p:nvPr>
+        </p:nvSpPr>
+        <p:spPr>
+          <a:xfrm>
+            <a:off x="0" y="1709738"/>
+            <a:ext cx="10515600" cy="2852737"/>
+          </a:xfrm>
+        </p:spPr>
+        <p:txBody>
+          <a:bodyPr/>
+          <a:lstStyle/>
+          <a:p>
+            <a:r>
+              <a:rPr lang="en-US" dirty="0"/>
+              <a:t>Lesson 16</a:t>
+            </a:r>
+          </a:p>
+        </p:txBody>
+      </p:sp>
+      <p:sp>
+        <p:nvSpPr>
+          <p:cNvPr id="3" name="Text Placeholder 2">
+            <a:extLst>
+              <a:ext uri="{FF2B5EF4-FFF2-40B4-BE49-F238E27FC236}">
+                <a16:creationId xmlns:a16="http://schemas.microsoft.com/office/drawing/2014/main" id="{551AA14F-63AB-40DA-A2E5-77B9ECBA8D3C}"/>
+              </a:ext>
+            </a:extLst>
+          </p:cNvPr>
+          <p:cNvSpPr>
+            <a:spLocks noGrp="1"/>
+          </p:cNvSpPr>
+          <p:nvPr>
+            <p:ph type="body" idx="4294967295"/>
+          </p:nvPr>
+        </p:nvSpPr>
+        <p:spPr>
+          <a:xfrm>
+            <a:off x="0" y="4589463"/>
+            <a:ext cx="7014368" cy="1500187"/>
+          </a:xfrm>
+        </p:spPr>
+        <p:txBody>
+          <a:bodyPr>
+            <a:normAutofit/>
+          </a:bodyPr>
+          <a:lstStyle/>
+          <a:p>
+            <a:pPr marL="0" indent="0">
+              <a:buNone/>
+            </a:pPr>
+            <a:r>
+              <a:rPr lang="en-US" dirty="0"/>
+              <a:t>Fine-Tuning Classes</a:t>
+            </a:r>
+          </a:p>
+        </p:txBody>
+      </p:sp>
+    </p:spTree>
+    <p:extLst>
+      <p:ext uri="{BB962C8B-B14F-4D97-AF65-F5344CB8AC3E}">
+        <p14:creationId xmlns:p14="http://schemas.microsoft.com/office/powerpoint/2010/main" val="662383641"/>
+      </p:ext>
+    </p:extLst>
+  </p:cSld>
+  <p:clrMapOvr>
+    <a:masterClrMapping/>
+  </p:clrMapOvr>
+  <mc:AlternateContent xmlns:mc="http://schemas.openxmlformats.org/markup-compatibility/2006" xmlns:p14="http://schemas.microsoft.com/office/powerpoint/2010/main">
+    <mc:Choice Requires="p14">
+      <p:transition spd="slow" p14:dur="1250" advTm="2000">
+        <p14:flip dir="r"/>
+      </p:transition>
+    </mc:Choice>
+    <mc:Fallback xmlns="">
+      <p:transition spd="slow" advTm="2000">
+        <p:fade/>
+      </p:transition>
+    </mc:Fallback>
+  </mc:AlternateContent>
+</p:sld>
+</file>
+
+<file path=ppt/slides/slide19.xml><?xml version="1.0" encoding="utf-8"?>
+<p:sld xmlns:a="http://schemas.openxmlformats.org/drawingml/2006/main" xmlns:r="http://schemas.openxmlformats.org/officeDocument/2006/relationships" xmlns:p="http://schemas.openxmlformats.org/presentationml/2006/main">
+  <p:cSld>
+    <p:spTree>
+      <p:nvGrpSpPr>
+        <p:cNvPr id="1" name=""/>
+        <p:cNvGrpSpPr/>
+        <p:nvPr/>
+      </p:nvGrpSpPr>
+      <p:grpSpPr>
+        <a:xfrm>
+          <a:off x="0" y="0"/>
+          <a:ext cx="0" cy="0"/>
+          <a:chOff x="0" y="0"/>
+          <a:chExt cx="0" cy="0"/>
+        </a:xfrm>
+      </p:grpSpPr>
+      <p:sp>
+        <p:nvSpPr>
+          <p:cNvPr id="7" name="Picture Placeholder 6">
+            <a:extLst>
+              <a:ext uri="{FF2B5EF4-FFF2-40B4-BE49-F238E27FC236}">
+                <a16:creationId xmlns:a16="http://schemas.microsoft.com/office/drawing/2014/main" id="{AC1BA873-815F-4E72-9BD9-93769C1DA7C7}"/>
+              </a:ext>
+            </a:extLst>
+          </p:cNvPr>
+          <p:cNvSpPr>
+            <a:spLocks noGrp="1"/>
+          </p:cNvSpPr>
+          <p:nvPr>
+            <p:ph type="pic" sz="quarter" idx="10"/>
+          </p:nvPr>
+        </p:nvSpPr>
+        <p:spPr/>
+      </p:sp>
+      <p:sp>
+        <p:nvSpPr>
+          <p:cNvPr id="2" name="Title 1">
+            <a:extLst>
+              <a:ext uri="{FF2B5EF4-FFF2-40B4-BE49-F238E27FC236}">
+                <a16:creationId xmlns:a16="http://schemas.microsoft.com/office/drawing/2014/main" id="{B2A8B21D-766A-4354-B054-43C814C7440B}"/>
+              </a:ext>
+            </a:extLst>
+          </p:cNvPr>
+          <p:cNvSpPr>
+            <a:spLocks noGrp="1"/>
+          </p:cNvSpPr>
+          <p:nvPr>
+            <p:ph type="title" idx="4294967295"/>
+          </p:nvPr>
+        </p:nvSpPr>
+        <p:spPr>
+          <a:xfrm>
+            <a:off x="0" y="1709738"/>
+            <a:ext cx="10515600" cy="2852737"/>
+          </a:xfrm>
+        </p:spPr>
+        <p:txBody>
+          <a:bodyPr/>
+          <a:lstStyle/>
+          <a:p>
+            <a:r>
+              <a:rPr lang="en-US" dirty="0"/>
+              <a:t>Lesson 17</a:t>
+            </a:r>
+          </a:p>
+        </p:txBody>
+      </p:sp>
+      <p:sp>
+        <p:nvSpPr>
+          <p:cNvPr id="3" name="Text Placeholder 2">
+            <a:extLst>
+              <a:ext uri="{FF2B5EF4-FFF2-40B4-BE49-F238E27FC236}">
+                <a16:creationId xmlns:a16="http://schemas.microsoft.com/office/drawing/2014/main" id="{551AA14F-63AB-40DA-A2E5-77B9ECBA8D3C}"/>
+              </a:ext>
+            </a:extLst>
+          </p:cNvPr>
+          <p:cNvSpPr>
+            <a:spLocks noGrp="1"/>
+          </p:cNvSpPr>
+          <p:nvPr>
+            <p:ph type="body" idx="4294967295"/>
+          </p:nvPr>
+        </p:nvSpPr>
+        <p:spPr>
+          <a:xfrm>
+            <a:off x="0" y="4589463"/>
+            <a:ext cx="7014368" cy="1500187"/>
+          </a:xfrm>
+        </p:spPr>
+        <p:txBody>
+          <a:bodyPr>
+            <a:normAutofit/>
+          </a:bodyPr>
+          <a:lstStyle/>
+          <a:p>
+            <a:pPr marL="0" indent="0">
+              <a:buNone/>
+            </a:pPr>
+            <a:r>
+              <a:rPr lang="en-US" dirty="0"/>
+              <a:t>Overloading Operators</a:t>
+            </a:r>
+          </a:p>
+        </p:txBody>
+      </p:sp>
+    </p:spTree>
+    <p:extLst>
+      <p:ext uri="{BB962C8B-B14F-4D97-AF65-F5344CB8AC3E}">
+        <p14:creationId xmlns:p14="http://schemas.microsoft.com/office/powerpoint/2010/main" val="432530578"/>
+      </p:ext>
+    </p:extLst>
+  </p:cSld>
+  <p:clrMapOvr>
+    <a:masterClrMapping/>
+  </p:clrMapOvr>
+  <mc:AlternateContent xmlns:mc="http://schemas.openxmlformats.org/markup-compatibility/2006" xmlns:p14="http://schemas.microsoft.com/office/powerpoint/2010/main">
+    <mc:Choice Requires="p14">
+      <p:transition spd="slow" p14:dur="1250" advTm="2000">
+        <p14:flip dir="r"/>
+      </p:transition>
+    </mc:Choice>
+    <mc:Fallback xmlns="">
+      <p:transition spd="slow" advTm="2000">
+        <p:fade/>
+      </p:transition>
+    </mc:Fallback>
+  </mc:AlternateContent>
+</p:sld>
+</file>
+
 <file path=ppt/slides/slide2.xml><?xml version="1.0" encoding="utf-8"?>
 <p:sld xmlns:a="http://schemas.openxmlformats.org/drawingml/2006/main" xmlns:r="http://schemas.openxmlformats.org/officeDocument/2006/relationships" xmlns:p="http://schemas.openxmlformats.org/presentationml/2006/main">
   <p:cSld>
@@ -19199,7 +20534,7 @@
         <p:spPr>
           <a:xfrm>
             <a:off x="0" y="4589463"/>
-            <a:ext cx="10515600" cy="1500187"/>
+            <a:ext cx="7014368" cy="1500187"/>
           </a:xfrm>
         </p:spPr>
         <p:txBody>
@@ -19220,6 +20555,923 @@
     <p:extLst>
       <p:ext uri="{BB962C8B-B14F-4D97-AF65-F5344CB8AC3E}">
         <p14:creationId xmlns:p14="http://schemas.microsoft.com/office/powerpoint/2010/main" val="1016018839"/>
+      </p:ext>
+    </p:extLst>
+  </p:cSld>
+  <p:clrMapOvr>
+    <a:masterClrMapping/>
+  </p:clrMapOvr>
+  <mc:AlternateContent xmlns:mc="http://schemas.openxmlformats.org/markup-compatibility/2006" xmlns:p14="http://schemas.microsoft.com/office/powerpoint/2010/main">
+    <mc:Choice Requires="p14">
+      <p:transition spd="slow" p14:dur="1250" advTm="2000">
+        <p14:flip dir="r"/>
+      </p:transition>
+    </mc:Choice>
+    <mc:Fallback xmlns="">
+      <p:transition spd="slow" advTm="2000">
+        <p:fade/>
+      </p:transition>
+    </mc:Fallback>
+  </mc:AlternateContent>
+</p:sld>
+</file>
+
+<file path=ppt/slides/slide20.xml><?xml version="1.0" encoding="utf-8"?>
+<p:sld xmlns:a="http://schemas.openxmlformats.org/drawingml/2006/main" xmlns:r="http://schemas.openxmlformats.org/officeDocument/2006/relationships" xmlns:p="http://schemas.openxmlformats.org/presentationml/2006/main">
+  <p:cSld>
+    <p:spTree>
+      <p:nvGrpSpPr>
+        <p:cNvPr id="1" name=""/>
+        <p:cNvGrpSpPr/>
+        <p:nvPr/>
+      </p:nvGrpSpPr>
+      <p:grpSpPr>
+        <a:xfrm>
+          <a:off x="0" y="0"/>
+          <a:ext cx="0" cy="0"/>
+          <a:chOff x="0" y="0"/>
+          <a:chExt cx="0" cy="0"/>
+        </a:xfrm>
+      </p:grpSpPr>
+      <p:sp>
+        <p:nvSpPr>
+          <p:cNvPr id="7" name="Picture Placeholder 6">
+            <a:extLst>
+              <a:ext uri="{FF2B5EF4-FFF2-40B4-BE49-F238E27FC236}">
+                <a16:creationId xmlns:a16="http://schemas.microsoft.com/office/drawing/2014/main" id="{AC1BA873-815F-4E72-9BD9-93769C1DA7C7}"/>
+              </a:ext>
+            </a:extLst>
+          </p:cNvPr>
+          <p:cNvSpPr>
+            <a:spLocks noGrp="1"/>
+          </p:cNvSpPr>
+          <p:nvPr>
+            <p:ph type="pic" sz="quarter" idx="10"/>
+          </p:nvPr>
+        </p:nvSpPr>
+        <p:spPr/>
+      </p:sp>
+      <p:sp>
+        <p:nvSpPr>
+          <p:cNvPr id="2" name="Title 1">
+            <a:extLst>
+              <a:ext uri="{FF2B5EF4-FFF2-40B4-BE49-F238E27FC236}">
+                <a16:creationId xmlns:a16="http://schemas.microsoft.com/office/drawing/2014/main" id="{B2A8B21D-766A-4354-B054-43C814C7440B}"/>
+              </a:ext>
+            </a:extLst>
+          </p:cNvPr>
+          <p:cNvSpPr>
+            <a:spLocks noGrp="1"/>
+          </p:cNvSpPr>
+          <p:nvPr>
+            <p:ph type="title" idx="4294967295"/>
+          </p:nvPr>
+        </p:nvSpPr>
+        <p:spPr>
+          <a:xfrm>
+            <a:off x="0" y="1709738"/>
+            <a:ext cx="10515600" cy="2852737"/>
+          </a:xfrm>
+        </p:spPr>
+        <p:txBody>
+          <a:bodyPr/>
+          <a:lstStyle/>
+          <a:p>
+            <a:r>
+              <a:rPr lang="en-US" dirty="0"/>
+              <a:t>Lesson 18</a:t>
+            </a:r>
+          </a:p>
+        </p:txBody>
+      </p:sp>
+      <p:sp>
+        <p:nvSpPr>
+          <p:cNvPr id="3" name="Text Placeholder 2">
+            <a:extLst>
+              <a:ext uri="{FF2B5EF4-FFF2-40B4-BE49-F238E27FC236}">
+                <a16:creationId xmlns:a16="http://schemas.microsoft.com/office/drawing/2014/main" id="{551AA14F-63AB-40DA-A2E5-77B9ECBA8D3C}"/>
+              </a:ext>
+            </a:extLst>
+          </p:cNvPr>
+          <p:cNvSpPr>
+            <a:spLocks noGrp="1"/>
+          </p:cNvSpPr>
+          <p:nvPr>
+            <p:ph type="body" idx="4294967295"/>
+          </p:nvPr>
+        </p:nvSpPr>
+        <p:spPr>
+          <a:xfrm>
+            <a:off x="0" y="4589463"/>
+            <a:ext cx="7014368" cy="1500187"/>
+          </a:xfrm>
+        </p:spPr>
+        <p:txBody>
+          <a:bodyPr>
+            <a:normAutofit/>
+          </a:bodyPr>
+          <a:lstStyle/>
+          <a:p>
+            <a:pPr marL="0" indent="0">
+              <a:buNone/>
+            </a:pPr>
+            <a:r>
+              <a:rPr lang="en-US" dirty="0"/>
+              <a:t>Using Interfaces</a:t>
+            </a:r>
+          </a:p>
+        </p:txBody>
+      </p:sp>
+    </p:spTree>
+    <p:extLst>
+      <p:ext uri="{BB962C8B-B14F-4D97-AF65-F5344CB8AC3E}">
+        <p14:creationId xmlns:p14="http://schemas.microsoft.com/office/powerpoint/2010/main" val="1560941405"/>
+      </p:ext>
+    </p:extLst>
+  </p:cSld>
+  <p:clrMapOvr>
+    <a:masterClrMapping/>
+  </p:clrMapOvr>
+  <mc:AlternateContent xmlns:mc="http://schemas.openxmlformats.org/markup-compatibility/2006" xmlns:p14="http://schemas.microsoft.com/office/powerpoint/2010/main">
+    <mc:Choice Requires="p14">
+      <p:transition spd="slow" p14:dur="1250" advTm="2000">
+        <p14:flip dir="r"/>
+      </p:transition>
+    </mc:Choice>
+    <mc:Fallback xmlns="">
+      <p:transition spd="slow" advTm="2000">
+        <p:fade/>
+      </p:transition>
+    </mc:Fallback>
+  </mc:AlternateContent>
+</p:sld>
+</file>
+
+<file path=ppt/slides/slide21.xml><?xml version="1.0" encoding="utf-8"?>
+<p:sld xmlns:a="http://schemas.openxmlformats.org/drawingml/2006/main" xmlns:r="http://schemas.openxmlformats.org/officeDocument/2006/relationships" xmlns:p="http://schemas.openxmlformats.org/presentationml/2006/main">
+  <p:cSld>
+    <p:spTree>
+      <p:nvGrpSpPr>
+        <p:cNvPr id="1" name=""/>
+        <p:cNvGrpSpPr/>
+        <p:nvPr/>
+      </p:nvGrpSpPr>
+      <p:grpSpPr>
+        <a:xfrm>
+          <a:off x="0" y="0"/>
+          <a:ext cx="0" cy="0"/>
+          <a:chOff x="0" y="0"/>
+          <a:chExt cx="0" cy="0"/>
+        </a:xfrm>
+      </p:grpSpPr>
+      <p:sp>
+        <p:nvSpPr>
+          <p:cNvPr id="7" name="Picture Placeholder 6">
+            <a:extLst>
+              <a:ext uri="{FF2B5EF4-FFF2-40B4-BE49-F238E27FC236}">
+                <a16:creationId xmlns:a16="http://schemas.microsoft.com/office/drawing/2014/main" id="{AC1BA873-815F-4E72-9BD9-93769C1DA7C7}"/>
+              </a:ext>
+            </a:extLst>
+          </p:cNvPr>
+          <p:cNvSpPr>
+            <a:spLocks noGrp="1"/>
+          </p:cNvSpPr>
+          <p:nvPr>
+            <p:ph type="pic" sz="quarter" idx="10"/>
+          </p:nvPr>
+        </p:nvSpPr>
+        <p:spPr/>
+      </p:sp>
+      <p:sp>
+        <p:nvSpPr>
+          <p:cNvPr id="2" name="Title 1">
+            <a:extLst>
+              <a:ext uri="{FF2B5EF4-FFF2-40B4-BE49-F238E27FC236}">
+                <a16:creationId xmlns:a16="http://schemas.microsoft.com/office/drawing/2014/main" id="{B2A8B21D-766A-4354-B054-43C814C7440B}"/>
+              </a:ext>
+            </a:extLst>
+          </p:cNvPr>
+          <p:cNvSpPr>
+            <a:spLocks noGrp="1"/>
+          </p:cNvSpPr>
+          <p:nvPr>
+            <p:ph type="title" idx="4294967295"/>
+          </p:nvPr>
+        </p:nvSpPr>
+        <p:spPr>
+          <a:xfrm>
+            <a:off x="0" y="1709738"/>
+            <a:ext cx="10515600" cy="2852737"/>
+          </a:xfrm>
+        </p:spPr>
+        <p:txBody>
+          <a:bodyPr/>
+          <a:lstStyle/>
+          <a:p>
+            <a:r>
+              <a:rPr lang="en-US" dirty="0"/>
+              <a:t>Lesson 19</a:t>
+            </a:r>
+          </a:p>
+        </p:txBody>
+      </p:sp>
+      <p:sp>
+        <p:nvSpPr>
+          <p:cNvPr id="3" name="Text Placeholder 2">
+            <a:extLst>
+              <a:ext uri="{FF2B5EF4-FFF2-40B4-BE49-F238E27FC236}">
+                <a16:creationId xmlns:a16="http://schemas.microsoft.com/office/drawing/2014/main" id="{551AA14F-63AB-40DA-A2E5-77B9ECBA8D3C}"/>
+              </a:ext>
+            </a:extLst>
+          </p:cNvPr>
+          <p:cNvSpPr>
+            <a:spLocks noGrp="1"/>
+          </p:cNvSpPr>
+          <p:nvPr>
+            <p:ph type="body" idx="4294967295"/>
+          </p:nvPr>
+        </p:nvSpPr>
+        <p:spPr>
+          <a:xfrm>
+            <a:off x="0" y="4589463"/>
+            <a:ext cx="7014368" cy="1500187"/>
+          </a:xfrm>
+        </p:spPr>
+        <p:txBody>
+          <a:bodyPr>
+            <a:normAutofit/>
+          </a:bodyPr>
+          <a:lstStyle/>
+          <a:p>
+            <a:pPr marL="0" indent="0">
+              <a:buNone/>
+            </a:pPr>
+            <a:r>
+              <a:rPr lang="en-US" dirty="0"/>
+              <a:t>Making Generic Classes</a:t>
+            </a:r>
+          </a:p>
+        </p:txBody>
+      </p:sp>
+    </p:spTree>
+    <p:extLst>
+      <p:ext uri="{BB962C8B-B14F-4D97-AF65-F5344CB8AC3E}">
+        <p14:creationId xmlns:p14="http://schemas.microsoft.com/office/powerpoint/2010/main" val="1782809940"/>
+      </p:ext>
+    </p:extLst>
+  </p:cSld>
+  <p:clrMapOvr>
+    <a:masterClrMapping/>
+  </p:clrMapOvr>
+  <mc:AlternateContent xmlns:mc="http://schemas.openxmlformats.org/markup-compatibility/2006" xmlns:p14="http://schemas.microsoft.com/office/powerpoint/2010/main">
+    <mc:Choice Requires="p14">
+      <p:transition spd="slow" p14:dur="1250" advTm="2000">
+        <p14:flip dir="r"/>
+      </p:transition>
+    </mc:Choice>
+    <mc:Fallback xmlns="">
+      <p:transition spd="slow" advTm="2000">
+        <p:fade/>
+      </p:transition>
+    </mc:Fallback>
+  </mc:AlternateContent>
+</p:sld>
+</file>
+
+<file path=ppt/slides/slide22.xml><?xml version="1.0" encoding="utf-8"?>
+<p:sld xmlns:a="http://schemas.openxmlformats.org/drawingml/2006/main" xmlns:r="http://schemas.openxmlformats.org/officeDocument/2006/relationships" xmlns:p="http://schemas.openxmlformats.org/presentationml/2006/main">
+  <p:cSld>
+    <p:spTree>
+      <p:nvGrpSpPr>
+        <p:cNvPr id="1" name=""/>
+        <p:cNvGrpSpPr/>
+        <p:nvPr/>
+      </p:nvGrpSpPr>
+      <p:grpSpPr>
+        <a:xfrm>
+          <a:off x="0" y="0"/>
+          <a:ext cx="0" cy="0"/>
+          <a:chOff x="0" y="0"/>
+          <a:chExt cx="0" cy="0"/>
+        </a:xfrm>
+      </p:grpSpPr>
+      <p:sp>
+        <p:nvSpPr>
+          <p:cNvPr id="7" name="Picture Placeholder 6">
+            <a:extLst>
+              <a:ext uri="{FF2B5EF4-FFF2-40B4-BE49-F238E27FC236}">
+                <a16:creationId xmlns:a16="http://schemas.microsoft.com/office/drawing/2014/main" id="{AC1BA873-815F-4E72-9BD9-93769C1DA7C7}"/>
+              </a:ext>
+            </a:extLst>
+          </p:cNvPr>
+          <p:cNvSpPr>
+            <a:spLocks noGrp="1"/>
+          </p:cNvSpPr>
+          <p:nvPr>
+            <p:ph type="pic" sz="quarter" idx="10"/>
+          </p:nvPr>
+        </p:nvSpPr>
+        <p:spPr/>
+      </p:sp>
+      <p:sp>
+        <p:nvSpPr>
+          <p:cNvPr id="2" name="Title 1">
+            <a:extLst>
+              <a:ext uri="{FF2B5EF4-FFF2-40B4-BE49-F238E27FC236}">
+                <a16:creationId xmlns:a16="http://schemas.microsoft.com/office/drawing/2014/main" id="{B2A8B21D-766A-4354-B054-43C814C7440B}"/>
+              </a:ext>
+            </a:extLst>
+          </p:cNvPr>
+          <p:cNvSpPr>
+            <a:spLocks noGrp="1"/>
+          </p:cNvSpPr>
+          <p:nvPr>
+            <p:ph type="title" idx="4294967295"/>
+          </p:nvPr>
+        </p:nvSpPr>
+        <p:spPr>
+          <a:xfrm>
+            <a:off x="0" y="1709738"/>
+            <a:ext cx="10515600" cy="2852737"/>
+          </a:xfrm>
+        </p:spPr>
+        <p:txBody>
+          <a:bodyPr/>
+          <a:lstStyle/>
+          <a:p>
+            <a:r>
+              <a:rPr lang="en-US" dirty="0"/>
+              <a:t>Lesson 20</a:t>
+            </a:r>
+          </a:p>
+        </p:txBody>
+      </p:sp>
+      <p:sp>
+        <p:nvSpPr>
+          <p:cNvPr id="3" name="Text Placeholder 2">
+            <a:extLst>
+              <a:ext uri="{FF2B5EF4-FFF2-40B4-BE49-F238E27FC236}">
+                <a16:creationId xmlns:a16="http://schemas.microsoft.com/office/drawing/2014/main" id="{551AA14F-63AB-40DA-A2E5-77B9ECBA8D3C}"/>
+              </a:ext>
+            </a:extLst>
+          </p:cNvPr>
+          <p:cNvSpPr>
+            <a:spLocks noGrp="1"/>
+          </p:cNvSpPr>
+          <p:nvPr>
+            <p:ph type="body" idx="4294967295"/>
+          </p:nvPr>
+        </p:nvSpPr>
+        <p:spPr>
+          <a:xfrm>
+            <a:off x="0" y="4589463"/>
+            <a:ext cx="7014368" cy="1500187"/>
+          </a:xfrm>
+        </p:spPr>
+        <p:txBody>
+          <a:bodyPr>
+            <a:normAutofit/>
+          </a:bodyPr>
+          <a:lstStyle/>
+          <a:p>
+            <a:pPr marL="0" indent="0">
+              <a:buNone/>
+            </a:pPr>
+            <a:r>
+              <a:rPr lang="en-US" dirty="0"/>
+              <a:t>Windows Apps with XAML</a:t>
+            </a:r>
+          </a:p>
+        </p:txBody>
+      </p:sp>
+    </p:spTree>
+    <p:extLst>
+      <p:ext uri="{BB962C8B-B14F-4D97-AF65-F5344CB8AC3E}">
+        <p14:creationId xmlns:p14="http://schemas.microsoft.com/office/powerpoint/2010/main" val="3888143967"/>
+      </p:ext>
+    </p:extLst>
+  </p:cSld>
+  <p:clrMapOvr>
+    <a:masterClrMapping/>
+  </p:clrMapOvr>
+  <mc:AlternateContent xmlns:mc="http://schemas.openxmlformats.org/markup-compatibility/2006" xmlns:p14="http://schemas.microsoft.com/office/powerpoint/2010/main">
+    <mc:Choice Requires="p14">
+      <p:transition spd="slow" p14:dur="1250" advTm="2000">
+        <p14:flip dir="r"/>
+      </p:transition>
+    </mc:Choice>
+    <mc:Fallback xmlns="">
+      <p:transition spd="slow" advTm="2000">
+        <p:fade/>
+      </p:transition>
+    </mc:Fallback>
+  </mc:AlternateContent>
+</p:sld>
+</file>
+
+<file path=ppt/slides/slide23.xml><?xml version="1.0" encoding="utf-8"?>
+<p:sld xmlns:a="http://schemas.openxmlformats.org/drawingml/2006/main" xmlns:r="http://schemas.openxmlformats.org/officeDocument/2006/relationships" xmlns:p="http://schemas.openxmlformats.org/presentationml/2006/main">
+  <p:cSld>
+    <p:spTree>
+      <p:nvGrpSpPr>
+        <p:cNvPr id="1" name=""/>
+        <p:cNvGrpSpPr/>
+        <p:nvPr/>
+      </p:nvGrpSpPr>
+      <p:grpSpPr>
+        <a:xfrm>
+          <a:off x="0" y="0"/>
+          <a:ext cx="0" cy="0"/>
+          <a:chOff x="0" y="0"/>
+          <a:chExt cx="0" cy="0"/>
+        </a:xfrm>
+      </p:grpSpPr>
+      <p:sp>
+        <p:nvSpPr>
+          <p:cNvPr id="7" name="Picture Placeholder 6">
+            <a:extLst>
+              <a:ext uri="{FF2B5EF4-FFF2-40B4-BE49-F238E27FC236}">
+                <a16:creationId xmlns:a16="http://schemas.microsoft.com/office/drawing/2014/main" id="{AC1BA873-815F-4E72-9BD9-93769C1DA7C7}"/>
+              </a:ext>
+            </a:extLst>
+          </p:cNvPr>
+          <p:cNvSpPr>
+            <a:spLocks noGrp="1"/>
+          </p:cNvSpPr>
+          <p:nvPr>
+            <p:ph type="pic" sz="quarter" idx="10"/>
+          </p:nvPr>
+        </p:nvSpPr>
+        <p:spPr/>
+      </p:sp>
+      <p:sp>
+        <p:nvSpPr>
+          <p:cNvPr id="2" name="Title 1">
+            <a:extLst>
+              <a:ext uri="{FF2B5EF4-FFF2-40B4-BE49-F238E27FC236}">
+                <a16:creationId xmlns:a16="http://schemas.microsoft.com/office/drawing/2014/main" id="{B2A8B21D-766A-4354-B054-43C814C7440B}"/>
+              </a:ext>
+            </a:extLst>
+          </p:cNvPr>
+          <p:cNvSpPr>
+            <a:spLocks noGrp="1"/>
+          </p:cNvSpPr>
+          <p:nvPr>
+            <p:ph type="title" idx="4294967295"/>
+          </p:nvPr>
+        </p:nvSpPr>
+        <p:spPr>
+          <a:xfrm>
+            <a:off x="0" y="1709738"/>
+            <a:ext cx="10515600" cy="2852737"/>
+          </a:xfrm>
+        </p:spPr>
+        <p:txBody>
+          <a:bodyPr/>
+          <a:lstStyle/>
+          <a:p>
+            <a:r>
+              <a:rPr lang="en-US" dirty="0"/>
+              <a:t>Lesson 21</a:t>
+            </a:r>
+          </a:p>
+        </p:txBody>
+      </p:sp>
+      <p:sp>
+        <p:nvSpPr>
+          <p:cNvPr id="3" name="Text Placeholder 2">
+            <a:extLst>
+              <a:ext uri="{FF2B5EF4-FFF2-40B4-BE49-F238E27FC236}">
+                <a16:creationId xmlns:a16="http://schemas.microsoft.com/office/drawing/2014/main" id="{551AA14F-63AB-40DA-A2E5-77B9ECBA8D3C}"/>
+              </a:ext>
+            </a:extLst>
+          </p:cNvPr>
+          <p:cNvSpPr>
+            <a:spLocks noGrp="1"/>
+          </p:cNvSpPr>
+          <p:nvPr>
+            <p:ph type="body" idx="4294967295"/>
+          </p:nvPr>
+        </p:nvSpPr>
+        <p:spPr>
+          <a:xfrm>
+            <a:off x="0" y="4589463"/>
+            <a:ext cx="7014368" cy="1500187"/>
+          </a:xfrm>
+        </p:spPr>
+        <p:txBody>
+          <a:bodyPr>
+            <a:normAutofit/>
+          </a:bodyPr>
+          <a:lstStyle/>
+          <a:p>
+            <a:pPr marL="0" indent="0">
+              <a:buNone/>
+            </a:pPr>
+            <a:r>
+              <a:rPr lang="en-US" dirty="0"/>
+              <a:t>System.IO</a:t>
+            </a:r>
+          </a:p>
+        </p:txBody>
+      </p:sp>
+    </p:spTree>
+    <p:extLst>
+      <p:ext uri="{BB962C8B-B14F-4D97-AF65-F5344CB8AC3E}">
+        <p14:creationId xmlns:p14="http://schemas.microsoft.com/office/powerpoint/2010/main" val="171045466"/>
+      </p:ext>
+    </p:extLst>
+  </p:cSld>
+  <p:clrMapOvr>
+    <a:masterClrMapping/>
+  </p:clrMapOvr>
+  <mc:AlternateContent xmlns:mc="http://schemas.openxmlformats.org/markup-compatibility/2006" xmlns:p14="http://schemas.microsoft.com/office/powerpoint/2010/main">
+    <mc:Choice Requires="p14">
+      <p:transition spd="slow" p14:dur="1250" advTm="2000">
+        <p14:flip dir="r"/>
+      </p:transition>
+    </mc:Choice>
+    <mc:Fallback xmlns="">
+      <p:transition spd="slow" advTm="2000">
+        <p:fade/>
+      </p:transition>
+    </mc:Fallback>
+  </mc:AlternateContent>
+</p:sld>
+</file>
+
+<file path=ppt/slides/slide24.xml><?xml version="1.0" encoding="utf-8"?>
+<p:sld xmlns:a="http://schemas.openxmlformats.org/drawingml/2006/main" xmlns:r="http://schemas.openxmlformats.org/officeDocument/2006/relationships" xmlns:p="http://schemas.openxmlformats.org/presentationml/2006/main">
+  <p:cSld>
+    <p:spTree>
+      <p:nvGrpSpPr>
+        <p:cNvPr id="1" name=""/>
+        <p:cNvGrpSpPr/>
+        <p:nvPr/>
+      </p:nvGrpSpPr>
+      <p:grpSpPr>
+        <a:xfrm>
+          <a:off x="0" y="0"/>
+          <a:ext cx="0" cy="0"/>
+          <a:chOff x="0" y="0"/>
+          <a:chExt cx="0" cy="0"/>
+        </a:xfrm>
+      </p:grpSpPr>
+      <p:sp>
+        <p:nvSpPr>
+          <p:cNvPr id="7" name="Picture Placeholder 6">
+            <a:extLst>
+              <a:ext uri="{FF2B5EF4-FFF2-40B4-BE49-F238E27FC236}">
+                <a16:creationId xmlns:a16="http://schemas.microsoft.com/office/drawing/2014/main" id="{AC1BA873-815F-4E72-9BD9-93769C1DA7C7}"/>
+              </a:ext>
+            </a:extLst>
+          </p:cNvPr>
+          <p:cNvSpPr>
+            <a:spLocks noGrp="1"/>
+          </p:cNvSpPr>
+          <p:nvPr>
+            <p:ph type="pic" sz="quarter" idx="10"/>
+          </p:nvPr>
+        </p:nvSpPr>
+        <p:spPr/>
+      </p:sp>
+      <p:sp>
+        <p:nvSpPr>
+          <p:cNvPr id="2" name="Title 1">
+            <a:extLst>
+              <a:ext uri="{FF2B5EF4-FFF2-40B4-BE49-F238E27FC236}">
+                <a16:creationId xmlns:a16="http://schemas.microsoft.com/office/drawing/2014/main" id="{B2A8B21D-766A-4354-B054-43C814C7440B}"/>
+              </a:ext>
+            </a:extLst>
+          </p:cNvPr>
+          <p:cNvSpPr>
+            <a:spLocks noGrp="1"/>
+          </p:cNvSpPr>
+          <p:nvPr>
+            <p:ph type="title" idx="4294967295"/>
+          </p:nvPr>
+        </p:nvSpPr>
+        <p:spPr>
+          <a:xfrm>
+            <a:off x="0" y="1709738"/>
+            <a:ext cx="10515600" cy="2852737"/>
+          </a:xfrm>
+        </p:spPr>
+        <p:txBody>
+          <a:bodyPr/>
+          <a:lstStyle/>
+          <a:p>
+            <a:r>
+              <a:rPr lang="en-US" dirty="0"/>
+              <a:t>Lesson 22</a:t>
+            </a:r>
+          </a:p>
+        </p:txBody>
+      </p:sp>
+      <p:sp>
+        <p:nvSpPr>
+          <p:cNvPr id="3" name="Text Placeholder 2">
+            <a:extLst>
+              <a:ext uri="{FF2B5EF4-FFF2-40B4-BE49-F238E27FC236}">
+                <a16:creationId xmlns:a16="http://schemas.microsoft.com/office/drawing/2014/main" id="{551AA14F-63AB-40DA-A2E5-77B9ECBA8D3C}"/>
+              </a:ext>
+            </a:extLst>
+          </p:cNvPr>
+          <p:cNvSpPr>
+            <a:spLocks noGrp="1"/>
+          </p:cNvSpPr>
+          <p:nvPr>
+            <p:ph type="body" idx="4294967295"/>
+          </p:nvPr>
+        </p:nvSpPr>
+        <p:spPr>
+          <a:xfrm>
+            <a:off x="0" y="4589463"/>
+            <a:ext cx="7014368" cy="1500187"/>
+          </a:xfrm>
+        </p:spPr>
+        <p:txBody>
+          <a:bodyPr>
+            <a:normAutofit/>
+          </a:bodyPr>
+          <a:lstStyle/>
+          <a:p>
+            <a:pPr marL="0" indent="0">
+              <a:buNone/>
+            </a:pPr>
+            <a:r>
+              <a:rPr lang="en-US" dirty="0"/>
+              <a:t>Programming Databases</a:t>
+            </a:r>
+          </a:p>
+        </p:txBody>
+      </p:sp>
+    </p:spTree>
+    <p:extLst>
+      <p:ext uri="{BB962C8B-B14F-4D97-AF65-F5344CB8AC3E}">
+        <p14:creationId xmlns:p14="http://schemas.microsoft.com/office/powerpoint/2010/main" val="3062775636"/>
+      </p:ext>
+    </p:extLst>
+  </p:cSld>
+  <p:clrMapOvr>
+    <a:masterClrMapping/>
+  </p:clrMapOvr>
+  <mc:AlternateContent xmlns:mc="http://schemas.openxmlformats.org/markup-compatibility/2006" xmlns:p14="http://schemas.microsoft.com/office/powerpoint/2010/main">
+    <mc:Choice Requires="p14">
+      <p:transition spd="slow" p14:dur="1250" advTm="2000">
+        <p14:flip dir="r"/>
+      </p:transition>
+    </mc:Choice>
+    <mc:Fallback xmlns="">
+      <p:transition spd="slow" advTm="2000">
+        <p:fade/>
+      </p:transition>
+    </mc:Fallback>
+  </mc:AlternateContent>
+</p:sld>
+</file>
+
+<file path=ppt/slides/slide25.xml><?xml version="1.0" encoding="utf-8"?>
+<p:sld xmlns:a="http://schemas.openxmlformats.org/drawingml/2006/main" xmlns:r="http://schemas.openxmlformats.org/officeDocument/2006/relationships" xmlns:p="http://schemas.openxmlformats.org/presentationml/2006/main">
+  <p:cSld>
+    <p:spTree>
+      <p:nvGrpSpPr>
+        <p:cNvPr id="1" name=""/>
+        <p:cNvGrpSpPr/>
+        <p:nvPr/>
+      </p:nvGrpSpPr>
+      <p:grpSpPr>
+        <a:xfrm>
+          <a:off x="0" y="0"/>
+          <a:ext cx="0" cy="0"/>
+          <a:chOff x="0" y="0"/>
+          <a:chExt cx="0" cy="0"/>
+        </a:xfrm>
+      </p:grpSpPr>
+      <p:sp>
+        <p:nvSpPr>
+          <p:cNvPr id="7" name="Picture Placeholder 6">
+            <a:extLst>
+              <a:ext uri="{FF2B5EF4-FFF2-40B4-BE49-F238E27FC236}">
+                <a16:creationId xmlns:a16="http://schemas.microsoft.com/office/drawing/2014/main" id="{AC1BA873-815F-4E72-9BD9-93769C1DA7C7}"/>
+              </a:ext>
+            </a:extLst>
+          </p:cNvPr>
+          <p:cNvSpPr>
+            <a:spLocks noGrp="1"/>
+          </p:cNvSpPr>
+          <p:nvPr>
+            <p:ph type="pic" sz="quarter" idx="10"/>
+          </p:nvPr>
+        </p:nvSpPr>
+        <p:spPr/>
+      </p:sp>
+      <p:sp>
+        <p:nvSpPr>
+          <p:cNvPr id="2" name="Title 1">
+            <a:extLst>
+              <a:ext uri="{FF2B5EF4-FFF2-40B4-BE49-F238E27FC236}">
+                <a16:creationId xmlns:a16="http://schemas.microsoft.com/office/drawing/2014/main" id="{B2A8B21D-766A-4354-B054-43C814C7440B}"/>
+              </a:ext>
+            </a:extLst>
+          </p:cNvPr>
+          <p:cNvSpPr>
+            <a:spLocks noGrp="1"/>
+          </p:cNvSpPr>
+          <p:nvPr>
+            <p:ph type="title" idx="4294967295"/>
+          </p:nvPr>
+        </p:nvSpPr>
+        <p:spPr>
+          <a:xfrm>
+            <a:off x="0" y="1709738"/>
+            <a:ext cx="10515600" cy="2852737"/>
+          </a:xfrm>
+        </p:spPr>
+        <p:txBody>
+          <a:bodyPr/>
+          <a:lstStyle/>
+          <a:p>
+            <a:r>
+              <a:rPr lang="en-US" dirty="0"/>
+              <a:t>Lesson 23</a:t>
+            </a:r>
+          </a:p>
+        </p:txBody>
+      </p:sp>
+      <p:sp>
+        <p:nvSpPr>
+          <p:cNvPr id="3" name="Text Placeholder 2">
+            <a:extLst>
+              <a:ext uri="{FF2B5EF4-FFF2-40B4-BE49-F238E27FC236}">
+                <a16:creationId xmlns:a16="http://schemas.microsoft.com/office/drawing/2014/main" id="{551AA14F-63AB-40DA-A2E5-77B9ECBA8D3C}"/>
+              </a:ext>
+            </a:extLst>
+          </p:cNvPr>
+          <p:cNvSpPr>
+            <a:spLocks noGrp="1"/>
+          </p:cNvSpPr>
+          <p:nvPr>
+            <p:ph type="body" idx="4294967295"/>
+          </p:nvPr>
+        </p:nvSpPr>
+        <p:spPr>
+          <a:xfrm>
+            <a:off x="0" y="4589463"/>
+            <a:ext cx="7014368" cy="1500187"/>
+          </a:xfrm>
+        </p:spPr>
+        <p:txBody>
+          <a:bodyPr>
+            <a:normAutofit/>
+          </a:bodyPr>
+          <a:lstStyle/>
+          <a:p>
+            <a:pPr marL="0" indent="0">
+              <a:buNone/>
+            </a:pPr>
+            <a:r>
+              <a:rPr lang="en-US" dirty="0"/>
+              <a:t>LINQ to Objects</a:t>
+            </a:r>
+          </a:p>
+        </p:txBody>
+      </p:sp>
+    </p:spTree>
+    <p:extLst>
+      <p:ext uri="{BB962C8B-B14F-4D97-AF65-F5344CB8AC3E}">
+        <p14:creationId xmlns:p14="http://schemas.microsoft.com/office/powerpoint/2010/main" val="384631692"/>
+      </p:ext>
+    </p:extLst>
+  </p:cSld>
+  <p:clrMapOvr>
+    <a:masterClrMapping/>
+  </p:clrMapOvr>
+  <mc:AlternateContent xmlns:mc="http://schemas.openxmlformats.org/markup-compatibility/2006" xmlns:p14="http://schemas.microsoft.com/office/powerpoint/2010/main">
+    <mc:Choice Requires="p14">
+      <p:transition spd="slow" p14:dur="1250" advTm="2000">
+        <p14:flip dir="r"/>
+      </p:transition>
+    </mc:Choice>
+    <mc:Fallback xmlns="">
+      <p:transition spd="slow" advTm="2000">
+        <p:fade/>
+      </p:transition>
+    </mc:Fallback>
+  </mc:AlternateContent>
+</p:sld>
+</file>
+
+<file path=ppt/slides/slide26.xml><?xml version="1.0" encoding="utf-8"?>
+<p:sld xmlns:a="http://schemas.openxmlformats.org/drawingml/2006/main" xmlns:r="http://schemas.openxmlformats.org/officeDocument/2006/relationships" xmlns:p="http://schemas.openxmlformats.org/presentationml/2006/main">
+  <p:cSld>
+    <p:spTree>
+      <p:nvGrpSpPr>
+        <p:cNvPr id="1" name=""/>
+        <p:cNvGrpSpPr/>
+        <p:nvPr/>
+      </p:nvGrpSpPr>
+      <p:grpSpPr>
+        <a:xfrm>
+          <a:off x="0" y="0"/>
+          <a:ext cx="0" cy="0"/>
+          <a:chOff x="0" y="0"/>
+          <a:chExt cx="0" cy="0"/>
+        </a:xfrm>
+      </p:grpSpPr>
+      <p:sp>
+        <p:nvSpPr>
+          <p:cNvPr id="7" name="Picture Placeholder 6">
+            <a:extLst>
+              <a:ext uri="{FF2B5EF4-FFF2-40B4-BE49-F238E27FC236}">
+                <a16:creationId xmlns:a16="http://schemas.microsoft.com/office/drawing/2014/main" id="{AC1BA873-815F-4E72-9BD9-93769C1DA7C7}"/>
+              </a:ext>
+            </a:extLst>
+          </p:cNvPr>
+          <p:cNvSpPr>
+            <a:spLocks noGrp="1"/>
+          </p:cNvSpPr>
+          <p:nvPr>
+            <p:ph type="pic" sz="quarter" idx="10"/>
+          </p:nvPr>
+        </p:nvSpPr>
+        <p:spPr/>
+      </p:sp>
+      <p:sp>
+        <p:nvSpPr>
+          <p:cNvPr id="2" name="Title 1">
+            <a:extLst>
+              <a:ext uri="{FF2B5EF4-FFF2-40B4-BE49-F238E27FC236}">
+                <a16:creationId xmlns:a16="http://schemas.microsoft.com/office/drawing/2014/main" id="{B2A8B21D-766A-4354-B054-43C814C7440B}"/>
+              </a:ext>
+            </a:extLst>
+          </p:cNvPr>
+          <p:cNvSpPr>
+            <a:spLocks noGrp="1"/>
+          </p:cNvSpPr>
+          <p:nvPr>
+            <p:ph type="title" idx="4294967295"/>
+          </p:nvPr>
+        </p:nvSpPr>
+        <p:spPr>
+          <a:xfrm>
+            <a:off x="0" y="1709738"/>
+            <a:ext cx="10515600" cy="2852737"/>
+          </a:xfrm>
+        </p:spPr>
+        <p:txBody>
+          <a:bodyPr/>
+          <a:lstStyle/>
+          <a:p>
+            <a:r>
+              <a:rPr lang="en-US" dirty="0"/>
+              <a:t>Lesson 24</a:t>
+            </a:r>
+          </a:p>
+        </p:txBody>
+      </p:sp>
+      <p:sp>
+        <p:nvSpPr>
+          <p:cNvPr id="3" name="Text Placeholder 2">
+            <a:extLst>
+              <a:ext uri="{FF2B5EF4-FFF2-40B4-BE49-F238E27FC236}">
+                <a16:creationId xmlns:a16="http://schemas.microsoft.com/office/drawing/2014/main" id="{551AA14F-63AB-40DA-A2E5-77B9ECBA8D3C}"/>
+              </a:ext>
+            </a:extLst>
+          </p:cNvPr>
+          <p:cNvSpPr>
+            <a:spLocks noGrp="1"/>
+          </p:cNvSpPr>
+          <p:nvPr>
+            <p:ph type="body" idx="4294967295"/>
+          </p:nvPr>
+        </p:nvSpPr>
+        <p:spPr>
+          <a:xfrm>
+            <a:off x="0" y="4589463"/>
+            <a:ext cx="7014368" cy="1500187"/>
+          </a:xfrm>
+        </p:spPr>
+        <p:txBody>
+          <a:bodyPr>
+            <a:normAutofit/>
+          </a:bodyPr>
+          <a:lstStyle/>
+          <a:p>
+            <a:pPr marL="0" indent="0">
+              <a:buNone/>
+            </a:pPr>
+            <a:r>
+              <a:rPr lang="en-US" dirty="0"/>
+              <a:t>LINQ to SQL</a:t>
+            </a:r>
+          </a:p>
+        </p:txBody>
+      </p:sp>
+    </p:spTree>
+    <p:extLst>
+      <p:ext uri="{BB962C8B-B14F-4D97-AF65-F5344CB8AC3E}">
+        <p14:creationId xmlns:p14="http://schemas.microsoft.com/office/powerpoint/2010/main" val="1825812137"/>
       </p:ext>
     </p:extLst>
   </p:cSld>
@@ -19509,6 +21761,661 @@
     <p:extLst>
       <p:ext uri="{BB962C8B-B14F-4D97-AF65-F5344CB8AC3E}">
         <p14:creationId xmlns:p14="http://schemas.microsoft.com/office/powerpoint/2010/main" val="1551964428"/>
+      </p:ext>
+    </p:extLst>
+  </p:cSld>
+  <p:clrMapOvr>
+    <a:masterClrMapping/>
+  </p:clrMapOvr>
+  <mc:AlternateContent xmlns:mc="http://schemas.openxmlformats.org/markup-compatibility/2006" xmlns:p14="http://schemas.microsoft.com/office/powerpoint/2010/main">
+    <mc:Choice Requires="p14">
+      <p:transition spd="slow" p14:dur="1250" advTm="2000">
+        <p14:flip dir="r"/>
+      </p:transition>
+    </mc:Choice>
+    <mc:Fallback xmlns="">
+      <p:transition spd="slow" advTm="2000">
+        <p:fade/>
+      </p:transition>
+    </mc:Fallback>
+  </mc:AlternateContent>
+</p:sld>
+</file>
+
+<file path=ppt/slides/slide5.xml><?xml version="1.0" encoding="utf-8"?>
+<p:sld xmlns:a="http://schemas.openxmlformats.org/drawingml/2006/main" xmlns:r="http://schemas.openxmlformats.org/officeDocument/2006/relationships" xmlns:p="http://schemas.openxmlformats.org/presentationml/2006/main">
+  <p:cSld>
+    <p:spTree>
+      <p:nvGrpSpPr>
+        <p:cNvPr id="1" name=""/>
+        <p:cNvGrpSpPr/>
+        <p:nvPr/>
+      </p:nvGrpSpPr>
+      <p:grpSpPr>
+        <a:xfrm>
+          <a:off x="0" y="0"/>
+          <a:ext cx="0" cy="0"/>
+          <a:chOff x="0" y="0"/>
+          <a:chExt cx="0" cy="0"/>
+        </a:xfrm>
+      </p:grpSpPr>
+      <p:sp>
+        <p:nvSpPr>
+          <p:cNvPr id="7" name="Picture Placeholder 6">
+            <a:extLst>
+              <a:ext uri="{FF2B5EF4-FFF2-40B4-BE49-F238E27FC236}">
+                <a16:creationId xmlns:a16="http://schemas.microsoft.com/office/drawing/2014/main" id="{AC1BA873-815F-4E72-9BD9-93769C1DA7C7}"/>
+              </a:ext>
+            </a:extLst>
+          </p:cNvPr>
+          <p:cNvSpPr>
+            <a:spLocks noGrp="1"/>
+          </p:cNvSpPr>
+          <p:nvPr>
+            <p:ph type="pic" sz="quarter" idx="10"/>
+          </p:nvPr>
+        </p:nvSpPr>
+        <p:spPr/>
+      </p:sp>
+      <p:sp>
+        <p:nvSpPr>
+          <p:cNvPr id="2" name="Title 1">
+            <a:extLst>
+              <a:ext uri="{FF2B5EF4-FFF2-40B4-BE49-F238E27FC236}">
+                <a16:creationId xmlns:a16="http://schemas.microsoft.com/office/drawing/2014/main" id="{B2A8B21D-766A-4354-B054-43C814C7440B}"/>
+              </a:ext>
+            </a:extLst>
+          </p:cNvPr>
+          <p:cNvSpPr>
+            <a:spLocks noGrp="1"/>
+          </p:cNvSpPr>
+          <p:nvPr>
+            <p:ph type="title" idx="4294967295"/>
+          </p:nvPr>
+        </p:nvSpPr>
+        <p:spPr>
+          <a:xfrm>
+            <a:off x="0" y="1709738"/>
+            <a:ext cx="10515600" cy="2852737"/>
+          </a:xfrm>
+        </p:spPr>
+        <p:txBody>
+          <a:bodyPr/>
+          <a:lstStyle/>
+          <a:p>
+            <a:r>
+              <a:rPr lang="en-US" dirty="0"/>
+              <a:t>Lesson 3</a:t>
+            </a:r>
+          </a:p>
+        </p:txBody>
+      </p:sp>
+      <p:sp>
+        <p:nvSpPr>
+          <p:cNvPr id="3" name="Text Placeholder 2">
+            <a:extLst>
+              <a:ext uri="{FF2B5EF4-FFF2-40B4-BE49-F238E27FC236}">
+                <a16:creationId xmlns:a16="http://schemas.microsoft.com/office/drawing/2014/main" id="{551AA14F-63AB-40DA-A2E5-77B9ECBA8D3C}"/>
+              </a:ext>
+            </a:extLst>
+          </p:cNvPr>
+          <p:cNvSpPr>
+            <a:spLocks noGrp="1"/>
+          </p:cNvSpPr>
+          <p:nvPr>
+            <p:ph type="body" idx="4294967295"/>
+          </p:nvPr>
+        </p:nvSpPr>
+        <p:spPr>
+          <a:xfrm>
+            <a:off x="0" y="4589463"/>
+            <a:ext cx="7014368" cy="1500187"/>
+          </a:xfrm>
+        </p:spPr>
+        <p:txBody>
+          <a:bodyPr>
+            <a:normAutofit/>
+          </a:bodyPr>
+          <a:lstStyle/>
+          <a:p>
+            <a:pPr marL="0" indent="0">
+              <a:buNone/>
+            </a:pPr>
+            <a:r>
+              <a:rPr lang="en-US" dirty="0"/>
+              <a:t>Debugging</a:t>
+            </a:r>
+          </a:p>
+        </p:txBody>
+      </p:sp>
+    </p:spTree>
+    <p:extLst>
+      <p:ext uri="{BB962C8B-B14F-4D97-AF65-F5344CB8AC3E}">
+        <p14:creationId xmlns:p14="http://schemas.microsoft.com/office/powerpoint/2010/main" val="82761267"/>
+      </p:ext>
+    </p:extLst>
+  </p:cSld>
+  <p:clrMapOvr>
+    <a:masterClrMapping/>
+  </p:clrMapOvr>
+  <mc:AlternateContent xmlns:mc="http://schemas.openxmlformats.org/markup-compatibility/2006" xmlns:p14="http://schemas.microsoft.com/office/powerpoint/2010/main">
+    <mc:Choice Requires="p14">
+      <p:transition spd="slow" p14:dur="1250" advTm="2000">
+        <p14:flip dir="r"/>
+      </p:transition>
+    </mc:Choice>
+    <mc:Fallback xmlns="">
+      <p:transition spd="slow" advTm="2000">
+        <p:fade/>
+      </p:transition>
+    </mc:Fallback>
+  </mc:AlternateContent>
+</p:sld>
+</file>
+
+<file path=ppt/slides/slide6.xml><?xml version="1.0" encoding="utf-8"?>
+<p:sld xmlns:a="http://schemas.openxmlformats.org/drawingml/2006/main" xmlns:r="http://schemas.openxmlformats.org/officeDocument/2006/relationships" xmlns:p="http://schemas.openxmlformats.org/presentationml/2006/main">
+  <p:cSld>
+    <p:spTree>
+      <p:nvGrpSpPr>
+        <p:cNvPr id="1" name=""/>
+        <p:cNvGrpSpPr/>
+        <p:nvPr/>
+      </p:nvGrpSpPr>
+      <p:grpSpPr>
+        <a:xfrm>
+          <a:off x="0" y="0"/>
+          <a:ext cx="0" cy="0"/>
+          <a:chOff x="0" y="0"/>
+          <a:chExt cx="0" cy="0"/>
+        </a:xfrm>
+      </p:grpSpPr>
+      <p:sp>
+        <p:nvSpPr>
+          <p:cNvPr id="7" name="Picture Placeholder 6">
+            <a:extLst>
+              <a:ext uri="{FF2B5EF4-FFF2-40B4-BE49-F238E27FC236}">
+                <a16:creationId xmlns:a16="http://schemas.microsoft.com/office/drawing/2014/main" id="{AC1BA873-815F-4E72-9BD9-93769C1DA7C7}"/>
+              </a:ext>
+            </a:extLst>
+          </p:cNvPr>
+          <p:cNvSpPr>
+            <a:spLocks noGrp="1"/>
+          </p:cNvSpPr>
+          <p:nvPr>
+            <p:ph type="pic" sz="quarter" idx="10"/>
+          </p:nvPr>
+        </p:nvSpPr>
+        <p:spPr/>
+      </p:sp>
+      <p:sp>
+        <p:nvSpPr>
+          <p:cNvPr id="2" name="Title 1">
+            <a:extLst>
+              <a:ext uri="{FF2B5EF4-FFF2-40B4-BE49-F238E27FC236}">
+                <a16:creationId xmlns:a16="http://schemas.microsoft.com/office/drawing/2014/main" id="{B2A8B21D-766A-4354-B054-43C814C7440B}"/>
+              </a:ext>
+            </a:extLst>
+          </p:cNvPr>
+          <p:cNvSpPr>
+            <a:spLocks noGrp="1"/>
+          </p:cNvSpPr>
+          <p:nvPr>
+            <p:ph type="title" idx="4294967295"/>
+          </p:nvPr>
+        </p:nvSpPr>
+        <p:spPr>
+          <a:xfrm>
+            <a:off x="0" y="1709738"/>
+            <a:ext cx="10515600" cy="2852737"/>
+          </a:xfrm>
+        </p:spPr>
+        <p:txBody>
+          <a:bodyPr/>
+          <a:lstStyle/>
+          <a:p>
+            <a:r>
+              <a:rPr lang="en-US" dirty="0"/>
+              <a:t>Lesson 4</a:t>
+            </a:r>
+          </a:p>
+        </p:txBody>
+      </p:sp>
+      <p:sp>
+        <p:nvSpPr>
+          <p:cNvPr id="3" name="Text Placeholder 2">
+            <a:extLst>
+              <a:ext uri="{FF2B5EF4-FFF2-40B4-BE49-F238E27FC236}">
+                <a16:creationId xmlns:a16="http://schemas.microsoft.com/office/drawing/2014/main" id="{551AA14F-63AB-40DA-A2E5-77B9ECBA8D3C}"/>
+              </a:ext>
+            </a:extLst>
+          </p:cNvPr>
+          <p:cNvSpPr>
+            <a:spLocks noGrp="1"/>
+          </p:cNvSpPr>
+          <p:nvPr>
+            <p:ph type="body" idx="4294967295"/>
+          </p:nvPr>
+        </p:nvSpPr>
+        <p:spPr>
+          <a:xfrm>
+            <a:off x="0" y="4589463"/>
+            <a:ext cx="7014368" cy="1500187"/>
+          </a:xfrm>
+        </p:spPr>
+        <p:txBody>
+          <a:bodyPr>
+            <a:normAutofit/>
+          </a:bodyPr>
+          <a:lstStyle/>
+          <a:p>
+            <a:pPr marL="0" indent="0">
+              <a:buNone/>
+            </a:pPr>
+            <a:r>
+              <a:rPr lang="en-US" dirty="0"/>
+              <a:t>Scope</a:t>
+            </a:r>
+          </a:p>
+        </p:txBody>
+      </p:sp>
+    </p:spTree>
+    <p:extLst>
+      <p:ext uri="{BB962C8B-B14F-4D97-AF65-F5344CB8AC3E}">
+        <p14:creationId xmlns:p14="http://schemas.microsoft.com/office/powerpoint/2010/main" val="337890428"/>
+      </p:ext>
+    </p:extLst>
+  </p:cSld>
+  <p:clrMapOvr>
+    <a:masterClrMapping/>
+  </p:clrMapOvr>
+  <mc:AlternateContent xmlns:mc="http://schemas.openxmlformats.org/markup-compatibility/2006" xmlns:p14="http://schemas.microsoft.com/office/powerpoint/2010/main">
+    <mc:Choice Requires="p14">
+      <p:transition spd="slow" p14:dur="1250" advTm="2000">
+        <p14:flip dir="r"/>
+      </p:transition>
+    </mc:Choice>
+    <mc:Fallback xmlns="">
+      <p:transition spd="slow" advTm="2000">
+        <p:fade/>
+      </p:transition>
+    </mc:Fallback>
+  </mc:AlternateContent>
+</p:sld>
+</file>
+
+<file path=ppt/slides/slide7.xml><?xml version="1.0" encoding="utf-8"?>
+<p:sld xmlns:a="http://schemas.openxmlformats.org/drawingml/2006/main" xmlns:r="http://schemas.openxmlformats.org/officeDocument/2006/relationships" xmlns:p="http://schemas.openxmlformats.org/presentationml/2006/main">
+  <p:cSld>
+    <p:spTree>
+      <p:nvGrpSpPr>
+        <p:cNvPr id="1" name=""/>
+        <p:cNvGrpSpPr/>
+        <p:nvPr/>
+      </p:nvGrpSpPr>
+      <p:grpSpPr>
+        <a:xfrm>
+          <a:off x="0" y="0"/>
+          <a:ext cx="0" cy="0"/>
+          <a:chOff x="0" y="0"/>
+          <a:chExt cx="0" cy="0"/>
+        </a:xfrm>
+      </p:grpSpPr>
+      <p:sp>
+        <p:nvSpPr>
+          <p:cNvPr id="7" name="Picture Placeholder 6">
+            <a:extLst>
+              <a:ext uri="{FF2B5EF4-FFF2-40B4-BE49-F238E27FC236}">
+                <a16:creationId xmlns:a16="http://schemas.microsoft.com/office/drawing/2014/main" id="{AC1BA873-815F-4E72-9BD9-93769C1DA7C7}"/>
+              </a:ext>
+            </a:extLst>
+          </p:cNvPr>
+          <p:cNvSpPr>
+            <a:spLocks noGrp="1"/>
+          </p:cNvSpPr>
+          <p:nvPr>
+            <p:ph type="pic" sz="quarter" idx="10"/>
+          </p:nvPr>
+        </p:nvSpPr>
+        <p:spPr/>
+      </p:sp>
+      <p:sp>
+        <p:nvSpPr>
+          <p:cNvPr id="2" name="Title 1">
+            <a:extLst>
+              <a:ext uri="{FF2B5EF4-FFF2-40B4-BE49-F238E27FC236}">
+                <a16:creationId xmlns:a16="http://schemas.microsoft.com/office/drawing/2014/main" id="{B2A8B21D-766A-4354-B054-43C814C7440B}"/>
+              </a:ext>
+            </a:extLst>
+          </p:cNvPr>
+          <p:cNvSpPr>
+            <a:spLocks noGrp="1"/>
+          </p:cNvSpPr>
+          <p:nvPr>
+            <p:ph type="title" idx="4294967295"/>
+          </p:nvPr>
+        </p:nvSpPr>
+        <p:spPr>
+          <a:xfrm>
+            <a:off x="0" y="1709738"/>
+            <a:ext cx="10515600" cy="2852737"/>
+          </a:xfrm>
+        </p:spPr>
+        <p:txBody>
+          <a:bodyPr/>
+          <a:lstStyle/>
+          <a:p>
+            <a:r>
+              <a:rPr lang="en-US" dirty="0"/>
+              <a:t>Lesson 5</a:t>
+            </a:r>
+          </a:p>
+        </p:txBody>
+      </p:sp>
+      <p:sp>
+        <p:nvSpPr>
+          <p:cNvPr id="3" name="Text Placeholder 2">
+            <a:extLst>
+              <a:ext uri="{FF2B5EF4-FFF2-40B4-BE49-F238E27FC236}">
+                <a16:creationId xmlns:a16="http://schemas.microsoft.com/office/drawing/2014/main" id="{551AA14F-63AB-40DA-A2E5-77B9ECBA8D3C}"/>
+              </a:ext>
+            </a:extLst>
+          </p:cNvPr>
+          <p:cNvSpPr>
+            <a:spLocks noGrp="1"/>
+          </p:cNvSpPr>
+          <p:nvPr>
+            <p:ph type="body" idx="4294967295"/>
+          </p:nvPr>
+        </p:nvSpPr>
+        <p:spPr>
+          <a:xfrm>
+            <a:off x="0" y="4589463"/>
+            <a:ext cx="7014368" cy="1500187"/>
+          </a:xfrm>
+        </p:spPr>
+        <p:txBody>
+          <a:bodyPr>
+            <a:normAutofit/>
+          </a:bodyPr>
+          <a:lstStyle/>
+          <a:p>
+            <a:pPr marL="0" indent="0">
+              <a:buNone/>
+            </a:pPr>
+            <a:r>
+              <a:rPr lang="en-US" dirty="0"/>
+              <a:t>Strings</a:t>
+            </a:r>
+          </a:p>
+        </p:txBody>
+      </p:sp>
+    </p:spTree>
+    <p:extLst>
+      <p:ext uri="{BB962C8B-B14F-4D97-AF65-F5344CB8AC3E}">
+        <p14:creationId xmlns:p14="http://schemas.microsoft.com/office/powerpoint/2010/main" val="3915960176"/>
+      </p:ext>
+    </p:extLst>
+  </p:cSld>
+  <p:clrMapOvr>
+    <a:masterClrMapping/>
+  </p:clrMapOvr>
+  <mc:AlternateContent xmlns:mc="http://schemas.openxmlformats.org/markup-compatibility/2006" xmlns:p14="http://schemas.microsoft.com/office/powerpoint/2010/main">
+    <mc:Choice Requires="p14">
+      <p:transition spd="slow" p14:dur="1250" advTm="2000">
+        <p14:flip dir="r"/>
+      </p:transition>
+    </mc:Choice>
+    <mc:Fallback xmlns="">
+      <p:transition spd="slow" advTm="2000">
+        <p:fade/>
+      </p:transition>
+    </mc:Fallback>
+  </mc:AlternateContent>
+</p:sld>
+</file>
+
+<file path=ppt/slides/slide8.xml><?xml version="1.0" encoding="utf-8"?>
+<p:sld xmlns:a="http://schemas.openxmlformats.org/drawingml/2006/main" xmlns:r="http://schemas.openxmlformats.org/officeDocument/2006/relationships" xmlns:p="http://schemas.openxmlformats.org/presentationml/2006/main">
+  <p:cSld>
+    <p:spTree>
+      <p:nvGrpSpPr>
+        <p:cNvPr id="1" name=""/>
+        <p:cNvGrpSpPr/>
+        <p:nvPr/>
+      </p:nvGrpSpPr>
+      <p:grpSpPr>
+        <a:xfrm>
+          <a:off x="0" y="0"/>
+          <a:ext cx="0" cy="0"/>
+          <a:chOff x="0" y="0"/>
+          <a:chExt cx="0" cy="0"/>
+        </a:xfrm>
+      </p:grpSpPr>
+      <p:sp>
+        <p:nvSpPr>
+          <p:cNvPr id="7" name="Picture Placeholder 6">
+            <a:extLst>
+              <a:ext uri="{FF2B5EF4-FFF2-40B4-BE49-F238E27FC236}">
+                <a16:creationId xmlns:a16="http://schemas.microsoft.com/office/drawing/2014/main" id="{AC1BA873-815F-4E72-9BD9-93769C1DA7C7}"/>
+              </a:ext>
+            </a:extLst>
+          </p:cNvPr>
+          <p:cNvSpPr>
+            <a:spLocks noGrp="1"/>
+          </p:cNvSpPr>
+          <p:nvPr>
+            <p:ph type="pic" sz="quarter" idx="10"/>
+          </p:nvPr>
+        </p:nvSpPr>
+        <p:spPr/>
+      </p:sp>
+      <p:sp>
+        <p:nvSpPr>
+          <p:cNvPr id="2" name="Title 1">
+            <a:extLst>
+              <a:ext uri="{FF2B5EF4-FFF2-40B4-BE49-F238E27FC236}">
+                <a16:creationId xmlns:a16="http://schemas.microsoft.com/office/drawing/2014/main" id="{B2A8B21D-766A-4354-B054-43C814C7440B}"/>
+              </a:ext>
+            </a:extLst>
+          </p:cNvPr>
+          <p:cNvSpPr>
+            <a:spLocks noGrp="1"/>
+          </p:cNvSpPr>
+          <p:nvPr>
+            <p:ph type="title" idx="4294967295"/>
+          </p:nvPr>
+        </p:nvSpPr>
+        <p:spPr>
+          <a:xfrm>
+            <a:off x="0" y="1709738"/>
+            <a:ext cx="10515600" cy="2852737"/>
+          </a:xfrm>
+        </p:spPr>
+        <p:txBody>
+          <a:bodyPr/>
+          <a:lstStyle/>
+          <a:p>
+            <a:r>
+              <a:rPr lang="en-US" dirty="0"/>
+              <a:t>Lesson 6</a:t>
+            </a:r>
+          </a:p>
+        </p:txBody>
+      </p:sp>
+      <p:sp>
+        <p:nvSpPr>
+          <p:cNvPr id="3" name="Text Placeholder 2">
+            <a:extLst>
+              <a:ext uri="{FF2B5EF4-FFF2-40B4-BE49-F238E27FC236}">
+                <a16:creationId xmlns:a16="http://schemas.microsoft.com/office/drawing/2014/main" id="{551AA14F-63AB-40DA-A2E5-77B9ECBA8D3C}"/>
+              </a:ext>
+            </a:extLst>
+          </p:cNvPr>
+          <p:cNvSpPr>
+            <a:spLocks noGrp="1"/>
+          </p:cNvSpPr>
+          <p:nvPr>
+            <p:ph type="body" idx="4294967295"/>
+          </p:nvPr>
+        </p:nvSpPr>
+        <p:spPr>
+          <a:xfrm>
+            <a:off x="0" y="4589463"/>
+            <a:ext cx="7014368" cy="1500187"/>
+          </a:xfrm>
+        </p:spPr>
+        <p:txBody>
+          <a:bodyPr>
+            <a:normAutofit/>
+          </a:bodyPr>
+          <a:lstStyle/>
+          <a:p>
+            <a:pPr marL="0" indent="0">
+              <a:buNone/>
+            </a:pPr>
+            <a:r>
+              <a:rPr lang="en-US" dirty="0"/>
+              <a:t>Dates and Times</a:t>
+            </a:r>
+          </a:p>
+        </p:txBody>
+      </p:sp>
+    </p:spTree>
+    <p:extLst>
+      <p:ext uri="{BB962C8B-B14F-4D97-AF65-F5344CB8AC3E}">
+        <p14:creationId xmlns:p14="http://schemas.microsoft.com/office/powerpoint/2010/main" val="2340841402"/>
+      </p:ext>
+    </p:extLst>
+  </p:cSld>
+  <p:clrMapOvr>
+    <a:masterClrMapping/>
+  </p:clrMapOvr>
+  <mc:AlternateContent xmlns:mc="http://schemas.openxmlformats.org/markup-compatibility/2006" xmlns:p14="http://schemas.microsoft.com/office/powerpoint/2010/main">
+    <mc:Choice Requires="p14">
+      <p:transition spd="slow" p14:dur="1250" advTm="2000">
+        <p14:flip dir="r"/>
+      </p:transition>
+    </mc:Choice>
+    <mc:Fallback xmlns="">
+      <p:transition spd="slow" advTm="2000">
+        <p:fade/>
+      </p:transition>
+    </mc:Fallback>
+  </mc:AlternateContent>
+</p:sld>
+</file>
+
+<file path=ppt/slides/slide9.xml><?xml version="1.0" encoding="utf-8"?>
+<p:sld xmlns:a="http://schemas.openxmlformats.org/drawingml/2006/main" xmlns:r="http://schemas.openxmlformats.org/officeDocument/2006/relationships" xmlns:p="http://schemas.openxmlformats.org/presentationml/2006/main">
+  <p:cSld>
+    <p:spTree>
+      <p:nvGrpSpPr>
+        <p:cNvPr id="1" name=""/>
+        <p:cNvGrpSpPr/>
+        <p:nvPr/>
+      </p:nvGrpSpPr>
+      <p:grpSpPr>
+        <a:xfrm>
+          <a:off x="0" y="0"/>
+          <a:ext cx="0" cy="0"/>
+          <a:chOff x="0" y="0"/>
+          <a:chExt cx="0" cy="0"/>
+        </a:xfrm>
+      </p:grpSpPr>
+      <p:sp>
+        <p:nvSpPr>
+          <p:cNvPr id="7" name="Picture Placeholder 6">
+            <a:extLst>
+              <a:ext uri="{FF2B5EF4-FFF2-40B4-BE49-F238E27FC236}">
+                <a16:creationId xmlns:a16="http://schemas.microsoft.com/office/drawing/2014/main" id="{AC1BA873-815F-4E72-9BD9-93769C1DA7C7}"/>
+              </a:ext>
+            </a:extLst>
+          </p:cNvPr>
+          <p:cNvSpPr>
+            <a:spLocks noGrp="1"/>
+          </p:cNvSpPr>
+          <p:nvPr>
+            <p:ph type="pic" sz="quarter" idx="10"/>
+          </p:nvPr>
+        </p:nvSpPr>
+        <p:spPr/>
+      </p:sp>
+      <p:sp>
+        <p:nvSpPr>
+          <p:cNvPr id="2" name="Title 1">
+            <a:extLst>
+              <a:ext uri="{FF2B5EF4-FFF2-40B4-BE49-F238E27FC236}">
+                <a16:creationId xmlns:a16="http://schemas.microsoft.com/office/drawing/2014/main" id="{B2A8B21D-766A-4354-B054-43C814C7440B}"/>
+              </a:ext>
+            </a:extLst>
+          </p:cNvPr>
+          <p:cNvSpPr>
+            <a:spLocks noGrp="1"/>
+          </p:cNvSpPr>
+          <p:nvPr>
+            <p:ph type="title" idx="4294967295"/>
+          </p:nvPr>
+        </p:nvSpPr>
+        <p:spPr>
+          <a:xfrm>
+            <a:off x="0" y="1709738"/>
+            <a:ext cx="10515600" cy="2852737"/>
+          </a:xfrm>
+        </p:spPr>
+        <p:txBody>
+          <a:bodyPr/>
+          <a:lstStyle/>
+          <a:p>
+            <a:r>
+              <a:rPr lang="en-US" dirty="0"/>
+              <a:t>Lesson 7</a:t>
+            </a:r>
+          </a:p>
+        </p:txBody>
+      </p:sp>
+      <p:sp>
+        <p:nvSpPr>
+          <p:cNvPr id="3" name="Text Placeholder 2">
+            <a:extLst>
+              <a:ext uri="{FF2B5EF4-FFF2-40B4-BE49-F238E27FC236}">
+                <a16:creationId xmlns:a16="http://schemas.microsoft.com/office/drawing/2014/main" id="{551AA14F-63AB-40DA-A2E5-77B9ECBA8D3C}"/>
+              </a:ext>
+            </a:extLst>
+          </p:cNvPr>
+          <p:cNvSpPr>
+            <a:spLocks noGrp="1"/>
+          </p:cNvSpPr>
+          <p:nvPr>
+            <p:ph type="body" idx="4294967295"/>
+          </p:nvPr>
+        </p:nvSpPr>
+        <p:spPr>
+          <a:xfrm>
+            <a:off x="0" y="4589463"/>
+            <a:ext cx="7014368" cy="1500187"/>
+          </a:xfrm>
+        </p:spPr>
+        <p:txBody>
+          <a:bodyPr>
+            <a:normAutofit/>
+          </a:bodyPr>
+          <a:lstStyle/>
+          <a:p>
+            <a:pPr marL="0" indent="0">
+              <a:buNone/>
+            </a:pPr>
+            <a:r>
+              <a:rPr lang="en-US" dirty="0"/>
+              <a:t>Arrays and Collections</a:t>
+            </a:r>
+          </a:p>
+        </p:txBody>
+      </p:sp>
+    </p:spTree>
+    <p:extLst>
+      <p:ext uri="{BB962C8B-B14F-4D97-AF65-F5344CB8AC3E}">
+        <p14:creationId xmlns:p14="http://schemas.microsoft.com/office/powerpoint/2010/main" val="655158604"/>
       </p:ext>
     </p:extLst>
   </p:cSld>

</xml_diff>

<commit_message>
mini update on ppt fie
</commit_message>
<xml_diff>
--- a/01-intro/C# Lessons.pptx
+++ b/01-intro/C# Lessons.pptx
@@ -20698,24 +20698,31 @@
           <a:chExt cx="0" cy="0"/>
         </a:xfrm>
       </p:grpSpPr>
-      <p:sp>
-        <p:nvSpPr>
-          <p:cNvPr id="5" name="Picture Placeholder 4">
+      <p:pic>
+        <p:nvPicPr>
+          <p:cNvPr id="8" name="Picture Placeholder 7">
             <a:extLst>
               <a:ext uri="{FF2B5EF4-FFF2-40B4-BE49-F238E27FC236}">
-                <a16:creationId xmlns:a16="http://schemas.microsoft.com/office/drawing/2014/main" id="{72AB115E-897A-4835-8BDF-505CC414FB6E}"/>
+                <a16:creationId xmlns:a16="http://schemas.microsoft.com/office/drawing/2014/main" id="{9E98361B-C687-4010-988B-57B2AB37B861}"/>
               </a:ext>
             </a:extLst>
           </p:cNvPr>
-          <p:cNvSpPr>
-            <a:spLocks noGrp="1"/>
-          </p:cNvSpPr>
+          <p:cNvPicPr>
+            <a:picLocks noGrp="1" noChangeAspect="1"/>
+          </p:cNvPicPr>
           <p:nvPr>
             <p:ph type="pic" sz="quarter" idx="10"/>
           </p:nvPr>
-        </p:nvSpPr>
+        </p:nvPicPr>
+        <p:blipFill>
+          <a:blip r:embed="rId2"/>
+          <a:srcRect l="17133" r="17133"/>
+          <a:stretch>
+            <a:fillRect/>
+          </a:stretch>
+        </p:blipFill>
         <p:spPr/>
-      </p:sp>
+      </p:pic>
       <p:sp>
         <p:nvSpPr>
           <p:cNvPr id="2" name="Title 1">
@@ -21744,24 +21751,34 @@
           <a:chExt cx="0" cy="0"/>
         </a:xfrm>
       </p:grpSpPr>
-      <p:sp>
-        <p:nvSpPr>
-          <p:cNvPr id="7" name="Picture Placeholder 6">
+      <p:pic>
+        <p:nvPicPr>
+          <p:cNvPr id="8" name="Picture Placeholder 7">
             <a:extLst>
               <a:ext uri="{FF2B5EF4-FFF2-40B4-BE49-F238E27FC236}">
-                <a16:creationId xmlns:a16="http://schemas.microsoft.com/office/drawing/2014/main" id="{AC1BA873-815F-4E72-9BD9-93769C1DA7C7}"/>
+                <a16:creationId xmlns:a16="http://schemas.microsoft.com/office/drawing/2014/main" id="{CABD3A5B-2263-4153-8E6B-BA79BA906718}"/>
               </a:ext>
             </a:extLst>
           </p:cNvPr>
-          <p:cNvSpPr>
-            <a:spLocks noGrp="1"/>
-          </p:cNvSpPr>
+          <p:cNvPicPr>
+            <a:picLocks noGrp="1" noChangeAspect="1"/>
+          </p:cNvPicPr>
           <p:nvPr>
             <p:ph type="pic" sz="quarter" idx="10"/>
           </p:nvPr>
-        </p:nvSpPr>
-        <p:spPr/>
-      </p:sp>
+        </p:nvPicPr>
+        <p:blipFill rotWithShape="1">
+          <a:blip r:embed="rId2"/>
+          <a:srcRect l="13260" t="9820" r="31713" b="6466"/>
+          <a:stretch/>
+        </p:blipFill>
+        <p:spPr>
+          <a:xfrm>
+            <a:off x="4648200" y="-3676294"/>
+            <a:ext cx="13796168" cy="13993098"/>
+          </a:xfrm>
+        </p:spPr>
+      </p:pic>
       <p:sp>
         <p:nvSpPr>
           <p:cNvPr id="2" name="Title 1">
@@ -23922,4 +23939,24 @@
     </a:ext>
   </a:extLst>
 </a:theme>
+</file>
+
+<file path=ppt/webextensions/taskpanes.xml><?xml version="1.0" encoding="utf-8"?>
+<wetp:taskpanes xmlns:wetp="http://schemas.microsoft.com/office/webextensions/taskpanes/2010/11">
+  <wetp:taskpane dockstate="right" visibility="0" width="350" row="6">
+    <wetp:webextensionref xmlns:r="http://schemas.openxmlformats.org/officeDocument/2006/relationships" r:id="rId1"/>
+  </wetp:taskpane>
+</wetp:taskpanes>
+</file>
+
+<file path=ppt/webextensions/webextension1.xml><?xml version="1.0" encoding="utf-8"?>
+<we:webextension xmlns:we="http://schemas.microsoft.com/office/webextensions/webextension/2010/11" id="{BB5CC6DB-0F30-4A87-A598-3BAC938B81F0}">
+  <we:reference id="wa104381335" version="1.0.0.1" store="en-US" storeType="OMEX"/>
+  <we:alternateReferences>
+    <we:reference id="WA104381335" version="1.0.0.1" store="" storeType="OMEX"/>
+  </we:alternateReferences>
+  <we:properties/>
+  <we:bindings/>
+  <we:snapshot xmlns:r="http://schemas.openxmlformats.org/officeDocument/2006/relationships"/>
+</we:webextension>
 </file>
</xml_diff>

<commit_message>
not sure what I am commmiting
</commit_message>
<xml_diff>
--- a/01-intro/C# Lessons.pptx
+++ b/01-intro/C# Lessons.pptx
@@ -13,28 +13,29 @@
     <p:sldId id="257" r:id="rId7"/>
     <p:sldId id="258" r:id="rId8"/>
     <p:sldId id="259" r:id="rId9"/>
-    <p:sldId id="260" r:id="rId10"/>
-    <p:sldId id="261" r:id="rId11"/>
-    <p:sldId id="262" r:id="rId12"/>
-    <p:sldId id="263" r:id="rId13"/>
-    <p:sldId id="264" r:id="rId14"/>
-    <p:sldId id="265" r:id="rId15"/>
-    <p:sldId id="266" r:id="rId16"/>
-    <p:sldId id="267" r:id="rId17"/>
-    <p:sldId id="268" r:id="rId18"/>
-    <p:sldId id="269" r:id="rId19"/>
-    <p:sldId id="270" r:id="rId20"/>
-    <p:sldId id="271" r:id="rId21"/>
-    <p:sldId id="272" r:id="rId22"/>
-    <p:sldId id="273" r:id="rId23"/>
-    <p:sldId id="274" r:id="rId24"/>
-    <p:sldId id="275" r:id="rId25"/>
-    <p:sldId id="276" r:id="rId26"/>
-    <p:sldId id="277" r:id="rId27"/>
-    <p:sldId id="278" r:id="rId28"/>
-    <p:sldId id="279" r:id="rId29"/>
-    <p:sldId id="280" r:id="rId30"/>
-    <p:sldId id="281" r:id="rId31"/>
+    <p:sldId id="282" r:id="rId10"/>
+    <p:sldId id="260" r:id="rId11"/>
+    <p:sldId id="261" r:id="rId12"/>
+    <p:sldId id="262" r:id="rId13"/>
+    <p:sldId id="263" r:id="rId14"/>
+    <p:sldId id="264" r:id="rId15"/>
+    <p:sldId id="265" r:id="rId16"/>
+    <p:sldId id="266" r:id="rId17"/>
+    <p:sldId id="267" r:id="rId18"/>
+    <p:sldId id="268" r:id="rId19"/>
+    <p:sldId id="269" r:id="rId20"/>
+    <p:sldId id="270" r:id="rId21"/>
+    <p:sldId id="271" r:id="rId22"/>
+    <p:sldId id="272" r:id="rId23"/>
+    <p:sldId id="273" r:id="rId24"/>
+    <p:sldId id="274" r:id="rId25"/>
+    <p:sldId id="275" r:id="rId26"/>
+    <p:sldId id="276" r:id="rId27"/>
+    <p:sldId id="277" r:id="rId28"/>
+    <p:sldId id="278" r:id="rId29"/>
+    <p:sldId id="279" r:id="rId30"/>
+    <p:sldId id="280" r:id="rId31"/>
+    <p:sldId id="281" r:id="rId32"/>
   </p:sldIdLst>
   <p:sldSz cx="12192000" cy="6858000"/>
   <p:notesSz cx="6858000" cy="9144000"/>
@@ -146,6 +147,7 @@
           <p14:sldIdLst>
             <p14:sldId id="258"/>
             <p14:sldId id="259"/>
+            <p14:sldId id="282"/>
             <p14:sldId id="260"/>
             <p14:sldId id="261"/>
             <p14:sldId id="262"/>
@@ -19388,24 +19390,36 @@
           <a:chExt cx="0" cy="0"/>
         </a:xfrm>
       </p:grpSpPr>
-      <p:sp>
-        <p:nvSpPr>
-          <p:cNvPr id="7" name="Picture Placeholder 6">
+      <p:pic>
+        <p:nvPicPr>
+          <p:cNvPr id="4" name="Picture Placeholder 3">
             <a:extLst>
               <a:ext uri="{FF2B5EF4-FFF2-40B4-BE49-F238E27FC236}">
-                <a16:creationId xmlns:a16="http://schemas.microsoft.com/office/drawing/2014/main" id="{AC1BA873-815F-4E72-9BD9-93769C1DA7C7}"/>
+                <a16:creationId xmlns:a16="http://schemas.microsoft.com/office/drawing/2014/main" id="{DD13BB6E-472D-42B8-B3A7-4805E50DF0DD}"/>
               </a:ext>
             </a:extLst>
           </p:cNvPr>
-          <p:cNvSpPr>
-            <a:spLocks noGrp="1"/>
-          </p:cNvSpPr>
+          <p:cNvPicPr>
+            <a:picLocks noGrp="1" noChangeAspect="1"/>
+          </p:cNvPicPr>
           <p:nvPr>
             <p:ph type="pic" sz="quarter" idx="10"/>
           </p:nvPr>
-        </p:nvSpPr>
-        <p:spPr/>
-      </p:sp>
+        </p:nvPicPr>
+        <p:blipFill>
+          <a:blip r:embed="rId2"/>
+          <a:srcRect l="13025" r="13025"/>
+          <a:stretch>
+            <a:fillRect/>
+          </a:stretch>
+        </p:blipFill>
+        <p:spPr>
+          <a:xfrm>
+            <a:off x="5542764" y="-2768961"/>
+            <a:ext cx="12007040" cy="12178432"/>
+          </a:xfrm>
+        </p:spPr>
+      </p:pic>
       <p:sp>
         <p:nvSpPr>
           <p:cNvPr id="2" name="Title 1">
@@ -19434,7 +19448,7 @@
           <a:p>
             <a:r>
               <a:rPr lang="en-US" dirty="0"/>
-              <a:t>Lesson 8</a:t>
+              <a:t>Lesson 7</a:t>
             </a:r>
           </a:p>
         </p:txBody>
@@ -19472,7 +19486,7 @@
             </a:pPr>
             <a:r>
               <a:rPr lang="en-US" dirty="0"/>
-              <a:t>Enumerations and Structures</a:t>
+              <a:t>Arrays and Collections</a:t>
             </a:r>
           </a:p>
         </p:txBody>
@@ -19480,7 +19494,7 @@
     </p:spTree>
     <p:extLst>
       <p:ext uri="{BB962C8B-B14F-4D97-AF65-F5344CB8AC3E}">
-        <p14:creationId xmlns:p14="http://schemas.microsoft.com/office/powerpoint/2010/main" val="2122467810"/>
+        <p14:creationId xmlns:p14="http://schemas.microsoft.com/office/powerpoint/2010/main" val="655158604"/>
       </p:ext>
     </p:extLst>
   </p:cSld>
@@ -19519,24 +19533,36 @@
           <a:chExt cx="0" cy="0"/>
         </a:xfrm>
       </p:grpSpPr>
-      <p:sp>
-        <p:nvSpPr>
-          <p:cNvPr id="7" name="Picture Placeholder 6">
+      <p:pic>
+        <p:nvPicPr>
+          <p:cNvPr id="4" name="Picture Placeholder 3">
             <a:extLst>
               <a:ext uri="{FF2B5EF4-FFF2-40B4-BE49-F238E27FC236}">
-                <a16:creationId xmlns:a16="http://schemas.microsoft.com/office/drawing/2014/main" id="{AC1BA873-815F-4E72-9BD9-93769C1DA7C7}"/>
+                <a16:creationId xmlns:a16="http://schemas.microsoft.com/office/drawing/2014/main" id="{2275A6BB-906D-4E74-B715-47980696FB8B}"/>
               </a:ext>
             </a:extLst>
           </p:cNvPr>
-          <p:cNvSpPr>
-            <a:spLocks noGrp="1"/>
-          </p:cNvSpPr>
+          <p:cNvPicPr>
+            <a:picLocks noGrp="1" noChangeAspect="1"/>
+          </p:cNvPicPr>
           <p:nvPr>
             <p:ph type="pic" sz="quarter" idx="10"/>
           </p:nvPr>
-        </p:nvSpPr>
-        <p:spPr/>
-      </p:sp>
+        </p:nvPicPr>
+        <p:blipFill>
+          <a:blip r:embed="rId2"/>
+          <a:srcRect l="17133" r="17133"/>
+          <a:stretch>
+            <a:fillRect/>
+          </a:stretch>
+        </p:blipFill>
+        <p:spPr>
+          <a:xfrm>
+            <a:off x="7013575" y="-1276350"/>
+            <a:ext cx="9064625" cy="9193213"/>
+          </a:xfrm>
+        </p:spPr>
+      </p:pic>
       <p:sp>
         <p:nvSpPr>
           <p:cNvPr id="2" name="Title 1">
@@ -19565,7 +19591,7 @@
           <a:p>
             <a:r>
               <a:rPr lang="en-US" dirty="0"/>
-              <a:t>Lesson 9</a:t>
+              <a:t>Lesson 8</a:t>
             </a:r>
           </a:p>
         </p:txBody>
@@ -19603,7 +19629,7 @@
             </a:pPr>
             <a:r>
               <a:rPr lang="en-US" dirty="0"/>
-              <a:t>Making Choices</a:t>
+              <a:t>Enumerations and Structures</a:t>
             </a:r>
           </a:p>
         </p:txBody>
@@ -19611,7 +19637,7 @@
     </p:spTree>
     <p:extLst>
       <p:ext uri="{BB962C8B-B14F-4D97-AF65-F5344CB8AC3E}">
-        <p14:creationId xmlns:p14="http://schemas.microsoft.com/office/powerpoint/2010/main" val="2722297980"/>
+        <p14:creationId xmlns:p14="http://schemas.microsoft.com/office/powerpoint/2010/main" val="2122467810"/>
       </p:ext>
     </p:extLst>
   </p:cSld>
@@ -19650,24 +19676,31 @@
           <a:chExt cx="0" cy="0"/>
         </a:xfrm>
       </p:grpSpPr>
-      <p:sp>
-        <p:nvSpPr>
-          <p:cNvPr id="7" name="Picture Placeholder 6">
+      <p:pic>
+        <p:nvPicPr>
+          <p:cNvPr id="4" name="Picture Placeholder 3">
             <a:extLst>
               <a:ext uri="{FF2B5EF4-FFF2-40B4-BE49-F238E27FC236}">
-                <a16:creationId xmlns:a16="http://schemas.microsoft.com/office/drawing/2014/main" id="{AC1BA873-815F-4E72-9BD9-93769C1DA7C7}"/>
+                <a16:creationId xmlns:a16="http://schemas.microsoft.com/office/drawing/2014/main" id="{81D15399-48F7-4649-BF88-F6F906AA50BA}"/>
               </a:ext>
             </a:extLst>
           </p:cNvPr>
-          <p:cNvSpPr>
-            <a:spLocks noGrp="1"/>
-          </p:cNvSpPr>
+          <p:cNvPicPr>
+            <a:picLocks noGrp="1" noChangeAspect="1"/>
+          </p:cNvPicPr>
           <p:nvPr>
             <p:ph type="pic" sz="quarter" idx="10"/>
           </p:nvPr>
-        </p:nvSpPr>
+        </p:nvPicPr>
+        <p:blipFill>
+          <a:blip r:embed="rId2"/>
+          <a:srcRect l="17801" r="17801"/>
+          <a:stretch>
+            <a:fillRect/>
+          </a:stretch>
+        </p:blipFill>
         <p:spPr/>
-      </p:sp>
+      </p:pic>
       <p:sp>
         <p:nvSpPr>
           <p:cNvPr id="2" name="Title 1">
@@ -19696,7 +19729,7 @@
           <a:p>
             <a:r>
               <a:rPr lang="en-US" dirty="0"/>
-              <a:t>Lesson 10</a:t>
+              <a:t>Lesson 9</a:t>
             </a:r>
           </a:p>
         </p:txBody>
@@ -19734,7 +19767,7 @@
             </a:pPr>
             <a:r>
               <a:rPr lang="en-US" dirty="0"/>
-              <a:t>Repeating Program Steps</a:t>
+              <a:t>Making Choices</a:t>
             </a:r>
           </a:p>
         </p:txBody>
@@ -19742,7 +19775,7 @@
     </p:spTree>
     <p:extLst>
       <p:ext uri="{BB962C8B-B14F-4D97-AF65-F5344CB8AC3E}">
-        <p14:creationId xmlns:p14="http://schemas.microsoft.com/office/powerpoint/2010/main" val="2385190478"/>
+        <p14:creationId xmlns:p14="http://schemas.microsoft.com/office/powerpoint/2010/main" val="2722297980"/>
       </p:ext>
     </p:extLst>
   </p:cSld>
@@ -19781,24 +19814,31 @@
           <a:chExt cx="0" cy="0"/>
         </a:xfrm>
       </p:grpSpPr>
-      <p:sp>
-        <p:nvSpPr>
-          <p:cNvPr id="7" name="Picture Placeholder 6">
+      <p:pic>
+        <p:nvPicPr>
+          <p:cNvPr id="4" name="Picture Placeholder 3">
             <a:extLst>
               <a:ext uri="{FF2B5EF4-FFF2-40B4-BE49-F238E27FC236}">
-                <a16:creationId xmlns:a16="http://schemas.microsoft.com/office/drawing/2014/main" id="{AC1BA873-815F-4E72-9BD9-93769C1DA7C7}"/>
+                <a16:creationId xmlns:a16="http://schemas.microsoft.com/office/drawing/2014/main" id="{21CF88B5-98FE-435D-B828-5CAD8FE4288D}"/>
               </a:ext>
             </a:extLst>
           </p:cNvPr>
-          <p:cNvSpPr>
-            <a:spLocks noGrp="1"/>
-          </p:cNvSpPr>
+          <p:cNvPicPr>
+            <a:picLocks noGrp="1" noChangeAspect="1"/>
+          </p:cNvPicPr>
           <p:nvPr>
             <p:ph type="pic" sz="quarter" idx="10"/>
           </p:nvPr>
-        </p:nvSpPr>
+        </p:nvPicPr>
+        <p:blipFill>
+          <a:blip r:embed="rId2"/>
+          <a:srcRect l="699" r="699"/>
+          <a:stretch>
+            <a:fillRect/>
+          </a:stretch>
+        </p:blipFill>
         <p:spPr/>
-      </p:sp>
+      </p:pic>
       <p:sp>
         <p:nvSpPr>
           <p:cNvPr id="2" name="Title 1">
@@ -19827,7 +19867,7 @@
           <a:p>
             <a:r>
               <a:rPr lang="en-US" dirty="0"/>
-              <a:t>Lesson 11</a:t>
+              <a:t>Lesson 10</a:t>
             </a:r>
           </a:p>
         </p:txBody>
@@ -19865,7 +19905,7 @@
             </a:pPr>
             <a:r>
               <a:rPr lang="en-US" dirty="0"/>
-              <a:t>Reusing Code with Methods</a:t>
+              <a:t>Repeating Program Steps</a:t>
             </a:r>
           </a:p>
         </p:txBody>
@@ -19873,7 +19913,7 @@
     </p:spTree>
     <p:extLst>
       <p:ext uri="{BB962C8B-B14F-4D97-AF65-F5344CB8AC3E}">
-        <p14:creationId xmlns:p14="http://schemas.microsoft.com/office/powerpoint/2010/main" val="1420352367"/>
+        <p14:creationId xmlns:p14="http://schemas.microsoft.com/office/powerpoint/2010/main" val="2385190478"/>
       </p:ext>
     </p:extLst>
   </p:cSld>
@@ -19912,24 +19952,31 @@
           <a:chExt cx="0" cy="0"/>
         </a:xfrm>
       </p:grpSpPr>
-      <p:sp>
-        <p:nvSpPr>
-          <p:cNvPr id="7" name="Picture Placeholder 6">
+      <p:pic>
+        <p:nvPicPr>
+          <p:cNvPr id="4" name="Picture Placeholder 3">
             <a:extLst>
               <a:ext uri="{FF2B5EF4-FFF2-40B4-BE49-F238E27FC236}">
-                <a16:creationId xmlns:a16="http://schemas.microsoft.com/office/drawing/2014/main" id="{AC1BA873-815F-4E72-9BD9-93769C1DA7C7}"/>
+                <a16:creationId xmlns:a16="http://schemas.microsoft.com/office/drawing/2014/main" id="{F92309F6-7AC4-439E-87EF-927B8F1F99D5}"/>
               </a:ext>
             </a:extLst>
           </p:cNvPr>
-          <p:cNvSpPr>
-            <a:spLocks noGrp="1"/>
-          </p:cNvSpPr>
+          <p:cNvPicPr>
+            <a:picLocks noGrp="1" noChangeAspect="1"/>
+          </p:cNvPicPr>
           <p:nvPr>
             <p:ph type="pic" sz="quarter" idx="10"/>
           </p:nvPr>
-        </p:nvSpPr>
+        </p:nvPicPr>
+        <p:blipFill>
+          <a:blip r:embed="rId2"/>
+          <a:srcRect l="4666" r="4666"/>
+          <a:stretch>
+            <a:fillRect/>
+          </a:stretch>
+        </p:blipFill>
         <p:spPr/>
-      </p:sp>
+      </p:pic>
       <p:sp>
         <p:nvSpPr>
           <p:cNvPr id="2" name="Title 1">
@@ -19958,7 +20005,7 @@
           <a:p>
             <a:r>
               <a:rPr lang="en-US" dirty="0"/>
-              <a:t>Lesson 12</a:t>
+              <a:t>Lesson 11</a:t>
             </a:r>
           </a:p>
         </p:txBody>
@@ -19996,7 +20043,7 @@
             </a:pPr>
             <a:r>
               <a:rPr lang="en-US" dirty="0"/>
-              <a:t>Handling Errors</a:t>
+              <a:t>Reusing Code with Methods</a:t>
             </a:r>
           </a:p>
         </p:txBody>
@@ -20004,7 +20051,7 @@
     </p:spTree>
     <p:extLst>
       <p:ext uri="{BB962C8B-B14F-4D97-AF65-F5344CB8AC3E}">
-        <p14:creationId xmlns:p14="http://schemas.microsoft.com/office/powerpoint/2010/main" val="837109256"/>
+        <p14:creationId xmlns:p14="http://schemas.microsoft.com/office/powerpoint/2010/main" val="1420352367"/>
       </p:ext>
     </p:extLst>
   </p:cSld>
@@ -20043,24 +20090,34 @@
           <a:chExt cx="0" cy="0"/>
         </a:xfrm>
       </p:grpSpPr>
-      <p:sp>
-        <p:nvSpPr>
-          <p:cNvPr id="7" name="Picture Placeholder 6">
+      <p:pic>
+        <p:nvPicPr>
+          <p:cNvPr id="4" name="Picture Placeholder 3">
             <a:extLst>
               <a:ext uri="{FF2B5EF4-FFF2-40B4-BE49-F238E27FC236}">
-                <a16:creationId xmlns:a16="http://schemas.microsoft.com/office/drawing/2014/main" id="{AC1BA873-815F-4E72-9BD9-93769C1DA7C7}"/>
+                <a16:creationId xmlns:a16="http://schemas.microsoft.com/office/drawing/2014/main" id="{0BAC5A6D-6A0D-47DC-AD1F-09823FDDCC57}"/>
               </a:ext>
             </a:extLst>
           </p:cNvPr>
-          <p:cNvSpPr>
-            <a:spLocks noGrp="1"/>
-          </p:cNvSpPr>
+          <p:cNvPicPr>
+            <a:picLocks noGrp="1" noChangeAspect="1"/>
+          </p:cNvPicPr>
           <p:nvPr>
             <p:ph type="pic" sz="quarter" idx="10"/>
           </p:nvPr>
-        </p:nvSpPr>
-        <p:spPr/>
-      </p:sp>
+        </p:nvPicPr>
+        <p:blipFill rotWithShape="1">
+          <a:blip r:embed="rId2"/>
+          <a:srcRect l="40873" t="-561" r="256" b="20952"/>
+          <a:stretch/>
+        </p:blipFill>
+        <p:spPr>
+          <a:xfrm>
+            <a:off x="7014368" y="-1276351"/>
+            <a:ext cx="9063832" cy="9193212"/>
+          </a:xfrm>
+        </p:spPr>
+      </p:pic>
       <p:sp>
         <p:nvSpPr>
           <p:cNvPr id="2" name="Title 1">
@@ -20089,7 +20146,7 @@
           <a:p>
             <a:r>
               <a:rPr lang="en-US" dirty="0"/>
-              <a:t>Lesson 13</a:t>
+              <a:t>Lesson 12</a:t>
             </a:r>
           </a:p>
         </p:txBody>
@@ -20127,7 +20184,7 @@
             </a:pPr>
             <a:r>
               <a:rPr lang="en-US" dirty="0"/>
-              <a:t>Preventing Bugs</a:t>
+              <a:t>Handling Errors</a:t>
             </a:r>
           </a:p>
         </p:txBody>
@@ -20135,7 +20192,7 @@
     </p:spTree>
     <p:extLst>
       <p:ext uri="{BB962C8B-B14F-4D97-AF65-F5344CB8AC3E}">
-        <p14:creationId xmlns:p14="http://schemas.microsoft.com/office/powerpoint/2010/main" val="479623129"/>
+        <p14:creationId xmlns:p14="http://schemas.microsoft.com/office/powerpoint/2010/main" val="837109256"/>
       </p:ext>
     </p:extLst>
   </p:cSld>
@@ -20174,24 +20231,36 @@
           <a:chExt cx="0" cy="0"/>
         </a:xfrm>
       </p:grpSpPr>
-      <p:sp>
-        <p:nvSpPr>
-          <p:cNvPr id="7" name="Picture Placeholder 6">
+      <p:pic>
+        <p:nvPicPr>
+          <p:cNvPr id="4" name="Picture Placeholder 3">
             <a:extLst>
               <a:ext uri="{FF2B5EF4-FFF2-40B4-BE49-F238E27FC236}">
-                <a16:creationId xmlns:a16="http://schemas.microsoft.com/office/drawing/2014/main" id="{AC1BA873-815F-4E72-9BD9-93769C1DA7C7}"/>
+                <a16:creationId xmlns:a16="http://schemas.microsoft.com/office/drawing/2014/main" id="{5498D730-A74A-4FFE-B019-83033997997B}"/>
               </a:ext>
             </a:extLst>
           </p:cNvPr>
-          <p:cNvSpPr>
-            <a:spLocks noGrp="1"/>
-          </p:cNvSpPr>
+          <p:cNvPicPr>
+            <a:picLocks noGrp="1" noChangeAspect="1"/>
+          </p:cNvPicPr>
           <p:nvPr>
             <p:ph type="pic" sz="quarter" idx="10"/>
           </p:nvPr>
-        </p:nvSpPr>
-        <p:spPr/>
-      </p:sp>
+        </p:nvPicPr>
+        <p:blipFill>
+          <a:blip r:embed="rId2"/>
+          <a:srcRect t="16194" b="16194"/>
+          <a:stretch>
+            <a:fillRect/>
+          </a:stretch>
+        </p:blipFill>
+        <p:spPr>
+          <a:xfrm>
+            <a:off x="4831606" y="-1276351"/>
+            <a:ext cx="9063832" cy="9193212"/>
+          </a:xfrm>
+        </p:spPr>
+      </p:pic>
       <p:sp>
         <p:nvSpPr>
           <p:cNvPr id="2" name="Title 1">
@@ -20220,7 +20289,7 @@
           <a:p>
             <a:r>
               <a:rPr lang="en-US" dirty="0"/>
-              <a:t>Lesson 14</a:t>
+              <a:t>Lesson 13</a:t>
             </a:r>
           </a:p>
         </p:txBody>
@@ -20258,7 +20327,7 @@
             </a:pPr>
             <a:r>
               <a:rPr lang="en-US" dirty="0"/>
-              <a:t>Defining Classes</a:t>
+              <a:t>Preventing Bugs</a:t>
             </a:r>
           </a:p>
         </p:txBody>
@@ -20266,7 +20335,7 @@
     </p:spTree>
     <p:extLst>
       <p:ext uri="{BB962C8B-B14F-4D97-AF65-F5344CB8AC3E}">
-        <p14:creationId xmlns:p14="http://schemas.microsoft.com/office/powerpoint/2010/main" val="187124869"/>
+        <p14:creationId xmlns:p14="http://schemas.microsoft.com/office/powerpoint/2010/main" val="479623129"/>
       </p:ext>
     </p:extLst>
   </p:cSld>
@@ -20305,24 +20374,31 @@
           <a:chExt cx="0" cy="0"/>
         </a:xfrm>
       </p:grpSpPr>
-      <p:sp>
-        <p:nvSpPr>
-          <p:cNvPr id="7" name="Picture Placeholder 6">
+      <p:pic>
+        <p:nvPicPr>
+          <p:cNvPr id="4" name="Picture Placeholder 3">
             <a:extLst>
               <a:ext uri="{FF2B5EF4-FFF2-40B4-BE49-F238E27FC236}">
-                <a16:creationId xmlns:a16="http://schemas.microsoft.com/office/drawing/2014/main" id="{AC1BA873-815F-4E72-9BD9-93769C1DA7C7}"/>
+                <a16:creationId xmlns:a16="http://schemas.microsoft.com/office/drawing/2014/main" id="{71546D5D-9B0F-4486-B807-6D96A4146254}"/>
               </a:ext>
             </a:extLst>
           </p:cNvPr>
-          <p:cNvSpPr>
-            <a:spLocks noGrp="1"/>
-          </p:cNvSpPr>
+          <p:cNvPicPr>
+            <a:picLocks noGrp="1" noChangeAspect="1"/>
+          </p:cNvPicPr>
           <p:nvPr>
             <p:ph type="pic" sz="quarter" idx="10"/>
           </p:nvPr>
-        </p:nvSpPr>
+        </p:nvPicPr>
+        <p:blipFill>
+          <a:blip r:embed="rId2"/>
+          <a:srcRect l="13025" r="13025"/>
+          <a:stretch>
+            <a:fillRect/>
+          </a:stretch>
+        </p:blipFill>
         <p:spPr/>
-      </p:sp>
+      </p:pic>
       <p:sp>
         <p:nvSpPr>
           <p:cNvPr id="2" name="Title 1">
@@ -20351,7 +20427,7 @@
           <a:p>
             <a:r>
               <a:rPr lang="en-US" dirty="0"/>
-              <a:t>Lesson 15</a:t>
+              <a:t>Lesson 14</a:t>
             </a:r>
           </a:p>
         </p:txBody>
@@ -20389,7 +20465,7 @@
             </a:pPr>
             <a:r>
               <a:rPr lang="en-US" dirty="0"/>
-              <a:t>Initializing Objects</a:t>
+              <a:t>Defining Classes</a:t>
             </a:r>
           </a:p>
         </p:txBody>
@@ -20397,7 +20473,7 @@
     </p:spTree>
     <p:extLst>
       <p:ext uri="{BB962C8B-B14F-4D97-AF65-F5344CB8AC3E}">
-        <p14:creationId xmlns:p14="http://schemas.microsoft.com/office/powerpoint/2010/main" val="593587069"/>
+        <p14:creationId xmlns:p14="http://schemas.microsoft.com/office/powerpoint/2010/main" val="187124869"/>
       </p:ext>
     </p:extLst>
   </p:cSld>
@@ -20436,24 +20512,31 @@
           <a:chExt cx="0" cy="0"/>
         </a:xfrm>
       </p:grpSpPr>
-      <p:sp>
-        <p:nvSpPr>
-          <p:cNvPr id="7" name="Picture Placeholder 6">
+      <p:pic>
+        <p:nvPicPr>
+          <p:cNvPr id="4" name="Picture Placeholder 3">
             <a:extLst>
               <a:ext uri="{FF2B5EF4-FFF2-40B4-BE49-F238E27FC236}">
-                <a16:creationId xmlns:a16="http://schemas.microsoft.com/office/drawing/2014/main" id="{AC1BA873-815F-4E72-9BD9-93769C1DA7C7}"/>
+                <a16:creationId xmlns:a16="http://schemas.microsoft.com/office/drawing/2014/main" id="{322A13A7-D685-4C47-9FD0-58FBF07B2C71}"/>
               </a:ext>
             </a:extLst>
           </p:cNvPr>
-          <p:cNvSpPr>
-            <a:spLocks noGrp="1"/>
-          </p:cNvSpPr>
+          <p:cNvPicPr>
+            <a:picLocks noGrp="1" noChangeAspect="1"/>
+          </p:cNvPicPr>
           <p:nvPr>
             <p:ph type="pic" sz="quarter" idx="10"/>
           </p:nvPr>
-        </p:nvSpPr>
+        </p:nvPicPr>
+        <p:blipFill>
+          <a:blip r:embed="rId2"/>
+          <a:srcRect l="18263" r="18263"/>
+          <a:stretch>
+            <a:fillRect/>
+          </a:stretch>
+        </p:blipFill>
         <p:spPr/>
-      </p:sp>
+      </p:pic>
       <p:sp>
         <p:nvSpPr>
           <p:cNvPr id="2" name="Title 1">
@@ -20482,7 +20565,7 @@
           <a:p>
             <a:r>
               <a:rPr lang="en-US" dirty="0"/>
-              <a:t>Lesson 16</a:t>
+              <a:t>Lesson 15</a:t>
             </a:r>
           </a:p>
         </p:txBody>
@@ -20520,7 +20603,7 @@
             </a:pPr>
             <a:r>
               <a:rPr lang="en-US" dirty="0"/>
-              <a:t>Fine-Tuning Classes</a:t>
+              <a:t>Initializing Objects</a:t>
             </a:r>
           </a:p>
         </p:txBody>
@@ -20528,7 +20611,7 @@
     </p:spTree>
     <p:extLst>
       <p:ext uri="{BB962C8B-B14F-4D97-AF65-F5344CB8AC3E}">
-        <p14:creationId xmlns:p14="http://schemas.microsoft.com/office/powerpoint/2010/main" val="662383641"/>
+        <p14:creationId xmlns:p14="http://schemas.microsoft.com/office/powerpoint/2010/main" val="593587069"/>
       </p:ext>
     </p:extLst>
   </p:cSld>
@@ -20567,24 +20650,31 @@
           <a:chExt cx="0" cy="0"/>
         </a:xfrm>
       </p:grpSpPr>
-      <p:sp>
-        <p:nvSpPr>
-          <p:cNvPr id="7" name="Picture Placeholder 6">
+      <p:pic>
+        <p:nvPicPr>
+          <p:cNvPr id="4" name="Picture Placeholder 3">
             <a:extLst>
               <a:ext uri="{FF2B5EF4-FFF2-40B4-BE49-F238E27FC236}">
-                <a16:creationId xmlns:a16="http://schemas.microsoft.com/office/drawing/2014/main" id="{AC1BA873-815F-4E72-9BD9-93769C1DA7C7}"/>
+                <a16:creationId xmlns:a16="http://schemas.microsoft.com/office/drawing/2014/main" id="{3F0DD061-A1DB-48E3-9E3D-50DE7F5F286C}"/>
               </a:ext>
             </a:extLst>
           </p:cNvPr>
-          <p:cNvSpPr>
-            <a:spLocks noGrp="1"/>
-          </p:cNvSpPr>
+          <p:cNvPicPr>
+            <a:picLocks noGrp="1" noChangeAspect="1"/>
+          </p:cNvPicPr>
           <p:nvPr>
             <p:ph type="pic" sz="quarter" idx="10"/>
           </p:nvPr>
-        </p:nvSpPr>
+        </p:nvPicPr>
+        <p:blipFill>
+          <a:blip r:embed="rId2"/>
+          <a:srcRect l="17133" r="17133"/>
+          <a:stretch>
+            <a:fillRect/>
+          </a:stretch>
+        </p:blipFill>
         <p:spPr/>
-      </p:sp>
+      </p:pic>
       <p:sp>
         <p:nvSpPr>
           <p:cNvPr id="2" name="Title 1">
@@ -20613,7 +20703,7 @@
           <a:p>
             <a:r>
               <a:rPr lang="en-US" dirty="0"/>
-              <a:t>Lesson 17</a:t>
+              <a:t>Lesson 16</a:t>
             </a:r>
           </a:p>
         </p:txBody>
@@ -20651,7 +20741,7 @@
             </a:pPr>
             <a:r>
               <a:rPr lang="en-US" dirty="0"/>
-              <a:t>Overloading Operators</a:t>
+              <a:t>Fine-Tuning Classes</a:t>
             </a:r>
           </a:p>
         </p:txBody>
@@ -20659,7 +20749,7 @@
     </p:spTree>
     <p:extLst>
       <p:ext uri="{BB962C8B-B14F-4D97-AF65-F5344CB8AC3E}">
-        <p14:creationId xmlns:p14="http://schemas.microsoft.com/office/powerpoint/2010/main" val="432530578"/>
+        <p14:creationId xmlns:p14="http://schemas.microsoft.com/office/powerpoint/2010/main" val="662383641"/>
       </p:ext>
     </p:extLst>
   </p:cSld>
@@ -20834,24 +20924,36 @@
           <a:chExt cx="0" cy="0"/>
         </a:xfrm>
       </p:grpSpPr>
-      <p:sp>
-        <p:nvSpPr>
-          <p:cNvPr id="7" name="Picture Placeholder 6">
+      <p:pic>
+        <p:nvPicPr>
+          <p:cNvPr id="4" name="Picture Placeholder 3">
             <a:extLst>
               <a:ext uri="{FF2B5EF4-FFF2-40B4-BE49-F238E27FC236}">
-                <a16:creationId xmlns:a16="http://schemas.microsoft.com/office/drawing/2014/main" id="{AC1BA873-815F-4E72-9BD9-93769C1DA7C7}"/>
+                <a16:creationId xmlns:a16="http://schemas.microsoft.com/office/drawing/2014/main" id="{CF348E2F-8404-4D15-B607-7A76572144F7}"/>
               </a:ext>
             </a:extLst>
           </p:cNvPr>
-          <p:cNvSpPr>
-            <a:spLocks noGrp="1"/>
-          </p:cNvSpPr>
+          <p:cNvPicPr>
+            <a:picLocks noGrp="1" noChangeAspect="1"/>
+          </p:cNvPicPr>
           <p:nvPr>
             <p:ph type="pic" sz="quarter" idx="10"/>
           </p:nvPr>
-        </p:nvSpPr>
-        <p:spPr/>
-      </p:sp>
+        </p:nvPicPr>
+        <p:blipFill>
+          <a:blip r:embed="rId2"/>
+          <a:srcRect l="16825" r="16825"/>
+          <a:stretch>
+            <a:fillRect/>
+          </a:stretch>
+        </p:blipFill>
+        <p:spPr>
+          <a:xfrm>
+            <a:off x="4743116" y="-1167606"/>
+            <a:ext cx="9063832" cy="9193212"/>
+          </a:xfrm>
+        </p:spPr>
+      </p:pic>
       <p:sp>
         <p:nvSpPr>
           <p:cNvPr id="2" name="Title 1">
@@ -20880,7 +20982,7 @@
           <a:p>
             <a:r>
               <a:rPr lang="en-US" dirty="0"/>
-              <a:t>Lesson 18</a:t>
+              <a:t>Lesson 17</a:t>
             </a:r>
           </a:p>
         </p:txBody>
@@ -20918,7 +21020,7 @@
             </a:pPr>
             <a:r>
               <a:rPr lang="en-US" dirty="0"/>
-              <a:t>Using Interfaces</a:t>
+              <a:t>Overloading Operators</a:t>
             </a:r>
           </a:p>
         </p:txBody>
@@ -20926,7 +21028,7 @@
     </p:spTree>
     <p:extLst>
       <p:ext uri="{BB962C8B-B14F-4D97-AF65-F5344CB8AC3E}">
-        <p14:creationId xmlns:p14="http://schemas.microsoft.com/office/powerpoint/2010/main" val="1560941405"/>
+        <p14:creationId xmlns:p14="http://schemas.microsoft.com/office/powerpoint/2010/main" val="432530578"/>
       </p:ext>
     </p:extLst>
   </p:cSld>
@@ -20965,24 +21067,36 @@
           <a:chExt cx="0" cy="0"/>
         </a:xfrm>
       </p:grpSpPr>
-      <p:sp>
-        <p:nvSpPr>
-          <p:cNvPr id="7" name="Picture Placeholder 6">
+      <p:pic>
+        <p:nvPicPr>
+          <p:cNvPr id="4" name="Picture Placeholder 3">
             <a:extLst>
               <a:ext uri="{FF2B5EF4-FFF2-40B4-BE49-F238E27FC236}">
-                <a16:creationId xmlns:a16="http://schemas.microsoft.com/office/drawing/2014/main" id="{AC1BA873-815F-4E72-9BD9-93769C1DA7C7}"/>
+                <a16:creationId xmlns:a16="http://schemas.microsoft.com/office/drawing/2014/main" id="{CD939774-683B-46AF-9262-B8D43310C9D1}"/>
               </a:ext>
             </a:extLst>
           </p:cNvPr>
-          <p:cNvSpPr>
-            <a:spLocks noGrp="1"/>
-          </p:cNvSpPr>
+          <p:cNvPicPr>
+            <a:picLocks noGrp="1" noChangeAspect="1"/>
+          </p:cNvPicPr>
           <p:nvPr>
             <p:ph type="pic" sz="quarter" idx="10"/>
           </p:nvPr>
-        </p:nvSpPr>
-        <p:spPr/>
-      </p:sp>
+        </p:nvPicPr>
+        <p:blipFill>
+          <a:blip r:embed="rId2"/>
+          <a:srcRect l="12076" r="12076"/>
+          <a:stretch>
+            <a:fillRect/>
+          </a:stretch>
+        </p:blipFill>
+        <p:spPr>
+          <a:xfrm>
+            <a:off x="4743116" y="-1167606"/>
+            <a:ext cx="9063832" cy="9193212"/>
+          </a:xfrm>
+        </p:spPr>
+      </p:pic>
       <p:sp>
         <p:nvSpPr>
           <p:cNvPr id="2" name="Title 1">
@@ -21011,7 +21125,7 @@
           <a:p>
             <a:r>
               <a:rPr lang="en-US" dirty="0"/>
-              <a:t>Lesson 19</a:t>
+              <a:t>Lesson 18</a:t>
             </a:r>
           </a:p>
         </p:txBody>
@@ -21049,7 +21163,7 @@
             </a:pPr>
             <a:r>
               <a:rPr lang="en-US" dirty="0"/>
-              <a:t>Making Generic Classes</a:t>
+              <a:t>Using Interfaces</a:t>
             </a:r>
           </a:p>
         </p:txBody>
@@ -21057,7 +21171,7 @@
     </p:spTree>
     <p:extLst>
       <p:ext uri="{BB962C8B-B14F-4D97-AF65-F5344CB8AC3E}">
-        <p14:creationId xmlns:p14="http://schemas.microsoft.com/office/powerpoint/2010/main" val="1782809940"/>
+        <p14:creationId xmlns:p14="http://schemas.microsoft.com/office/powerpoint/2010/main" val="1560941405"/>
       </p:ext>
     </p:extLst>
   </p:cSld>
@@ -21096,24 +21210,31 @@
           <a:chExt cx="0" cy="0"/>
         </a:xfrm>
       </p:grpSpPr>
-      <p:sp>
-        <p:nvSpPr>
-          <p:cNvPr id="7" name="Picture Placeholder 6">
+      <p:pic>
+        <p:nvPicPr>
+          <p:cNvPr id="4" name="Picture Placeholder 3">
             <a:extLst>
               <a:ext uri="{FF2B5EF4-FFF2-40B4-BE49-F238E27FC236}">
-                <a16:creationId xmlns:a16="http://schemas.microsoft.com/office/drawing/2014/main" id="{AC1BA873-815F-4E72-9BD9-93769C1DA7C7}"/>
+                <a16:creationId xmlns:a16="http://schemas.microsoft.com/office/drawing/2014/main" id="{40CFE1B1-A7D7-4478-B6B1-5B398326D672}"/>
               </a:ext>
             </a:extLst>
           </p:cNvPr>
-          <p:cNvSpPr>
-            <a:spLocks noGrp="1"/>
-          </p:cNvSpPr>
+          <p:cNvPicPr>
+            <a:picLocks noGrp="1" noChangeAspect="1"/>
+          </p:cNvPicPr>
           <p:nvPr>
             <p:ph type="pic" sz="quarter" idx="10"/>
           </p:nvPr>
-        </p:nvSpPr>
+        </p:nvPicPr>
+        <p:blipFill>
+          <a:blip r:embed="rId2"/>
+          <a:srcRect l="10071" r="10071"/>
+          <a:stretch>
+            <a:fillRect/>
+          </a:stretch>
+        </p:blipFill>
         <p:spPr/>
-      </p:sp>
+      </p:pic>
       <p:sp>
         <p:nvSpPr>
           <p:cNvPr id="2" name="Title 1">
@@ -21142,7 +21263,7 @@
           <a:p>
             <a:r>
               <a:rPr lang="en-US" dirty="0"/>
-              <a:t>Lesson 20</a:t>
+              <a:t>Lesson 19</a:t>
             </a:r>
           </a:p>
         </p:txBody>
@@ -21180,7 +21301,7 @@
             </a:pPr>
             <a:r>
               <a:rPr lang="en-US" dirty="0"/>
-              <a:t>Windows Apps with XAML</a:t>
+              <a:t>Making Generic Classes</a:t>
             </a:r>
           </a:p>
         </p:txBody>
@@ -21188,7 +21309,7 @@
     </p:spTree>
     <p:extLst>
       <p:ext uri="{BB962C8B-B14F-4D97-AF65-F5344CB8AC3E}">
-        <p14:creationId xmlns:p14="http://schemas.microsoft.com/office/powerpoint/2010/main" val="3888143967"/>
+        <p14:creationId xmlns:p14="http://schemas.microsoft.com/office/powerpoint/2010/main" val="1782809940"/>
       </p:ext>
     </p:extLst>
   </p:cSld>
@@ -21227,24 +21348,36 @@
           <a:chExt cx="0" cy="0"/>
         </a:xfrm>
       </p:grpSpPr>
-      <p:sp>
-        <p:nvSpPr>
-          <p:cNvPr id="7" name="Picture Placeholder 6">
+      <p:pic>
+        <p:nvPicPr>
+          <p:cNvPr id="4" name="Picture Placeholder 3">
             <a:extLst>
               <a:ext uri="{FF2B5EF4-FFF2-40B4-BE49-F238E27FC236}">
-                <a16:creationId xmlns:a16="http://schemas.microsoft.com/office/drawing/2014/main" id="{AC1BA873-815F-4E72-9BD9-93769C1DA7C7}"/>
+                <a16:creationId xmlns:a16="http://schemas.microsoft.com/office/drawing/2014/main" id="{CD77BC9E-3D0D-4120-8C99-31F72FB0DB97}"/>
               </a:ext>
             </a:extLst>
           </p:cNvPr>
-          <p:cNvSpPr>
-            <a:spLocks noGrp="1"/>
-          </p:cNvSpPr>
+          <p:cNvPicPr>
+            <a:picLocks noGrp="1" noChangeAspect="1"/>
+          </p:cNvPicPr>
           <p:nvPr>
             <p:ph type="pic" sz="quarter" idx="10"/>
           </p:nvPr>
-        </p:nvSpPr>
-        <p:spPr/>
-      </p:sp>
+        </p:nvPicPr>
+        <p:blipFill>
+          <a:blip r:embed="rId2"/>
+          <a:srcRect l="699" r="699"/>
+          <a:stretch>
+            <a:fillRect/>
+          </a:stretch>
+        </p:blipFill>
+        <p:spPr>
+          <a:xfrm>
+            <a:off x="4831609" y="-1276351"/>
+            <a:ext cx="9063832" cy="9193212"/>
+          </a:xfrm>
+        </p:spPr>
+      </p:pic>
       <p:sp>
         <p:nvSpPr>
           <p:cNvPr id="2" name="Title 1">
@@ -21273,7 +21406,7 @@
           <a:p>
             <a:r>
               <a:rPr lang="en-US" dirty="0"/>
-              <a:t>Lesson 21</a:t>
+              <a:t>Lesson 20</a:t>
             </a:r>
           </a:p>
         </p:txBody>
@@ -21311,7 +21444,7 @@
             </a:pPr>
             <a:r>
               <a:rPr lang="en-US" dirty="0"/>
-              <a:t>System.IO</a:t>
+              <a:t>Windows Apps with XAML</a:t>
             </a:r>
           </a:p>
         </p:txBody>
@@ -21319,7 +21452,7 @@
     </p:spTree>
     <p:extLst>
       <p:ext uri="{BB962C8B-B14F-4D97-AF65-F5344CB8AC3E}">
-        <p14:creationId xmlns:p14="http://schemas.microsoft.com/office/powerpoint/2010/main" val="171045466"/>
+        <p14:creationId xmlns:p14="http://schemas.microsoft.com/office/powerpoint/2010/main" val="3888143967"/>
       </p:ext>
     </p:extLst>
   </p:cSld>
@@ -21358,24 +21491,36 @@
           <a:chExt cx="0" cy="0"/>
         </a:xfrm>
       </p:grpSpPr>
-      <p:sp>
-        <p:nvSpPr>
-          <p:cNvPr id="7" name="Picture Placeholder 6">
+      <p:pic>
+        <p:nvPicPr>
+          <p:cNvPr id="4" name="Picture Placeholder 3">
             <a:extLst>
               <a:ext uri="{FF2B5EF4-FFF2-40B4-BE49-F238E27FC236}">
-                <a16:creationId xmlns:a16="http://schemas.microsoft.com/office/drawing/2014/main" id="{AC1BA873-815F-4E72-9BD9-93769C1DA7C7}"/>
+                <a16:creationId xmlns:a16="http://schemas.microsoft.com/office/drawing/2014/main" id="{464C21FD-2E4B-432A-B91D-CF6AE207A3A7}"/>
               </a:ext>
             </a:extLst>
           </p:cNvPr>
-          <p:cNvSpPr>
-            <a:spLocks noGrp="1"/>
-          </p:cNvSpPr>
+          <p:cNvPicPr>
+            <a:picLocks noGrp="1" noChangeAspect="1"/>
+          </p:cNvPicPr>
           <p:nvPr>
             <p:ph type="pic" sz="quarter" idx="10"/>
           </p:nvPr>
-        </p:nvSpPr>
-        <p:spPr/>
-      </p:sp>
+        </p:nvPicPr>
+        <p:blipFill>
+          <a:blip r:embed="rId2"/>
+          <a:srcRect l="21293" r="21293"/>
+          <a:stretch>
+            <a:fillRect/>
+          </a:stretch>
+        </p:blipFill>
+        <p:spPr>
+          <a:xfrm>
+            <a:off x="4831610" y="-1276351"/>
+            <a:ext cx="9063832" cy="9193212"/>
+          </a:xfrm>
+        </p:spPr>
+      </p:pic>
       <p:sp>
         <p:nvSpPr>
           <p:cNvPr id="2" name="Title 1">
@@ -21404,7 +21549,7 @@
           <a:p>
             <a:r>
               <a:rPr lang="en-US" dirty="0"/>
-              <a:t>Lesson 22</a:t>
+              <a:t>Lesson 21</a:t>
             </a:r>
           </a:p>
         </p:txBody>
@@ -21442,7 +21587,7 @@
             </a:pPr>
             <a:r>
               <a:rPr lang="en-US" dirty="0"/>
-              <a:t>Programming Databases</a:t>
+              <a:t>System.IO</a:t>
             </a:r>
           </a:p>
         </p:txBody>
@@ -21450,7 +21595,7 @@
     </p:spTree>
     <p:extLst>
       <p:ext uri="{BB962C8B-B14F-4D97-AF65-F5344CB8AC3E}">
-        <p14:creationId xmlns:p14="http://schemas.microsoft.com/office/powerpoint/2010/main" val="3062775636"/>
+        <p14:creationId xmlns:p14="http://schemas.microsoft.com/office/powerpoint/2010/main" val="171045466"/>
       </p:ext>
     </p:extLst>
   </p:cSld>
@@ -21489,24 +21634,31 @@
           <a:chExt cx="0" cy="0"/>
         </a:xfrm>
       </p:grpSpPr>
-      <p:sp>
-        <p:nvSpPr>
-          <p:cNvPr id="7" name="Picture Placeholder 6">
+      <p:pic>
+        <p:nvPicPr>
+          <p:cNvPr id="4" name="Picture Placeholder 3">
             <a:extLst>
               <a:ext uri="{FF2B5EF4-FFF2-40B4-BE49-F238E27FC236}">
-                <a16:creationId xmlns:a16="http://schemas.microsoft.com/office/drawing/2014/main" id="{AC1BA873-815F-4E72-9BD9-93769C1DA7C7}"/>
+                <a16:creationId xmlns:a16="http://schemas.microsoft.com/office/drawing/2014/main" id="{D095E459-51F9-472B-8FE6-9BFC39330CBA}"/>
               </a:ext>
             </a:extLst>
           </p:cNvPr>
-          <p:cNvSpPr>
-            <a:spLocks noGrp="1"/>
-          </p:cNvSpPr>
+          <p:cNvPicPr>
+            <a:picLocks noGrp="1" noChangeAspect="1"/>
+          </p:cNvPicPr>
           <p:nvPr>
             <p:ph type="pic" sz="quarter" idx="10"/>
           </p:nvPr>
-        </p:nvSpPr>
+        </p:nvPicPr>
+        <p:blipFill>
+          <a:blip r:embed="rId2"/>
+          <a:srcRect t="4080" b="4080"/>
+          <a:stretch>
+            <a:fillRect/>
+          </a:stretch>
+        </p:blipFill>
         <p:spPr/>
-      </p:sp>
+      </p:pic>
       <p:sp>
         <p:nvSpPr>
           <p:cNvPr id="2" name="Title 1">
@@ -21535,7 +21687,7 @@
           <a:p>
             <a:r>
               <a:rPr lang="en-US" dirty="0"/>
-              <a:t>Lesson 23</a:t>
+              <a:t>Lesson 22</a:t>
             </a:r>
           </a:p>
         </p:txBody>
@@ -21573,7 +21725,7 @@
             </a:pPr>
             <a:r>
               <a:rPr lang="en-US" dirty="0"/>
-              <a:t>LINQ to Objects</a:t>
+              <a:t>Programming Databases</a:t>
             </a:r>
           </a:p>
         </p:txBody>
@@ -21581,7 +21733,7 @@
     </p:spTree>
     <p:extLst>
       <p:ext uri="{BB962C8B-B14F-4D97-AF65-F5344CB8AC3E}">
-        <p14:creationId xmlns:p14="http://schemas.microsoft.com/office/powerpoint/2010/main" val="384631692"/>
+        <p14:creationId xmlns:p14="http://schemas.microsoft.com/office/powerpoint/2010/main" val="3062775636"/>
       </p:ext>
     </p:extLst>
   </p:cSld>
@@ -21620,24 +21772,179 @@
           <a:chExt cx="0" cy="0"/>
         </a:xfrm>
       </p:grpSpPr>
-      <p:sp>
-        <p:nvSpPr>
-          <p:cNvPr id="7" name="Picture Placeholder 6">
+      <p:pic>
+        <p:nvPicPr>
+          <p:cNvPr id="4" name="Picture Placeholder 3">
             <a:extLst>
               <a:ext uri="{FF2B5EF4-FFF2-40B4-BE49-F238E27FC236}">
-                <a16:creationId xmlns:a16="http://schemas.microsoft.com/office/drawing/2014/main" id="{AC1BA873-815F-4E72-9BD9-93769C1DA7C7}"/>
+                <a16:creationId xmlns:a16="http://schemas.microsoft.com/office/drawing/2014/main" id="{B9BFDE3A-3AD5-4BB0-977A-29CBD5947C18}"/>
               </a:ext>
             </a:extLst>
           </p:cNvPr>
-          <p:cNvSpPr>
-            <a:spLocks noGrp="1"/>
-          </p:cNvSpPr>
+          <p:cNvPicPr>
+            <a:picLocks noGrp="1" noChangeAspect="1"/>
+          </p:cNvPicPr>
           <p:nvPr>
             <p:ph type="pic" sz="quarter" idx="10"/>
           </p:nvPr>
-        </p:nvSpPr>
-        <p:spPr/>
-      </p:sp>
+        </p:nvPicPr>
+        <p:blipFill>
+          <a:blip r:embed="rId2"/>
+          <a:srcRect l="18982" r="18982"/>
+          <a:stretch>
+            <a:fillRect/>
+          </a:stretch>
+        </p:blipFill>
+        <p:spPr>
+          <a:xfrm>
+            <a:off x="4802111" y="-1276351"/>
+            <a:ext cx="9063832" cy="9193212"/>
+          </a:xfrm>
+        </p:spPr>
+      </p:pic>
+      <p:sp>
+        <p:nvSpPr>
+          <p:cNvPr id="2" name="Title 1">
+            <a:extLst>
+              <a:ext uri="{FF2B5EF4-FFF2-40B4-BE49-F238E27FC236}">
+                <a16:creationId xmlns:a16="http://schemas.microsoft.com/office/drawing/2014/main" id="{B2A8B21D-766A-4354-B054-43C814C7440B}"/>
+              </a:ext>
+            </a:extLst>
+          </p:cNvPr>
+          <p:cNvSpPr>
+            <a:spLocks noGrp="1"/>
+          </p:cNvSpPr>
+          <p:nvPr>
+            <p:ph type="title" idx="4294967295"/>
+          </p:nvPr>
+        </p:nvSpPr>
+        <p:spPr>
+          <a:xfrm>
+            <a:off x="0" y="1709738"/>
+            <a:ext cx="10515600" cy="2852737"/>
+          </a:xfrm>
+        </p:spPr>
+        <p:txBody>
+          <a:bodyPr/>
+          <a:lstStyle/>
+          <a:p>
+            <a:r>
+              <a:rPr lang="en-US" dirty="0"/>
+              <a:t>Lesson 23</a:t>
+            </a:r>
+          </a:p>
+        </p:txBody>
+      </p:sp>
+      <p:sp>
+        <p:nvSpPr>
+          <p:cNvPr id="3" name="Text Placeholder 2">
+            <a:extLst>
+              <a:ext uri="{FF2B5EF4-FFF2-40B4-BE49-F238E27FC236}">
+                <a16:creationId xmlns:a16="http://schemas.microsoft.com/office/drawing/2014/main" id="{551AA14F-63AB-40DA-A2E5-77B9ECBA8D3C}"/>
+              </a:ext>
+            </a:extLst>
+          </p:cNvPr>
+          <p:cNvSpPr>
+            <a:spLocks noGrp="1"/>
+          </p:cNvSpPr>
+          <p:nvPr>
+            <p:ph type="body" idx="4294967295"/>
+          </p:nvPr>
+        </p:nvSpPr>
+        <p:spPr>
+          <a:xfrm>
+            <a:off x="0" y="4589463"/>
+            <a:ext cx="7014368" cy="1500187"/>
+          </a:xfrm>
+        </p:spPr>
+        <p:txBody>
+          <a:bodyPr>
+            <a:normAutofit/>
+          </a:bodyPr>
+          <a:lstStyle/>
+          <a:p>
+            <a:pPr marL="0" indent="0">
+              <a:buNone/>
+            </a:pPr>
+            <a:r>
+              <a:rPr lang="en-US" dirty="0"/>
+              <a:t>LINQ to Objects</a:t>
+            </a:r>
+          </a:p>
+        </p:txBody>
+      </p:sp>
+    </p:spTree>
+    <p:extLst>
+      <p:ext uri="{BB962C8B-B14F-4D97-AF65-F5344CB8AC3E}">
+        <p14:creationId xmlns:p14="http://schemas.microsoft.com/office/powerpoint/2010/main" val="384631692"/>
+      </p:ext>
+    </p:extLst>
+  </p:cSld>
+  <p:clrMapOvr>
+    <a:masterClrMapping/>
+  </p:clrMapOvr>
+  <mc:AlternateContent xmlns:mc="http://schemas.openxmlformats.org/markup-compatibility/2006" xmlns:p14="http://schemas.microsoft.com/office/powerpoint/2010/main">
+    <mc:Choice Requires="p14">
+      <p:transition spd="slow" p14:dur="1250" advTm="2000">
+        <p14:flip dir="r"/>
+      </p:transition>
+    </mc:Choice>
+    <mc:Fallback xmlns="">
+      <p:transition spd="slow" advTm="2000">
+        <p:fade/>
+      </p:transition>
+    </mc:Fallback>
+  </mc:AlternateContent>
+</p:sld>
+</file>
+
+<file path=ppt/slides/slide27.xml><?xml version="1.0" encoding="utf-8"?>
+<p:sld xmlns:a="http://schemas.openxmlformats.org/drawingml/2006/main" xmlns:r="http://schemas.openxmlformats.org/officeDocument/2006/relationships" xmlns:p="http://schemas.openxmlformats.org/presentationml/2006/main">
+  <p:cSld>
+    <p:spTree>
+      <p:nvGrpSpPr>
+        <p:cNvPr id="1" name=""/>
+        <p:cNvGrpSpPr/>
+        <p:nvPr/>
+      </p:nvGrpSpPr>
+      <p:grpSpPr>
+        <a:xfrm>
+          <a:off x="0" y="0"/>
+          <a:ext cx="0" cy="0"/>
+          <a:chOff x="0" y="0"/>
+          <a:chExt cx="0" cy="0"/>
+        </a:xfrm>
+      </p:grpSpPr>
+      <p:pic>
+        <p:nvPicPr>
+          <p:cNvPr id="4" name="Picture Placeholder 3">
+            <a:extLst>
+              <a:ext uri="{FF2B5EF4-FFF2-40B4-BE49-F238E27FC236}">
+                <a16:creationId xmlns:a16="http://schemas.microsoft.com/office/drawing/2014/main" id="{FB4C5B47-D1F1-4F06-AD84-30DD0CB87BCB}"/>
+              </a:ext>
+            </a:extLst>
+          </p:cNvPr>
+          <p:cNvPicPr>
+            <a:picLocks noGrp="1" noChangeAspect="1"/>
+          </p:cNvPicPr>
+          <p:nvPr>
+            <p:ph type="pic" sz="quarter" idx="10"/>
+          </p:nvPr>
+        </p:nvPicPr>
+        <p:blipFill>
+          <a:blip r:embed="rId2"/>
+          <a:srcRect l="6922" r="6922"/>
+          <a:stretch>
+            <a:fillRect/>
+          </a:stretch>
+        </p:blipFill>
+        <p:spPr>
+          <a:xfrm>
+            <a:off x="7013575" y="-1276350"/>
+            <a:ext cx="9064625" cy="9193213"/>
+          </a:xfrm>
+        </p:spPr>
+      </p:pic>
       <p:sp>
         <p:nvSpPr>
           <p:cNvPr id="2" name="Title 1">
@@ -21774,8 +22081,8 @@
         </p:blipFill>
         <p:spPr>
           <a:xfrm>
-            <a:off x="4648200" y="-3676294"/>
-            <a:ext cx="13796168" cy="13993098"/>
+            <a:off x="4227471" y="-1421351"/>
+            <a:ext cx="9564180" cy="9700702"/>
           </a:xfrm>
         </p:spPr>
       </p:pic>
@@ -21919,24 +22226,31 @@
           <a:chExt cx="0" cy="0"/>
         </a:xfrm>
       </p:grpSpPr>
-      <p:sp>
-        <p:nvSpPr>
-          <p:cNvPr id="7" name="Picture Placeholder 6">
+      <p:pic>
+        <p:nvPicPr>
+          <p:cNvPr id="4" name="Picture Placeholder 3">
             <a:extLst>
               <a:ext uri="{FF2B5EF4-FFF2-40B4-BE49-F238E27FC236}">
-                <a16:creationId xmlns:a16="http://schemas.microsoft.com/office/drawing/2014/main" id="{AC1BA873-815F-4E72-9BD9-93769C1DA7C7}"/>
+                <a16:creationId xmlns:a16="http://schemas.microsoft.com/office/drawing/2014/main" id="{1D06C444-3061-4FC8-BC64-B62DC4ED2B76}"/>
               </a:ext>
             </a:extLst>
           </p:cNvPr>
-          <p:cNvSpPr>
-            <a:spLocks noGrp="1"/>
-          </p:cNvSpPr>
+          <p:cNvPicPr>
+            <a:picLocks noGrp="1" noChangeAspect="1"/>
+          </p:cNvPicPr>
           <p:nvPr>
             <p:ph type="pic" sz="quarter" idx="10"/>
           </p:nvPr>
-        </p:nvSpPr>
+        </p:nvPicPr>
+        <p:blipFill>
+          <a:blip r:embed="rId2"/>
+          <a:srcRect l="20985" r="20985"/>
+          <a:stretch>
+            <a:fillRect/>
+          </a:stretch>
+        </p:blipFill>
         <p:spPr/>
-      </p:sp>
+      </p:pic>
       <p:sp>
         <p:nvSpPr>
           <p:cNvPr id="2" name="Title 1">
@@ -22052,10 +22366,10 @@
       </p:grpSpPr>
       <p:sp>
         <p:nvSpPr>
-          <p:cNvPr id="7" name="Picture Placeholder 6">
+          <p:cNvPr id="6" name="Title 5">
             <a:extLst>
               <a:ext uri="{FF2B5EF4-FFF2-40B4-BE49-F238E27FC236}">
-                <a16:creationId xmlns:a16="http://schemas.microsoft.com/office/drawing/2014/main" id="{AC1BA873-815F-4E72-9BD9-93769C1DA7C7}"/>
+                <a16:creationId xmlns:a16="http://schemas.microsoft.com/office/drawing/2014/main" id="{41FE839C-D3BC-4FC6-945F-BDDB98835EBA}"/>
               </a:ext>
             </a:extLst>
           </p:cNvPr>
@@ -22063,86 +22377,698 @@
             <a:spLocks noGrp="1"/>
           </p:cNvSpPr>
           <p:nvPr>
-            <p:ph type="pic" sz="quarter" idx="10"/>
-          </p:nvPr>
-        </p:nvSpPr>
-        <p:spPr/>
-      </p:sp>
-      <p:sp>
-        <p:nvSpPr>
-          <p:cNvPr id="2" name="Title 1">
+            <p:ph type="title"/>
+          </p:nvPr>
+        </p:nvSpPr>
+        <p:spPr>
+          <a:xfrm>
+            <a:off x="457200" y="0"/>
+            <a:ext cx="10515600" cy="1325563"/>
+          </a:xfrm>
+        </p:spPr>
+        <p:txBody>
+          <a:bodyPr/>
+          <a:lstStyle/>
+          <a:p>
+            <a:r>
+              <a:rPr lang="en-US" dirty="0"/>
+              <a:t>Data Types</a:t>
+            </a:r>
+          </a:p>
+        </p:txBody>
+      </p:sp>
+      <p:graphicFrame>
+        <p:nvGraphicFramePr>
+          <p:cNvPr id="8" name="Content Placeholder 7">
             <a:extLst>
               <a:ext uri="{FF2B5EF4-FFF2-40B4-BE49-F238E27FC236}">
-                <a16:creationId xmlns:a16="http://schemas.microsoft.com/office/drawing/2014/main" id="{B2A8B21D-766A-4354-B054-43C814C7440B}"/>
+                <a16:creationId xmlns:a16="http://schemas.microsoft.com/office/drawing/2014/main" id="{4A762BD9-D61A-4D6F-A6F4-7177E80CFAB3}"/>
               </a:ext>
             </a:extLst>
           </p:cNvPr>
-          <p:cNvSpPr>
-            <a:spLocks noGrp="1"/>
-          </p:cNvSpPr>
-          <p:nvPr>
-            <p:ph type="title" idx="4294967295"/>
-          </p:nvPr>
-        </p:nvSpPr>
-        <p:spPr>
-          <a:xfrm>
-            <a:off x="0" y="1709738"/>
-            <a:ext cx="10515600" cy="2852737"/>
-          </a:xfrm>
-        </p:spPr>
-        <p:txBody>
-          <a:bodyPr/>
-          <a:lstStyle/>
-          <a:p>
-            <a:r>
-              <a:rPr lang="en-US" dirty="0"/>
-              <a:t>Lesson 3</a:t>
-            </a:r>
-          </a:p>
-        </p:txBody>
-      </p:sp>
-      <p:sp>
-        <p:nvSpPr>
-          <p:cNvPr id="3" name="Text Placeholder 2">
-            <a:extLst>
-              <a:ext uri="{FF2B5EF4-FFF2-40B4-BE49-F238E27FC236}">
-                <a16:creationId xmlns:a16="http://schemas.microsoft.com/office/drawing/2014/main" id="{551AA14F-63AB-40DA-A2E5-77B9ECBA8D3C}"/>
-              </a:ext>
-            </a:extLst>
-          </p:cNvPr>
-          <p:cNvSpPr>
-            <a:spLocks noGrp="1"/>
-          </p:cNvSpPr>
-          <p:nvPr>
-            <p:ph type="body" idx="4294967295"/>
-          </p:nvPr>
-        </p:nvSpPr>
-        <p:spPr>
-          <a:xfrm>
-            <a:off x="0" y="4589463"/>
-            <a:ext cx="7014368" cy="1500187"/>
-          </a:xfrm>
-        </p:spPr>
-        <p:txBody>
-          <a:bodyPr>
-            <a:normAutofit/>
-          </a:bodyPr>
-          <a:lstStyle/>
-          <a:p>
-            <a:pPr marL="0" indent="0">
-              <a:buNone/>
-            </a:pPr>
-            <a:r>
-              <a:rPr lang="en-US" dirty="0"/>
-              <a:t>Debugging</a:t>
-            </a:r>
-          </a:p>
-        </p:txBody>
-      </p:sp>
+          <p:cNvGraphicFramePr>
+            <a:graphicFrameLocks noGrp="1"/>
+          </p:cNvGraphicFramePr>
+          <p:nvPr>
+            <p:ph idx="1"/>
+            <p:extLst>
+              <p:ext uri="{D42A27DB-BD31-4B8C-83A1-F6EECF244321}">
+                <p14:modId xmlns:p14="http://schemas.microsoft.com/office/powerpoint/2010/main" val="51108728"/>
+              </p:ext>
+            </p:extLst>
+          </p:nvPr>
+        </p:nvGraphicFramePr>
+        <p:xfrm>
+          <a:off x="457200" y="1054100"/>
+          <a:ext cx="10515600" cy="5562600"/>
+        </p:xfrm>
+        <a:graphic>
+          <a:graphicData uri="http://schemas.openxmlformats.org/drawingml/2006/table">
+            <a:tbl>
+              <a:tblPr firstRow="1" bandRow="1">
+                <a:tableStyleId>{5C22544A-7EE6-4342-B048-85BDC9FD1C3A}</a:tableStyleId>
+              </a:tblPr>
+              <a:tblGrid>
+                <a:gridCol w="3505200">
+                  <a:extLst>
+                    <a:ext uri="{9D8B030D-6E8A-4147-A177-3AD203B41FA5}">
+                      <a16:colId xmlns:a16="http://schemas.microsoft.com/office/drawing/2014/main" val="652293511"/>
+                    </a:ext>
+                  </a:extLst>
+                </a:gridCol>
+                <a:gridCol w="3505200">
+                  <a:extLst>
+                    <a:ext uri="{9D8B030D-6E8A-4147-A177-3AD203B41FA5}">
+                      <a16:colId xmlns:a16="http://schemas.microsoft.com/office/drawing/2014/main" val="2504988398"/>
+                    </a:ext>
+                  </a:extLst>
+                </a:gridCol>
+                <a:gridCol w="3505200">
+                  <a:extLst>
+                    <a:ext uri="{9D8B030D-6E8A-4147-A177-3AD203B41FA5}">
+                      <a16:colId xmlns:a16="http://schemas.microsoft.com/office/drawing/2014/main" val="3991444147"/>
+                    </a:ext>
+                  </a:extLst>
+                </a:gridCol>
+              </a:tblGrid>
+              <a:tr h="370840">
+                <a:tc>
+                  <a:txBody>
+                    <a:bodyPr/>
+                    <a:lstStyle/>
+                    <a:p>
+                      <a:r>
+                        <a:rPr lang="en-US" dirty="0"/>
+                        <a:t>Data Type</a:t>
+                      </a:r>
+                    </a:p>
+                  </a:txBody>
+                  <a:tcPr/>
+                </a:tc>
+                <a:tc>
+                  <a:txBody>
+                    <a:bodyPr/>
+                    <a:lstStyle/>
+                    <a:p>
+                      <a:r>
+                        <a:rPr lang="en-US" dirty="0"/>
+                        <a:t>Meaning</a:t>
+                      </a:r>
+                    </a:p>
+                  </a:txBody>
+                  <a:tcPr/>
+                </a:tc>
+                <a:tc>
+                  <a:txBody>
+                    <a:bodyPr/>
+                    <a:lstStyle/>
+                    <a:p>
+                      <a:r>
+                        <a:rPr lang="en-US" dirty="0"/>
+                        <a:t>Range</a:t>
+                      </a:r>
+                    </a:p>
+                  </a:txBody>
+                  <a:tcPr/>
+                </a:tc>
+                <a:extLst>
+                  <a:ext uri="{0D108BD9-81ED-4DB2-BD59-A6C34878D82A}">
+                    <a16:rowId xmlns:a16="http://schemas.microsoft.com/office/drawing/2014/main" val="1431503701"/>
+                  </a:ext>
+                </a:extLst>
+              </a:tr>
+              <a:tr h="370840">
+                <a:tc>
+                  <a:txBody>
+                    <a:bodyPr/>
+                    <a:lstStyle/>
+                    <a:p>
+                      <a:r>
+                        <a:rPr lang="en-US" dirty="0"/>
+                        <a:t>byte</a:t>
+                      </a:r>
+                    </a:p>
+                  </a:txBody>
+                  <a:tcPr/>
+                </a:tc>
+                <a:tc>
+                  <a:txBody>
+                    <a:bodyPr/>
+                    <a:lstStyle/>
+                    <a:p>
+                      <a:endParaRPr lang="en-US"/>
+                    </a:p>
+                  </a:txBody>
+                  <a:tcPr/>
+                </a:tc>
+                <a:tc>
+                  <a:txBody>
+                    <a:bodyPr/>
+                    <a:lstStyle/>
+                    <a:p>
+                      <a:endParaRPr lang="en-US"/>
+                    </a:p>
+                  </a:txBody>
+                  <a:tcPr/>
+                </a:tc>
+                <a:extLst>
+                  <a:ext uri="{0D108BD9-81ED-4DB2-BD59-A6C34878D82A}">
+                    <a16:rowId xmlns:a16="http://schemas.microsoft.com/office/drawing/2014/main" val="3468311115"/>
+                  </a:ext>
+                </a:extLst>
+              </a:tr>
+              <a:tr h="370840">
+                <a:tc>
+                  <a:txBody>
+                    <a:bodyPr/>
+                    <a:lstStyle/>
+                    <a:p>
+                      <a:r>
+                        <a:rPr lang="en-US" dirty="0" err="1"/>
+                        <a:t>sbyte</a:t>
+                      </a:r>
+                      <a:endParaRPr lang="en-US" dirty="0"/>
+                    </a:p>
+                  </a:txBody>
+                  <a:tcPr/>
+                </a:tc>
+                <a:tc>
+                  <a:txBody>
+                    <a:bodyPr/>
+                    <a:lstStyle/>
+                    <a:p>
+                      <a:endParaRPr lang="en-US"/>
+                    </a:p>
+                  </a:txBody>
+                  <a:tcPr/>
+                </a:tc>
+                <a:tc>
+                  <a:txBody>
+                    <a:bodyPr/>
+                    <a:lstStyle/>
+                    <a:p>
+                      <a:endParaRPr lang="en-US"/>
+                    </a:p>
+                  </a:txBody>
+                  <a:tcPr/>
+                </a:tc>
+                <a:extLst>
+                  <a:ext uri="{0D108BD9-81ED-4DB2-BD59-A6C34878D82A}">
+                    <a16:rowId xmlns:a16="http://schemas.microsoft.com/office/drawing/2014/main" val="2812899350"/>
+                  </a:ext>
+                </a:extLst>
+              </a:tr>
+              <a:tr h="370840">
+                <a:tc>
+                  <a:txBody>
+                    <a:bodyPr/>
+                    <a:lstStyle/>
+                    <a:p>
+                      <a:r>
+                        <a:rPr lang="en-US" dirty="0" err="1"/>
+                        <a:t>ushort</a:t>
+                      </a:r>
+                      <a:endParaRPr lang="en-US" dirty="0"/>
+                    </a:p>
+                  </a:txBody>
+                  <a:tcPr/>
+                </a:tc>
+                <a:tc>
+                  <a:txBody>
+                    <a:bodyPr/>
+                    <a:lstStyle/>
+                    <a:p>
+                      <a:endParaRPr lang="en-US"/>
+                    </a:p>
+                  </a:txBody>
+                  <a:tcPr/>
+                </a:tc>
+                <a:tc>
+                  <a:txBody>
+                    <a:bodyPr/>
+                    <a:lstStyle/>
+                    <a:p>
+                      <a:endParaRPr lang="en-US"/>
+                    </a:p>
+                  </a:txBody>
+                  <a:tcPr/>
+                </a:tc>
+                <a:extLst>
+                  <a:ext uri="{0D108BD9-81ED-4DB2-BD59-A6C34878D82A}">
+                    <a16:rowId xmlns:a16="http://schemas.microsoft.com/office/drawing/2014/main" val="1595019581"/>
+                  </a:ext>
+                </a:extLst>
+              </a:tr>
+              <a:tr h="370840">
+                <a:tc>
+                  <a:txBody>
+                    <a:bodyPr/>
+                    <a:lstStyle/>
+                    <a:p>
+                      <a:r>
+                        <a:rPr lang="en-US" dirty="0"/>
+                        <a:t>int</a:t>
+                      </a:r>
+                    </a:p>
+                  </a:txBody>
+                  <a:tcPr/>
+                </a:tc>
+                <a:tc>
+                  <a:txBody>
+                    <a:bodyPr/>
+                    <a:lstStyle/>
+                    <a:p>
+                      <a:endParaRPr lang="en-US"/>
+                    </a:p>
+                  </a:txBody>
+                  <a:tcPr/>
+                </a:tc>
+                <a:tc>
+                  <a:txBody>
+                    <a:bodyPr/>
+                    <a:lstStyle/>
+                    <a:p>
+                      <a:endParaRPr lang="en-US"/>
+                    </a:p>
+                  </a:txBody>
+                  <a:tcPr/>
+                </a:tc>
+                <a:extLst>
+                  <a:ext uri="{0D108BD9-81ED-4DB2-BD59-A6C34878D82A}">
+                    <a16:rowId xmlns:a16="http://schemas.microsoft.com/office/drawing/2014/main" val="859887377"/>
+                  </a:ext>
+                </a:extLst>
+              </a:tr>
+              <a:tr h="370840">
+                <a:tc>
+                  <a:txBody>
+                    <a:bodyPr/>
+                    <a:lstStyle/>
+                    <a:p>
+                      <a:r>
+                        <a:rPr lang="en-US" dirty="0" err="1"/>
+                        <a:t>uint</a:t>
+                      </a:r>
+                      <a:endParaRPr lang="en-US" dirty="0"/>
+                    </a:p>
+                  </a:txBody>
+                  <a:tcPr/>
+                </a:tc>
+                <a:tc>
+                  <a:txBody>
+                    <a:bodyPr/>
+                    <a:lstStyle/>
+                    <a:p>
+                      <a:endParaRPr lang="en-US"/>
+                    </a:p>
+                  </a:txBody>
+                  <a:tcPr/>
+                </a:tc>
+                <a:tc>
+                  <a:txBody>
+                    <a:bodyPr/>
+                    <a:lstStyle/>
+                    <a:p>
+                      <a:endParaRPr lang="en-US"/>
+                    </a:p>
+                  </a:txBody>
+                  <a:tcPr/>
+                </a:tc>
+                <a:extLst>
+                  <a:ext uri="{0D108BD9-81ED-4DB2-BD59-A6C34878D82A}">
+                    <a16:rowId xmlns:a16="http://schemas.microsoft.com/office/drawing/2014/main" val="2506358267"/>
+                  </a:ext>
+                </a:extLst>
+              </a:tr>
+              <a:tr h="370840">
+                <a:tc>
+                  <a:txBody>
+                    <a:bodyPr/>
+                    <a:lstStyle/>
+                    <a:p>
+                      <a:r>
+                        <a:rPr lang="en-US" dirty="0"/>
+                        <a:t>long</a:t>
+                      </a:r>
+                    </a:p>
+                  </a:txBody>
+                  <a:tcPr/>
+                </a:tc>
+                <a:tc>
+                  <a:txBody>
+                    <a:bodyPr/>
+                    <a:lstStyle/>
+                    <a:p>
+                      <a:endParaRPr lang="en-US"/>
+                    </a:p>
+                  </a:txBody>
+                  <a:tcPr/>
+                </a:tc>
+                <a:tc>
+                  <a:txBody>
+                    <a:bodyPr/>
+                    <a:lstStyle/>
+                    <a:p>
+                      <a:endParaRPr lang="en-US"/>
+                    </a:p>
+                  </a:txBody>
+                  <a:tcPr/>
+                </a:tc>
+                <a:extLst>
+                  <a:ext uri="{0D108BD9-81ED-4DB2-BD59-A6C34878D82A}">
+                    <a16:rowId xmlns:a16="http://schemas.microsoft.com/office/drawing/2014/main" val="3453333940"/>
+                  </a:ext>
+                </a:extLst>
+              </a:tr>
+              <a:tr h="370840">
+                <a:tc>
+                  <a:txBody>
+                    <a:bodyPr/>
+                    <a:lstStyle/>
+                    <a:p>
+                      <a:r>
+                        <a:rPr lang="en-US" dirty="0" err="1"/>
+                        <a:t>ulong</a:t>
+                      </a:r>
+                      <a:endParaRPr lang="en-US" dirty="0"/>
+                    </a:p>
+                  </a:txBody>
+                  <a:tcPr/>
+                </a:tc>
+                <a:tc>
+                  <a:txBody>
+                    <a:bodyPr/>
+                    <a:lstStyle/>
+                    <a:p>
+                      <a:endParaRPr lang="en-US"/>
+                    </a:p>
+                  </a:txBody>
+                  <a:tcPr/>
+                </a:tc>
+                <a:tc>
+                  <a:txBody>
+                    <a:bodyPr/>
+                    <a:lstStyle/>
+                    <a:p>
+                      <a:endParaRPr lang="en-US"/>
+                    </a:p>
+                  </a:txBody>
+                  <a:tcPr/>
+                </a:tc>
+                <a:extLst>
+                  <a:ext uri="{0D108BD9-81ED-4DB2-BD59-A6C34878D82A}">
+                    <a16:rowId xmlns:a16="http://schemas.microsoft.com/office/drawing/2014/main" val="3934054090"/>
+                  </a:ext>
+                </a:extLst>
+              </a:tr>
+              <a:tr h="370840">
+                <a:tc>
+                  <a:txBody>
+                    <a:bodyPr/>
+                    <a:lstStyle/>
+                    <a:p>
+                      <a:r>
+                        <a:rPr lang="en-US" dirty="0"/>
+                        <a:t>float</a:t>
+                      </a:r>
+                    </a:p>
+                  </a:txBody>
+                  <a:tcPr/>
+                </a:tc>
+                <a:tc>
+                  <a:txBody>
+                    <a:bodyPr/>
+                    <a:lstStyle/>
+                    <a:p>
+                      <a:endParaRPr lang="en-US"/>
+                    </a:p>
+                  </a:txBody>
+                  <a:tcPr/>
+                </a:tc>
+                <a:tc>
+                  <a:txBody>
+                    <a:bodyPr/>
+                    <a:lstStyle/>
+                    <a:p>
+                      <a:endParaRPr lang="en-US"/>
+                    </a:p>
+                  </a:txBody>
+                  <a:tcPr/>
+                </a:tc>
+                <a:extLst>
+                  <a:ext uri="{0D108BD9-81ED-4DB2-BD59-A6C34878D82A}">
+                    <a16:rowId xmlns:a16="http://schemas.microsoft.com/office/drawing/2014/main" val="3883991138"/>
+                  </a:ext>
+                </a:extLst>
+              </a:tr>
+              <a:tr h="370840">
+                <a:tc>
+                  <a:txBody>
+                    <a:bodyPr/>
+                    <a:lstStyle/>
+                    <a:p>
+                      <a:r>
+                        <a:rPr lang="en-US" dirty="0"/>
+                        <a:t>double</a:t>
+                      </a:r>
+                    </a:p>
+                  </a:txBody>
+                  <a:tcPr/>
+                </a:tc>
+                <a:tc>
+                  <a:txBody>
+                    <a:bodyPr/>
+                    <a:lstStyle/>
+                    <a:p>
+                      <a:endParaRPr lang="en-US"/>
+                    </a:p>
+                  </a:txBody>
+                  <a:tcPr/>
+                </a:tc>
+                <a:tc>
+                  <a:txBody>
+                    <a:bodyPr/>
+                    <a:lstStyle/>
+                    <a:p>
+                      <a:endParaRPr lang="en-US"/>
+                    </a:p>
+                  </a:txBody>
+                  <a:tcPr/>
+                </a:tc>
+                <a:extLst>
+                  <a:ext uri="{0D108BD9-81ED-4DB2-BD59-A6C34878D82A}">
+                    <a16:rowId xmlns:a16="http://schemas.microsoft.com/office/drawing/2014/main" val="378162465"/>
+                  </a:ext>
+                </a:extLst>
+              </a:tr>
+              <a:tr h="370840">
+                <a:tc>
+                  <a:txBody>
+                    <a:bodyPr/>
+                    <a:lstStyle/>
+                    <a:p>
+                      <a:r>
+                        <a:rPr lang="en-US" dirty="0"/>
+                        <a:t>decimal</a:t>
+                      </a:r>
+                    </a:p>
+                  </a:txBody>
+                  <a:tcPr/>
+                </a:tc>
+                <a:tc>
+                  <a:txBody>
+                    <a:bodyPr/>
+                    <a:lstStyle/>
+                    <a:p>
+                      <a:endParaRPr lang="en-US"/>
+                    </a:p>
+                  </a:txBody>
+                  <a:tcPr/>
+                </a:tc>
+                <a:tc>
+                  <a:txBody>
+                    <a:bodyPr/>
+                    <a:lstStyle/>
+                    <a:p>
+                      <a:endParaRPr lang="en-US"/>
+                    </a:p>
+                  </a:txBody>
+                  <a:tcPr/>
+                </a:tc>
+                <a:extLst>
+                  <a:ext uri="{0D108BD9-81ED-4DB2-BD59-A6C34878D82A}">
+                    <a16:rowId xmlns:a16="http://schemas.microsoft.com/office/drawing/2014/main" val="2927619745"/>
+                  </a:ext>
+                </a:extLst>
+              </a:tr>
+              <a:tr h="370840">
+                <a:tc>
+                  <a:txBody>
+                    <a:bodyPr/>
+                    <a:lstStyle/>
+                    <a:p>
+                      <a:r>
+                        <a:rPr lang="en-US" dirty="0"/>
+                        <a:t>char</a:t>
+                      </a:r>
+                    </a:p>
+                  </a:txBody>
+                  <a:tcPr/>
+                </a:tc>
+                <a:tc>
+                  <a:txBody>
+                    <a:bodyPr/>
+                    <a:lstStyle/>
+                    <a:p>
+                      <a:endParaRPr lang="en-US"/>
+                    </a:p>
+                  </a:txBody>
+                  <a:tcPr/>
+                </a:tc>
+                <a:tc>
+                  <a:txBody>
+                    <a:bodyPr/>
+                    <a:lstStyle/>
+                    <a:p>
+                      <a:endParaRPr lang="en-US"/>
+                    </a:p>
+                  </a:txBody>
+                  <a:tcPr/>
+                </a:tc>
+                <a:extLst>
+                  <a:ext uri="{0D108BD9-81ED-4DB2-BD59-A6C34878D82A}">
+                    <a16:rowId xmlns:a16="http://schemas.microsoft.com/office/drawing/2014/main" val="1548022296"/>
+                  </a:ext>
+                </a:extLst>
+              </a:tr>
+              <a:tr h="370840">
+                <a:tc>
+                  <a:txBody>
+                    <a:bodyPr/>
+                    <a:lstStyle/>
+                    <a:p>
+                      <a:r>
+                        <a:rPr lang="en-US" dirty="0"/>
+                        <a:t>string</a:t>
+                      </a:r>
+                    </a:p>
+                  </a:txBody>
+                  <a:tcPr/>
+                </a:tc>
+                <a:tc>
+                  <a:txBody>
+                    <a:bodyPr/>
+                    <a:lstStyle/>
+                    <a:p>
+                      <a:endParaRPr lang="en-US"/>
+                    </a:p>
+                  </a:txBody>
+                  <a:tcPr/>
+                </a:tc>
+                <a:tc>
+                  <a:txBody>
+                    <a:bodyPr/>
+                    <a:lstStyle/>
+                    <a:p>
+                      <a:endParaRPr lang="en-US"/>
+                    </a:p>
+                  </a:txBody>
+                  <a:tcPr/>
+                </a:tc>
+                <a:extLst>
+                  <a:ext uri="{0D108BD9-81ED-4DB2-BD59-A6C34878D82A}">
+                    <a16:rowId xmlns:a16="http://schemas.microsoft.com/office/drawing/2014/main" val="812204365"/>
+                  </a:ext>
+                </a:extLst>
+              </a:tr>
+              <a:tr h="370840">
+                <a:tc>
+                  <a:txBody>
+                    <a:bodyPr/>
+                    <a:lstStyle/>
+                    <a:p>
+                      <a:r>
+                        <a:rPr lang="en-US" dirty="0"/>
+                        <a:t>bool</a:t>
+                      </a:r>
+                    </a:p>
+                  </a:txBody>
+                  <a:tcPr/>
+                </a:tc>
+                <a:tc>
+                  <a:txBody>
+                    <a:bodyPr/>
+                    <a:lstStyle/>
+                    <a:p>
+                      <a:endParaRPr lang="en-US"/>
+                    </a:p>
+                  </a:txBody>
+                  <a:tcPr/>
+                </a:tc>
+                <a:tc>
+                  <a:txBody>
+                    <a:bodyPr/>
+                    <a:lstStyle/>
+                    <a:p>
+                      <a:endParaRPr lang="en-US"/>
+                    </a:p>
+                  </a:txBody>
+                  <a:tcPr/>
+                </a:tc>
+                <a:extLst>
+                  <a:ext uri="{0D108BD9-81ED-4DB2-BD59-A6C34878D82A}">
+                    <a16:rowId xmlns:a16="http://schemas.microsoft.com/office/drawing/2014/main" val="3144949389"/>
+                  </a:ext>
+                </a:extLst>
+              </a:tr>
+              <a:tr h="370840">
+                <a:tc>
+                  <a:txBody>
+                    <a:bodyPr/>
+                    <a:lstStyle/>
+                    <a:p>
+                      <a:r>
+                        <a:rPr lang="en-US" dirty="0"/>
+                        <a:t>object</a:t>
+                      </a:r>
+                    </a:p>
+                  </a:txBody>
+                  <a:tcPr/>
+                </a:tc>
+                <a:tc>
+                  <a:txBody>
+                    <a:bodyPr/>
+                    <a:lstStyle/>
+                    <a:p>
+                      <a:endParaRPr lang="en-US"/>
+                    </a:p>
+                  </a:txBody>
+                  <a:tcPr/>
+                </a:tc>
+                <a:tc>
+                  <a:txBody>
+                    <a:bodyPr/>
+                    <a:lstStyle/>
+                    <a:p>
+                      <a:endParaRPr lang="en-US" dirty="0"/>
+                    </a:p>
+                  </a:txBody>
+                  <a:tcPr/>
+                </a:tc>
+                <a:extLst>
+                  <a:ext uri="{0D108BD9-81ED-4DB2-BD59-A6C34878D82A}">
+                    <a16:rowId xmlns:a16="http://schemas.microsoft.com/office/drawing/2014/main" val="1176870459"/>
+                  </a:ext>
+                </a:extLst>
+              </a:tr>
+            </a:tbl>
+          </a:graphicData>
+        </a:graphic>
+      </p:graphicFrame>
     </p:spTree>
     <p:extLst>
       <p:ext uri="{BB962C8B-B14F-4D97-AF65-F5344CB8AC3E}">
-        <p14:creationId xmlns:p14="http://schemas.microsoft.com/office/powerpoint/2010/main" val="82761267"/>
+        <p14:creationId xmlns:p14="http://schemas.microsoft.com/office/powerpoint/2010/main" val="1435494132"/>
       </p:ext>
     </p:extLst>
   </p:cSld>
@@ -22181,24 +23107,31 @@
           <a:chExt cx="0" cy="0"/>
         </a:xfrm>
       </p:grpSpPr>
-      <p:sp>
-        <p:nvSpPr>
-          <p:cNvPr id="7" name="Picture Placeholder 6">
+      <p:pic>
+        <p:nvPicPr>
+          <p:cNvPr id="4" name="Picture Placeholder 3">
             <a:extLst>
               <a:ext uri="{FF2B5EF4-FFF2-40B4-BE49-F238E27FC236}">
-                <a16:creationId xmlns:a16="http://schemas.microsoft.com/office/drawing/2014/main" id="{AC1BA873-815F-4E72-9BD9-93769C1DA7C7}"/>
+                <a16:creationId xmlns:a16="http://schemas.microsoft.com/office/drawing/2014/main" id="{E0EA6BD2-3016-4603-992F-BE6209FDC5BE}"/>
               </a:ext>
             </a:extLst>
           </p:cNvPr>
-          <p:cNvSpPr>
-            <a:spLocks noGrp="1"/>
-          </p:cNvSpPr>
+          <p:cNvPicPr>
+            <a:picLocks noGrp="1" noChangeAspect="1"/>
+          </p:cNvPicPr>
           <p:nvPr>
             <p:ph type="pic" sz="quarter" idx="10"/>
           </p:nvPr>
-        </p:nvSpPr>
+        </p:nvPicPr>
+        <p:blipFill>
+          <a:blip r:embed="rId2"/>
+          <a:srcRect l="4550" r="4550"/>
+          <a:stretch>
+            <a:fillRect/>
+          </a:stretch>
+        </p:blipFill>
         <p:spPr/>
-      </p:sp>
+      </p:pic>
       <p:sp>
         <p:nvSpPr>
           <p:cNvPr id="2" name="Title 1">
@@ -22227,7 +23160,7 @@
           <a:p>
             <a:r>
               <a:rPr lang="en-US" dirty="0"/>
-              <a:t>Lesson 4</a:t>
+              <a:t>Lesson 3</a:t>
             </a:r>
           </a:p>
         </p:txBody>
@@ -22265,7 +23198,7 @@
             </a:pPr>
             <a:r>
               <a:rPr lang="en-US" dirty="0"/>
-              <a:t>Scope</a:t>
+              <a:t>Debugging</a:t>
             </a:r>
           </a:p>
         </p:txBody>
@@ -22273,7 +23206,7 @@
     </p:spTree>
     <p:extLst>
       <p:ext uri="{BB962C8B-B14F-4D97-AF65-F5344CB8AC3E}">
-        <p14:creationId xmlns:p14="http://schemas.microsoft.com/office/powerpoint/2010/main" val="337890428"/>
+        <p14:creationId xmlns:p14="http://schemas.microsoft.com/office/powerpoint/2010/main" val="82761267"/>
       </p:ext>
     </p:extLst>
   </p:cSld>
@@ -22312,24 +23245,31 @@
           <a:chExt cx="0" cy="0"/>
         </a:xfrm>
       </p:grpSpPr>
-      <p:sp>
-        <p:nvSpPr>
-          <p:cNvPr id="7" name="Picture Placeholder 6">
+      <p:pic>
+        <p:nvPicPr>
+          <p:cNvPr id="4" name="Picture Placeholder 3">
             <a:extLst>
               <a:ext uri="{FF2B5EF4-FFF2-40B4-BE49-F238E27FC236}">
-                <a16:creationId xmlns:a16="http://schemas.microsoft.com/office/drawing/2014/main" id="{AC1BA873-815F-4E72-9BD9-93769C1DA7C7}"/>
+                <a16:creationId xmlns:a16="http://schemas.microsoft.com/office/drawing/2014/main" id="{1A66767F-6F55-4F1C-89A3-E9A106BC0918}"/>
               </a:ext>
             </a:extLst>
           </p:cNvPr>
-          <p:cNvSpPr>
-            <a:spLocks noGrp="1"/>
-          </p:cNvSpPr>
+          <p:cNvPicPr>
+            <a:picLocks noGrp="1" noChangeAspect="1"/>
+          </p:cNvPicPr>
           <p:nvPr>
             <p:ph type="pic" sz="quarter" idx="10"/>
           </p:nvPr>
-        </p:nvSpPr>
+        </p:nvPicPr>
+        <p:blipFill>
+          <a:blip r:embed="rId2"/>
+          <a:srcRect l="17133" r="17133"/>
+          <a:stretch>
+            <a:fillRect/>
+          </a:stretch>
+        </p:blipFill>
         <p:spPr/>
-      </p:sp>
+      </p:pic>
       <p:sp>
         <p:nvSpPr>
           <p:cNvPr id="2" name="Title 1">
@@ -22358,7 +23298,7 @@
           <a:p>
             <a:r>
               <a:rPr lang="en-US" dirty="0"/>
-              <a:t>Lesson 5</a:t>
+              <a:t>Lesson 4</a:t>
             </a:r>
           </a:p>
         </p:txBody>
@@ -22396,7 +23336,7 @@
             </a:pPr>
             <a:r>
               <a:rPr lang="en-US" dirty="0"/>
-              <a:t>Strings</a:t>
+              <a:t>Scope</a:t>
             </a:r>
           </a:p>
         </p:txBody>
@@ -22404,7 +23344,7 @@
     </p:spTree>
     <p:extLst>
       <p:ext uri="{BB962C8B-B14F-4D97-AF65-F5344CB8AC3E}">
-        <p14:creationId xmlns:p14="http://schemas.microsoft.com/office/powerpoint/2010/main" val="3915960176"/>
+        <p14:creationId xmlns:p14="http://schemas.microsoft.com/office/powerpoint/2010/main" val="337890428"/>
       </p:ext>
     </p:extLst>
   </p:cSld>
@@ -22443,24 +23383,34 @@
           <a:chExt cx="0" cy="0"/>
         </a:xfrm>
       </p:grpSpPr>
-      <p:sp>
-        <p:nvSpPr>
-          <p:cNvPr id="7" name="Picture Placeholder 6">
+      <p:pic>
+        <p:nvPicPr>
+          <p:cNvPr id="4" name="Picture Placeholder 3">
             <a:extLst>
               <a:ext uri="{FF2B5EF4-FFF2-40B4-BE49-F238E27FC236}">
-                <a16:creationId xmlns:a16="http://schemas.microsoft.com/office/drawing/2014/main" id="{AC1BA873-815F-4E72-9BD9-93769C1DA7C7}"/>
+                <a16:creationId xmlns:a16="http://schemas.microsoft.com/office/drawing/2014/main" id="{6E3F5DAB-7304-40F1-AF3F-603B5ABD5215}"/>
               </a:ext>
             </a:extLst>
           </p:cNvPr>
-          <p:cNvSpPr>
-            <a:spLocks noGrp="1"/>
-          </p:cNvSpPr>
+          <p:cNvPicPr>
+            <a:picLocks noGrp="1" noChangeAspect="1"/>
+          </p:cNvPicPr>
           <p:nvPr>
             <p:ph type="pic" sz="quarter" idx="10"/>
           </p:nvPr>
-        </p:nvSpPr>
-        <p:spPr/>
-      </p:sp>
+        </p:nvPicPr>
+        <p:blipFill rotWithShape="1">
+          <a:blip r:embed="rId2"/>
+          <a:srcRect t="2003" r="34266" b="-2003"/>
+          <a:stretch/>
+        </p:blipFill>
+        <p:spPr>
+          <a:xfrm>
+            <a:off x="7014368" y="-1276351"/>
+            <a:ext cx="9063832" cy="9193212"/>
+          </a:xfrm>
+        </p:spPr>
+      </p:pic>
       <p:sp>
         <p:nvSpPr>
           <p:cNvPr id="2" name="Title 1">
@@ -22489,7 +23439,7 @@
           <a:p>
             <a:r>
               <a:rPr lang="en-US" dirty="0"/>
-              <a:t>Lesson 6</a:t>
+              <a:t>Lesson 5</a:t>
             </a:r>
           </a:p>
         </p:txBody>
@@ -22527,7 +23477,7 @@
             </a:pPr>
             <a:r>
               <a:rPr lang="en-US" dirty="0"/>
-              <a:t>Dates and Times</a:t>
+              <a:t>Strings</a:t>
             </a:r>
           </a:p>
         </p:txBody>
@@ -22535,7 +23485,7 @@
     </p:spTree>
     <p:extLst>
       <p:ext uri="{BB962C8B-B14F-4D97-AF65-F5344CB8AC3E}">
-        <p14:creationId xmlns:p14="http://schemas.microsoft.com/office/powerpoint/2010/main" val="2340841402"/>
+        <p14:creationId xmlns:p14="http://schemas.microsoft.com/office/powerpoint/2010/main" val="3915960176"/>
       </p:ext>
     </p:extLst>
   </p:cSld>
@@ -22574,24 +23524,36 @@
           <a:chExt cx="0" cy="0"/>
         </a:xfrm>
       </p:grpSpPr>
-      <p:sp>
-        <p:nvSpPr>
-          <p:cNvPr id="7" name="Picture Placeholder 6">
+      <p:pic>
+        <p:nvPicPr>
+          <p:cNvPr id="4" name="Picture Placeholder 3">
             <a:extLst>
               <a:ext uri="{FF2B5EF4-FFF2-40B4-BE49-F238E27FC236}">
-                <a16:creationId xmlns:a16="http://schemas.microsoft.com/office/drawing/2014/main" id="{AC1BA873-815F-4E72-9BD9-93769C1DA7C7}"/>
+                <a16:creationId xmlns:a16="http://schemas.microsoft.com/office/drawing/2014/main" id="{2270C87E-432C-4399-AE51-069DE6A2EE8B}"/>
               </a:ext>
             </a:extLst>
           </p:cNvPr>
-          <p:cNvSpPr>
-            <a:spLocks noGrp="1"/>
-          </p:cNvSpPr>
+          <p:cNvPicPr>
+            <a:picLocks noGrp="1" noChangeAspect="1"/>
+          </p:cNvPicPr>
           <p:nvPr>
             <p:ph type="pic" sz="quarter" idx="10"/>
           </p:nvPr>
-        </p:nvSpPr>
-        <p:spPr/>
-      </p:sp>
+        </p:nvPicPr>
+        <p:blipFill>
+          <a:blip r:embed="rId2"/>
+          <a:srcRect l="699" r="699"/>
+          <a:stretch>
+            <a:fillRect/>
+          </a:stretch>
+        </p:blipFill>
+        <p:spPr>
+          <a:xfrm>
+            <a:off x="5073445" y="-3244979"/>
+            <a:ext cx="12945678" cy="13130468"/>
+          </a:xfrm>
+        </p:spPr>
+      </p:pic>
       <p:sp>
         <p:nvSpPr>
           <p:cNvPr id="2" name="Title 1">
@@ -22620,7 +23582,7 @@
           <a:p>
             <a:r>
               <a:rPr lang="en-US" dirty="0"/>
-              <a:t>Lesson 7</a:t>
+              <a:t>Lesson 6</a:t>
             </a:r>
           </a:p>
         </p:txBody>
@@ -22658,7 +23620,7 @@
             </a:pPr>
             <a:r>
               <a:rPr lang="en-US" dirty="0"/>
-              <a:t>Arrays and Collections</a:t>
+              <a:t>Dates and Times</a:t>
             </a:r>
           </a:p>
         </p:txBody>
@@ -22666,7 +23628,7 @@
     </p:spTree>
     <p:extLst>
       <p:ext uri="{BB962C8B-B14F-4D97-AF65-F5344CB8AC3E}">
-        <p14:creationId xmlns:p14="http://schemas.microsoft.com/office/powerpoint/2010/main" val="655158604"/>
+        <p14:creationId xmlns:p14="http://schemas.microsoft.com/office/powerpoint/2010/main" val="2340841402"/>
       </p:ext>
     </p:extLst>
   </p:cSld>
@@ -23943,7 +24905,7 @@
 
 <file path=ppt/webextensions/taskpanes.xml><?xml version="1.0" encoding="utf-8"?>
 <wetp:taskpanes xmlns:wetp="http://schemas.microsoft.com/office/webextensions/taskpanes/2010/11">
-  <wetp:taskpane dockstate="right" visibility="0" width="350" row="6">
+  <wetp:taskpane dockstate="right" visibility="0" width="350" row="5">
     <wetp:webextensionref xmlns:r="http://schemas.openxmlformats.org/officeDocument/2006/relationships" r:id="rId1"/>
   </wetp:taskpane>
 </wetp:taskpanes>

</xml_diff>

<commit_message>
added datatypes project to seprearate from variables then updated the deck for datatypes
</commit_message>
<xml_diff>
--- a/01-intro/C# Lessons.pptx
+++ b/01-intro/C# Lessons.pptx
@@ -14,28 +14,29 @@
     <p:sldId id="258" r:id="rId8"/>
     <p:sldId id="259" r:id="rId9"/>
     <p:sldId id="282" r:id="rId10"/>
-    <p:sldId id="260" r:id="rId11"/>
-    <p:sldId id="261" r:id="rId12"/>
-    <p:sldId id="262" r:id="rId13"/>
-    <p:sldId id="263" r:id="rId14"/>
-    <p:sldId id="264" r:id="rId15"/>
-    <p:sldId id="265" r:id="rId16"/>
-    <p:sldId id="266" r:id="rId17"/>
-    <p:sldId id="267" r:id="rId18"/>
-    <p:sldId id="268" r:id="rId19"/>
-    <p:sldId id="269" r:id="rId20"/>
-    <p:sldId id="270" r:id="rId21"/>
-    <p:sldId id="271" r:id="rId22"/>
-    <p:sldId id="272" r:id="rId23"/>
-    <p:sldId id="273" r:id="rId24"/>
-    <p:sldId id="274" r:id="rId25"/>
-    <p:sldId id="275" r:id="rId26"/>
-    <p:sldId id="276" r:id="rId27"/>
-    <p:sldId id="277" r:id="rId28"/>
-    <p:sldId id="278" r:id="rId29"/>
-    <p:sldId id="279" r:id="rId30"/>
-    <p:sldId id="280" r:id="rId31"/>
-    <p:sldId id="281" r:id="rId32"/>
+    <p:sldId id="283" r:id="rId11"/>
+    <p:sldId id="260" r:id="rId12"/>
+    <p:sldId id="261" r:id="rId13"/>
+    <p:sldId id="262" r:id="rId14"/>
+    <p:sldId id="263" r:id="rId15"/>
+    <p:sldId id="264" r:id="rId16"/>
+    <p:sldId id="265" r:id="rId17"/>
+    <p:sldId id="266" r:id="rId18"/>
+    <p:sldId id="267" r:id="rId19"/>
+    <p:sldId id="268" r:id="rId20"/>
+    <p:sldId id="269" r:id="rId21"/>
+    <p:sldId id="270" r:id="rId22"/>
+    <p:sldId id="271" r:id="rId23"/>
+    <p:sldId id="272" r:id="rId24"/>
+    <p:sldId id="273" r:id="rId25"/>
+    <p:sldId id="274" r:id="rId26"/>
+    <p:sldId id="275" r:id="rId27"/>
+    <p:sldId id="276" r:id="rId28"/>
+    <p:sldId id="277" r:id="rId29"/>
+    <p:sldId id="278" r:id="rId30"/>
+    <p:sldId id="279" r:id="rId31"/>
+    <p:sldId id="280" r:id="rId32"/>
+    <p:sldId id="281" r:id="rId33"/>
   </p:sldIdLst>
   <p:sldSz cx="12192000" cy="6858000"/>
   <p:notesSz cx="6858000" cy="9144000"/>
@@ -148,6 +149,7 @@
             <p14:sldId id="258"/>
             <p14:sldId id="259"/>
             <p14:sldId id="282"/>
+            <p14:sldId id="283"/>
             <p14:sldId id="260"/>
             <p14:sldId id="261"/>
             <p14:sldId id="262"/>
@@ -329,7 +331,7 @@
             <a:fld id="{B61BEF0D-F0BB-DE4B-95CE-6DB70DBA9567}" type="datetimeFigureOut">
               <a:rPr lang="en-US" smtClean="0"/>
               <a:pPr/>
-              <a:t>7/13/2018</a:t>
+              <a:t>7/14/2018</a:t>
             </a:fld>
             <a:endParaRPr lang="en-US" dirty="0"/>
           </a:p>
@@ -529,7 +531,7 @@
             <a:fld id="{B61BEF0D-F0BB-DE4B-95CE-6DB70DBA9567}" type="datetimeFigureOut">
               <a:rPr lang="en-US" smtClean="0"/>
               <a:pPr/>
-              <a:t>7/13/2018</a:t>
+              <a:t>7/14/2018</a:t>
             </a:fld>
             <a:endParaRPr lang="en-US" dirty="0"/>
           </a:p>
@@ -739,7 +741,7 @@
             <a:fld id="{B61BEF0D-F0BB-DE4B-95CE-6DB70DBA9567}" type="datetimeFigureOut">
               <a:rPr lang="en-US" smtClean="0"/>
               <a:pPr/>
-              <a:t>7/13/2018</a:t>
+              <a:t>7/14/2018</a:t>
             </a:fld>
             <a:endParaRPr lang="en-US" dirty="0"/>
           </a:p>
@@ -893,7 +895,7 @@
             <a:fld id="{B61BEF0D-F0BB-DE4B-95CE-6DB70DBA9567}" type="datetimeFigureOut">
               <a:rPr lang="en-US" smtClean="0"/>
               <a:pPr/>
-              <a:t>7/13/2018</a:t>
+              <a:t>7/14/2018</a:t>
             </a:fld>
             <a:endParaRPr lang="en-US" dirty="0"/>
           </a:p>
@@ -1154,7 +1156,7 @@
           <a:p>
             <a:fld id="{9A7FAFC6-84A1-4ED5-94BF-84CE28F91C6F}" type="datetimeFigureOut">
               <a:rPr lang="es-ES" smtClean="0"/>
-              <a:t>13/07/2018</a:t>
+              <a:t>14/07/2018</a:t>
             </a:fld>
             <a:endParaRPr lang="es-ES"/>
           </a:p>
@@ -1324,7 +1326,7 @@
           <a:p>
             <a:fld id="{9A7FAFC6-84A1-4ED5-94BF-84CE28F91C6F}" type="datetimeFigureOut">
               <a:rPr lang="es-ES" smtClean="0"/>
-              <a:t>13/07/2018</a:t>
+              <a:t>14/07/2018</a:t>
             </a:fld>
             <a:endParaRPr lang="es-ES"/>
           </a:p>
@@ -1570,7 +1572,7 @@
           <a:p>
             <a:fld id="{9A7FAFC6-84A1-4ED5-94BF-84CE28F91C6F}" type="datetimeFigureOut">
               <a:rPr lang="es-ES" smtClean="0"/>
-              <a:t>13/07/2018</a:t>
+              <a:t>14/07/2018</a:t>
             </a:fld>
             <a:endParaRPr lang="es-ES"/>
           </a:p>
@@ -1802,7 +1804,7 @@
           <a:p>
             <a:fld id="{9A7FAFC6-84A1-4ED5-94BF-84CE28F91C6F}" type="datetimeFigureOut">
               <a:rPr lang="es-ES" smtClean="0"/>
-              <a:t>13/07/2018</a:t>
+              <a:t>14/07/2018</a:t>
             </a:fld>
             <a:endParaRPr lang="es-ES"/>
           </a:p>
@@ -2169,7 +2171,7 @@
           <a:p>
             <a:fld id="{9A7FAFC6-84A1-4ED5-94BF-84CE28F91C6F}" type="datetimeFigureOut">
               <a:rPr lang="es-ES" smtClean="0"/>
-              <a:t>13/07/2018</a:t>
+              <a:t>14/07/2018</a:t>
             </a:fld>
             <a:endParaRPr lang="es-ES"/>
           </a:p>
@@ -2287,7 +2289,7 @@
           <a:p>
             <a:fld id="{9A7FAFC6-84A1-4ED5-94BF-84CE28F91C6F}" type="datetimeFigureOut">
               <a:rPr lang="es-ES" smtClean="0"/>
-              <a:t>13/07/2018</a:t>
+              <a:t>14/07/2018</a:t>
             </a:fld>
             <a:endParaRPr lang="es-ES"/>
           </a:p>
@@ -2382,7 +2384,7 @@
           <a:p>
             <a:fld id="{9A7FAFC6-84A1-4ED5-94BF-84CE28F91C6F}" type="datetimeFigureOut">
               <a:rPr lang="es-ES" smtClean="0"/>
-              <a:t>13/07/2018</a:t>
+              <a:t>14/07/2018</a:t>
             </a:fld>
             <a:endParaRPr lang="es-ES"/>
           </a:p>
@@ -2569,7 +2571,7 @@
             <a:fld id="{B61BEF0D-F0BB-DE4B-95CE-6DB70DBA9567}" type="datetimeFigureOut">
               <a:rPr lang="en-US" smtClean="0"/>
               <a:pPr/>
-              <a:t>7/13/2018</a:t>
+              <a:t>7/14/2018</a:t>
             </a:fld>
             <a:endParaRPr lang="en-US" dirty="0"/>
           </a:p>
@@ -2859,7 +2861,7 @@
           <a:p>
             <a:fld id="{9A7FAFC6-84A1-4ED5-94BF-84CE28F91C6F}" type="datetimeFigureOut">
               <a:rPr lang="es-ES" smtClean="0"/>
-              <a:t>13/07/2018</a:t>
+              <a:t>14/07/2018</a:t>
             </a:fld>
             <a:endParaRPr lang="es-ES"/>
           </a:p>
@@ -3116,7 +3118,7 @@
           <a:p>
             <a:fld id="{9A7FAFC6-84A1-4ED5-94BF-84CE28F91C6F}" type="datetimeFigureOut">
               <a:rPr lang="es-ES" smtClean="0"/>
-              <a:t>13/07/2018</a:t>
+              <a:t>14/07/2018</a:t>
             </a:fld>
             <a:endParaRPr lang="es-ES"/>
           </a:p>
@@ -3286,7 +3288,7 @@
           <a:p>
             <a:fld id="{9A7FAFC6-84A1-4ED5-94BF-84CE28F91C6F}" type="datetimeFigureOut">
               <a:rPr lang="es-ES" smtClean="0"/>
-              <a:t>13/07/2018</a:t>
+              <a:t>14/07/2018</a:t>
             </a:fld>
             <a:endParaRPr lang="es-ES"/>
           </a:p>
@@ -3466,7 +3468,7 @@
           <a:p>
             <a:fld id="{9A7FAFC6-84A1-4ED5-94BF-84CE28F91C6F}" type="datetimeFigureOut">
               <a:rPr lang="es-ES" smtClean="0"/>
-              <a:t>13/07/2018</a:t>
+              <a:t>14/07/2018</a:t>
             </a:fld>
             <a:endParaRPr lang="es-ES"/>
           </a:p>
@@ -3658,7 +3660,7 @@
           <a:p>
             <a:fld id="{9A7FAFC6-84A1-4ED5-94BF-84CE28F91C6F}" type="datetimeFigureOut">
               <a:rPr lang="es-ES" smtClean="0"/>
-              <a:t>13/07/2018</a:t>
+              <a:t>14/07/2018</a:t>
             </a:fld>
             <a:endParaRPr lang="es-ES"/>
           </a:p>
@@ -3828,7 +3830,7 @@
           <a:p>
             <a:fld id="{9A7FAFC6-84A1-4ED5-94BF-84CE28F91C6F}" type="datetimeFigureOut">
               <a:rPr lang="es-ES" smtClean="0"/>
-              <a:t>13/07/2018</a:t>
+              <a:t>14/07/2018</a:t>
             </a:fld>
             <a:endParaRPr lang="es-ES"/>
           </a:p>
@@ -4074,7 +4076,7 @@
           <a:p>
             <a:fld id="{9A7FAFC6-84A1-4ED5-94BF-84CE28F91C6F}" type="datetimeFigureOut">
               <a:rPr lang="es-ES" smtClean="0"/>
-              <a:t>13/07/2018</a:t>
+              <a:t>14/07/2018</a:t>
             </a:fld>
             <a:endParaRPr lang="es-ES"/>
           </a:p>
@@ -4306,7 +4308,7 @@
           <a:p>
             <a:fld id="{9A7FAFC6-84A1-4ED5-94BF-84CE28F91C6F}" type="datetimeFigureOut">
               <a:rPr lang="es-ES" smtClean="0"/>
-              <a:t>13/07/2018</a:t>
+              <a:t>14/07/2018</a:t>
             </a:fld>
             <a:endParaRPr lang="es-ES"/>
           </a:p>
@@ -4673,7 +4675,7 @@
           <a:p>
             <a:fld id="{9A7FAFC6-84A1-4ED5-94BF-84CE28F91C6F}" type="datetimeFigureOut">
               <a:rPr lang="es-ES" smtClean="0"/>
-              <a:t>13/07/2018</a:t>
+              <a:t>14/07/2018</a:t>
             </a:fld>
             <a:endParaRPr lang="es-ES"/>
           </a:p>
@@ -4791,7 +4793,7 @@
           <a:p>
             <a:fld id="{9A7FAFC6-84A1-4ED5-94BF-84CE28F91C6F}" type="datetimeFigureOut">
               <a:rPr lang="es-ES" smtClean="0"/>
-              <a:t>13/07/2018</a:t>
+              <a:t>14/07/2018</a:t>
             </a:fld>
             <a:endParaRPr lang="es-ES"/>
           </a:p>
@@ -5055,7 +5057,7 @@
             <a:fld id="{B61BEF0D-F0BB-DE4B-95CE-6DB70DBA9567}" type="datetimeFigureOut">
               <a:rPr lang="en-US" smtClean="0"/>
               <a:pPr/>
-              <a:t>7/13/2018</a:t>
+              <a:t>7/14/2018</a:t>
             </a:fld>
             <a:endParaRPr lang="en-US" dirty="0"/>
           </a:p>
@@ -5163,7 +5165,7 @@
           <a:p>
             <a:fld id="{9A7FAFC6-84A1-4ED5-94BF-84CE28F91C6F}" type="datetimeFigureOut">
               <a:rPr lang="es-ES" smtClean="0"/>
-              <a:t>13/07/2018</a:t>
+              <a:t>14/07/2018</a:t>
             </a:fld>
             <a:endParaRPr lang="es-ES"/>
           </a:p>
@@ -5440,7 +5442,7 @@
           <a:p>
             <a:fld id="{9A7FAFC6-84A1-4ED5-94BF-84CE28F91C6F}" type="datetimeFigureOut">
               <a:rPr lang="es-ES" smtClean="0"/>
-              <a:t>13/07/2018</a:t>
+              <a:t>14/07/2018</a:t>
             </a:fld>
             <a:endParaRPr lang="es-ES"/>
           </a:p>
@@ -5697,7 +5699,7 @@
           <a:p>
             <a:fld id="{9A7FAFC6-84A1-4ED5-94BF-84CE28F91C6F}" type="datetimeFigureOut">
               <a:rPr lang="es-ES" smtClean="0"/>
-              <a:t>13/07/2018</a:t>
+              <a:t>14/07/2018</a:t>
             </a:fld>
             <a:endParaRPr lang="es-ES"/>
           </a:p>
@@ -5867,7 +5869,7 @@
           <a:p>
             <a:fld id="{9A7FAFC6-84A1-4ED5-94BF-84CE28F91C6F}" type="datetimeFigureOut">
               <a:rPr lang="es-ES" smtClean="0"/>
-              <a:t>13/07/2018</a:t>
+              <a:t>14/07/2018</a:t>
             </a:fld>
             <a:endParaRPr lang="es-ES"/>
           </a:p>
@@ -6047,7 +6049,7 @@
           <a:p>
             <a:fld id="{9A7FAFC6-84A1-4ED5-94BF-84CE28F91C6F}" type="datetimeFigureOut">
               <a:rPr lang="es-ES" smtClean="0"/>
-              <a:t>13/07/2018</a:t>
+              <a:t>14/07/2018</a:t>
             </a:fld>
             <a:endParaRPr lang="es-ES"/>
           </a:p>
@@ -6255,7 +6257,7 @@
           <a:p>
             <a:fld id="{E5C7B1E8-D5F9-4681-A815-75D059791994}" type="datetimeFigureOut">
               <a:rPr lang="en-US" smtClean="0"/>
-              <a:t>7/13/2018</a:t>
+              <a:t>7/14/2018</a:t>
             </a:fld>
             <a:endParaRPr lang="en-US"/>
           </a:p>
@@ -6453,7 +6455,7 @@
           <a:p>
             <a:fld id="{E5C7B1E8-D5F9-4681-A815-75D059791994}" type="datetimeFigureOut">
               <a:rPr lang="en-US" smtClean="0"/>
-              <a:t>7/13/2018</a:t>
+              <a:t>7/14/2018</a:t>
             </a:fld>
             <a:endParaRPr lang="en-US"/>
           </a:p>
@@ -6764,7 +6766,7 @@
           <a:p>
             <a:fld id="{E5C7B1E8-D5F9-4681-A815-75D059791994}" type="datetimeFigureOut">
               <a:rPr lang="en-US" smtClean="0"/>
-              <a:t>7/13/2018</a:t>
+              <a:t>7/14/2018</a:t>
             </a:fld>
             <a:endParaRPr lang="en-US"/>
           </a:p>
@@ -7029,7 +7031,7 @@
           <a:p>
             <a:fld id="{E5C7B1E8-D5F9-4681-A815-75D059791994}" type="datetimeFigureOut">
               <a:rPr lang="en-US" smtClean="0"/>
-              <a:t>7/13/2018</a:t>
+              <a:t>7/14/2018</a:t>
             </a:fld>
             <a:endParaRPr lang="en-US"/>
           </a:p>
@@ -7477,7 +7479,7 @@
           <a:p>
             <a:fld id="{E5C7B1E8-D5F9-4681-A815-75D059791994}" type="datetimeFigureOut">
               <a:rPr lang="en-US" smtClean="0"/>
-              <a:t>7/13/2018</a:t>
+              <a:t>7/14/2018</a:t>
             </a:fld>
             <a:endParaRPr lang="en-US"/>
           </a:p>
@@ -7779,7 +7781,7 @@
             <a:fld id="{B61BEF0D-F0BB-DE4B-95CE-6DB70DBA9567}" type="datetimeFigureOut">
               <a:rPr lang="en-US" smtClean="0"/>
               <a:pPr/>
-              <a:t>7/13/2018</a:t>
+              <a:t>7/14/2018</a:t>
             </a:fld>
             <a:endParaRPr lang="en-US" dirty="0"/>
           </a:p>
@@ -7921,7 +7923,7 @@
           <a:p>
             <a:fld id="{E5C7B1E8-D5F9-4681-A815-75D059791994}" type="datetimeFigureOut">
               <a:rPr lang="en-US" smtClean="0"/>
-              <a:t>7/13/2018</a:t>
+              <a:t>7/14/2018</a:t>
             </a:fld>
             <a:endParaRPr lang="en-US"/>
           </a:p>
@@ -8070,7 +8072,7 @@
           <a:p>
             <a:fld id="{E5C7B1E8-D5F9-4681-A815-75D059791994}" type="datetimeFigureOut">
               <a:rPr lang="en-US" smtClean="0"/>
-              <a:t>7/13/2018</a:t>
+              <a:t>7/14/2018</a:t>
             </a:fld>
             <a:endParaRPr lang="en-US"/>
           </a:p>
@@ -8417,7 +8419,7 @@
           <a:p>
             <a:fld id="{E5C7B1E8-D5F9-4681-A815-75D059791994}" type="datetimeFigureOut">
               <a:rPr lang="en-US" smtClean="0"/>
-              <a:t>7/13/2018</a:t>
+              <a:t>7/14/2018</a:t>
             </a:fld>
             <a:endParaRPr lang="en-US"/>
           </a:p>
@@ -8744,7 +8746,7 @@
           <a:p>
             <a:fld id="{E5C7B1E8-D5F9-4681-A815-75D059791994}" type="datetimeFigureOut">
               <a:rPr lang="en-US" smtClean="0"/>
-              <a:t>7/13/2018</a:t>
+              <a:t>7/14/2018</a:t>
             </a:fld>
             <a:endParaRPr lang="en-US"/>
           </a:p>
@@ -8978,7 +8980,7 @@
           <a:p>
             <a:fld id="{E5C7B1E8-D5F9-4681-A815-75D059791994}" type="datetimeFigureOut">
               <a:rPr lang="en-US" smtClean="0"/>
-              <a:t>7/13/2018</a:t>
+              <a:t>7/14/2018</a:t>
             </a:fld>
             <a:endParaRPr lang="en-US"/>
           </a:p>
@@ -9222,7 +9224,7 @@
           <a:p>
             <a:fld id="{E5C7B1E8-D5F9-4681-A815-75D059791994}" type="datetimeFigureOut">
               <a:rPr lang="en-US" smtClean="0"/>
-              <a:t>7/13/2018</a:t>
+              <a:t>7/14/2018</a:t>
             </a:fld>
             <a:endParaRPr lang="en-US"/>
           </a:p>
@@ -9461,7 +9463,7 @@
             <a:fld id="{B61BEF0D-F0BB-DE4B-95CE-6DB70DBA9567}" type="datetimeFigureOut">
               <a:rPr lang="en-US" smtClean="0"/>
               <a:pPr/>
-              <a:t>7/13/2018</a:t>
+              <a:t>7/14/2018</a:t>
             </a:fld>
             <a:endParaRPr lang="en-US" dirty="0"/>
           </a:p>
@@ -9643,7 +9645,7 @@
             <a:fld id="{B61BEF0D-F0BB-DE4B-95CE-6DB70DBA9567}" type="datetimeFigureOut">
               <a:rPr lang="en-US" smtClean="0"/>
               <a:pPr/>
-              <a:t>7/13/2018</a:t>
+              <a:t>7/14/2018</a:t>
             </a:fld>
             <a:endParaRPr lang="en-US" dirty="0"/>
           </a:p>
@@ -9902,7 +9904,7 @@
             <a:fld id="{B61BEF0D-F0BB-DE4B-95CE-6DB70DBA9567}" type="datetimeFigureOut">
               <a:rPr lang="en-US" smtClean="0"/>
               <a:pPr/>
-              <a:t>7/13/2018</a:t>
+              <a:t>7/14/2018</a:t>
             </a:fld>
             <a:endParaRPr lang="en-US" dirty="0"/>
           </a:p>
@@ -10145,7 +10147,7 @@
             <a:fld id="{B61BEF0D-F0BB-DE4B-95CE-6DB70DBA9567}" type="datetimeFigureOut">
               <a:rPr lang="en-US" smtClean="0"/>
               <a:pPr/>
-              <a:t>7/13/2018</a:t>
+              <a:t>7/14/2018</a:t>
             </a:fld>
             <a:endParaRPr lang="en-US" dirty="0"/>
           </a:p>
@@ -10559,7 +10561,7 @@
             <a:fld id="{B61BEF0D-F0BB-DE4B-95CE-6DB70DBA9567}" type="datetimeFigureOut">
               <a:rPr lang="en-US" smtClean="0"/>
               <a:pPr/>
-              <a:t>7/13/2018</a:t>
+              <a:t>7/14/2018</a:t>
             </a:fld>
             <a:endParaRPr lang="en-US" dirty="0"/>
           </a:p>
@@ -10937,7 +10939,7 @@
             <a:fld id="{B61BEF0D-F0BB-DE4B-95CE-6DB70DBA9567}" type="datetimeFigureOut">
               <a:rPr lang="en-US" smtClean="0"/>
               <a:pPr/>
-              <a:t>7/13/2018</a:t>
+              <a:t>7/14/2018</a:t>
             </a:fld>
             <a:endParaRPr lang="en-US" dirty="0"/>
           </a:p>
@@ -11068,7 +11070,7 @@
             <a:fld id="{B61BEF0D-F0BB-DE4B-95CE-6DB70DBA9567}" type="datetimeFigureOut">
               <a:rPr lang="en-US" smtClean="0"/>
               <a:pPr/>
-              <a:t>7/13/2018</a:t>
+              <a:t>7/14/2018</a:t>
             </a:fld>
             <a:endParaRPr lang="en-US" dirty="0"/>
           </a:p>
@@ -11177,7 +11179,7 @@
             <a:fld id="{B61BEF0D-F0BB-DE4B-95CE-6DB70DBA9567}" type="datetimeFigureOut">
               <a:rPr lang="en-US" smtClean="0"/>
               <a:pPr/>
-              <a:t>7/13/2018</a:t>
+              <a:t>7/14/2018</a:t>
             </a:fld>
             <a:endParaRPr lang="en-US" dirty="0"/>
           </a:p>
@@ -11466,7 +11468,7 @@
             <a:fld id="{B61BEF0D-F0BB-DE4B-95CE-6DB70DBA9567}" type="datetimeFigureOut">
               <a:rPr lang="en-US" smtClean="0"/>
               <a:pPr/>
-              <a:t>7/13/2018</a:t>
+              <a:t>7/14/2018</a:t>
             </a:fld>
             <a:endParaRPr lang="en-US" dirty="0"/>
           </a:p>
@@ -11735,7 +11737,7 @@
             <a:fld id="{B61BEF0D-F0BB-DE4B-95CE-6DB70DBA9567}" type="datetimeFigureOut">
               <a:rPr lang="en-US" smtClean="0"/>
               <a:pPr/>
-              <a:t>7/13/2018</a:t>
+              <a:t>7/14/2018</a:t>
             </a:fld>
             <a:endParaRPr lang="en-US" dirty="0"/>
           </a:p>
@@ -11917,7 +11919,7 @@
             <a:fld id="{B61BEF0D-F0BB-DE4B-95CE-6DB70DBA9567}" type="datetimeFigureOut">
               <a:rPr lang="en-US" smtClean="0"/>
               <a:pPr/>
-              <a:t>7/13/2018</a:t>
+              <a:t>7/14/2018</a:t>
             </a:fld>
             <a:endParaRPr lang="en-US" dirty="0"/>
           </a:p>
@@ -12109,7 +12111,7 @@
             <a:fld id="{B61BEF0D-F0BB-DE4B-95CE-6DB70DBA9567}" type="datetimeFigureOut">
               <a:rPr lang="en-US" smtClean="0"/>
               <a:pPr/>
-              <a:t>7/13/2018</a:t>
+              <a:t>7/14/2018</a:t>
             </a:fld>
             <a:endParaRPr lang="en-US" dirty="0"/>
           </a:p>
@@ -12513,7 +12515,7 @@
             <a:fld id="{B61BEF0D-F0BB-DE4B-95CE-6DB70DBA9567}" type="datetimeFigureOut">
               <a:rPr lang="en-US" smtClean="0"/>
               <a:pPr/>
-              <a:t>7/13/2018</a:t>
+              <a:t>7/14/2018</a:t>
             </a:fld>
             <a:endParaRPr lang="en-US" dirty="0"/>
           </a:p>
@@ -15485,7 +15487,7 @@
             <a:fld id="{B61BEF0D-F0BB-DE4B-95CE-6DB70DBA9567}" type="datetimeFigureOut">
               <a:rPr lang="en-US" smtClean="0"/>
               <a:pPr/>
-              <a:t>7/13/2018</a:t>
+              <a:t>7/14/2018</a:t>
             </a:fld>
             <a:endParaRPr lang="en-US" dirty="0"/>
           </a:p>
@@ -15894,7 +15896,7 @@
             <a:fld id="{B61BEF0D-F0BB-DE4B-95CE-6DB70DBA9567}" type="datetimeFigureOut">
               <a:rPr lang="en-US" smtClean="0"/>
               <a:pPr/>
-              <a:t>7/13/2018</a:t>
+              <a:t>7/14/2018</a:t>
             </a:fld>
             <a:endParaRPr lang="en-US" dirty="0"/>
           </a:p>
@@ -16187,7 +16189,7 @@
             <a:fld id="{B61BEF0D-F0BB-DE4B-95CE-6DB70DBA9567}" type="datetimeFigureOut">
               <a:rPr lang="en-US" smtClean="0"/>
               <a:pPr/>
-              <a:t>7/13/2018</a:t>
+              <a:t>7/14/2018</a:t>
             </a:fld>
             <a:endParaRPr lang="en-US" dirty="0"/>
           </a:p>
@@ -16430,7 +16432,7 @@
             <a:fld id="{B61BEF0D-F0BB-DE4B-95CE-6DB70DBA9567}" type="datetimeFigureOut">
               <a:rPr lang="en-US" smtClean="0"/>
               <a:pPr/>
-              <a:t>7/13/2018</a:t>
+              <a:t>7/14/2018</a:t>
             </a:fld>
             <a:endParaRPr lang="en-US" dirty="0"/>
           </a:p>
@@ -16984,7 +16986,7 @@
           <a:p>
             <a:fld id="{9A7FAFC6-84A1-4ED5-94BF-84CE28F91C6F}" type="datetimeFigureOut">
               <a:rPr lang="es-ES" smtClean="0"/>
-              <a:t>13/07/2018</a:t>
+              <a:t>14/07/2018</a:t>
             </a:fld>
             <a:endParaRPr lang="es-ES"/>
           </a:p>
@@ -17524,7 +17526,7 @@
           <a:p>
             <a:fld id="{9A7FAFC6-84A1-4ED5-94BF-84CE28F91C6F}" type="datetimeFigureOut">
               <a:rPr lang="es-ES" smtClean="0"/>
-              <a:t>13/07/2018</a:t>
+              <a:t>14/07/2018</a:t>
             </a:fld>
             <a:endParaRPr lang="es-ES"/>
           </a:p>
@@ -18080,7 +18082,7 @@
           <a:p>
             <a:fld id="{E5C7B1E8-D5F9-4681-A815-75D059791994}" type="datetimeFigureOut">
               <a:rPr lang="en-US" smtClean="0"/>
-              <a:t>7/13/2018</a:t>
+              <a:t>7/14/2018</a:t>
             </a:fld>
             <a:endParaRPr lang="en-US"/>
           </a:p>
@@ -18631,7 +18633,7 @@
             <a:fld id="{B61BEF0D-F0BB-DE4B-95CE-6DB70DBA9567}" type="datetimeFigureOut">
               <a:rPr lang="en-US" smtClean="0"/>
               <a:pPr/>
-              <a:t>7/13/2018</a:t>
+              <a:t>7/14/2018</a:t>
             </a:fld>
             <a:endParaRPr lang="en-US" dirty="0"/>
           </a:p>
@@ -19395,7 +19397,7 @@
           <p:cNvPr id="4" name="Picture Placeholder 3">
             <a:extLst>
               <a:ext uri="{FF2B5EF4-FFF2-40B4-BE49-F238E27FC236}">
-                <a16:creationId xmlns:a16="http://schemas.microsoft.com/office/drawing/2014/main" id="{DD13BB6E-472D-42B8-B3A7-4805E50DF0DD}"/>
+                <a16:creationId xmlns:a16="http://schemas.microsoft.com/office/drawing/2014/main" id="{2270C87E-432C-4399-AE51-069DE6A2EE8B}"/>
               </a:ext>
             </a:extLst>
           </p:cNvPr>
@@ -19408,15 +19410,15 @@
         </p:nvPicPr>
         <p:blipFill>
           <a:blip r:embed="rId2"/>
-          <a:srcRect l="13025" r="13025"/>
+          <a:srcRect l="699" r="699"/>
           <a:stretch>
             <a:fillRect/>
           </a:stretch>
         </p:blipFill>
         <p:spPr>
           <a:xfrm>
-            <a:off x="5542764" y="-2768961"/>
-            <a:ext cx="12007040" cy="12178432"/>
+            <a:off x="5073445" y="-3244979"/>
+            <a:ext cx="12945678" cy="13130468"/>
           </a:xfrm>
         </p:spPr>
       </p:pic>
@@ -19448,7 +19450,7 @@
           <a:p>
             <a:r>
               <a:rPr lang="en-US" dirty="0"/>
-              <a:t>Lesson 7</a:t>
+              <a:t>Lesson 6</a:t>
             </a:r>
           </a:p>
         </p:txBody>
@@ -19486,7 +19488,7 @@
             </a:pPr>
             <a:r>
               <a:rPr lang="en-US" dirty="0"/>
-              <a:t>Arrays and Collections</a:t>
+              <a:t>Dates and Times</a:t>
             </a:r>
           </a:p>
         </p:txBody>
@@ -19494,7 +19496,7 @@
     </p:spTree>
     <p:extLst>
       <p:ext uri="{BB962C8B-B14F-4D97-AF65-F5344CB8AC3E}">
-        <p14:creationId xmlns:p14="http://schemas.microsoft.com/office/powerpoint/2010/main" val="655158604"/>
+        <p14:creationId xmlns:p14="http://schemas.microsoft.com/office/powerpoint/2010/main" val="2340841402"/>
       </p:ext>
     </p:extLst>
   </p:cSld>
@@ -19538,7 +19540,7 @@
           <p:cNvPr id="4" name="Picture Placeholder 3">
             <a:extLst>
               <a:ext uri="{FF2B5EF4-FFF2-40B4-BE49-F238E27FC236}">
-                <a16:creationId xmlns:a16="http://schemas.microsoft.com/office/drawing/2014/main" id="{2275A6BB-906D-4E74-B715-47980696FB8B}"/>
+                <a16:creationId xmlns:a16="http://schemas.microsoft.com/office/drawing/2014/main" id="{DD13BB6E-472D-42B8-B3A7-4805E50DF0DD}"/>
               </a:ext>
             </a:extLst>
           </p:cNvPr>
@@ -19551,15 +19553,15 @@
         </p:nvPicPr>
         <p:blipFill>
           <a:blip r:embed="rId2"/>
-          <a:srcRect l="17133" r="17133"/>
+          <a:srcRect l="13025" r="13025"/>
           <a:stretch>
             <a:fillRect/>
           </a:stretch>
         </p:blipFill>
         <p:spPr>
           <a:xfrm>
-            <a:off x="7013575" y="-1276350"/>
-            <a:ext cx="9064625" cy="9193213"/>
+            <a:off x="5542764" y="-2768961"/>
+            <a:ext cx="12007040" cy="12178432"/>
           </a:xfrm>
         </p:spPr>
       </p:pic>
@@ -19591,7 +19593,7 @@
           <a:p>
             <a:r>
               <a:rPr lang="en-US" dirty="0"/>
-              <a:t>Lesson 8</a:t>
+              <a:t>Lesson 7</a:t>
             </a:r>
           </a:p>
         </p:txBody>
@@ -19629,7 +19631,7 @@
             </a:pPr>
             <a:r>
               <a:rPr lang="en-US" dirty="0"/>
-              <a:t>Enumerations and Structures</a:t>
+              <a:t>Arrays and Collections</a:t>
             </a:r>
           </a:p>
         </p:txBody>
@@ -19637,7 +19639,7 @@
     </p:spTree>
     <p:extLst>
       <p:ext uri="{BB962C8B-B14F-4D97-AF65-F5344CB8AC3E}">
-        <p14:creationId xmlns:p14="http://schemas.microsoft.com/office/powerpoint/2010/main" val="2122467810"/>
+        <p14:creationId xmlns:p14="http://schemas.microsoft.com/office/powerpoint/2010/main" val="655158604"/>
       </p:ext>
     </p:extLst>
   </p:cSld>
@@ -19681,7 +19683,7 @@
           <p:cNvPr id="4" name="Picture Placeholder 3">
             <a:extLst>
               <a:ext uri="{FF2B5EF4-FFF2-40B4-BE49-F238E27FC236}">
-                <a16:creationId xmlns:a16="http://schemas.microsoft.com/office/drawing/2014/main" id="{81D15399-48F7-4649-BF88-F6F906AA50BA}"/>
+                <a16:creationId xmlns:a16="http://schemas.microsoft.com/office/drawing/2014/main" id="{2275A6BB-906D-4E74-B715-47980696FB8B}"/>
               </a:ext>
             </a:extLst>
           </p:cNvPr>
@@ -19694,12 +19696,17 @@
         </p:nvPicPr>
         <p:blipFill>
           <a:blip r:embed="rId2"/>
-          <a:srcRect l="17801" r="17801"/>
+          <a:srcRect l="17133" r="17133"/>
           <a:stretch>
             <a:fillRect/>
           </a:stretch>
         </p:blipFill>
-        <p:spPr/>
+        <p:spPr>
+          <a:xfrm>
+            <a:off x="7013575" y="-1276350"/>
+            <a:ext cx="9064625" cy="9193213"/>
+          </a:xfrm>
+        </p:spPr>
       </p:pic>
       <p:sp>
         <p:nvSpPr>
@@ -19729,7 +19736,7 @@
           <a:p>
             <a:r>
               <a:rPr lang="en-US" dirty="0"/>
-              <a:t>Lesson 9</a:t>
+              <a:t>Lesson 8</a:t>
             </a:r>
           </a:p>
         </p:txBody>
@@ -19767,7 +19774,7 @@
             </a:pPr>
             <a:r>
               <a:rPr lang="en-US" dirty="0"/>
-              <a:t>Making Choices</a:t>
+              <a:t>Enumerations and Structures</a:t>
             </a:r>
           </a:p>
         </p:txBody>
@@ -19775,7 +19782,7 @@
     </p:spTree>
     <p:extLst>
       <p:ext uri="{BB962C8B-B14F-4D97-AF65-F5344CB8AC3E}">
-        <p14:creationId xmlns:p14="http://schemas.microsoft.com/office/powerpoint/2010/main" val="2722297980"/>
+        <p14:creationId xmlns:p14="http://schemas.microsoft.com/office/powerpoint/2010/main" val="2122467810"/>
       </p:ext>
     </p:extLst>
   </p:cSld>
@@ -19819,7 +19826,7 @@
           <p:cNvPr id="4" name="Picture Placeholder 3">
             <a:extLst>
               <a:ext uri="{FF2B5EF4-FFF2-40B4-BE49-F238E27FC236}">
-                <a16:creationId xmlns:a16="http://schemas.microsoft.com/office/drawing/2014/main" id="{21CF88B5-98FE-435D-B828-5CAD8FE4288D}"/>
+                <a16:creationId xmlns:a16="http://schemas.microsoft.com/office/drawing/2014/main" id="{81D15399-48F7-4649-BF88-F6F906AA50BA}"/>
               </a:ext>
             </a:extLst>
           </p:cNvPr>
@@ -19832,7 +19839,7 @@
         </p:nvPicPr>
         <p:blipFill>
           <a:blip r:embed="rId2"/>
-          <a:srcRect l="699" r="699"/>
+          <a:srcRect l="17801" r="17801"/>
           <a:stretch>
             <a:fillRect/>
           </a:stretch>
@@ -19867,7 +19874,7 @@
           <a:p>
             <a:r>
               <a:rPr lang="en-US" dirty="0"/>
-              <a:t>Lesson 10</a:t>
+              <a:t>Lesson 9</a:t>
             </a:r>
           </a:p>
         </p:txBody>
@@ -19905,7 +19912,7 @@
             </a:pPr>
             <a:r>
               <a:rPr lang="en-US" dirty="0"/>
-              <a:t>Repeating Program Steps</a:t>
+              <a:t>Making Choices</a:t>
             </a:r>
           </a:p>
         </p:txBody>
@@ -19913,7 +19920,7 @@
     </p:spTree>
     <p:extLst>
       <p:ext uri="{BB962C8B-B14F-4D97-AF65-F5344CB8AC3E}">
-        <p14:creationId xmlns:p14="http://schemas.microsoft.com/office/powerpoint/2010/main" val="2385190478"/>
+        <p14:creationId xmlns:p14="http://schemas.microsoft.com/office/powerpoint/2010/main" val="2722297980"/>
       </p:ext>
     </p:extLst>
   </p:cSld>
@@ -19957,7 +19964,7 @@
           <p:cNvPr id="4" name="Picture Placeholder 3">
             <a:extLst>
               <a:ext uri="{FF2B5EF4-FFF2-40B4-BE49-F238E27FC236}">
-                <a16:creationId xmlns:a16="http://schemas.microsoft.com/office/drawing/2014/main" id="{F92309F6-7AC4-439E-87EF-927B8F1F99D5}"/>
+                <a16:creationId xmlns:a16="http://schemas.microsoft.com/office/drawing/2014/main" id="{21CF88B5-98FE-435D-B828-5CAD8FE4288D}"/>
               </a:ext>
             </a:extLst>
           </p:cNvPr>
@@ -19970,7 +19977,7 @@
         </p:nvPicPr>
         <p:blipFill>
           <a:blip r:embed="rId2"/>
-          <a:srcRect l="4666" r="4666"/>
+          <a:srcRect l="699" r="699"/>
           <a:stretch>
             <a:fillRect/>
           </a:stretch>
@@ -20005,7 +20012,7 @@
           <a:p>
             <a:r>
               <a:rPr lang="en-US" dirty="0"/>
-              <a:t>Lesson 11</a:t>
+              <a:t>Lesson 10</a:t>
             </a:r>
           </a:p>
         </p:txBody>
@@ -20043,7 +20050,7 @@
             </a:pPr>
             <a:r>
               <a:rPr lang="en-US" dirty="0"/>
-              <a:t>Reusing Code with Methods</a:t>
+              <a:t>Repeating Program Steps</a:t>
             </a:r>
           </a:p>
         </p:txBody>
@@ -20051,7 +20058,7 @@
     </p:spTree>
     <p:extLst>
       <p:ext uri="{BB962C8B-B14F-4D97-AF65-F5344CB8AC3E}">
-        <p14:creationId xmlns:p14="http://schemas.microsoft.com/office/powerpoint/2010/main" val="1420352367"/>
+        <p14:creationId xmlns:p14="http://schemas.microsoft.com/office/powerpoint/2010/main" val="2385190478"/>
       </p:ext>
     </p:extLst>
   </p:cSld>
@@ -20095,7 +20102,7 @@
           <p:cNvPr id="4" name="Picture Placeholder 3">
             <a:extLst>
               <a:ext uri="{FF2B5EF4-FFF2-40B4-BE49-F238E27FC236}">
-                <a16:creationId xmlns:a16="http://schemas.microsoft.com/office/drawing/2014/main" id="{0BAC5A6D-6A0D-47DC-AD1F-09823FDDCC57}"/>
+                <a16:creationId xmlns:a16="http://schemas.microsoft.com/office/drawing/2014/main" id="{F92309F6-7AC4-439E-87EF-927B8F1F99D5}"/>
               </a:ext>
             </a:extLst>
           </p:cNvPr>
@@ -20106,17 +20113,14 @@
             <p:ph type="pic" sz="quarter" idx="10"/>
           </p:nvPr>
         </p:nvPicPr>
-        <p:blipFill rotWithShape="1">
+        <p:blipFill>
           <a:blip r:embed="rId2"/>
-          <a:srcRect l="40873" t="-561" r="256" b="20952"/>
-          <a:stretch/>
+          <a:srcRect l="4666" r="4666"/>
+          <a:stretch>
+            <a:fillRect/>
+          </a:stretch>
         </p:blipFill>
-        <p:spPr>
-          <a:xfrm>
-            <a:off x="7014368" y="-1276351"/>
-            <a:ext cx="9063832" cy="9193212"/>
-          </a:xfrm>
-        </p:spPr>
+        <p:spPr/>
       </p:pic>
       <p:sp>
         <p:nvSpPr>
@@ -20146,7 +20150,7 @@
           <a:p>
             <a:r>
               <a:rPr lang="en-US" dirty="0"/>
-              <a:t>Lesson 12</a:t>
+              <a:t>Lesson 11</a:t>
             </a:r>
           </a:p>
         </p:txBody>
@@ -20184,7 +20188,7 @@
             </a:pPr>
             <a:r>
               <a:rPr lang="en-US" dirty="0"/>
-              <a:t>Handling Errors</a:t>
+              <a:t>Reusing Code with Methods</a:t>
             </a:r>
           </a:p>
         </p:txBody>
@@ -20192,7 +20196,7 @@
     </p:spTree>
     <p:extLst>
       <p:ext uri="{BB962C8B-B14F-4D97-AF65-F5344CB8AC3E}">
-        <p14:creationId xmlns:p14="http://schemas.microsoft.com/office/powerpoint/2010/main" val="837109256"/>
+        <p14:creationId xmlns:p14="http://schemas.microsoft.com/office/powerpoint/2010/main" val="1420352367"/>
       </p:ext>
     </p:extLst>
   </p:cSld>
@@ -20236,7 +20240,7 @@
           <p:cNvPr id="4" name="Picture Placeholder 3">
             <a:extLst>
               <a:ext uri="{FF2B5EF4-FFF2-40B4-BE49-F238E27FC236}">
-                <a16:creationId xmlns:a16="http://schemas.microsoft.com/office/drawing/2014/main" id="{5498D730-A74A-4FFE-B019-83033997997B}"/>
+                <a16:creationId xmlns:a16="http://schemas.microsoft.com/office/drawing/2014/main" id="{0BAC5A6D-6A0D-47DC-AD1F-09823FDDCC57}"/>
               </a:ext>
             </a:extLst>
           </p:cNvPr>
@@ -20247,16 +20251,14 @@
             <p:ph type="pic" sz="quarter" idx="10"/>
           </p:nvPr>
         </p:nvPicPr>
-        <p:blipFill>
+        <p:blipFill rotWithShape="1">
           <a:blip r:embed="rId2"/>
-          <a:srcRect t="16194" b="16194"/>
-          <a:stretch>
-            <a:fillRect/>
-          </a:stretch>
+          <a:srcRect l="40873" t="-561" r="256" b="20952"/>
+          <a:stretch/>
         </p:blipFill>
         <p:spPr>
           <a:xfrm>
-            <a:off x="4831606" y="-1276351"/>
+            <a:off x="7014368" y="-1276351"/>
             <a:ext cx="9063832" cy="9193212"/>
           </a:xfrm>
         </p:spPr>
@@ -20289,7 +20291,7 @@
           <a:p>
             <a:r>
               <a:rPr lang="en-US" dirty="0"/>
-              <a:t>Lesson 13</a:t>
+              <a:t>Lesson 12</a:t>
             </a:r>
           </a:p>
         </p:txBody>
@@ -20327,7 +20329,7 @@
             </a:pPr>
             <a:r>
               <a:rPr lang="en-US" dirty="0"/>
-              <a:t>Preventing Bugs</a:t>
+              <a:t>Handling Errors</a:t>
             </a:r>
           </a:p>
         </p:txBody>
@@ -20335,7 +20337,7 @@
     </p:spTree>
     <p:extLst>
       <p:ext uri="{BB962C8B-B14F-4D97-AF65-F5344CB8AC3E}">
-        <p14:creationId xmlns:p14="http://schemas.microsoft.com/office/powerpoint/2010/main" val="479623129"/>
+        <p14:creationId xmlns:p14="http://schemas.microsoft.com/office/powerpoint/2010/main" val="837109256"/>
       </p:ext>
     </p:extLst>
   </p:cSld>
@@ -20379,7 +20381,7 @@
           <p:cNvPr id="4" name="Picture Placeholder 3">
             <a:extLst>
               <a:ext uri="{FF2B5EF4-FFF2-40B4-BE49-F238E27FC236}">
-                <a16:creationId xmlns:a16="http://schemas.microsoft.com/office/drawing/2014/main" id="{71546D5D-9B0F-4486-B807-6D96A4146254}"/>
+                <a16:creationId xmlns:a16="http://schemas.microsoft.com/office/drawing/2014/main" id="{5498D730-A74A-4FFE-B019-83033997997B}"/>
               </a:ext>
             </a:extLst>
           </p:cNvPr>
@@ -20392,12 +20394,17 @@
         </p:nvPicPr>
         <p:blipFill>
           <a:blip r:embed="rId2"/>
-          <a:srcRect l="13025" r="13025"/>
+          <a:srcRect t="16194" b="16194"/>
           <a:stretch>
             <a:fillRect/>
           </a:stretch>
         </p:blipFill>
-        <p:spPr/>
+        <p:spPr>
+          <a:xfrm>
+            <a:off x="4831606" y="-1276351"/>
+            <a:ext cx="9063832" cy="9193212"/>
+          </a:xfrm>
+        </p:spPr>
       </p:pic>
       <p:sp>
         <p:nvSpPr>
@@ -20427,7 +20434,7 @@
           <a:p>
             <a:r>
               <a:rPr lang="en-US" dirty="0"/>
-              <a:t>Lesson 14</a:t>
+              <a:t>Lesson 13</a:t>
             </a:r>
           </a:p>
         </p:txBody>
@@ -20465,7 +20472,7 @@
             </a:pPr>
             <a:r>
               <a:rPr lang="en-US" dirty="0"/>
-              <a:t>Defining Classes</a:t>
+              <a:t>Preventing Bugs</a:t>
             </a:r>
           </a:p>
         </p:txBody>
@@ -20473,7 +20480,7 @@
     </p:spTree>
     <p:extLst>
       <p:ext uri="{BB962C8B-B14F-4D97-AF65-F5344CB8AC3E}">
-        <p14:creationId xmlns:p14="http://schemas.microsoft.com/office/powerpoint/2010/main" val="187124869"/>
+        <p14:creationId xmlns:p14="http://schemas.microsoft.com/office/powerpoint/2010/main" val="479623129"/>
       </p:ext>
     </p:extLst>
   </p:cSld>
@@ -20517,7 +20524,7 @@
           <p:cNvPr id="4" name="Picture Placeholder 3">
             <a:extLst>
               <a:ext uri="{FF2B5EF4-FFF2-40B4-BE49-F238E27FC236}">
-                <a16:creationId xmlns:a16="http://schemas.microsoft.com/office/drawing/2014/main" id="{322A13A7-D685-4C47-9FD0-58FBF07B2C71}"/>
+                <a16:creationId xmlns:a16="http://schemas.microsoft.com/office/drawing/2014/main" id="{71546D5D-9B0F-4486-B807-6D96A4146254}"/>
               </a:ext>
             </a:extLst>
           </p:cNvPr>
@@ -20530,7 +20537,7 @@
         </p:nvPicPr>
         <p:blipFill>
           <a:blip r:embed="rId2"/>
-          <a:srcRect l="18263" r="18263"/>
+          <a:srcRect l="13025" r="13025"/>
           <a:stretch>
             <a:fillRect/>
           </a:stretch>
@@ -20565,7 +20572,7 @@
           <a:p>
             <a:r>
               <a:rPr lang="en-US" dirty="0"/>
-              <a:t>Lesson 15</a:t>
+              <a:t>Lesson 14</a:t>
             </a:r>
           </a:p>
         </p:txBody>
@@ -20603,7 +20610,7 @@
             </a:pPr>
             <a:r>
               <a:rPr lang="en-US" dirty="0"/>
-              <a:t>Initializing Objects</a:t>
+              <a:t>Defining Classes</a:t>
             </a:r>
           </a:p>
         </p:txBody>
@@ -20611,7 +20618,7 @@
     </p:spTree>
     <p:extLst>
       <p:ext uri="{BB962C8B-B14F-4D97-AF65-F5344CB8AC3E}">
-        <p14:creationId xmlns:p14="http://schemas.microsoft.com/office/powerpoint/2010/main" val="593587069"/>
+        <p14:creationId xmlns:p14="http://schemas.microsoft.com/office/powerpoint/2010/main" val="187124869"/>
       </p:ext>
     </p:extLst>
   </p:cSld>
@@ -20655,7 +20662,7 @@
           <p:cNvPr id="4" name="Picture Placeholder 3">
             <a:extLst>
               <a:ext uri="{FF2B5EF4-FFF2-40B4-BE49-F238E27FC236}">
-                <a16:creationId xmlns:a16="http://schemas.microsoft.com/office/drawing/2014/main" id="{3F0DD061-A1DB-48E3-9E3D-50DE7F5F286C}"/>
+                <a16:creationId xmlns:a16="http://schemas.microsoft.com/office/drawing/2014/main" id="{322A13A7-D685-4C47-9FD0-58FBF07B2C71}"/>
               </a:ext>
             </a:extLst>
           </p:cNvPr>
@@ -20668,7 +20675,7 @@
         </p:nvPicPr>
         <p:blipFill>
           <a:blip r:embed="rId2"/>
-          <a:srcRect l="17133" r="17133"/>
+          <a:srcRect l="18263" r="18263"/>
           <a:stretch>
             <a:fillRect/>
           </a:stretch>
@@ -20703,7 +20710,7 @@
           <a:p>
             <a:r>
               <a:rPr lang="en-US" dirty="0"/>
-              <a:t>Lesson 16</a:t>
+              <a:t>Lesson 15</a:t>
             </a:r>
           </a:p>
         </p:txBody>
@@ -20741,7 +20748,7 @@
             </a:pPr>
             <a:r>
               <a:rPr lang="en-US" dirty="0"/>
-              <a:t>Fine-Tuning Classes</a:t>
+              <a:t>Initializing Objects</a:t>
             </a:r>
           </a:p>
         </p:txBody>
@@ -20749,7 +20756,7 @@
     </p:spTree>
     <p:extLst>
       <p:ext uri="{BB962C8B-B14F-4D97-AF65-F5344CB8AC3E}">
-        <p14:creationId xmlns:p14="http://schemas.microsoft.com/office/powerpoint/2010/main" val="662383641"/>
+        <p14:creationId xmlns:p14="http://schemas.microsoft.com/office/powerpoint/2010/main" val="593587069"/>
       </p:ext>
     </p:extLst>
   </p:cSld>
@@ -20929,7 +20936,7 @@
           <p:cNvPr id="4" name="Picture Placeholder 3">
             <a:extLst>
               <a:ext uri="{FF2B5EF4-FFF2-40B4-BE49-F238E27FC236}">
-                <a16:creationId xmlns:a16="http://schemas.microsoft.com/office/drawing/2014/main" id="{CF348E2F-8404-4D15-B607-7A76572144F7}"/>
+                <a16:creationId xmlns:a16="http://schemas.microsoft.com/office/drawing/2014/main" id="{3F0DD061-A1DB-48E3-9E3D-50DE7F5F286C}"/>
               </a:ext>
             </a:extLst>
           </p:cNvPr>
@@ -20942,17 +20949,12 @@
         </p:nvPicPr>
         <p:blipFill>
           <a:blip r:embed="rId2"/>
-          <a:srcRect l="16825" r="16825"/>
+          <a:srcRect l="17133" r="17133"/>
           <a:stretch>
             <a:fillRect/>
           </a:stretch>
         </p:blipFill>
-        <p:spPr>
-          <a:xfrm>
-            <a:off x="4743116" y="-1167606"/>
-            <a:ext cx="9063832" cy="9193212"/>
-          </a:xfrm>
-        </p:spPr>
+        <p:spPr/>
       </p:pic>
       <p:sp>
         <p:nvSpPr>
@@ -20982,7 +20984,7 @@
           <a:p>
             <a:r>
               <a:rPr lang="en-US" dirty="0"/>
-              <a:t>Lesson 17</a:t>
+              <a:t>Lesson 16</a:t>
             </a:r>
           </a:p>
         </p:txBody>
@@ -21020,7 +21022,7 @@
             </a:pPr>
             <a:r>
               <a:rPr lang="en-US" dirty="0"/>
-              <a:t>Overloading Operators</a:t>
+              <a:t>Fine-Tuning Classes</a:t>
             </a:r>
           </a:p>
         </p:txBody>
@@ -21028,7 +21030,7 @@
     </p:spTree>
     <p:extLst>
       <p:ext uri="{BB962C8B-B14F-4D97-AF65-F5344CB8AC3E}">
-        <p14:creationId xmlns:p14="http://schemas.microsoft.com/office/powerpoint/2010/main" val="432530578"/>
+        <p14:creationId xmlns:p14="http://schemas.microsoft.com/office/powerpoint/2010/main" val="662383641"/>
       </p:ext>
     </p:extLst>
   </p:cSld>
@@ -21072,7 +21074,7 @@
           <p:cNvPr id="4" name="Picture Placeholder 3">
             <a:extLst>
               <a:ext uri="{FF2B5EF4-FFF2-40B4-BE49-F238E27FC236}">
-                <a16:creationId xmlns:a16="http://schemas.microsoft.com/office/drawing/2014/main" id="{CD939774-683B-46AF-9262-B8D43310C9D1}"/>
+                <a16:creationId xmlns:a16="http://schemas.microsoft.com/office/drawing/2014/main" id="{CF348E2F-8404-4D15-B607-7A76572144F7}"/>
               </a:ext>
             </a:extLst>
           </p:cNvPr>
@@ -21085,7 +21087,7 @@
         </p:nvPicPr>
         <p:blipFill>
           <a:blip r:embed="rId2"/>
-          <a:srcRect l="12076" r="12076"/>
+          <a:srcRect l="16825" r="16825"/>
           <a:stretch>
             <a:fillRect/>
           </a:stretch>
@@ -21125,7 +21127,7 @@
           <a:p>
             <a:r>
               <a:rPr lang="en-US" dirty="0"/>
-              <a:t>Lesson 18</a:t>
+              <a:t>Lesson 17</a:t>
             </a:r>
           </a:p>
         </p:txBody>
@@ -21163,7 +21165,7 @@
             </a:pPr>
             <a:r>
               <a:rPr lang="en-US" dirty="0"/>
-              <a:t>Using Interfaces</a:t>
+              <a:t>Overloading Operators</a:t>
             </a:r>
           </a:p>
         </p:txBody>
@@ -21171,7 +21173,7 @@
     </p:spTree>
     <p:extLst>
       <p:ext uri="{BB962C8B-B14F-4D97-AF65-F5344CB8AC3E}">
-        <p14:creationId xmlns:p14="http://schemas.microsoft.com/office/powerpoint/2010/main" val="1560941405"/>
+        <p14:creationId xmlns:p14="http://schemas.microsoft.com/office/powerpoint/2010/main" val="432530578"/>
       </p:ext>
     </p:extLst>
   </p:cSld>
@@ -21215,7 +21217,7 @@
           <p:cNvPr id="4" name="Picture Placeholder 3">
             <a:extLst>
               <a:ext uri="{FF2B5EF4-FFF2-40B4-BE49-F238E27FC236}">
-                <a16:creationId xmlns:a16="http://schemas.microsoft.com/office/drawing/2014/main" id="{40CFE1B1-A7D7-4478-B6B1-5B398326D672}"/>
+                <a16:creationId xmlns:a16="http://schemas.microsoft.com/office/drawing/2014/main" id="{CD939774-683B-46AF-9262-B8D43310C9D1}"/>
               </a:ext>
             </a:extLst>
           </p:cNvPr>
@@ -21228,12 +21230,17 @@
         </p:nvPicPr>
         <p:blipFill>
           <a:blip r:embed="rId2"/>
-          <a:srcRect l="10071" r="10071"/>
+          <a:srcRect l="12076" r="12076"/>
           <a:stretch>
             <a:fillRect/>
           </a:stretch>
         </p:blipFill>
-        <p:spPr/>
+        <p:spPr>
+          <a:xfrm>
+            <a:off x="4743116" y="-1167606"/>
+            <a:ext cx="9063832" cy="9193212"/>
+          </a:xfrm>
+        </p:spPr>
       </p:pic>
       <p:sp>
         <p:nvSpPr>
@@ -21263,7 +21270,7 @@
           <a:p>
             <a:r>
               <a:rPr lang="en-US" dirty="0"/>
-              <a:t>Lesson 19</a:t>
+              <a:t>Lesson 18</a:t>
             </a:r>
           </a:p>
         </p:txBody>
@@ -21301,7 +21308,7 @@
             </a:pPr>
             <a:r>
               <a:rPr lang="en-US" dirty="0"/>
-              <a:t>Making Generic Classes</a:t>
+              <a:t>Using Interfaces</a:t>
             </a:r>
           </a:p>
         </p:txBody>
@@ -21309,7 +21316,7 @@
     </p:spTree>
     <p:extLst>
       <p:ext uri="{BB962C8B-B14F-4D97-AF65-F5344CB8AC3E}">
-        <p14:creationId xmlns:p14="http://schemas.microsoft.com/office/powerpoint/2010/main" val="1782809940"/>
+        <p14:creationId xmlns:p14="http://schemas.microsoft.com/office/powerpoint/2010/main" val="1560941405"/>
       </p:ext>
     </p:extLst>
   </p:cSld>
@@ -21353,7 +21360,7 @@
           <p:cNvPr id="4" name="Picture Placeholder 3">
             <a:extLst>
               <a:ext uri="{FF2B5EF4-FFF2-40B4-BE49-F238E27FC236}">
-                <a16:creationId xmlns:a16="http://schemas.microsoft.com/office/drawing/2014/main" id="{CD77BC9E-3D0D-4120-8C99-31F72FB0DB97}"/>
+                <a16:creationId xmlns:a16="http://schemas.microsoft.com/office/drawing/2014/main" id="{40CFE1B1-A7D7-4478-B6B1-5B398326D672}"/>
               </a:ext>
             </a:extLst>
           </p:cNvPr>
@@ -21366,17 +21373,12 @@
         </p:nvPicPr>
         <p:blipFill>
           <a:blip r:embed="rId2"/>
-          <a:srcRect l="699" r="699"/>
+          <a:srcRect l="10071" r="10071"/>
           <a:stretch>
             <a:fillRect/>
           </a:stretch>
         </p:blipFill>
-        <p:spPr>
-          <a:xfrm>
-            <a:off x="4831609" y="-1276351"/>
-            <a:ext cx="9063832" cy="9193212"/>
-          </a:xfrm>
-        </p:spPr>
+        <p:spPr/>
       </p:pic>
       <p:sp>
         <p:nvSpPr>
@@ -21406,7 +21408,7 @@
           <a:p>
             <a:r>
               <a:rPr lang="en-US" dirty="0"/>
-              <a:t>Lesson 20</a:t>
+              <a:t>Lesson 19</a:t>
             </a:r>
           </a:p>
         </p:txBody>
@@ -21444,7 +21446,7 @@
             </a:pPr>
             <a:r>
               <a:rPr lang="en-US" dirty="0"/>
-              <a:t>Windows Apps with XAML</a:t>
+              <a:t>Making Generic Classes</a:t>
             </a:r>
           </a:p>
         </p:txBody>
@@ -21452,7 +21454,7 @@
     </p:spTree>
     <p:extLst>
       <p:ext uri="{BB962C8B-B14F-4D97-AF65-F5344CB8AC3E}">
-        <p14:creationId xmlns:p14="http://schemas.microsoft.com/office/powerpoint/2010/main" val="3888143967"/>
+        <p14:creationId xmlns:p14="http://schemas.microsoft.com/office/powerpoint/2010/main" val="1782809940"/>
       </p:ext>
     </p:extLst>
   </p:cSld>
@@ -21496,7 +21498,7 @@
           <p:cNvPr id="4" name="Picture Placeholder 3">
             <a:extLst>
               <a:ext uri="{FF2B5EF4-FFF2-40B4-BE49-F238E27FC236}">
-                <a16:creationId xmlns:a16="http://schemas.microsoft.com/office/drawing/2014/main" id="{464C21FD-2E4B-432A-B91D-CF6AE207A3A7}"/>
+                <a16:creationId xmlns:a16="http://schemas.microsoft.com/office/drawing/2014/main" id="{CD77BC9E-3D0D-4120-8C99-31F72FB0DB97}"/>
               </a:ext>
             </a:extLst>
           </p:cNvPr>
@@ -21509,14 +21511,14 @@
         </p:nvPicPr>
         <p:blipFill>
           <a:blip r:embed="rId2"/>
-          <a:srcRect l="21293" r="21293"/>
+          <a:srcRect l="699" r="699"/>
           <a:stretch>
             <a:fillRect/>
           </a:stretch>
         </p:blipFill>
         <p:spPr>
           <a:xfrm>
-            <a:off x="4831610" y="-1276351"/>
+            <a:off x="4831609" y="-1276351"/>
             <a:ext cx="9063832" cy="9193212"/>
           </a:xfrm>
         </p:spPr>
@@ -21549,7 +21551,7 @@
           <a:p>
             <a:r>
               <a:rPr lang="en-US" dirty="0"/>
-              <a:t>Lesson 21</a:t>
+              <a:t>Lesson 20</a:t>
             </a:r>
           </a:p>
         </p:txBody>
@@ -21587,7 +21589,7 @@
             </a:pPr>
             <a:r>
               <a:rPr lang="en-US" dirty="0"/>
-              <a:t>System.IO</a:t>
+              <a:t>Windows Apps with XAML</a:t>
             </a:r>
           </a:p>
         </p:txBody>
@@ -21595,7 +21597,7 @@
     </p:spTree>
     <p:extLst>
       <p:ext uri="{BB962C8B-B14F-4D97-AF65-F5344CB8AC3E}">
-        <p14:creationId xmlns:p14="http://schemas.microsoft.com/office/powerpoint/2010/main" val="171045466"/>
+        <p14:creationId xmlns:p14="http://schemas.microsoft.com/office/powerpoint/2010/main" val="3888143967"/>
       </p:ext>
     </p:extLst>
   </p:cSld>
@@ -21639,7 +21641,7 @@
           <p:cNvPr id="4" name="Picture Placeholder 3">
             <a:extLst>
               <a:ext uri="{FF2B5EF4-FFF2-40B4-BE49-F238E27FC236}">
-                <a16:creationId xmlns:a16="http://schemas.microsoft.com/office/drawing/2014/main" id="{D095E459-51F9-472B-8FE6-9BFC39330CBA}"/>
+                <a16:creationId xmlns:a16="http://schemas.microsoft.com/office/drawing/2014/main" id="{464C21FD-2E4B-432A-B91D-CF6AE207A3A7}"/>
               </a:ext>
             </a:extLst>
           </p:cNvPr>
@@ -21652,12 +21654,17 @@
         </p:nvPicPr>
         <p:blipFill>
           <a:blip r:embed="rId2"/>
-          <a:srcRect t="4080" b="4080"/>
+          <a:srcRect l="21293" r="21293"/>
           <a:stretch>
             <a:fillRect/>
           </a:stretch>
         </p:blipFill>
-        <p:spPr/>
+        <p:spPr>
+          <a:xfrm>
+            <a:off x="4831610" y="-1276351"/>
+            <a:ext cx="9063832" cy="9193212"/>
+          </a:xfrm>
+        </p:spPr>
       </p:pic>
       <p:sp>
         <p:nvSpPr>
@@ -21687,7 +21694,7 @@
           <a:p>
             <a:r>
               <a:rPr lang="en-US" dirty="0"/>
-              <a:t>Lesson 22</a:t>
+              <a:t>Lesson 21</a:t>
             </a:r>
           </a:p>
         </p:txBody>
@@ -21725,7 +21732,7 @@
             </a:pPr>
             <a:r>
               <a:rPr lang="en-US" dirty="0"/>
-              <a:t>Programming Databases</a:t>
+              <a:t>System.IO</a:t>
             </a:r>
           </a:p>
         </p:txBody>
@@ -21733,7 +21740,7 @@
     </p:spTree>
     <p:extLst>
       <p:ext uri="{BB962C8B-B14F-4D97-AF65-F5344CB8AC3E}">
-        <p14:creationId xmlns:p14="http://schemas.microsoft.com/office/powerpoint/2010/main" val="3062775636"/>
+        <p14:creationId xmlns:p14="http://schemas.microsoft.com/office/powerpoint/2010/main" val="171045466"/>
       </p:ext>
     </p:extLst>
   </p:cSld>
@@ -21777,6 +21784,144 @@
           <p:cNvPr id="4" name="Picture Placeholder 3">
             <a:extLst>
               <a:ext uri="{FF2B5EF4-FFF2-40B4-BE49-F238E27FC236}">
+                <a16:creationId xmlns:a16="http://schemas.microsoft.com/office/drawing/2014/main" id="{D095E459-51F9-472B-8FE6-9BFC39330CBA}"/>
+              </a:ext>
+            </a:extLst>
+          </p:cNvPr>
+          <p:cNvPicPr>
+            <a:picLocks noGrp="1" noChangeAspect="1"/>
+          </p:cNvPicPr>
+          <p:nvPr>
+            <p:ph type="pic" sz="quarter" idx="10"/>
+          </p:nvPr>
+        </p:nvPicPr>
+        <p:blipFill>
+          <a:blip r:embed="rId2"/>
+          <a:srcRect t="4080" b="4080"/>
+          <a:stretch>
+            <a:fillRect/>
+          </a:stretch>
+        </p:blipFill>
+        <p:spPr/>
+      </p:pic>
+      <p:sp>
+        <p:nvSpPr>
+          <p:cNvPr id="2" name="Title 1">
+            <a:extLst>
+              <a:ext uri="{FF2B5EF4-FFF2-40B4-BE49-F238E27FC236}">
+                <a16:creationId xmlns:a16="http://schemas.microsoft.com/office/drawing/2014/main" id="{B2A8B21D-766A-4354-B054-43C814C7440B}"/>
+              </a:ext>
+            </a:extLst>
+          </p:cNvPr>
+          <p:cNvSpPr>
+            <a:spLocks noGrp="1"/>
+          </p:cNvSpPr>
+          <p:nvPr>
+            <p:ph type="title" idx="4294967295"/>
+          </p:nvPr>
+        </p:nvSpPr>
+        <p:spPr>
+          <a:xfrm>
+            <a:off x="0" y="1709738"/>
+            <a:ext cx="10515600" cy="2852737"/>
+          </a:xfrm>
+        </p:spPr>
+        <p:txBody>
+          <a:bodyPr/>
+          <a:lstStyle/>
+          <a:p>
+            <a:r>
+              <a:rPr lang="en-US" dirty="0"/>
+              <a:t>Lesson 22</a:t>
+            </a:r>
+          </a:p>
+        </p:txBody>
+      </p:sp>
+      <p:sp>
+        <p:nvSpPr>
+          <p:cNvPr id="3" name="Text Placeholder 2">
+            <a:extLst>
+              <a:ext uri="{FF2B5EF4-FFF2-40B4-BE49-F238E27FC236}">
+                <a16:creationId xmlns:a16="http://schemas.microsoft.com/office/drawing/2014/main" id="{551AA14F-63AB-40DA-A2E5-77B9ECBA8D3C}"/>
+              </a:ext>
+            </a:extLst>
+          </p:cNvPr>
+          <p:cNvSpPr>
+            <a:spLocks noGrp="1"/>
+          </p:cNvSpPr>
+          <p:nvPr>
+            <p:ph type="body" idx="4294967295"/>
+          </p:nvPr>
+        </p:nvSpPr>
+        <p:spPr>
+          <a:xfrm>
+            <a:off x="0" y="4589463"/>
+            <a:ext cx="7014368" cy="1500187"/>
+          </a:xfrm>
+        </p:spPr>
+        <p:txBody>
+          <a:bodyPr>
+            <a:normAutofit/>
+          </a:bodyPr>
+          <a:lstStyle/>
+          <a:p>
+            <a:pPr marL="0" indent="0">
+              <a:buNone/>
+            </a:pPr>
+            <a:r>
+              <a:rPr lang="en-US" dirty="0"/>
+              <a:t>Programming Databases</a:t>
+            </a:r>
+          </a:p>
+        </p:txBody>
+      </p:sp>
+    </p:spTree>
+    <p:extLst>
+      <p:ext uri="{BB962C8B-B14F-4D97-AF65-F5344CB8AC3E}">
+        <p14:creationId xmlns:p14="http://schemas.microsoft.com/office/powerpoint/2010/main" val="3062775636"/>
+      </p:ext>
+    </p:extLst>
+  </p:cSld>
+  <p:clrMapOvr>
+    <a:masterClrMapping/>
+  </p:clrMapOvr>
+  <mc:AlternateContent xmlns:mc="http://schemas.openxmlformats.org/markup-compatibility/2006" xmlns:p14="http://schemas.microsoft.com/office/powerpoint/2010/main">
+    <mc:Choice Requires="p14">
+      <p:transition spd="slow" p14:dur="1250" advTm="2000">
+        <p14:flip dir="r"/>
+      </p:transition>
+    </mc:Choice>
+    <mc:Fallback xmlns="">
+      <p:transition spd="slow" advTm="2000">
+        <p:fade/>
+      </p:transition>
+    </mc:Fallback>
+  </mc:AlternateContent>
+</p:sld>
+</file>
+
+<file path=ppt/slides/slide27.xml><?xml version="1.0" encoding="utf-8"?>
+<p:sld xmlns:a="http://schemas.openxmlformats.org/drawingml/2006/main" xmlns:r="http://schemas.openxmlformats.org/officeDocument/2006/relationships" xmlns:p="http://schemas.openxmlformats.org/presentationml/2006/main">
+  <p:cSld>
+    <p:spTree>
+      <p:nvGrpSpPr>
+        <p:cNvPr id="1" name=""/>
+        <p:cNvGrpSpPr/>
+        <p:nvPr/>
+      </p:nvGrpSpPr>
+      <p:grpSpPr>
+        <a:xfrm>
+          <a:off x="0" y="0"/>
+          <a:ext cx="0" cy="0"/>
+          <a:chOff x="0" y="0"/>
+          <a:chExt cx="0" cy="0"/>
+        </a:xfrm>
+      </p:grpSpPr>
+      <p:pic>
+        <p:nvPicPr>
+          <p:cNvPr id="4" name="Picture Placeholder 3">
+            <a:extLst>
+              <a:ext uri="{FF2B5EF4-FFF2-40B4-BE49-F238E27FC236}">
                 <a16:creationId xmlns:a16="http://schemas.microsoft.com/office/drawing/2014/main" id="{B9BFDE3A-3AD5-4BB0-977A-29CBD5947C18}"/>
               </a:ext>
             </a:extLst>
@@ -21898,7 +22043,7 @@
 </p:sld>
 </file>
 
-<file path=ppt/slides/slide27.xml><?xml version="1.0" encoding="utf-8"?>
+<file path=ppt/slides/slide28.xml><?xml version="1.0" encoding="utf-8"?>
 <p:sld xmlns:a="http://schemas.openxmlformats.org/drawingml/2006/main" xmlns:r="http://schemas.openxmlformats.org/officeDocument/2006/relationships" xmlns:p="http://schemas.openxmlformats.org/presentationml/2006/main">
   <p:cSld>
     <p:spTree>
@@ -22382,16 +22527,18 @@
         </p:nvSpPr>
         <p:spPr>
           <a:xfrm>
-            <a:off x="457200" y="0"/>
+            <a:off x="334369" y="-353350"/>
             <a:ext cx="10515600" cy="1325563"/>
           </a:xfrm>
         </p:spPr>
         <p:txBody>
-          <a:bodyPr/>
-          <a:lstStyle/>
-          <a:p>
-            <a:r>
-              <a:rPr lang="en-US" dirty="0"/>
+          <a:bodyPr>
+            <a:normAutofit/>
+          </a:bodyPr>
+          <a:lstStyle/>
+          <a:p>
+            <a:r>
+              <a:rPr lang="en-US" sz="3200" dirty="0"/>
               <a:t>Data Types</a:t>
             </a:r>
           </a:p>
@@ -22413,14 +22560,14 @@
             <p:ph idx="1"/>
             <p:extLst>
               <p:ext uri="{D42A27DB-BD31-4B8C-83A1-F6EECF244321}">
-                <p14:modId xmlns:p14="http://schemas.microsoft.com/office/powerpoint/2010/main" val="51108728"/>
+                <p14:modId xmlns:p14="http://schemas.microsoft.com/office/powerpoint/2010/main" val="1963346552"/>
               </p:ext>
             </p:extLst>
           </p:nvPr>
         </p:nvGraphicFramePr>
         <p:xfrm>
-          <a:off x="457200" y="1054100"/>
-          <a:ext cx="10515600" cy="5562600"/>
+          <a:off x="334369" y="505195"/>
+          <a:ext cx="11730251" cy="6202680"/>
         </p:xfrm>
         <a:graphic>
           <a:graphicData uri="http://schemas.openxmlformats.org/drawingml/2006/table">
@@ -22429,24 +22576,24 @@
                 <a:tableStyleId>{5C22544A-7EE6-4342-B048-85BDC9FD1C3A}</a:tableStyleId>
               </a:tblPr>
               <a:tblGrid>
-                <a:gridCol w="3505200">
+                <a:gridCol w="1369870">
                   <a:extLst>
                     <a:ext uri="{9D8B030D-6E8A-4147-A177-3AD203B41FA5}">
                       <a16:colId xmlns:a16="http://schemas.microsoft.com/office/drawing/2014/main" val="652293511"/>
                     </a:ext>
                   </a:extLst>
                 </a:gridCol>
-                <a:gridCol w="3505200">
+                <a:gridCol w="3727570">
                   <a:extLst>
                     <a:ext uri="{9D8B030D-6E8A-4147-A177-3AD203B41FA5}">
                       <a16:colId xmlns:a16="http://schemas.microsoft.com/office/drawing/2014/main" val="2504988398"/>
                     </a:ext>
                   </a:extLst>
                 </a:gridCol>
-                <a:gridCol w="3505200">
+                <a:gridCol w="6632811">
                   <a:extLst>
                     <a:ext uri="{9D8B030D-6E8A-4147-A177-3AD203B41FA5}">
-                      <a16:colId xmlns:a16="http://schemas.microsoft.com/office/drawing/2014/main" val="3991444147"/>
+                      <a16:colId xmlns:a16="http://schemas.microsoft.com/office/drawing/2014/main" val="2046533522"/>
                     </a:ext>
                   </a:extLst>
                 </a:gridCol>
@@ -22516,7 +22663,18 @@
                     <a:bodyPr/>
                     <a:lstStyle/>
                     <a:p>
-                      <a:endParaRPr lang="en-US"/>
+                      <a:r>
+                        <a:rPr lang="en-US" sz="1800" b="0" i="0" u="none" strike="noStrike" kern="1200" baseline="0" dirty="0">
+                          <a:solidFill>
+                            <a:schemeClr val="dk1"/>
+                          </a:solidFill>
+                          <a:latin typeface="+mn-lt"/>
+                          <a:ea typeface="+mn-ea"/>
+                          <a:cs typeface="+mn-cs"/>
+                        </a:rPr>
+                        <a:t>Byte</a:t>
+                      </a:r>
+                      <a:endParaRPr lang="en-US" dirty="0"/>
                     </a:p>
                   </a:txBody>
                   <a:tcPr/>
@@ -22526,7 +22684,18 @@
                     <a:bodyPr/>
                     <a:lstStyle/>
                     <a:p>
-                      <a:endParaRPr lang="en-US"/>
+                      <a:r>
+                        <a:rPr lang="en-US" sz="1800" b="0" i="0" u="none" strike="noStrike" kern="1200" baseline="0" dirty="0">
+                          <a:solidFill>
+                            <a:schemeClr val="dk1"/>
+                          </a:solidFill>
+                          <a:latin typeface="+mn-lt"/>
+                          <a:ea typeface="+mn-ea"/>
+                          <a:cs typeface="+mn-cs"/>
+                        </a:rPr>
+                        <a:t>0 to 255</a:t>
+                      </a:r>
+                      <a:endParaRPr lang="en-US" dirty="0"/>
                     </a:p>
                   </a:txBody>
                   <a:tcPr/>
@@ -22557,7 +22726,18 @@
                     <a:bodyPr/>
                     <a:lstStyle/>
                     <a:p>
-                      <a:endParaRPr lang="en-US"/>
+                      <a:r>
+                        <a:rPr lang="en-US" sz="1800" b="0" i="0" u="none" strike="noStrike" kern="1200" baseline="0" dirty="0">
+                          <a:solidFill>
+                            <a:schemeClr val="dk1"/>
+                          </a:solidFill>
+                          <a:latin typeface="+mn-lt"/>
+                          <a:ea typeface="+mn-ea"/>
+                          <a:cs typeface="+mn-cs"/>
+                        </a:rPr>
+                        <a:t>Signed byte</a:t>
+                      </a:r>
+                      <a:endParaRPr lang="en-US" dirty="0"/>
                     </a:p>
                   </a:txBody>
                   <a:tcPr/>
@@ -22567,7 +22747,18 @@
                     <a:bodyPr/>
                     <a:lstStyle/>
                     <a:p>
-                      <a:endParaRPr lang="en-US"/>
+                      <a:r>
+                        <a:rPr lang="en-US" sz="1800" b="0" i="0" u="none" strike="noStrike" kern="1200" baseline="0" dirty="0">
+                          <a:solidFill>
+                            <a:schemeClr val="dk1"/>
+                          </a:solidFill>
+                          <a:latin typeface="+mn-lt"/>
+                          <a:ea typeface="+mn-ea"/>
+                          <a:cs typeface="+mn-cs"/>
+                        </a:rPr>
+                        <a:t>–128 to 127</a:t>
+                      </a:r>
+                      <a:endParaRPr lang="en-US" dirty="0"/>
                     </a:p>
                   </a:txBody>
                   <a:tcPr/>
@@ -22575,6 +22766,85 @@
                 <a:extLst>
                   <a:ext uri="{0D108BD9-81ED-4DB2-BD59-A6C34878D82A}">
                     <a16:rowId xmlns:a16="http://schemas.microsoft.com/office/drawing/2014/main" val="2812899350"/>
+                  </a:ext>
+                </a:extLst>
+              </a:tr>
+              <a:tr h="370840">
+                <a:tc>
+                  <a:txBody>
+                    <a:bodyPr/>
+                    <a:lstStyle/>
+                    <a:p>
+                      <a:r>
+                        <a:rPr lang="en-US" dirty="0"/>
+                        <a:t>short</a:t>
+                      </a:r>
+                    </a:p>
+                  </a:txBody>
+                  <a:tcPr/>
+                </a:tc>
+                <a:tc>
+                  <a:txBody>
+                    <a:bodyPr/>
+                    <a:lstStyle/>
+                    <a:p>
+                      <a:pPr marL="0" marR="0" lvl="0" indent="0" algn="l" defTabSz="914400" rtl="0" eaLnBrk="1" fontAlgn="auto" latinLnBrk="0" hangingPunct="1">
+                        <a:lnSpc>
+                          <a:spcPct val="100000"/>
+                        </a:lnSpc>
+                        <a:spcBef>
+                          <a:spcPts val="0"/>
+                        </a:spcBef>
+                        <a:spcAft>
+                          <a:spcPts val="0"/>
+                        </a:spcAft>
+                        <a:buClrTx/>
+                        <a:buSzTx/>
+                        <a:buFontTx/>
+                        <a:buNone/>
+                        <a:tabLst/>
+                        <a:defRPr/>
+                      </a:pPr>
+                      <a:r>
+                        <a:rPr lang="en-US" sz="1800" b="0" i="0" u="none" strike="noStrike" kern="1200" baseline="0" dirty="0">
+                          <a:solidFill>
+                            <a:schemeClr val="dk1"/>
+                          </a:solidFill>
+                          <a:latin typeface="+mn-lt"/>
+                          <a:ea typeface="+mn-ea"/>
+                          <a:cs typeface="+mn-cs"/>
+                        </a:rPr>
+                        <a:t>Small signed integer</a:t>
+                      </a:r>
+                      <a:endParaRPr lang="en-US" dirty="0"/>
+                    </a:p>
+                  </a:txBody>
+                  <a:tcPr/>
+                </a:tc>
+                <a:tc>
+                  <a:txBody>
+                    <a:bodyPr/>
+                    <a:lstStyle/>
+                    <a:p>
+                      <a:r>
+                        <a:rPr lang="en-US" sz="1800" b="0" i="0" u="none" strike="noStrike" kern="1200" baseline="0" dirty="0">
+                          <a:solidFill>
+                            <a:schemeClr val="dk1"/>
+                          </a:solidFill>
+                          <a:latin typeface="+mn-lt"/>
+                          <a:ea typeface="+mn-ea"/>
+                          <a:cs typeface="+mn-cs"/>
+                        </a:rPr>
+                        <a:t>–32,768 to 32,767</a:t>
+                      </a:r>
+                      <a:endParaRPr lang="en-US" dirty="0"/>
+                    </a:p>
+                  </a:txBody>
+                  <a:tcPr/>
+                </a:tc>
+                <a:extLst>
+                  <a:ext uri="{0D108BD9-81ED-4DB2-BD59-A6C34878D82A}">
+                    <a16:rowId xmlns:a16="http://schemas.microsoft.com/office/drawing/2014/main" val="1647705906"/>
                   </a:ext>
                 </a:extLst>
               </a:tr>
@@ -22598,7 +22868,35 @@
                     <a:bodyPr/>
                     <a:lstStyle/>
                     <a:p>
-                      <a:endParaRPr lang="en-US"/>
+                      <a:pPr marL="0" marR="0" lvl="0" indent="0" algn="l" defTabSz="914400" rtl="0" eaLnBrk="1" fontAlgn="auto" latinLnBrk="0" hangingPunct="1">
+                        <a:lnSpc>
+                          <a:spcPct val="100000"/>
+                        </a:lnSpc>
+                        <a:spcBef>
+                          <a:spcPts val="0"/>
+                        </a:spcBef>
+                        <a:spcAft>
+                          <a:spcPts val="0"/>
+                        </a:spcAft>
+                        <a:buClrTx/>
+                        <a:buSzTx/>
+                        <a:buFontTx/>
+                        <a:buNone/>
+                        <a:tabLst/>
+                        <a:defRPr/>
+                      </a:pPr>
+                      <a:r>
+                        <a:rPr lang="en-US" sz="1800" b="0" i="0" u="none" strike="noStrike" kern="1200" baseline="0" dirty="0">
+                          <a:solidFill>
+                            <a:schemeClr val="dk1"/>
+                          </a:solidFill>
+                          <a:latin typeface="+mn-lt"/>
+                          <a:ea typeface="+mn-ea"/>
+                          <a:cs typeface="+mn-cs"/>
+                        </a:rPr>
+                        <a:t>Unsigned short integer</a:t>
+                      </a:r>
+                      <a:endParaRPr lang="en-US" dirty="0"/>
                     </a:p>
                   </a:txBody>
                   <a:tcPr/>
@@ -22608,7 +22906,18 @@
                     <a:bodyPr/>
                     <a:lstStyle/>
                     <a:p>
-                      <a:endParaRPr lang="en-US"/>
+                      <a:r>
+                        <a:rPr lang="en-US" sz="1800" b="0" i="0" u="none" strike="noStrike" kern="1200" baseline="0" dirty="0">
+                          <a:solidFill>
+                            <a:schemeClr val="dk1"/>
+                          </a:solidFill>
+                          <a:latin typeface="+mn-lt"/>
+                          <a:ea typeface="+mn-ea"/>
+                          <a:cs typeface="+mn-cs"/>
+                        </a:rPr>
+                        <a:t>0 to 65,535</a:t>
+                      </a:r>
+                      <a:endParaRPr lang="en-US" b="0" dirty="0"/>
                     </a:p>
                   </a:txBody>
                   <a:tcPr/>
@@ -22638,7 +22947,39 @@
                     <a:bodyPr/>
                     <a:lstStyle/>
                     <a:p>
-                      <a:endParaRPr lang="en-US"/>
+                      <a:pPr marL="0" marR="0" lvl="0" indent="0" algn="l" defTabSz="914400" rtl="0" eaLnBrk="1" fontAlgn="auto" latinLnBrk="0" hangingPunct="1">
+                        <a:lnSpc>
+                          <a:spcPct val="100000"/>
+                        </a:lnSpc>
+                        <a:spcBef>
+                          <a:spcPts val="0"/>
+                        </a:spcBef>
+                        <a:spcAft>
+                          <a:spcPts val="0"/>
+                        </a:spcAft>
+                        <a:buClrTx/>
+                        <a:buSzTx/>
+                        <a:buFontTx/>
+                        <a:buNone/>
+                        <a:tabLst/>
+                        <a:defRPr/>
+                      </a:pPr>
+                      <a:r>
+                        <a:rPr lang="en-US" dirty="0"/>
+                        <a:t>I</a:t>
+                      </a:r>
+                      <a:r>
+                        <a:rPr lang="en-US" sz="1800" b="0" i="0" u="none" strike="noStrike" kern="1200" baseline="0" dirty="0">
+                          <a:solidFill>
+                            <a:schemeClr val="dk1"/>
+                          </a:solidFill>
+                          <a:latin typeface="+mn-lt"/>
+                          <a:ea typeface="+mn-ea"/>
+                          <a:cs typeface="+mn-cs"/>
+                        </a:rPr>
+                        <a:t>nteger</a:t>
+                      </a:r>
+                      <a:endParaRPr lang="en-US" dirty="0"/>
                     </a:p>
                   </a:txBody>
                   <a:tcPr/>
@@ -22648,7 +22989,18 @@
                     <a:bodyPr/>
                     <a:lstStyle/>
                     <a:p>
-                      <a:endParaRPr lang="en-US"/>
+                      <a:r>
+                        <a:rPr lang="en-US" sz="1800" b="0" i="0" u="none" strike="noStrike" kern="1200" baseline="0" dirty="0">
+                          <a:solidFill>
+                            <a:schemeClr val="dk1"/>
+                          </a:solidFill>
+                          <a:latin typeface="+mn-lt"/>
+                          <a:ea typeface="+mn-ea"/>
+                          <a:cs typeface="+mn-cs"/>
+                        </a:rPr>
+                        <a:t>–2,147,483,648 to 2,147,483,647</a:t>
+                      </a:r>
+                      <a:endParaRPr lang="en-US" dirty="0"/>
                     </a:p>
                   </a:txBody>
                   <a:tcPr/>
@@ -22679,7 +23031,35 @@
                     <a:bodyPr/>
                     <a:lstStyle/>
                     <a:p>
-                      <a:endParaRPr lang="en-US"/>
+                      <a:pPr marL="0" marR="0" lvl="0" indent="0" algn="l" defTabSz="914400" rtl="0" eaLnBrk="1" fontAlgn="auto" latinLnBrk="0" hangingPunct="1">
+                        <a:lnSpc>
+                          <a:spcPct val="100000"/>
+                        </a:lnSpc>
+                        <a:spcBef>
+                          <a:spcPts val="0"/>
+                        </a:spcBef>
+                        <a:spcAft>
+                          <a:spcPts val="0"/>
+                        </a:spcAft>
+                        <a:buClrTx/>
+                        <a:buSzTx/>
+                        <a:buFontTx/>
+                        <a:buNone/>
+                        <a:tabLst/>
+                        <a:defRPr/>
+                      </a:pPr>
+                      <a:r>
+                        <a:rPr lang="en-US" sz="1800" b="0" i="0" u="none" strike="noStrike" kern="1200" baseline="0" dirty="0">
+                          <a:solidFill>
+                            <a:schemeClr val="dk1"/>
+                          </a:solidFill>
+                          <a:latin typeface="+mn-lt"/>
+                          <a:ea typeface="+mn-ea"/>
+                          <a:cs typeface="+mn-cs"/>
+                        </a:rPr>
+                        <a:t>Unsigned integer</a:t>
+                      </a:r>
+                      <a:endParaRPr lang="en-US" dirty="0"/>
                     </a:p>
                   </a:txBody>
                   <a:tcPr/>
@@ -22689,7 +23069,35 @@
                     <a:bodyPr/>
                     <a:lstStyle/>
                     <a:p>
-                      <a:endParaRPr lang="en-US"/>
+                      <a:pPr marL="0" marR="0" lvl="0" indent="0" algn="l" defTabSz="914400" rtl="0" eaLnBrk="1" fontAlgn="auto" latinLnBrk="0" hangingPunct="1">
+                        <a:lnSpc>
+                          <a:spcPct val="100000"/>
+                        </a:lnSpc>
+                        <a:spcBef>
+                          <a:spcPts val="0"/>
+                        </a:spcBef>
+                        <a:spcAft>
+                          <a:spcPts val="0"/>
+                        </a:spcAft>
+                        <a:buClrTx/>
+                        <a:buSzTx/>
+                        <a:buFontTx/>
+                        <a:buNone/>
+                        <a:tabLst/>
+                        <a:defRPr/>
+                      </a:pPr>
+                      <a:r>
+                        <a:rPr lang="en-US" sz="1800" b="0" i="0" u="none" strike="noStrike" kern="1200" baseline="0" dirty="0">
+                          <a:solidFill>
+                            <a:schemeClr val="dk1"/>
+                          </a:solidFill>
+                          <a:latin typeface="+mn-lt"/>
+                          <a:ea typeface="+mn-ea"/>
+                          <a:cs typeface="+mn-cs"/>
+                        </a:rPr>
+                        <a:t>0 to 4,294,967,295</a:t>
+                      </a:r>
+                      <a:endParaRPr lang="en-US" dirty="0"/>
                     </a:p>
                   </a:txBody>
                   <a:tcPr/>
@@ -22719,7 +23127,35 @@
                     <a:bodyPr/>
                     <a:lstStyle/>
                     <a:p>
-                      <a:endParaRPr lang="en-US"/>
+                      <a:pPr marL="0" marR="0" lvl="0" indent="0" algn="l" defTabSz="914400" rtl="0" eaLnBrk="1" fontAlgn="auto" latinLnBrk="0" hangingPunct="1">
+                        <a:lnSpc>
+                          <a:spcPct val="100000"/>
+                        </a:lnSpc>
+                        <a:spcBef>
+                          <a:spcPts val="0"/>
+                        </a:spcBef>
+                        <a:spcAft>
+                          <a:spcPts val="0"/>
+                        </a:spcAft>
+                        <a:buClrTx/>
+                        <a:buSzTx/>
+                        <a:buFontTx/>
+                        <a:buNone/>
+                        <a:tabLst/>
+                        <a:defRPr/>
+                      </a:pPr>
+                      <a:r>
+                        <a:rPr lang="en-US" sz="1800" b="0" i="0" u="none" strike="noStrike" kern="1200" baseline="0" dirty="0">
+                          <a:solidFill>
+                            <a:schemeClr val="dk1"/>
+                          </a:solidFill>
+                          <a:latin typeface="+mn-lt"/>
+                          <a:ea typeface="+mn-ea"/>
+                          <a:cs typeface="+mn-cs"/>
+                        </a:rPr>
+                        <a:t>Long integer</a:t>
+                      </a:r>
+                      <a:endParaRPr lang="en-US" dirty="0"/>
                     </a:p>
                   </a:txBody>
                   <a:tcPr/>
@@ -22729,7 +23165,18 @@
                     <a:bodyPr/>
                     <a:lstStyle/>
                     <a:p>
-                      <a:endParaRPr lang="en-US"/>
+                      <a:r>
+                        <a:rPr lang="en-US" sz="1800" b="0" i="0" u="none" strike="noStrike" kern="1200" baseline="0" dirty="0">
+                          <a:solidFill>
+                            <a:schemeClr val="dk1"/>
+                          </a:solidFill>
+                          <a:latin typeface="+mn-lt"/>
+                          <a:ea typeface="+mn-ea"/>
+                          <a:cs typeface="+mn-cs"/>
+                        </a:rPr>
+                        <a:t>–9,223,372,036,854,775,808 to 9,223,372,036,854,775,807</a:t>
+                      </a:r>
+                      <a:endParaRPr lang="en-US" dirty="0"/>
                     </a:p>
                   </a:txBody>
                   <a:tcPr/>
@@ -22760,7 +23207,35 @@
                     <a:bodyPr/>
                     <a:lstStyle/>
                     <a:p>
-                      <a:endParaRPr lang="en-US"/>
+                      <a:pPr marL="0" marR="0" lvl="0" indent="0" algn="l" defTabSz="914400" rtl="0" eaLnBrk="1" fontAlgn="auto" latinLnBrk="0" hangingPunct="1">
+                        <a:lnSpc>
+                          <a:spcPct val="100000"/>
+                        </a:lnSpc>
+                        <a:spcBef>
+                          <a:spcPts val="0"/>
+                        </a:spcBef>
+                        <a:spcAft>
+                          <a:spcPts val="0"/>
+                        </a:spcAft>
+                        <a:buClrTx/>
+                        <a:buSzTx/>
+                        <a:buFontTx/>
+                        <a:buNone/>
+                        <a:tabLst/>
+                        <a:defRPr/>
+                      </a:pPr>
+                      <a:r>
+                        <a:rPr lang="en-US" sz="1800" b="0" i="0" u="none" strike="noStrike" kern="1200" baseline="0" dirty="0">
+                          <a:solidFill>
+                            <a:schemeClr val="dk1"/>
+                          </a:solidFill>
+                          <a:latin typeface="+mn-lt"/>
+                          <a:ea typeface="+mn-ea"/>
+                          <a:cs typeface="+mn-cs"/>
+                        </a:rPr>
+                        <a:t>Unsigned long integer</a:t>
+                      </a:r>
+                      <a:endParaRPr lang="en-US" dirty="0"/>
                     </a:p>
                   </a:txBody>
                   <a:tcPr/>
@@ -22770,7 +23245,35 @@
                     <a:bodyPr/>
                     <a:lstStyle/>
                     <a:p>
-                      <a:endParaRPr lang="en-US"/>
+                      <a:pPr marL="0" marR="0" lvl="0" indent="0" algn="l" defTabSz="914400" rtl="0" eaLnBrk="1" fontAlgn="auto" latinLnBrk="0" hangingPunct="1">
+                        <a:lnSpc>
+                          <a:spcPct val="100000"/>
+                        </a:lnSpc>
+                        <a:spcBef>
+                          <a:spcPts val="0"/>
+                        </a:spcBef>
+                        <a:spcAft>
+                          <a:spcPts val="0"/>
+                        </a:spcAft>
+                        <a:buClrTx/>
+                        <a:buSzTx/>
+                        <a:buFontTx/>
+                        <a:buNone/>
+                        <a:tabLst/>
+                        <a:defRPr/>
+                      </a:pPr>
+                      <a:r>
+                        <a:rPr lang="en-US" sz="1800" b="0" i="0" u="none" strike="noStrike" kern="1200" baseline="0" dirty="0">
+                          <a:solidFill>
+                            <a:schemeClr val="dk1"/>
+                          </a:solidFill>
+                          <a:latin typeface="+mn-lt"/>
+                          <a:ea typeface="+mn-ea"/>
+                          <a:cs typeface="+mn-cs"/>
+                        </a:rPr>
+                        <a:t>0 to 18,446,744,073,709,551,615</a:t>
+                      </a:r>
+                      <a:endParaRPr lang="en-US" dirty="0"/>
                     </a:p>
                   </a:txBody>
                   <a:tcPr/>
@@ -22800,7 +23303,35 @@
                     <a:bodyPr/>
                     <a:lstStyle/>
                     <a:p>
-                      <a:endParaRPr lang="en-US"/>
+                      <a:pPr marL="0" marR="0" lvl="0" indent="0" algn="l" defTabSz="914400" rtl="0" eaLnBrk="1" fontAlgn="auto" latinLnBrk="0" hangingPunct="1">
+                        <a:lnSpc>
+                          <a:spcPct val="100000"/>
+                        </a:lnSpc>
+                        <a:spcBef>
+                          <a:spcPts val="0"/>
+                        </a:spcBef>
+                        <a:spcAft>
+                          <a:spcPts val="0"/>
+                        </a:spcAft>
+                        <a:buClrTx/>
+                        <a:buSzTx/>
+                        <a:buFontTx/>
+                        <a:buNone/>
+                        <a:tabLst/>
+                        <a:defRPr/>
+                      </a:pPr>
+                      <a:r>
+                        <a:rPr lang="en-US" sz="1800" b="0" i="0" u="none" strike="noStrike" kern="1200" baseline="0" dirty="0">
+                          <a:solidFill>
+                            <a:schemeClr val="dk1"/>
+                          </a:solidFill>
+                          <a:latin typeface="+mn-lt"/>
+                          <a:ea typeface="+mn-ea"/>
+                          <a:cs typeface="+mn-cs"/>
+                        </a:rPr>
+                        <a:t>Floating point</a:t>
+                      </a:r>
+                      <a:endParaRPr lang="en-US" dirty="0"/>
                     </a:p>
                   </a:txBody>
                   <a:tcPr/>
@@ -22810,7 +23341,35 @@
                     <a:bodyPr/>
                     <a:lstStyle/>
                     <a:p>
-                      <a:endParaRPr lang="en-US"/>
+                      <a:pPr marL="0" marR="0" lvl="0" indent="0" algn="l" defTabSz="914400" rtl="0" eaLnBrk="1" fontAlgn="auto" latinLnBrk="0" hangingPunct="1">
+                        <a:lnSpc>
+                          <a:spcPct val="100000"/>
+                        </a:lnSpc>
+                        <a:spcBef>
+                          <a:spcPts val="0"/>
+                        </a:spcBef>
+                        <a:spcAft>
+                          <a:spcPts val="0"/>
+                        </a:spcAft>
+                        <a:buClrTx/>
+                        <a:buSzTx/>
+                        <a:buFontTx/>
+                        <a:buNone/>
+                        <a:tabLst/>
+                        <a:defRPr/>
+                      </a:pPr>
+                      <a:r>
+                        <a:rPr lang="en-US" sz="1800" b="0" i="0" u="none" strike="noStrike" kern="1200" baseline="0" dirty="0">
+                          <a:solidFill>
+                            <a:schemeClr val="dk1"/>
+                          </a:solidFill>
+                          <a:latin typeface="+mn-lt"/>
+                          <a:ea typeface="+mn-ea"/>
+                          <a:cs typeface="+mn-cs"/>
+                        </a:rPr>
+                        <a:t>Roughly –3.4e38 to 3.4e38</a:t>
+                      </a:r>
+                      <a:endParaRPr lang="en-US" dirty="0"/>
                     </a:p>
                   </a:txBody>
                   <a:tcPr/>
@@ -22840,7 +23399,35 @@
                     <a:bodyPr/>
                     <a:lstStyle/>
                     <a:p>
-                      <a:endParaRPr lang="en-US"/>
+                      <a:pPr marL="0" marR="0" lvl="0" indent="0" algn="l" defTabSz="914400" rtl="0" eaLnBrk="1" fontAlgn="auto" latinLnBrk="0" hangingPunct="1">
+                        <a:lnSpc>
+                          <a:spcPct val="100000"/>
+                        </a:lnSpc>
+                        <a:spcBef>
+                          <a:spcPts val="0"/>
+                        </a:spcBef>
+                        <a:spcAft>
+                          <a:spcPts val="0"/>
+                        </a:spcAft>
+                        <a:buClrTx/>
+                        <a:buSzTx/>
+                        <a:buFontTx/>
+                        <a:buNone/>
+                        <a:tabLst/>
+                        <a:defRPr/>
+                      </a:pPr>
+                      <a:r>
+                        <a:rPr lang="en-US" sz="1800" b="0" i="0" u="none" strike="noStrike" kern="1200" baseline="0" dirty="0">
+                          <a:solidFill>
+                            <a:schemeClr val="dk1"/>
+                          </a:solidFill>
+                          <a:latin typeface="+mn-lt"/>
+                          <a:ea typeface="+mn-ea"/>
+                          <a:cs typeface="+mn-cs"/>
+                        </a:rPr>
+                        <a:t>Double-precision floating point</a:t>
+                      </a:r>
+                      <a:endParaRPr lang="en-US" dirty="0"/>
                     </a:p>
                   </a:txBody>
                   <a:tcPr/>
@@ -22850,7 +23437,35 @@
                     <a:bodyPr/>
                     <a:lstStyle/>
                     <a:p>
-                      <a:endParaRPr lang="en-US"/>
+                      <a:pPr marL="0" marR="0" lvl="0" indent="0" algn="l" defTabSz="914400" rtl="0" eaLnBrk="1" fontAlgn="auto" latinLnBrk="0" hangingPunct="1">
+                        <a:lnSpc>
+                          <a:spcPct val="100000"/>
+                        </a:lnSpc>
+                        <a:spcBef>
+                          <a:spcPts val="0"/>
+                        </a:spcBef>
+                        <a:spcAft>
+                          <a:spcPts val="0"/>
+                        </a:spcAft>
+                        <a:buClrTx/>
+                        <a:buSzTx/>
+                        <a:buFontTx/>
+                        <a:buNone/>
+                        <a:tabLst/>
+                        <a:defRPr/>
+                      </a:pPr>
+                      <a:r>
+                        <a:rPr lang="en-US" sz="1800" b="0" i="0" u="none" strike="noStrike" kern="1200" baseline="0" dirty="0">
+                          <a:solidFill>
+                            <a:schemeClr val="dk1"/>
+                          </a:solidFill>
+                          <a:latin typeface="+mn-lt"/>
+                          <a:ea typeface="+mn-ea"/>
+                          <a:cs typeface="+mn-cs"/>
+                        </a:rPr>
+                        <a:t>Roughly –1.8e308 to 1.8e308</a:t>
+                      </a:r>
+                      <a:endParaRPr lang="en-US" dirty="0"/>
                     </a:p>
                   </a:txBody>
                   <a:tcPr/>
@@ -22880,7 +23495,29 @@
                     <a:bodyPr/>
                     <a:lstStyle/>
                     <a:p>
-                      <a:endParaRPr lang="en-US"/>
+                      <a:r>
+                        <a:rPr lang="en-GB" sz="1800" b="0" i="0" u="none" strike="noStrike" kern="1200" baseline="0" dirty="0">
+                          <a:solidFill>
+                            <a:schemeClr val="dk1"/>
+                          </a:solidFill>
+                          <a:latin typeface="+mn-lt"/>
+                          <a:ea typeface="+mn-ea"/>
+                          <a:cs typeface="+mn-cs"/>
+                        </a:rPr>
+                        <a:t>Higher precision and smaller range </a:t>
+                      </a:r>
+                      <a:r>
+                        <a:rPr lang="en-US" sz="1800" b="0" i="0" u="none" strike="noStrike" kern="1200" baseline="0" dirty="0">
+                          <a:solidFill>
+                            <a:schemeClr val="dk1"/>
+                          </a:solidFill>
+                          <a:latin typeface="+mn-lt"/>
+                          <a:ea typeface="+mn-ea"/>
+                          <a:cs typeface="+mn-cs"/>
+                        </a:rPr>
+                        <a:t>than floating-point types</a:t>
+                      </a:r>
+                      <a:endParaRPr lang="en-US" dirty="0"/>
                     </a:p>
                   </a:txBody>
                   <a:tcPr/>
@@ -22920,7 +23557,18 @@
                     <a:bodyPr/>
                     <a:lstStyle/>
                     <a:p>
-                      <a:endParaRPr lang="en-US"/>
+                      <a:r>
+                        <a:rPr lang="en-US" sz="1800" b="0" i="0" u="none" strike="noStrike" kern="1200" baseline="0" dirty="0">
+                          <a:solidFill>
+                            <a:schemeClr val="dk1"/>
+                          </a:solidFill>
+                          <a:latin typeface="+mn-lt"/>
+                          <a:ea typeface="+mn-ea"/>
+                          <a:cs typeface="+mn-cs"/>
+                        </a:rPr>
+                        <a:t>Character</a:t>
+                      </a:r>
+                      <a:endParaRPr lang="en-US" dirty="0"/>
                     </a:p>
                   </a:txBody>
                   <a:tcPr/>
@@ -22930,7 +23578,18 @@
                     <a:bodyPr/>
                     <a:lstStyle/>
                     <a:p>
-                      <a:endParaRPr lang="en-US"/>
+                      <a:r>
+                        <a:rPr lang="en-US" sz="1800" b="0" i="0" u="none" strike="noStrike" kern="1200" baseline="0" dirty="0">
+                          <a:solidFill>
+                            <a:schemeClr val="dk1"/>
+                          </a:solidFill>
+                          <a:latin typeface="+mn-lt"/>
+                          <a:ea typeface="+mn-ea"/>
+                          <a:cs typeface="+mn-cs"/>
+                        </a:rPr>
+                        <a:t>single Unicode character.</a:t>
+                      </a:r>
+                      <a:endParaRPr lang="en-US" dirty="0"/>
                     </a:p>
                   </a:txBody>
                   <a:tcPr/>
@@ -22960,7 +23619,18 @@
                     <a:bodyPr/>
                     <a:lstStyle/>
                     <a:p>
-                      <a:endParaRPr lang="en-US"/>
+                      <a:r>
+                        <a:rPr lang="en-US" sz="1800" b="0" i="0" u="none" strike="noStrike" kern="1200" baseline="0" dirty="0">
+                          <a:solidFill>
+                            <a:schemeClr val="dk1"/>
+                          </a:solidFill>
+                          <a:latin typeface="+mn-lt"/>
+                          <a:ea typeface="+mn-ea"/>
+                          <a:cs typeface="+mn-cs"/>
+                        </a:rPr>
+                        <a:t>Text</a:t>
+                      </a:r>
+                      <a:endParaRPr lang="en-US" dirty="0"/>
                     </a:p>
                   </a:txBody>
                   <a:tcPr/>
@@ -22970,7 +23640,18 @@
                     <a:bodyPr/>
                     <a:lstStyle/>
                     <a:p>
-                      <a:endParaRPr lang="en-US"/>
+                      <a:r>
+                        <a:rPr lang="en-GB" sz="1800" b="0" i="0" u="none" strike="noStrike" kern="1200" baseline="0" dirty="0">
+                          <a:solidFill>
+                            <a:schemeClr val="dk1"/>
+                          </a:solidFill>
+                          <a:latin typeface="+mn-lt"/>
+                          <a:ea typeface="+mn-ea"/>
+                          <a:cs typeface="+mn-cs"/>
+                        </a:rPr>
+                        <a:t>A string of Unicode characters.</a:t>
+                      </a:r>
+                      <a:endParaRPr lang="en-US" dirty="0"/>
                     </a:p>
                   </a:txBody>
                   <a:tcPr/>
@@ -23000,7 +23681,10 @@
                     <a:bodyPr/>
                     <a:lstStyle/>
                     <a:p>
-                      <a:endParaRPr lang="en-US"/>
+                      <a:r>
+                        <a:rPr lang="en-US" dirty="0"/>
+                        <a:t>Boolean</a:t>
+                      </a:r>
                     </a:p>
                   </a:txBody>
                   <a:tcPr/>
@@ -23010,7 +23694,18 @@
                     <a:bodyPr/>
                     <a:lstStyle/>
                     <a:p>
-                      <a:endParaRPr lang="en-US"/>
+                      <a:r>
+                        <a:rPr lang="en-GB" sz="1800" b="0" i="0" u="none" strike="noStrike" kern="1200" baseline="0" dirty="0">
+                          <a:solidFill>
+                            <a:schemeClr val="dk1"/>
+                          </a:solidFill>
+                          <a:latin typeface="+mn-lt"/>
+                          <a:ea typeface="+mn-ea"/>
+                          <a:cs typeface="+mn-cs"/>
+                        </a:rPr>
+                        <a:t>Can be true or false.</a:t>
+                      </a:r>
+                      <a:endParaRPr lang="en-US" dirty="0"/>
                     </a:p>
                   </a:txBody>
                   <a:tcPr/>
@@ -23040,7 +23735,10 @@
                     <a:bodyPr/>
                     <a:lstStyle/>
                     <a:p>
-                      <a:endParaRPr lang="en-US"/>
+                      <a:r>
+                        <a:rPr lang="en-US" dirty="0"/>
+                        <a:t>An object</a:t>
+                      </a:r>
                     </a:p>
                   </a:txBody>
                   <a:tcPr/>
@@ -23050,6 +23748,17 @@
                     <a:bodyPr/>
                     <a:lstStyle/>
                     <a:p>
+                      <a:r>
+                        <a:rPr lang="en-GB" sz="1800" b="0" i="0" u="none" strike="noStrike" kern="1200" baseline="0" dirty="0">
+                          <a:solidFill>
+                            <a:schemeClr val="dk1"/>
+                          </a:solidFill>
+                          <a:latin typeface="+mn-lt"/>
+                          <a:ea typeface="+mn-ea"/>
+                          <a:cs typeface="+mn-cs"/>
+                        </a:rPr>
+                        <a:t>Can point to almost anything.</a:t>
+                      </a:r>
                       <a:endParaRPr lang="en-US" dirty="0"/>
                     </a:p>
                   </a:txBody>
@@ -23107,70 +23816,392 @@
           <a:chExt cx="0" cy="0"/>
         </a:xfrm>
       </p:grpSpPr>
-      <p:pic>
-        <p:nvPicPr>
-          <p:cNvPr id="4" name="Picture Placeholder 3">
+      <p:sp>
+        <p:nvSpPr>
+          <p:cNvPr id="6" name="Title 5">
             <a:extLst>
               <a:ext uri="{FF2B5EF4-FFF2-40B4-BE49-F238E27FC236}">
-                <a16:creationId xmlns:a16="http://schemas.microsoft.com/office/drawing/2014/main" id="{E0EA6BD2-3016-4603-992F-BE6209FDC5BE}"/>
+                <a16:creationId xmlns:a16="http://schemas.microsoft.com/office/drawing/2014/main" id="{41FE839C-D3BC-4FC6-945F-BDDB98835EBA}"/>
               </a:ext>
             </a:extLst>
           </p:cNvPr>
-          <p:cNvPicPr>
-            <a:picLocks noGrp="1" noChangeAspect="1"/>
-          </p:cNvPicPr>
-          <p:nvPr>
-            <p:ph type="pic" sz="quarter" idx="10"/>
-          </p:nvPr>
-        </p:nvPicPr>
-        <p:blipFill>
-          <a:blip r:embed="rId2"/>
-          <a:srcRect l="4550" r="4550"/>
-          <a:stretch>
-            <a:fillRect/>
-          </a:stretch>
-        </p:blipFill>
+          <p:cNvSpPr>
+            <a:spLocks noGrp="1"/>
+          </p:cNvSpPr>
+          <p:nvPr>
+            <p:ph type="title"/>
+          </p:nvPr>
+        </p:nvSpPr>
         <p:spPr/>
-      </p:pic>
-      <p:sp>
-        <p:nvSpPr>
-          <p:cNvPr id="2" name="Title 1">
+        <p:txBody>
+          <a:bodyPr/>
+          <a:lstStyle/>
+          <a:p>
+            <a:r>
+              <a:rPr lang="en-US" dirty="0"/>
+              <a:t>Data Type Suffix Characters</a:t>
+            </a:r>
+          </a:p>
+        </p:txBody>
+      </p:sp>
+      <p:graphicFrame>
+        <p:nvGraphicFramePr>
+          <p:cNvPr id="8" name="Content Placeholder 7">
             <a:extLst>
               <a:ext uri="{FF2B5EF4-FFF2-40B4-BE49-F238E27FC236}">
-                <a16:creationId xmlns:a16="http://schemas.microsoft.com/office/drawing/2014/main" id="{B2A8B21D-766A-4354-B054-43C814C7440B}"/>
+                <a16:creationId xmlns:a16="http://schemas.microsoft.com/office/drawing/2014/main" id="{4A762BD9-D61A-4D6F-A6F4-7177E80CFAB3}"/>
               </a:ext>
             </a:extLst>
           </p:cNvPr>
-          <p:cNvSpPr>
-            <a:spLocks noGrp="1"/>
-          </p:cNvSpPr>
-          <p:nvPr>
-            <p:ph type="title" idx="4294967295"/>
-          </p:nvPr>
-        </p:nvSpPr>
-        <p:spPr>
-          <a:xfrm>
-            <a:off x="0" y="1709738"/>
-            <a:ext cx="10515600" cy="2852737"/>
-          </a:xfrm>
-        </p:spPr>
-        <p:txBody>
-          <a:bodyPr/>
-          <a:lstStyle/>
-          <a:p>
-            <a:r>
-              <a:rPr lang="en-US" dirty="0"/>
-              <a:t>Lesson 3</a:t>
-            </a:r>
-          </a:p>
-        </p:txBody>
-      </p:sp>
-      <p:sp>
-        <p:nvSpPr>
-          <p:cNvPr id="3" name="Text Placeholder 2">
+          <p:cNvGraphicFramePr>
+            <a:graphicFrameLocks noGrp="1"/>
+          </p:cNvGraphicFramePr>
+          <p:nvPr>
+            <p:ph sz="half" idx="1"/>
+            <p:extLst>
+              <p:ext uri="{D42A27DB-BD31-4B8C-83A1-F6EECF244321}">
+                <p14:modId xmlns:p14="http://schemas.microsoft.com/office/powerpoint/2010/main" val="3831376603"/>
+              </p:ext>
+            </p:extLst>
+          </p:nvPr>
+        </p:nvGraphicFramePr>
+        <p:xfrm>
+          <a:off x="551597" y="1825625"/>
+          <a:ext cx="5181600" cy="2595880"/>
+        </p:xfrm>
+        <a:graphic>
+          <a:graphicData uri="http://schemas.openxmlformats.org/drawingml/2006/table">
+            <a:tbl>
+              <a:tblPr firstRow="1" bandRow="1">
+                <a:tableStyleId>{5C22544A-7EE6-4342-B048-85BDC9FD1C3A}</a:tableStyleId>
+              </a:tblPr>
+              <a:tblGrid>
+                <a:gridCol w="1195366">
+                  <a:extLst>
+                    <a:ext uri="{9D8B030D-6E8A-4147-A177-3AD203B41FA5}">
+                      <a16:colId xmlns:a16="http://schemas.microsoft.com/office/drawing/2014/main" val="652293511"/>
+                    </a:ext>
+                  </a:extLst>
+                </a:gridCol>
+                <a:gridCol w="3986234">
+                  <a:extLst>
+                    <a:ext uri="{9D8B030D-6E8A-4147-A177-3AD203B41FA5}">
+                      <a16:colId xmlns:a16="http://schemas.microsoft.com/office/drawing/2014/main" val="2504988398"/>
+                    </a:ext>
+                  </a:extLst>
+                </a:gridCol>
+              </a:tblGrid>
+              <a:tr h="370840">
+                <a:tc>
+                  <a:txBody>
+                    <a:bodyPr/>
+                    <a:lstStyle/>
+                    <a:p>
+                      <a:r>
+                        <a:rPr lang="en-US" dirty="0"/>
+                        <a:t>Data Type</a:t>
+                      </a:r>
+                    </a:p>
+                  </a:txBody>
+                  <a:tcPr marL="42013" marR="42013"/>
+                </a:tc>
+                <a:tc>
+                  <a:txBody>
+                    <a:bodyPr/>
+                    <a:lstStyle/>
+                    <a:p>
+                      <a:r>
+                        <a:rPr lang="en-US" dirty="0"/>
+                        <a:t>Meaning</a:t>
+                      </a:r>
+                    </a:p>
+                  </a:txBody>
+                  <a:tcPr marL="42013" marR="42013"/>
+                </a:tc>
+                <a:extLst>
+                  <a:ext uri="{0D108BD9-81ED-4DB2-BD59-A6C34878D82A}">
+                    <a16:rowId xmlns:a16="http://schemas.microsoft.com/office/drawing/2014/main" val="1431503701"/>
+                  </a:ext>
+                </a:extLst>
+              </a:tr>
+              <a:tr h="370840">
+                <a:tc>
+                  <a:txBody>
+                    <a:bodyPr/>
+                    <a:lstStyle/>
+                    <a:p>
+                      <a:r>
+                        <a:rPr lang="en-US" dirty="0" err="1"/>
+                        <a:t>uint</a:t>
+                      </a:r>
+                      <a:endParaRPr lang="en-US" dirty="0"/>
+                    </a:p>
+                  </a:txBody>
+                  <a:tcPr marL="42013" marR="42013"/>
+                </a:tc>
+                <a:tc>
+                  <a:txBody>
+                    <a:bodyPr/>
+                    <a:lstStyle/>
+                    <a:p>
+                      <a:r>
+                        <a:rPr lang="en-US" dirty="0"/>
+                        <a:t>U</a:t>
+                      </a:r>
+                    </a:p>
+                  </a:txBody>
+                  <a:tcPr marL="42013" marR="42013"/>
+                </a:tc>
+                <a:extLst>
+                  <a:ext uri="{0D108BD9-81ED-4DB2-BD59-A6C34878D82A}">
+                    <a16:rowId xmlns:a16="http://schemas.microsoft.com/office/drawing/2014/main" val="3468311115"/>
+                  </a:ext>
+                </a:extLst>
+              </a:tr>
+              <a:tr h="370840">
+                <a:tc>
+                  <a:txBody>
+                    <a:bodyPr/>
+                    <a:lstStyle/>
+                    <a:p>
+                      <a:r>
+                        <a:rPr lang="en-US" dirty="0"/>
+                        <a:t>long</a:t>
+                      </a:r>
+                    </a:p>
+                  </a:txBody>
+                  <a:tcPr marL="42013" marR="42013"/>
+                </a:tc>
+                <a:tc>
+                  <a:txBody>
+                    <a:bodyPr/>
+                    <a:lstStyle/>
+                    <a:p>
+                      <a:r>
+                        <a:rPr lang="en-US" dirty="0"/>
+                        <a:t>L</a:t>
+                      </a:r>
+                    </a:p>
+                  </a:txBody>
+                  <a:tcPr marL="42013" marR="42013"/>
+                </a:tc>
+                <a:extLst>
+                  <a:ext uri="{0D108BD9-81ED-4DB2-BD59-A6C34878D82A}">
+                    <a16:rowId xmlns:a16="http://schemas.microsoft.com/office/drawing/2014/main" val="2812899350"/>
+                  </a:ext>
+                </a:extLst>
+              </a:tr>
+              <a:tr h="370840">
+                <a:tc>
+                  <a:txBody>
+                    <a:bodyPr/>
+                    <a:lstStyle/>
+                    <a:p>
+                      <a:r>
+                        <a:rPr lang="en-US" dirty="0" err="1"/>
+                        <a:t>ulong</a:t>
+                      </a:r>
+                      <a:endParaRPr lang="en-US" dirty="0"/>
+                    </a:p>
+                  </a:txBody>
+                  <a:tcPr marL="42013" marR="42013"/>
+                </a:tc>
+                <a:tc>
+                  <a:txBody>
+                    <a:bodyPr/>
+                    <a:lstStyle/>
+                    <a:p>
+                      <a:pPr marL="0" marR="0" lvl="0" indent="0" algn="l" defTabSz="914400" rtl="0" eaLnBrk="1" fontAlgn="auto" latinLnBrk="0" hangingPunct="1">
+                        <a:lnSpc>
+                          <a:spcPct val="100000"/>
+                        </a:lnSpc>
+                        <a:spcBef>
+                          <a:spcPts val="0"/>
+                        </a:spcBef>
+                        <a:spcAft>
+                          <a:spcPts val="0"/>
+                        </a:spcAft>
+                        <a:buClrTx/>
+                        <a:buSzTx/>
+                        <a:buFontTx/>
+                        <a:buNone/>
+                        <a:tabLst/>
+                        <a:defRPr/>
+                      </a:pPr>
+                      <a:r>
+                        <a:rPr lang="en-US" dirty="0"/>
+                        <a:t>UL or LU</a:t>
+                      </a:r>
+                    </a:p>
+                  </a:txBody>
+                  <a:tcPr marL="42013" marR="42013"/>
+                </a:tc>
+                <a:extLst>
+                  <a:ext uri="{0D108BD9-81ED-4DB2-BD59-A6C34878D82A}">
+                    <a16:rowId xmlns:a16="http://schemas.microsoft.com/office/drawing/2014/main" val="1647705906"/>
+                  </a:ext>
+                </a:extLst>
+              </a:tr>
+              <a:tr h="370840">
+                <a:tc>
+                  <a:txBody>
+                    <a:bodyPr/>
+                    <a:lstStyle/>
+                    <a:p>
+                      <a:r>
+                        <a:rPr lang="en-US" dirty="0"/>
+                        <a:t>float</a:t>
+                      </a:r>
+                    </a:p>
+                  </a:txBody>
+                  <a:tcPr marL="42013" marR="42013"/>
+                </a:tc>
+                <a:tc>
+                  <a:txBody>
+                    <a:bodyPr/>
+                    <a:lstStyle/>
+                    <a:p>
+                      <a:pPr marL="0" marR="0" lvl="0" indent="0" algn="l" defTabSz="914400" rtl="0" eaLnBrk="1" fontAlgn="auto" latinLnBrk="0" hangingPunct="1">
+                        <a:lnSpc>
+                          <a:spcPct val="100000"/>
+                        </a:lnSpc>
+                        <a:spcBef>
+                          <a:spcPts val="0"/>
+                        </a:spcBef>
+                        <a:spcAft>
+                          <a:spcPts val="0"/>
+                        </a:spcAft>
+                        <a:buClrTx/>
+                        <a:buSzTx/>
+                        <a:buFontTx/>
+                        <a:buNone/>
+                        <a:tabLst/>
+                        <a:defRPr/>
+                      </a:pPr>
+                      <a:r>
+                        <a:rPr lang="en-US" dirty="0"/>
+                        <a:t>F</a:t>
+                      </a:r>
+                    </a:p>
+                  </a:txBody>
+                  <a:tcPr marL="42013" marR="42013"/>
+                </a:tc>
+                <a:extLst>
+                  <a:ext uri="{0D108BD9-81ED-4DB2-BD59-A6C34878D82A}">
+                    <a16:rowId xmlns:a16="http://schemas.microsoft.com/office/drawing/2014/main" val="1595019581"/>
+                  </a:ext>
+                </a:extLst>
+              </a:tr>
+              <a:tr h="370840">
+                <a:tc>
+                  <a:txBody>
+                    <a:bodyPr/>
+                    <a:lstStyle/>
+                    <a:p>
+                      <a:r>
+                        <a:rPr lang="en-US" dirty="0"/>
+                        <a:t>double</a:t>
+                      </a:r>
+                    </a:p>
+                  </a:txBody>
+                  <a:tcPr marL="42013" marR="42013"/>
+                </a:tc>
+                <a:tc>
+                  <a:txBody>
+                    <a:bodyPr/>
+                    <a:lstStyle/>
+                    <a:p>
+                      <a:pPr marL="0" marR="0" lvl="0" indent="0" algn="l" defTabSz="914400" rtl="0" eaLnBrk="1" fontAlgn="auto" latinLnBrk="0" hangingPunct="1">
+                        <a:lnSpc>
+                          <a:spcPct val="100000"/>
+                        </a:lnSpc>
+                        <a:spcBef>
+                          <a:spcPts val="0"/>
+                        </a:spcBef>
+                        <a:spcAft>
+                          <a:spcPts val="0"/>
+                        </a:spcAft>
+                        <a:buClrTx/>
+                        <a:buSzTx/>
+                        <a:buFontTx/>
+                        <a:buNone/>
+                        <a:tabLst/>
+                        <a:defRPr/>
+                      </a:pPr>
+                      <a:r>
+                        <a:rPr lang="en-US" dirty="0"/>
+                        <a:t>D</a:t>
+                      </a:r>
+                    </a:p>
+                  </a:txBody>
+                  <a:tcPr marL="42013" marR="42013"/>
+                </a:tc>
+                <a:extLst>
+                  <a:ext uri="{0D108BD9-81ED-4DB2-BD59-A6C34878D82A}">
+                    <a16:rowId xmlns:a16="http://schemas.microsoft.com/office/drawing/2014/main" val="859887377"/>
+                  </a:ext>
+                </a:extLst>
+              </a:tr>
+              <a:tr h="370840">
+                <a:tc>
+                  <a:txBody>
+                    <a:bodyPr/>
+                    <a:lstStyle/>
+                    <a:p>
+                      <a:r>
+                        <a:rPr lang="en-US" dirty="0"/>
+                        <a:t>decimal</a:t>
+                      </a:r>
+                    </a:p>
+                  </a:txBody>
+                  <a:tcPr marL="42013" marR="42013"/>
+                </a:tc>
+                <a:tc>
+                  <a:txBody>
+                    <a:bodyPr/>
+                    <a:lstStyle/>
+                    <a:p>
+                      <a:pPr marL="0" marR="0" lvl="0" indent="0" algn="l" defTabSz="914400" rtl="0" eaLnBrk="1" fontAlgn="auto" latinLnBrk="0" hangingPunct="1">
+                        <a:lnSpc>
+                          <a:spcPct val="100000"/>
+                        </a:lnSpc>
+                        <a:spcBef>
+                          <a:spcPts val="0"/>
+                        </a:spcBef>
+                        <a:spcAft>
+                          <a:spcPts val="0"/>
+                        </a:spcAft>
+                        <a:buClrTx/>
+                        <a:buSzTx/>
+                        <a:buFontTx/>
+                        <a:buNone/>
+                        <a:tabLst/>
+                        <a:defRPr/>
+                      </a:pPr>
+                      <a:r>
+                        <a:rPr lang="en-US" dirty="0"/>
+                        <a:t>M</a:t>
+                      </a:r>
+                    </a:p>
+                  </a:txBody>
+                  <a:tcPr marL="42013" marR="42013"/>
+                </a:tc>
+                <a:extLst>
+                  <a:ext uri="{0D108BD9-81ED-4DB2-BD59-A6C34878D82A}">
+                    <a16:rowId xmlns:a16="http://schemas.microsoft.com/office/drawing/2014/main" val="2506358267"/>
+                  </a:ext>
+                </a:extLst>
+              </a:tr>
+            </a:tbl>
+          </a:graphicData>
+        </a:graphic>
+      </p:graphicFrame>
+      <p:sp>
+        <p:nvSpPr>
+          <p:cNvPr id="2" name="Content Placeholder 1">
             <a:extLst>
               <a:ext uri="{FF2B5EF4-FFF2-40B4-BE49-F238E27FC236}">
-                <a16:creationId xmlns:a16="http://schemas.microsoft.com/office/drawing/2014/main" id="{551AA14F-63AB-40DA-A2E5-77B9ECBA8D3C}"/>
+                <a16:creationId xmlns:a16="http://schemas.microsoft.com/office/drawing/2014/main" id="{51426593-767B-40A3-A915-6391B046FAF3}"/>
               </a:ext>
             </a:extLst>
           </p:cNvPr>
@@ -23178,35 +24209,22 @@
             <a:spLocks noGrp="1"/>
           </p:cNvSpPr>
           <p:nvPr>
-            <p:ph type="body" idx="4294967295"/>
-          </p:nvPr>
-        </p:nvSpPr>
-        <p:spPr>
-          <a:xfrm>
-            <a:off x="0" y="4589463"/>
-            <a:ext cx="7014368" cy="1500187"/>
-          </a:xfrm>
-        </p:spPr>
-        <p:txBody>
-          <a:bodyPr>
-            <a:normAutofit/>
-          </a:bodyPr>
-          <a:lstStyle/>
-          <a:p>
-            <a:pPr marL="0" indent="0">
-              <a:buNone/>
-            </a:pPr>
-            <a:r>
-              <a:rPr lang="en-US" dirty="0"/>
-              <a:t>Debugging</a:t>
-            </a:r>
+            <p:ph sz="half" idx="2"/>
+          </p:nvPr>
+        </p:nvSpPr>
+        <p:spPr/>
+        <p:txBody>
+          <a:bodyPr/>
+          <a:lstStyle/>
+          <a:p>
+            <a:endParaRPr lang="en-US"/>
           </a:p>
         </p:txBody>
       </p:sp>
     </p:spTree>
     <p:extLst>
       <p:ext uri="{BB962C8B-B14F-4D97-AF65-F5344CB8AC3E}">
-        <p14:creationId xmlns:p14="http://schemas.microsoft.com/office/powerpoint/2010/main" val="82761267"/>
+        <p14:creationId xmlns:p14="http://schemas.microsoft.com/office/powerpoint/2010/main" val="1918087948"/>
       </p:ext>
     </p:extLst>
   </p:cSld>
@@ -23250,7 +24268,7 @@
           <p:cNvPr id="4" name="Picture Placeholder 3">
             <a:extLst>
               <a:ext uri="{FF2B5EF4-FFF2-40B4-BE49-F238E27FC236}">
-                <a16:creationId xmlns:a16="http://schemas.microsoft.com/office/drawing/2014/main" id="{1A66767F-6F55-4F1C-89A3-E9A106BC0918}"/>
+                <a16:creationId xmlns:a16="http://schemas.microsoft.com/office/drawing/2014/main" id="{E0EA6BD2-3016-4603-992F-BE6209FDC5BE}"/>
               </a:ext>
             </a:extLst>
           </p:cNvPr>
@@ -23263,7 +24281,7 @@
         </p:nvPicPr>
         <p:blipFill>
           <a:blip r:embed="rId2"/>
-          <a:srcRect l="17133" r="17133"/>
+          <a:srcRect l="4550" r="4550"/>
           <a:stretch>
             <a:fillRect/>
           </a:stretch>
@@ -23298,7 +24316,7 @@
           <a:p>
             <a:r>
               <a:rPr lang="en-US" dirty="0"/>
-              <a:t>Lesson 4</a:t>
+              <a:t>Lesson 3</a:t>
             </a:r>
           </a:p>
         </p:txBody>
@@ -23336,7 +24354,7 @@
             </a:pPr>
             <a:r>
               <a:rPr lang="en-US" dirty="0"/>
-              <a:t>Scope</a:t>
+              <a:t>Debugging</a:t>
             </a:r>
           </a:p>
         </p:txBody>
@@ -23344,7 +24362,7 @@
     </p:spTree>
     <p:extLst>
       <p:ext uri="{BB962C8B-B14F-4D97-AF65-F5344CB8AC3E}">
-        <p14:creationId xmlns:p14="http://schemas.microsoft.com/office/powerpoint/2010/main" val="337890428"/>
+        <p14:creationId xmlns:p14="http://schemas.microsoft.com/office/powerpoint/2010/main" val="82761267"/>
       </p:ext>
     </p:extLst>
   </p:cSld>
@@ -23388,7 +24406,7 @@
           <p:cNvPr id="4" name="Picture Placeholder 3">
             <a:extLst>
               <a:ext uri="{FF2B5EF4-FFF2-40B4-BE49-F238E27FC236}">
-                <a16:creationId xmlns:a16="http://schemas.microsoft.com/office/drawing/2014/main" id="{6E3F5DAB-7304-40F1-AF3F-603B5ABD5215}"/>
+                <a16:creationId xmlns:a16="http://schemas.microsoft.com/office/drawing/2014/main" id="{1A66767F-6F55-4F1C-89A3-E9A106BC0918}"/>
               </a:ext>
             </a:extLst>
           </p:cNvPr>
@@ -23399,17 +24417,14 @@
             <p:ph type="pic" sz="quarter" idx="10"/>
           </p:nvPr>
         </p:nvPicPr>
-        <p:blipFill rotWithShape="1">
+        <p:blipFill>
           <a:blip r:embed="rId2"/>
-          <a:srcRect t="2003" r="34266" b="-2003"/>
-          <a:stretch/>
+          <a:srcRect l="17133" r="17133"/>
+          <a:stretch>
+            <a:fillRect/>
+          </a:stretch>
         </p:blipFill>
-        <p:spPr>
-          <a:xfrm>
-            <a:off x="7014368" y="-1276351"/>
-            <a:ext cx="9063832" cy="9193212"/>
-          </a:xfrm>
-        </p:spPr>
+        <p:spPr/>
       </p:pic>
       <p:sp>
         <p:nvSpPr>
@@ -23439,7 +24454,7 @@
           <a:p>
             <a:r>
               <a:rPr lang="en-US" dirty="0"/>
-              <a:t>Lesson 5</a:t>
+              <a:t>Lesson 4</a:t>
             </a:r>
           </a:p>
         </p:txBody>
@@ -23477,7 +24492,7 @@
             </a:pPr>
             <a:r>
               <a:rPr lang="en-US" dirty="0"/>
-              <a:t>Strings</a:t>
+              <a:t>Scope</a:t>
             </a:r>
           </a:p>
         </p:txBody>
@@ -23485,7 +24500,7 @@
     </p:spTree>
     <p:extLst>
       <p:ext uri="{BB962C8B-B14F-4D97-AF65-F5344CB8AC3E}">
-        <p14:creationId xmlns:p14="http://schemas.microsoft.com/office/powerpoint/2010/main" val="3915960176"/>
+        <p14:creationId xmlns:p14="http://schemas.microsoft.com/office/powerpoint/2010/main" val="337890428"/>
       </p:ext>
     </p:extLst>
   </p:cSld>
@@ -23529,7 +24544,7 @@
           <p:cNvPr id="4" name="Picture Placeholder 3">
             <a:extLst>
               <a:ext uri="{FF2B5EF4-FFF2-40B4-BE49-F238E27FC236}">
-                <a16:creationId xmlns:a16="http://schemas.microsoft.com/office/drawing/2014/main" id="{2270C87E-432C-4399-AE51-069DE6A2EE8B}"/>
+                <a16:creationId xmlns:a16="http://schemas.microsoft.com/office/drawing/2014/main" id="{6E3F5DAB-7304-40F1-AF3F-603B5ABD5215}"/>
               </a:ext>
             </a:extLst>
           </p:cNvPr>
@@ -23540,17 +24555,15 @@
             <p:ph type="pic" sz="quarter" idx="10"/>
           </p:nvPr>
         </p:nvPicPr>
-        <p:blipFill>
+        <p:blipFill rotWithShape="1">
           <a:blip r:embed="rId2"/>
-          <a:srcRect l="699" r="699"/>
-          <a:stretch>
-            <a:fillRect/>
-          </a:stretch>
+          <a:srcRect t="2003" r="34266" b="-2003"/>
+          <a:stretch/>
         </p:blipFill>
         <p:spPr>
           <a:xfrm>
-            <a:off x="5073445" y="-3244979"/>
-            <a:ext cx="12945678" cy="13130468"/>
+            <a:off x="7014368" y="-1276351"/>
+            <a:ext cx="9063832" cy="9193212"/>
           </a:xfrm>
         </p:spPr>
       </p:pic>
@@ -23582,7 +24595,7 @@
           <a:p>
             <a:r>
               <a:rPr lang="en-US" dirty="0"/>
-              <a:t>Lesson 6</a:t>
+              <a:t>Lesson 5</a:t>
             </a:r>
           </a:p>
         </p:txBody>
@@ -23620,7 +24633,7 @@
             </a:pPr>
             <a:r>
               <a:rPr lang="en-US" dirty="0"/>
-              <a:t>Dates and Times</a:t>
+              <a:t>Strings</a:t>
             </a:r>
           </a:p>
         </p:txBody>
@@ -23628,7 +24641,7 @@
     </p:spTree>
     <p:extLst>
       <p:ext uri="{BB962C8B-B14F-4D97-AF65-F5344CB8AC3E}">
-        <p14:creationId xmlns:p14="http://schemas.microsoft.com/office/powerpoint/2010/main" val="2340841402"/>
+        <p14:creationId xmlns:p14="http://schemas.microsoft.com/office/powerpoint/2010/main" val="3915960176"/>
       </p:ext>
     </p:extLst>
   </p:cSld>

</xml_diff>

<commit_message>
some modifications from live class
</commit_message>
<xml_diff>
--- a/01-intro/C# Lessons.pptx
+++ b/01-intro/C# Lessons.pptx
@@ -11,32 +11,33 @@
   <p:sldIdLst>
     <p:sldId id="256" r:id="rId6"/>
     <p:sldId id="257" r:id="rId7"/>
-    <p:sldId id="258" r:id="rId8"/>
-    <p:sldId id="259" r:id="rId9"/>
-    <p:sldId id="282" r:id="rId10"/>
-    <p:sldId id="283" r:id="rId11"/>
-    <p:sldId id="260" r:id="rId12"/>
-    <p:sldId id="261" r:id="rId13"/>
-    <p:sldId id="262" r:id="rId14"/>
-    <p:sldId id="263" r:id="rId15"/>
-    <p:sldId id="264" r:id="rId16"/>
-    <p:sldId id="265" r:id="rId17"/>
-    <p:sldId id="266" r:id="rId18"/>
-    <p:sldId id="267" r:id="rId19"/>
-    <p:sldId id="268" r:id="rId20"/>
-    <p:sldId id="269" r:id="rId21"/>
-    <p:sldId id="270" r:id="rId22"/>
-    <p:sldId id="271" r:id="rId23"/>
-    <p:sldId id="272" r:id="rId24"/>
-    <p:sldId id="273" r:id="rId25"/>
-    <p:sldId id="274" r:id="rId26"/>
-    <p:sldId id="275" r:id="rId27"/>
-    <p:sldId id="276" r:id="rId28"/>
-    <p:sldId id="277" r:id="rId29"/>
-    <p:sldId id="278" r:id="rId30"/>
-    <p:sldId id="279" r:id="rId31"/>
-    <p:sldId id="280" r:id="rId32"/>
-    <p:sldId id="281" r:id="rId33"/>
+    <p:sldId id="284" r:id="rId8"/>
+    <p:sldId id="258" r:id="rId9"/>
+    <p:sldId id="259" r:id="rId10"/>
+    <p:sldId id="282" r:id="rId11"/>
+    <p:sldId id="283" r:id="rId12"/>
+    <p:sldId id="260" r:id="rId13"/>
+    <p:sldId id="261" r:id="rId14"/>
+    <p:sldId id="262" r:id="rId15"/>
+    <p:sldId id="263" r:id="rId16"/>
+    <p:sldId id="264" r:id="rId17"/>
+    <p:sldId id="265" r:id="rId18"/>
+    <p:sldId id="266" r:id="rId19"/>
+    <p:sldId id="267" r:id="rId20"/>
+    <p:sldId id="268" r:id="rId21"/>
+    <p:sldId id="269" r:id="rId22"/>
+    <p:sldId id="270" r:id="rId23"/>
+    <p:sldId id="271" r:id="rId24"/>
+    <p:sldId id="272" r:id="rId25"/>
+    <p:sldId id="273" r:id="rId26"/>
+    <p:sldId id="274" r:id="rId27"/>
+    <p:sldId id="275" r:id="rId28"/>
+    <p:sldId id="276" r:id="rId29"/>
+    <p:sldId id="277" r:id="rId30"/>
+    <p:sldId id="278" r:id="rId31"/>
+    <p:sldId id="279" r:id="rId32"/>
+    <p:sldId id="280" r:id="rId33"/>
+    <p:sldId id="281" r:id="rId34"/>
   </p:sldIdLst>
   <p:sldSz cx="12192000" cy="6858000"/>
   <p:notesSz cx="6858000" cy="9144000"/>
@@ -142,6 +143,7 @@
           <p14:sldIdLst>
             <p14:sldId id="256"/>
             <p14:sldId id="257"/>
+            <p14:sldId id="284"/>
           </p14:sldIdLst>
         </p14:section>
         <p14:section name="Lessons" id="{B9D9F39F-9444-4EFE-B408-98DBF3828EB7}">
@@ -331,7 +333,7 @@
             <a:fld id="{B61BEF0D-F0BB-DE4B-95CE-6DB70DBA9567}" type="datetimeFigureOut">
               <a:rPr lang="en-US" smtClean="0"/>
               <a:pPr/>
-              <a:t>7/14/2018</a:t>
+              <a:t>7/17/2018</a:t>
             </a:fld>
             <a:endParaRPr lang="en-US" dirty="0"/>
           </a:p>
@@ -531,7 +533,7 @@
             <a:fld id="{B61BEF0D-F0BB-DE4B-95CE-6DB70DBA9567}" type="datetimeFigureOut">
               <a:rPr lang="en-US" smtClean="0"/>
               <a:pPr/>
-              <a:t>7/14/2018</a:t>
+              <a:t>7/17/2018</a:t>
             </a:fld>
             <a:endParaRPr lang="en-US" dirty="0"/>
           </a:p>
@@ -741,7 +743,7 @@
             <a:fld id="{B61BEF0D-F0BB-DE4B-95CE-6DB70DBA9567}" type="datetimeFigureOut">
               <a:rPr lang="en-US" smtClean="0"/>
               <a:pPr/>
-              <a:t>7/14/2018</a:t>
+              <a:t>7/17/2018</a:t>
             </a:fld>
             <a:endParaRPr lang="en-US" dirty="0"/>
           </a:p>
@@ -895,7 +897,7 @@
             <a:fld id="{B61BEF0D-F0BB-DE4B-95CE-6DB70DBA9567}" type="datetimeFigureOut">
               <a:rPr lang="en-US" smtClean="0"/>
               <a:pPr/>
-              <a:t>7/14/2018</a:t>
+              <a:t>7/17/2018</a:t>
             </a:fld>
             <a:endParaRPr lang="en-US" dirty="0"/>
           </a:p>
@@ -1156,7 +1158,7 @@
           <a:p>
             <a:fld id="{9A7FAFC6-84A1-4ED5-94BF-84CE28F91C6F}" type="datetimeFigureOut">
               <a:rPr lang="es-ES" smtClean="0"/>
-              <a:t>14/07/2018</a:t>
+              <a:t>17/07/2018</a:t>
             </a:fld>
             <a:endParaRPr lang="es-ES"/>
           </a:p>
@@ -1326,7 +1328,7 @@
           <a:p>
             <a:fld id="{9A7FAFC6-84A1-4ED5-94BF-84CE28F91C6F}" type="datetimeFigureOut">
               <a:rPr lang="es-ES" smtClean="0"/>
-              <a:t>14/07/2018</a:t>
+              <a:t>17/07/2018</a:t>
             </a:fld>
             <a:endParaRPr lang="es-ES"/>
           </a:p>
@@ -1572,7 +1574,7 @@
           <a:p>
             <a:fld id="{9A7FAFC6-84A1-4ED5-94BF-84CE28F91C6F}" type="datetimeFigureOut">
               <a:rPr lang="es-ES" smtClean="0"/>
-              <a:t>14/07/2018</a:t>
+              <a:t>17/07/2018</a:t>
             </a:fld>
             <a:endParaRPr lang="es-ES"/>
           </a:p>
@@ -1804,7 +1806,7 @@
           <a:p>
             <a:fld id="{9A7FAFC6-84A1-4ED5-94BF-84CE28F91C6F}" type="datetimeFigureOut">
               <a:rPr lang="es-ES" smtClean="0"/>
-              <a:t>14/07/2018</a:t>
+              <a:t>17/07/2018</a:t>
             </a:fld>
             <a:endParaRPr lang="es-ES"/>
           </a:p>
@@ -2171,7 +2173,7 @@
           <a:p>
             <a:fld id="{9A7FAFC6-84A1-4ED5-94BF-84CE28F91C6F}" type="datetimeFigureOut">
               <a:rPr lang="es-ES" smtClean="0"/>
-              <a:t>14/07/2018</a:t>
+              <a:t>17/07/2018</a:t>
             </a:fld>
             <a:endParaRPr lang="es-ES"/>
           </a:p>
@@ -2289,7 +2291,7 @@
           <a:p>
             <a:fld id="{9A7FAFC6-84A1-4ED5-94BF-84CE28F91C6F}" type="datetimeFigureOut">
               <a:rPr lang="es-ES" smtClean="0"/>
-              <a:t>14/07/2018</a:t>
+              <a:t>17/07/2018</a:t>
             </a:fld>
             <a:endParaRPr lang="es-ES"/>
           </a:p>
@@ -2384,7 +2386,7 @@
           <a:p>
             <a:fld id="{9A7FAFC6-84A1-4ED5-94BF-84CE28F91C6F}" type="datetimeFigureOut">
               <a:rPr lang="es-ES" smtClean="0"/>
-              <a:t>14/07/2018</a:t>
+              <a:t>17/07/2018</a:t>
             </a:fld>
             <a:endParaRPr lang="es-ES"/>
           </a:p>
@@ -2571,7 +2573,7 @@
             <a:fld id="{B61BEF0D-F0BB-DE4B-95CE-6DB70DBA9567}" type="datetimeFigureOut">
               <a:rPr lang="en-US" smtClean="0"/>
               <a:pPr/>
-              <a:t>7/14/2018</a:t>
+              <a:t>7/17/2018</a:t>
             </a:fld>
             <a:endParaRPr lang="en-US" dirty="0"/>
           </a:p>
@@ -2861,7 +2863,7 @@
           <a:p>
             <a:fld id="{9A7FAFC6-84A1-4ED5-94BF-84CE28F91C6F}" type="datetimeFigureOut">
               <a:rPr lang="es-ES" smtClean="0"/>
-              <a:t>14/07/2018</a:t>
+              <a:t>17/07/2018</a:t>
             </a:fld>
             <a:endParaRPr lang="es-ES"/>
           </a:p>
@@ -3118,7 +3120,7 @@
           <a:p>
             <a:fld id="{9A7FAFC6-84A1-4ED5-94BF-84CE28F91C6F}" type="datetimeFigureOut">
               <a:rPr lang="es-ES" smtClean="0"/>
-              <a:t>14/07/2018</a:t>
+              <a:t>17/07/2018</a:t>
             </a:fld>
             <a:endParaRPr lang="es-ES"/>
           </a:p>
@@ -3288,7 +3290,7 @@
           <a:p>
             <a:fld id="{9A7FAFC6-84A1-4ED5-94BF-84CE28F91C6F}" type="datetimeFigureOut">
               <a:rPr lang="es-ES" smtClean="0"/>
-              <a:t>14/07/2018</a:t>
+              <a:t>17/07/2018</a:t>
             </a:fld>
             <a:endParaRPr lang="es-ES"/>
           </a:p>
@@ -3468,7 +3470,7 @@
           <a:p>
             <a:fld id="{9A7FAFC6-84A1-4ED5-94BF-84CE28F91C6F}" type="datetimeFigureOut">
               <a:rPr lang="es-ES" smtClean="0"/>
-              <a:t>14/07/2018</a:t>
+              <a:t>17/07/2018</a:t>
             </a:fld>
             <a:endParaRPr lang="es-ES"/>
           </a:p>
@@ -3660,7 +3662,7 @@
           <a:p>
             <a:fld id="{9A7FAFC6-84A1-4ED5-94BF-84CE28F91C6F}" type="datetimeFigureOut">
               <a:rPr lang="es-ES" smtClean="0"/>
-              <a:t>14/07/2018</a:t>
+              <a:t>17/07/2018</a:t>
             </a:fld>
             <a:endParaRPr lang="es-ES"/>
           </a:p>
@@ -3830,7 +3832,7 @@
           <a:p>
             <a:fld id="{9A7FAFC6-84A1-4ED5-94BF-84CE28F91C6F}" type="datetimeFigureOut">
               <a:rPr lang="es-ES" smtClean="0"/>
-              <a:t>14/07/2018</a:t>
+              <a:t>17/07/2018</a:t>
             </a:fld>
             <a:endParaRPr lang="es-ES"/>
           </a:p>
@@ -4076,7 +4078,7 @@
           <a:p>
             <a:fld id="{9A7FAFC6-84A1-4ED5-94BF-84CE28F91C6F}" type="datetimeFigureOut">
               <a:rPr lang="es-ES" smtClean="0"/>
-              <a:t>14/07/2018</a:t>
+              <a:t>17/07/2018</a:t>
             </a:fld>
             <a:endParaRPr lang="es-ES"/>
           </a:p>
@@ -4308,7 +4310,7 @@
           <a:p>
             <a:fld id="{9A7FAFC6-84A1-4ED5-94BF-84CE28F91C6F}" type="datetimeFigureOut">
               <a:rPr lang="es-ES" smtClean="0"/>
-              <a:t>14/07/2018</a:t>
+              <a:t>17/07/2018</a:t>
             </a:fld>
             <a:endParaRPr lang="es-ES"/>
           </a:p>
@@ -4675,7 +4677,7 @@
           <a:p>
             <a:fld id="{9A7FAFC6-84A1-4ED5-94BF-84CE28F91C6F}" type="datetimeFigureOut">
               <a:rPr lang="es-ES" smtClean="0"/>
-              <a:t>14/07/2018</a:t>
+              <a:t>17/07/2018</a:t>
             </a:fld>
             <a:endParaRPr lang="es-ES"/>
           </a:p>
@@ -4793,7 +4795,7 @@
           <a:p>
             <a:fld id="{9A7FAFC6-84A1-4ED5-94BF-84CE28F91C6F}" type="datetimeFigureOut">
               <a:rPr lang="es-ES" smtClean="0"/>
-              <a:t>14/07/2018</a:t>
+              <a:t>17/07/2018</a:t>
             </a:fld>
             <a:endParaRPr lang="es-ES"/>
           </a:p>
@@ -5057,7 +5059,7 @@
             <a:fld id="{B61BEF0D-F0BB-DE4B-95CE-6DB70DBA9567}" type="datetimeFigureOut">
               <a:rPr lang="en-US" smtClean="0"/>
               <a:pPr/>
-              <a:t>7/14/2018</a:t>
+              <a:t>7/17/2018</a:t>
             </a:fld>
             <a:endParaRPr lang="en-US" dirty="0"/>
           </a:p>
@@ -5165,7 +5167,7 @@
           <a:p>
             <a:fld id="{9A7FAFC6-84A1-4ED5-94BF-84CE28F91C6F}" type="datetimeFigureOut">
               <a:rPr lang="es-ES" smtClean="0"/>
-              <a:t>14/07/2018</a:t>
+              <a:t>17/07/2018</a:t>
             </a:fld>
             <a:endParaRPr lang="es-ES"/>
           </a:p>
@@ -5442,7 +5444,7 @@
           <a:p>
             <a:fld id="{9A7FAFC6-84A1-4ED5-94BF-84CE28F91C6F}" type="datetimeFigureOut">
               <a:rPr lang="es-ES" smtClean="0"/>
-              <a:t>14/07/2018</a:t>
+              <a:t>17/07/2018</a:t>
             </a:fld>
             <a:endParaRPr lang="es-ES"/>
           </a:p>
@@ -5699,7 +5701,7 @@
           <a:p>
             <a:fld id="{9A7FAFC6-84A1-4ED5-94BF-84CE28F91C6F}" type="datetimeFigureOut">
               <a:rPr lang="es-ES" smtClean="0"/>
-              <a:t>14/07/2018</a:t>
+              <a:t>17/07/2018</a:t>
             </a:fld>
             <a:endParaRPr lang="es-ES"/>
           </a:p>
@@ -5869,7 +5871,7 @@
           <a:p>
             <a:fld id="{9A7FAFC6-84A1-4ED5-94BF-84CE28F91C6F}" type="datetimeFigureOut">
               <a:rPr lang="es-ES" smtClean="0"/>
-              <a:t>14/07/2018</a:t>
+              <a:t>17/07/2018</a:t>
             </a:fld>
             <a:endParaRPr lang="es-ES"/>
           </a:p>
@@ -6049,7 +6051,7 @@
           <a:p>
             <a:fld id="{9A7FAFC6-84A1-4ED5-94BF-84CE28F91C6F}" type="datetimeFigureOut">
               <a:rPr lang="es-ES" smtClean="0"/>
-              <a:t>14/07/2018</a:t>
+              <a:t>17/07/2018</a:t>
             </a:fld>
             <a:endParaRPr lang="es-ES"/>
           </a:p>
@@ -6257,7 +6259,7 @@
           <a:p>
             <a:fld id="{E5C7B1E8-D5F9-4681-A815-75D059791994}" type="datetimeFigureOut">
               <a:rPr lang="en-US" smtClean="0"/>
-              <a:t>7/14/2018</a:t>
+              <a:t>7/17/2018</a:t>
             </a:fld>
             <a:endParaRPr lang="en-US"/>
           </a:p>
@@ -6455,7 +6457,7 @@
           <a:p>
             <a:fld id="{E5C7B1E8-D5F9-4681-A815-75D059791994}" type="datetimeFigureOut">
               <a:rPr lang="en-US" smtClean="0"/>
-              <a:t>7/14/2018</a:t>
+              <a:t>7/17/2018</a:t>
             </a:fld>
             <a:endParaRPr lang="en-US"/>
           </a:p>
@@ -6766,7 +6768,7 @@
           <a:p>
             <a:fld id="{E5C7B1E8-D5F9-4681-A815-75D059791994}" type="datetimeFigureOut">
               <a:rPr lang="en-US" smtClean="0"/>
-              <a:t>7/14/2018</a:t>
+              <a:t>7/17/2018</a:t>
             </a:fld>
             <a:endParaRPr lang="en-US"/>
           </a:p>
@@ -7031,7 +7033,7 @@
           <a:p>
             <a:fld id="{E5C7B1E8-D5F9-4681-A815-75D059791994}" type="datetimeFigureOut">
               <a:rPr lang="en-US" smtClean="0"/>
-              <a:t>7/14/2018</a:t>
+              <a:t>7/17/2018</a:t>
             </a:fld>
             <a:endParaRPr lang="en-US"/>
           </a:p>
@@ -7479,7 +7481,7 @@
           <a:p>
             <a:fld id="{E5C7B1E8-D5F9-4681-A815-75D059791994}" type="datetimeFigureOut">
               <a:rPr lang="en-US" smtClean="0"/>
-              <a:t>7/14/2018</a:t>
+              <a:t>7/17/2018</a:t>
             </a:fld>
             <a:endParaRPr lang="en-US"/>
           </a:p>
@@ -7781,7 +7783,7 @@
             <a:fld id="{B61BEF0D-F0BB-DE4B-95CE-6DB70DBA9567}" type="datetimeFigureOut">
               <a:rPr lang="en-US" smtClean="0"/>
               <a:pPr/>
-              <a:t>7/14/2018</a:t>
+              <a:t>7/17/2018</a:t>
             </a:fld>
             <a:endParaRPr lang="en-US" dirty="0"/>
           </a:p>
@@ -7923,7 +7925,7 @@
           <a:p>
             <a:fld id="{E5C7B1E8-D5F9-4681-A815-75D059791994}" type="datetimeFigureOut">
               <a:rPr lang="en-US" smtClean="0"/>
-              <a:t>7/14/2018</a:t>
+              <a:t>7/17/2018</a:t>
             </a:fld>
             <a:endParaRPr lang="en-US"/>
           </a:p>
@@ -8072,7 +8074,7 @@
           <a:p>
             <a:fld id="{E5C7B1E8-D5F9-4681-A815-75D059791994}" type="datetimeFigureOut">
               <a:rPr lang="en-US" smtClean="0"/>
-              <a:t>7/14/2018</a:t>
+              <a:t>7/17/2018</a:t>
             </a:fld>
             <a:endParaRPr lang="en-US"/>
           </a:p>
@@ -8419,7 +8421,7 @@
           <a:p>
             <a:fld id="{E5C7B1E8-D5F9-4681-A815-75D059791994}" type="datetimeFigureOut">
               <a:rPr lang="en-US" smtClean="0"/>
-              <a:t>7/14/2018</a:t>
+              <a:t>7/17/2018</a:t>
             </a:fld>
             <a:endParaRPr lang="en-US"/>
           </a:p>
@@ -8746,7 +8748,7 @@
           <a:p>
             <a:fld id="{E5C7B1E8-D5F9-4681-A815-75D059791994}" type="datetimeFigureOut">
               <a:rPr lang="en-US" smtClean="0"/>
-              <a:t>7/14/2018</a:t>
+              <a:t>7/17/2018</a:t>
             </a:fld>
             <a:endParaRPr lang="en-US"/>
           </a:p>
@@ -8980,7 +8982,7 @@
           <a:p>
             <a:fld id="{E5C7B1E8-D5F9-4681-A815-75D059791994}" type="datetimeFigureOut">
               <a:rPr lang="en-US" smtClean="0"/>
-              <a:t>7/14/2018</a:t>
+              <a:t>7/17/2018</a:t>
             </a:fld>
             <a:endParaRPr lang="en-US"/>
           </a:p>
@@ -9224,7 +9226,7 @@
           <a:p>
             <a:fld id="{E5C7B1E8-D5F9-4681-A815-75D059791994}" type="datetimeFigureOut">
               <a:rPr lang="en-US" smtClean="0"/>
-              <a:t>7/14/2018</a:t>
+              <a:t>7/17/2018</a:t>
             </a:fld>
             <a:endParaRPr lang="en-US"/>
           </a:p>
@@ -9463,7 +9465,7 @@
             <a:fld id="{B61BEF0D-F0BB-DE4B-95CE-6DB70DBA9567}" type="datetimeFigureOut">
               <a:rPr lang="en-US" smtClean="0"/>
               <a:pPr/>
-              <a:t>7/14/2018</a:t>
+              <a:t>7/17/2018</a:t>
             </a:fld>
             <a:endParaRPr lang="en-US" dirty="0"/>
           </a:p>
@@ -9645,7 +9647,7 @@
             <a:fld id="{B61BEF0D-F0BB-DE4B-95CE-6DB70DBA9567}" type="datetimeFigureOut">
               <a:rPr lang="en-US" smtClean="0"/>
               <a:pPr/>
-              <a:t>7/14/2018</a:t>
+              <a:t>7/17/2018</a:t>
             </a:fld>
             <a:endParaRPr lang="en-US" dirty="0"/>
           </a:p>
@@ -9904,7 +9906,7 @@
             <a:fld id="{B61BEF0D-F0BB-DE4B-95CE-6DB70DBA9567}" type="datetimeFigureOut">
               <a:rPr lang="en-US" smtClean="0"/>
               <a:pPr/>
-              <a:t>7/14/2018</a:t>
+              <a:t>7/17/2018</a:t>
             </a:fld>
             <a:endParaRPr lang="en-US" dirty="0"/>
           </a:p>
@@ -10147,7 +10149,7 @@
             <a:fld id="{B61BEF0D-F0BB-DE4B-95CE-6DB70DBA9567}" type="datetimeFigureOut">
               <a:rPr lang="en-US" smtClean="0"/>
               <a:pPr/>
-              <a:t>7/14/2018</a:t>
+              <a:t>7/17/2018</a:t>
             </a:fld>
             <a:endParaRPr lang="en-US" dirty="0"/>
           </a:p>
@@ -10561,7 +10563,7 @@
             <a:fld id="{B61BEF0D-F0BB-DE4B-95CE-6DB70DBA9567}" type="datetimeFigureOut">
               <a:rPr lang="en-US" smtClean="0"/>
               <a:pPr/>
-              <a:t>7/14/2018</a:t>
+              <a:t>7/17/2018</a:t>
             </a:fld>
             <a:endParaRPr lang="en-US" dirty="0"/>
           </a:p>
@@ -10939,7 +10941,7 @@
             <a:fld id="{B61BEF0D-F0BB-DE4B-95CE-6DB70DBA9567}" type="datetimeFigureOut">
               <a:rPr lang="en-US" smtClean="0"/>
               <a:pPr/>
-              <a:t>7/14/2018</a:t>
+              <a:t>7/17/2018</a:t>
             </a:fld>
             <a:endParaRPr lang="en-US" dirty="0"/>
           </a:p>
@@ -11070,7 +11072,7 @@
             <a:fld id="{B61BEF0D-F0BB-DE4B-95CE-6DB70DBA9567}" type="datetimeFigureOut">
               <a:rPr lang="en-US" smtClean="0"/>
               <a:pPr/>
-              <a:t>7/14/2018</a:t>
+              <a:t>7/17/2018</a:t>
             </a:fld>
             <a:endParaRPr lang="en-US" dirty="0"/>
           </a:p>
@@ -11179,7 +11181,7 @@
             <a:fld id="{B61BEF0D-F0BB-DE4B-95CE-6DB70DBA9567}" type="datetimeFigureOut">
               <a:rPr lang="en-US" smtClean="0"/>
               <a:pPr/>
-              <a:t>7/14/2018</a:t>
+              <a:t>7/17/2018</a:t>
             </a:fld>
             <a:endParaRPr lang="en-US" dirty="0"/>
           </a:p>
@@ -11468,7 +11470,7 @@
             <a:fld id="{B61BEF0D-F0BB-DE4B-95CE-6DB70DBA9567}" type="datetimeFigureOut">
               <a:rPr lang="en-US" smtClean="0"/>
               <a:pPr/>
-              <a:t>7/14/2018</a:t>
+              <a:t>7/17/2018</a:t>
             </a:fld>
             <a:endParaRPr lang="en-US" dirty="0"/>
           </a:p>
@@ -11737,7 +11739,7 @@
             <a:fld id="{B61BEF0D-F0BB-DE4B-95CE-6DB70DBA9567}" type="datetimeFigureOut">
               <a:rPr lang="en-US" smtClean="0"/>
               <a:pPr/>
-              <a:t>7/14/2018</a:t>
+              <a:t>7/17/2018</a:t>
             </a:fld>
             <a:endParaRPr lang="en-US" dirty="0"/>
           </a:p>
@@ -11919,7 +11921,7 @@
             <a:fld id="{B61BEF0D-F0BB-DE4B-95CE-6DB70DBA9567}" type="datetimeFigureOut">
               <a:rPr lang="en-US" smtClean="0"/>
               <a:pPr/>
-              <a:t>7/14/2018</a:t>
+              <a:t>7/17/2018</a:t>
             </a:fld>
             <a:endParaRPr lang="en-US" dirty="0"/>
           </a:p>
@@ -12111,7 +12113,7 @@
             <a:fld id="{B61BEF0D-F0BB-DE4B-95CE-6DB70DBA9567}" type="datetimeFigureOut">
               <a:rPr lang="en-US" smtClean="0"/>
               <a:pPr/>
-              <a:t>7/14/2018</a:t>
+              <a:t>7/17/2018</a:t>
             </a:fld>
             <a:endParaRPr lang="en-US" dirty="0"/>
           </a:p>
@@ -12515,7 +12517,7 @@
             <a:fld id="{B61BEF0D-F0BB-DE4B-95CE-6DB70DBA9567}" type="datetimeFigureOut">
               <a:rPr lang="en-US" smtClean="0"/>
               <a:pPr/>
-              <a:t>7/14/2018</a:t>
+              <a:t>7/17/2018</a:t>
             </a:fld>
             <a:endParaRPr lang="en-US" dirty="0"/>
           </a:p>
@@ -15487,7 +15489,7 @@
             <a:fld id="{B61BEF0D-F0BB-DE4B-95CE-6DB70DBA9567}" type="datetimeFigureOut">
               <a:rPr lang="en-US" smtClean="0"/>
               <a:pPr/>
-              <a:t>7/14/2018</a:t>
+              <a:t>7/17/2018</a:t>
             </a:fld>
             <a:endParaRPr lang="en-US" dirty="0"/>
           </a:p>
@@ -15896,7 +15898,7 @@
             <a:fld id="{B61BEF0D-F0BB-DE4B-95CE-6DB70DBA9567}" type="datetimeFigureOut">
               <a:rPr lang="en-US" smtClean="0"/>
               <a:pPr/>
-              <a:t>7/14/2018</a:t>
+              <a:t>7/17/2018</a:t>
             </a:fld>
             <a:endParaRPr lang="en-US" dirty="0"/>
           </a:p>
@@ -16189,7 +16191,7 @@
             <a:fld id="{B61BEF0D-F0BB-DE4B-95CE-6DB70DBA9567}" type="datetimeFigureOut">
               <a:rPr lang="en-US" smtClean="0"/>
               <a:pPr/>
-              <a:t>7/14/2018</a:t>
+              <a:t>7/17/2018</a:t>
             </a:fld>
             <a:endParaRPr lang="en-US" dirty="0"/>
           </a:p>
@@ -16432,7 +16434,7 @@
             <a:fld id="{B61BEF0D-F0BB-DE4B-95CE-6DB70DBA9567}" type="datetimeFigureOut">
               <a:rPr lang="en-US" smtClean="0"/>
               <a:pPr/>
-              <a:t>7/14/2018</a:t>
+              <a:t>7/17/2018</a:t>
             </a:fld>
             <a:endParaRPr lang="en-US" dirty="0"/>
           </a:p>
@@ -16986,7 +16988,7 @@
           <a:p>
             <a:fld id="{9A7FAFC6-84A1-4ED5-94BF-84CE28F91C6F}" type="datetimeFigureOut">
               <a:rPr lang="es-ES" smtClean="0"/>
-              <a:t>14/07/2018</a:t>
+              <a:t>17/07/2018</a:t>
             </a:fld>
             <a:endParaRPr lang="es-ES"/>
           </a:p>
@@ -17526,7 +17528,7 @@
           <a:p>
             <a:fld id="{9A7FAFC6-84A1-4ED5-94BF-84CE28F91C6F}" type="datetimeFigureOut">
               <a:rPr lang="es-ES" smtClean="0"/>
-              <a:t>14/07/2018</a:t>
+              <a:t>17/07/2018</a:t>
             </a:fld>
             <a:endParaRPr lang="es-ES"/>
           </a:p>
@@ -18082,7 +18084,7 @@
           <a:p>
             <a:fld id="{E5C7B1E8-D5F9-4681-A815-75D059791994}" type="datetimeFigureOut">
               <a:rPr lang="en-US" smtClean="0"/>
-              <a:t>7/14/2018</a:t>
+              <a:t>7/17/2018</a:t>
             </a:fld>
             <a:endParaRPr lang="en-US"/>
           </a:p>
@@ -18633,7 +18635,7 @@
             <a:fld id="{B61BEF0D-F0BB-DE4B-95CE-6DB70DBA9567}" type="datetimeFigureOut">
               <a:rPr lang="en-US" smtClean="0"/>
               <a:pPr/>
-              <a:t>7/14/2018</a:t>
+              <a:t>7/17/2018</a:t>
             </a:fld>
             <a:endParaRPr lang="en-US" dirty="0"/>
           </a:p>
@@ -19299,6 +19301,16 @@
               <a:t>Dara Oladapo</a:t>
             </a:r>
           </a:p>
+          <a:p>
+            <a:pPr marL="0" indent="0">
+              <a:buFont typeface="Arial" panose="020B0604020202020204" pitchFamily="34" charset="0"/>
+              <a:buNone/>
+            </a:pPr>
+            <a:r>
+              <a:rPr lang="en-US" sz="2000" dirty="0"/>
+              <a:t>https://github.com/daraoladapo/csharp-lessons</a:t>
+            </a:r>
+          </a:p>
         </p:txBody>
       </p:sp>
       <p:pic>
@@ -19360,14 +19372,14 @@
   <p:clrMapOvr>
     <a:masterClrMapping/>
   </p:clrMapOvr>
-  <mc:AlternateContent xmlns:mc="http://schemas.openxmlformats.org/markup-compatibility/2006" xmlns:p14="http://schemas.microsoft.com/office/powerpoint/2010/main">
-    <mc:Choice Requires="p14">
-      <p:transition spd="slow" p14:dur="1250" advTm="2000">
+  <mc:AlternateContent xmlns:mc="http://schemas.openxmlformats.org/markup-compatibility/2006">
+    <mc:Choice xmlns:p14="http://schemas.microsoft.com/office/powerpoint/2010/main" Requires="p14">
+      <p:transition spd="slow" p14:dur="1250">
         <p14:flip dir="r"/>
       </p:transition>
     </mc:Choice>
-    <mc:Fallback xmlns="">
-      <p:transition spd="slow" advTm="2000">
+    <mc:Fallback>
+      <p:transition spd="slow">
         <p:fade/>
       </p:transition>
     </mc:Fallback>
@@ -19397,7 +19409,7 @@
           <p:cNvPr id="4" name="Picture Placeholder 3">
             <a:extLst>
               <a:ext uri="{FF2B5EF4-FFF2-40B4-BE49-F238E27FC236}">
-                <a16:creationId xmlns:a16="http://schemas.microsoft.com/office/drawing/2014/main" id="{2270C87E-432C-4399-AE51-069DE6A2EE8B}"/>
+                <a16:creationId xmlns:a16="http://schemas.microsoft.com/office/drawing/2014/main" id="{6E3F5DAB-7304-40F1-AF3F-603B5ABD5215}"/>
               </a:ext>
             </a:extLst>
           </p:cNvPr>
@@ -19408,17 +19420,15 @@
             <p:ph type="pic" sz="quarter" idx="10"/>
           </p:nvPr>
         </p:nvPicPr>
-        <p:blipFill>
+        <p:blipFill rotWithShape="1">
           <a:blip r:embed="rId2"/>
-          <a:srcRect l="699" r="699"/>
-          <a:stretch>
-            <a:fillRect/>
-          </a:stretch>
+          <a:srcRect t="2003" r="34266" b="-2003"/>
+          <a:stretch/>
         </p:blipFill>
         <p:spPr>
           <a:xfrm>
-            <a:off x="5073445" y="-3244979"/>
-            <a:ext cx="12945678" cy="13130468"/>
+            <a:off x="7014368" y="-1276351"/>
+            <a:ext cx="9063832" cy="9193212"/>
           </a:xfrm>
         </p:spPr>
       </p:pic>
@@ -19450,7 +19460,7 @@
           <a:p>
             <a:r>
               <a:rPr lang="en-US" dirty="0"/>
-              <a:t>Lesson 6</a:t>
+              <a:t>Lesson 5</a:t>
             </a:r>
           </a:p>
         </p:txBody>
@@ -19488,7 +19498,7 @@
             </a:pPr>
             <a:r>
               <a:rPr lang="en-US" dirty="0"/>
-              <a:t>Dates and Times</a:t>
+              <a:t>Strings</a:t>
             </a:r>
           </a:p>
         </p:txBody>
@@ -19496,21 +19506,21 @@
     </p:spTree>
     <p:extLst>
       <p:ext uri="{BB962C8B-B14F-4D97-AF65-F5344CB8AC3E}">
-        <p14:creationId xmlns:p14="http://schemas.microsoft.com/office/powerpoint/2010/main" val="2340841402"/>
+        <p14:creationId xmlns:p14="http://schemas.microsoft.com/office/powerpoint/2010/main" val="3915960176"/>
       </p:ext>
     </p:extLst>
   </p:cSld>
   <p:clrMapOvr>
     <a:masterClrMapping/>
   </p:clrMapOvr>
-  <mc:AlternateContent xmlns:mc="http://schemas.openxmlformats.org/markup-compatibility/2006" xmlns:p14="http://schemas.microsoft.com/office/powerpoint/2010/main">
-    <mc:Choice Requires="p14">
-      <p:transition spd="slow" p14:dur="1250" advTm="2000">
+  <mc:AlternateContent xmlns:mc="http://schemas.openxmlformats.org/markup-compatibility/2006">
+    <mc:Choice xmlns:p14="http://schemas.microsoft.com/office/powerpoint/2010/main" Requires="p14">
+      <p:transition spd="slow" p14:dur="1250">
         <p14:flip dir="r"/>
       </p:transition>
     </mc:Choice>
-    <mc:Fallback xmlns="">
-      <p:transition spd="slow" advTm="2000">
+    <mc:Fallback>
+      <p:transition spd="slow">
         <p:fade/>
       </p:transition>
     </mc:Fallback>
@@ -19540,7 +19550,7 @@
           <p:cNvPr id="4" name="Picture Placeholder 3">
             <a:extLst>
               <a:ext uri="{FF2B5EF4-FFF2-40B4-BE49-F238E27FC236}">
-                <a16:creationId xmlns:a16="http://schemas.microsoft.com/office/drawing/2014/main" id="{DD13BB6E-472D-42B8-B3A7-4805E50DF0DD}"/>
+                <a16:creationId xmlns:a16="http://schemas.microsoft.com/office/drawing/2014/main" id="{2270C87E-432C-4399-AE51-069DE6A2EE8B}"/>
               </a:ext>
             </a:extLst>
           </p:cNvPr>
@@ -19553,15 +19563,15 @@
         </p:nvPicPr>
         <p:blipFill>
           <a:blip r:embed="rId2"/>
-          <a:srcRect l="13025" r="13025"/>
+          <a:srcRect l="699" r="699"/>
           <a:stretch>
             <a:fillRect/>
           </a:stretch>
         </p:blipFill>
         <p:spPr>
           <a:xfrm>
-            <a:off x="5542764" y="-2768961"/>
-            <a:ext cx="12007040" cy="12178432"/>
+            <a:off x="5073445" y="-3244979"/>
+            <a:ext cx="12945678" cy="13130468"/>
           </a:xfrm>
         </p:spPr>
       </p:pic>
@@ -19593,7 +19603,7 @@
           <a:p>
             <a:r>
               <a:rPr lang="en-US" dirty="0"/>
-              <a:t>Lesson 7</a:t>
+              <a:t>Lesson 6</a:t>
             </a:r>
           </a:p>
         </p:txBody>
@@ -19631,7 +19641,7 @@
             </a:pPr>
             <a:r>
               <a:rPr lang="en-US" dirty="0"/>
-              <a:t>Arrays and Collections</a:t>
+              <a:t>Dates and Times</a:t>
             </a:r>
           </a:p>
         </p:txBody>
@@ -19639,21 +19649,21 @@
     </p:spTree>
     <p:extLst>
       <p:ext uri="{BB962C8B-B14F-4D97-AF65-F5344CB8AC3E}">
-        <p14:creationId xmlns:p14="http://schemas.microsoft.com/office/powerpoint/2010/main" val="655158604"/>
+        <p14:creationId xmlns:p14="http://schemas.microsoft.com/office/powerpoint/2010/main" val="2340841402"/>
       </p:ext>
     </p:extLst>
   </p:cSld>
   <p:clrMapOvr>
     <a:masterClrMapping/>
   </p:clrMapOvr>
-  <mc:AlternateContent xmlns:mc="http://schemas.openxmlformats.org/markup-compatibility/2006" xmlns:p14="http://schemas.microsoft.com/office/powerpoint/2010/main">
-    <mc:Choice Requires="p14">
-      <p:transition spd="slow" p14:dur="1250" advTm="2000">
+  <mc:AlternateContent xmlns:mc="http://schemas.openxmlformats.org/markup-compatibility/2006">
+    <mc:Choice xmlns:p14="http://schemas.microsoft.com/office/powerpoint/2010/main" Requires="p14">
+      <p:transition spd="slow" p14:dur="1250">
         <p14:flip dir="r"/>
       </p:transition>
     </mc:Choice>
-    <mc:Fallback xmlns="">
-      <p:transition spd="slow" advTm="2000">
+    <mc:Fallback>
+      <p:transition spd="slow">
         <p:fade/>
       </p:transition>
     </mc:Fallback>
@@ -19683,7 +19693,7 @@
           <p:cNvPr id="4" name="Picture Placeholder 3">
             <a:extLst>
               <a:ext uri="{FF2B5EF4-FFF2-40B4-BE49-F238E27FC236}">
-                <a16:creationId xmlns:a16="http://schemas.microsoft.com/office/drawing/2014/main" id="{2275A6BB-906D-4E74-B715-47980696FB8B}"/>
+                <a16:creationId xmlns:a16="http://schemas.microsoft.com/office/drawing/2014/main" id="{DD13BB6E-472D-42B8-B3A7-4805E50DF0DD}"/>
               </a:ext>
             </a:extLst>
           </p:cNvPr>
@@ -19696,15 +19706,15 @@
         </p:nvPicPr>
         <p:blipFill>
           <a:blip r:embed="rId2"/>
-          <a:srcRect l="17133" r="17133"/>
+          <a:srcRect l="13025" r="13025"/>
           <a:stretch>
             <a:fillRect/>
           </a:stretch>
         </p:blipFill>
         <p:spPr>
           <a:xfrm>
-            <a:off x="7013575" y="-1276350"/>
-            <a:ext cx="9064625" cy="9193213"/>
+            <a:off x="5542764" y="-2768961"/>
+            <a:ext cx="12007040" cy="12178432"/>
           </a:xfrm>
         </p:spPr>
       </p:pic>
@@ -19736,7 +19746,7 @@
           <a:p>
             <a:r>
               <a:rPr lang="en-US" dirty="0"/>
-              <a:t>Lesson 8</a:t>
+              <a:t>Lesson 7</a:t>
             </a:r>
           </a:p>
         </p:txBody>
@@ -19774,7 +19784,7 @@
             </a:pPr>
             <a:r>
               <a:rPr lang="en-US" dirty="0"/>
-              <a:t>Enumerations and Structures</a:t>
+              <a:t>Arrays and Collections</a:t>
             </a:r>
           </a:p>
         </p:txBody>
@@ -19782,21 +19792,21 @@
     </p:spTree>
     <p:extLst>
       <p:ext uri="{BB962C8B-B14F-4D97-AF65-F5344CB8AC3E}">
-        <p14:creationId xmlns:p14="http://schemas.microsoft.com/office/powerpoint/2010/main" val="2122467810"/>
+        <p14:creationId xmlns:p14="http://schemas.microsoft.com/office/powerpoint/2010/main" val="655158604"/>
       </p:ext>
     </p:extLst>
   </p:cSld>
   <p:clrMapOvr>
     <a:masterClrMapping/>
   </p:clrMapOvr>
-  <mc:AlternateContent xmlns:mc="http://schemas.openxmlformats.org/markup-compatibility/2006" xmlns:p14="http://schemas.microsoft.com/office/powerpoint/2010/main">
-    <mc:Choice Requires="p14">
-      <p:transition spd="slow" p14:dur="1250" advTm="2000">
+  <mc:AlternateContent xmlns:mc="http://schemas.openxmlformats.org/markup-compatibility/2006">
+    <mc:Choice xmlns:p14="http://schemas.microsoft.com/office/powerpoint/2010/main" Requires="p14">
+      <p:transition spd="slow" p14:dur="1250">
         <p14:flip dir="r"/>
       </p:transition>
     </mc:Choice>
-    <mc:Fallback xmlns="">
-      <p:transition spd="slow" advTm="2000">
+    <mc:Fallback>
+      <p:transition spd="slow">
         <p:fade/>
       </p:transition>
     </mc:Fallback>
@@ -19826,7 +19836,7 @@
           <p:cNvPr id="4" name="Picture Placeholder 3">
             <a:extLst>
               <a:ext uri="{FF2B5EF4-FFF2-40B4-BE49-F238E27FC236}">
-                <a16:creationId xmlns:a16="http://schemas.microsoft.com/office/drawing/2014/main" id="{81D15399-48F7-4649-BF88-F6F906AA50BA}"/>
+                <a16:creationId xmlns:a16="http://schemas.microsoft.com/office/drawing/2014/main" id="{2275A6BB-906D-4E74-B715-47980696FB8B}"/>
               </a:ext>
             </a:extLst>
           </p:cNvPr>
@@ -19839,12 +19849,17 @@
         </p:nvPicPr>
         <p:blipFill>
           <a:blip r:embed="rId2"/>
-          <a:srcRect l="17801" r="17801"/>
+          <a:srcRect l="17133" r="17133"/>
           <a:stretch>
             <a:fillRect/>
           </a:stretch>
         </p:blipFill>
-        <p:spPr/>
+        <p:spPr>
+          <a:xfrm>
+            <a:off x="7013575" y="-1276350"/>
+            <a:ext cx="9064625" cy="9193213"/>
+          </a:xfrm>
+        </p:spPr>
       </p:pic>
       <p:sp>
         <p:nvSpPr>
@@ -19874,7 +19889,7 @@
           <a:p>
             <a:r>
               <a:rPr lang="en-US" dirty="0"/>
-              <a:t>Lesson 9</a:t>
+              <a:t>Lesson 8</a:t>
             </a:r>
           </a:p>
         </p:txBody>
@@ -19912,7 +19927,7 @@
             </a:pPr>
             <a:r>
               <a:rPr lang="en-US" dirty="0"/>
-              <a:t>Making Choices</a:t>
+              <a:t>Enumerations and Structures</a:t>
             </a:r>
           </a:p>
         </p:txBody>
@@ -19920,21 +19935,21 @@
     </p:spTree>
     <p:extLst>
       <p:ext uri="{BB962C8B-B14F-4D97-AF65-F5344CB8AC3E}">
-        <p14:creationId xmlns:p14="http://schemas.microsoft.com/office/powerpoint/2010/main" val="2722297980"/>
+        <p14:creationId xmlns:p14="http://schemas.microsoft.com/office/powerpoint/2010/main" val="2122467810"/>
       </p:ext>
     </p:extLst>
   </p:cSld>
   <p:clrMapOvr>
     <a:masterClrMapping/>
   </p:clrMapOvr>
-  <mc:AlternateContent xmlns:mc="http://schemas.openxmlformats.org/markup-compatibility/2006" xmlns:p14="http://schemas.microsoft.com/office/powerpoint/2010/main">
-    <mc:Choice Requires="p14">
-      <p:transition spd="slow" p14:dur="1250" advTm="2000">
+  <mc:AlternateContent xmlns:mc="http://schemas.openxmlformats.org/markup-compatibility/2006">
+    <mc:Choice xmlns:p14="http://schemas.microsoft.com/office/powerpoint/2010/main" Requires="p14">
+      <p:transition spd="slow" p14:dur="1250">
         <p14:flip dir="r"/>
       </p:transition>
     </mc:Choice>
-    <mc:Fallback xmlns="">
-      <p:transition spd="slow" advTm="2000">
+    <mc:Fallback>
+      <p:transition spd="slow">
         <p:fade/>
       </p:transition>
     </mc:Fallback>
@@ -19964,7 +19979,7 @@
           <p:cNvPr id="4" name="Picture Placeholder 3">
             <a:extLst>
               <a:ext uri="{FF2B5EF4-FFF2-40B4-BE49-F238E27FC236}">
-                <a16:creationId xmlns:a16="http://schemas.microsoft.com/office/drawing/2014/main" id="{21CF88B5-98FE-435D-B828-5CAD8FE4288D}"/>
+                <a16:creationId xmlns:a16="http://schemas.microsoft.com/office/drawing/2014/main" id="{81D15399-48F7-4649-BF88-F6F906AA50BA}"/>
               </a:ext>
             </a:extLst>
           </p:cNvPr>
@@ -19977,7 +19992,7 @@
         </p:nvPicPr>
         <p:blipFill>
           <a:blip r:embed="rId2"/>
-          <a:srcRect l="699" r="699"/>
+          <a:srcRect l="17801" r="17801"/>
           <a:stretch>
             <a:fillRect/>
           </a:stretch>
@@ -20012,7 +20027,7 @@
           <a:p>
             <a:r>
               <a:rPr lang="en-US" dirty="0"/>
-              <a:t>Lesson 10</a:t>
+              <a:t>Lesson 9</a:t>
             </a:r>
           </a:p>
         </p:txBody>
@@ -20050,7 +20065,7 @@
             </a:pPr>
             <a:r>
               <a:rPr lang="en-US" dirty="0"/>
-              <a:t>Repeating Program Steps</a:t>
+              <a:t>Making Choices</a:t>
             </a:r>
           </a:p>
         </p:txBody>
@@ -20058,21 +20073,21 @@
     </p:spTree>
     <p:extLst>
       <p:ext uri="{BB962C8B-B14F-4D97-AF65-F5344CB8AC3E}">
-        <p14:creationId xmlns:p14="http://schemas.microsoft.com/office/powerpoint/2010/main" val="2385190478"/>
+        <p14:creationId xmlns:p14="http://schemas.microsoft.com/office/powerpoint/2010/main" val="2722297980"/>
       </p:ext>
     </p:extLst>
   </p:cSld>
   <p:clrMapOvr>
     <a:masterClrMapping/>
   </p:clrMapOvr>
-  <mc:AlternateContent xmlns:mc="http://schemas.openxmlformats.org/markup-compatibility/2006" xmlns:p14="http://schemas.microsoft.com/office/powerpoint/2010/main">
-    <mc:Choice Requires="p14">
-      <p:transition spd="slow" p14:dur="1250" advTm="2000">
+  <mc:AlternateContent xmlns:mc="http://schemas.openxmlformats.org/markup-compatibility/2006">
+    <mc:Choice xmlns:p14="http://schemas.microsoft.com/office/powerpoint/2010/main" Requires="p14">
+      <p:transition spd="slow" p14:dur="1250">
         <p14:flip dir="r"/>
       </p:transition>
     </mc:Choice>
-    <mc:Fallback xmlns="">
-      <p:transition spd="slow" advTm="2000">
+    <mc:Fallback>
+      <p:transition spd="slow">
         <p:fade/>
       </p:transition>
     </mc:Fallback>
@@ -20102,7 +20117,7 @@
           <p:cNvPr id="4" name="Picture Placeholder 3">
             <a:extLst>
               <a:ext uri="{FF2B5EF4-FFF2-40B4-BE49-F238E27FC236}">
-                <a16:creationId xmlns:a16="http://schemas.microsoft.com/office/drawing/2014/main" id="{F92309F6-7AC4-439E-87EF-927B8F1F99D5}"/>
+                <a16:creationId xmlns:a16="http://schemas.microsoft.com/office/drawing/2014/main" id="{21CF88B5-98FE-435D-B828-5CAD8FE4288D}"/>
               </a:ext>
             </a:extLst>
           </p:cNvPr>
@@ -20115,7 +20130,7 @@
         </p:nvPicPr>
         <p:blipFill>
           <a:blip r:embed="rId2"/>
-          <a:srcRect l="4666" r="4666"/>
+          <a:srcRect l="699" r="699"/>
           <a:stretch>
             <a:fillRect/>
           </a:stretch>
@@ -20150,7 +20165,7 @@
           <a:p>
             <a:r>
               <a:rPr lang="en-US" dirty="0"/>
-              <a:t>Lesson 11</a:t>
+              <a:t>Lesson 10</a:t>
             </a:r>
           </a:p>
         </p:txBody>
@@ -20188,7 +20203,7 @@
             </a:pPr>
             <a:r>
               <a:rPr lang="en-US" dirty="0"/>
-              <a:t>Reusing Code with Methods</a:t>
+              <a:t>Repeating Program Steps</a:t>
             </a:r>
           </a:p>
         </p:txBody>
@@ -20196,21 +20211,21 @@
     </p:spTree>
     <p:extLst>
       <p:ext uri="{BB962C8B-B14F-4D97-AF65-F5344CB8AC3E}">
-        <p14:creationId xmlns:p14="http://schemas.microsoft.com/office/powerpoint/2010/main" val="1420352367"/>
+        <p14:creationId xmlns:p14="http://schemas.microsoft.com/office/powerpoint/2010/main" val="2385190478"/>
       </p:ext>
     </p:extLst>
   </p:cSld>
   <p:clrMapOvr>
     <a:masterClrMapping/>
   </p:clrMapOvr>
-  <mc:AlternateContent xmlns:mc="http://schemas.openxmlformats.org/markup-compatibility/2006" xmlns:p14="http://schemas.microsoft.com/office/powerpoint/2010/main">
-    <mc:Choice Requires="p14">
-      <p:transition spd="slow" p14:dur="1250" advTm="2000">
+  <mc:AlternateContent xmlns:mc="http://schemas.openxmlformats.org/markup-compatibility/2006">
+    <mc:Choice xmlns:p14="http://schemas.microsoft.com/office/powerpoint/2010/main" Requires="p14">
+      <p:transition spd="slow" p14:dur="1250">
         <p14:flip dir="r"/>
       </p:transition>
     </mc:Choice>
-    <mc:Fallback xmlns="">
-      <p:transition spd="slow" advTm="2000">
+    <mc:Fallback>
+      <p:transition spd="slow">
         <p:fade/>
       </p:transition>
     </mc:Fallback>
@@ -20240,7 +20255,7 @@
           <p:cNvPr id="4" name="Picture Placeholder 3">
             <a:extLst>
               <a:ext uri="{FF2B5EF4-FFF2-40B4-BE49-F238E27FC236}">
-                <a16:creationId xmlns:a16="http://schemas.microsoft.com/office/drawing/2014/main" id="{0BAC5A6D-6A0D-47DC-AD1F-09823FDDCC57}"/>
+                <a16:creationId xmlns:a16="http://schemas.microsoft.com/office/drawing/2014/main" id="{F92309F6-7AC4-439E-87EF-927B8F1F99D5}"/>
               </a:ext>
             </a:extLst>
           </p:cNvPr>
@@ -20251,17 +20266,14 @@
             <p:ph type="pic" sz="quarter" idx="10"/>
           </p:nvPr>
         </p:nvPicPr>
-        <p:blipFill rotWithShape="1">
+        <p:blipFill>
           <a:blip r:embed="rId2"/>
-          <a:srcRect l="40873" t="-561" r="256" b="20952"/>
-          <a:stretch/>
+          <a:srcRect l="4666" r="4666"/>
+          <a:stretch>
+            <a:fillRect/>
+          </a:stretch>
         </p:blipFill>
-        <p:spPr>
-          <a:xfrm>
-            <a:off x="7014368" y="-1276351"/>
-            <a:ext cx="9063832" cy="9193212"/>
-          </a:xfrm>
-        </p:spPr>
+        <p:spPr/>
       </p:pic>
       <p:sp>
         <p:nvSpPr>
@@ -20291,7 +20303,7 @@
           <a:p>
             <a:r>
               <a:rPr lang="en-US" dirty="0"/>
-              <a:t>Lesson 12</a:t>
+              <a:t>Lesson 11</a:t>
             </a:r>
           </a:p>
         </p:txBody>
@@ -20329,7 +20341,7 @@
             </a:pPr>
             <a:r>
               <a:rPr lang="en-US" dirty="0"/>
-              <a:t>Handling Errors</a:t>
+              <a:t>Reusing Code with Methods</a:t>
             </a:r>
           </a:p>
         </p:txBody>
@@ -20337,21 +20349,21 @@
     </p:spTree>
     <p:extLst>
       <p:ext uri="{BB962C8B-B14F-4D97-AF65-F5344CB8AC3E}">
-        <p14:creationId xmlns:p14="http://schemas.microsoft.com/office/powerpoint/2010/main" val="837109256"/>
+        <p14:creationId xmlns:p14="http://schemas.microsoft.com/office/powerpoint/2010/main" val="1420352367"/>
       </p:ext>
     </p:extLst>
   </p:cSld>
   <p:clrMapOvr>
     <a:masterClrMapping/>
   </p:clrMapOvr>
-  <mc:AlternateContent xmlns:mc="http://schemas.openxmlformats.org/markup-compatibility/2006" xmlns:p14="http://schemas.microsoft.com/office/powerpoint/2010/main">
-    <mc:Choice Requires="p14">
-      <p:transition spd="slow" p14:dur="1250" advTm="2000">
+  <mc:AlternateContent xmlns:mc="http://schemas.openxmlformats.org/markup-compatibility/2006">
+    <mc:Choice xmlns:p14="http://schemas.microsoft.com/office/powerpoint/2010/main" Requires="p14">
+      <p:transition spd="slow" p14:dur="1250">
         <p14:flip dir="r"/>
       </p:transition>
     </mc:Choice>
-    <mc:Fallback xmlns="">
-      <p:transition spd="slow" advTm="2000">
+    <mc:Fallback>
+      <p:transition spd="slow">
         <p:fade/>
       </p:transition>
     </mc:Fallback>
@@ -20381,7 +20393,7 @@
           <p:cNvPr id="4" name="Picture Placeholder 3">
             <a:extLst>
               <a:ext uri="{FF2B5EF4-FFF2-40B4-BE49-F238E27FC236}">
-                <a16:creationId xmlns:a16="http://schemas.microsoft.com/office/drawing/2014/main" id="{5498D730-A74A-4FFE-B019-83033997997B}"/>
+                <a16:creationId xmlns:a16="http://schemas.microsoft.com/office/drawing/2014/main" id="{0BAC5A6D-6A0D-47DC-AD1F-09823FDDCC57}"/>
               </a:ext>
             </a:extLst>
           </p:cNvPr>
@@ -20392,16 +20404,14 @@
             <p:ph type="pic" sz="quarter" idx="10"/>
           </p:nvPr>
         </p:nvPicPr>
-        <p:blipFill>
+        <p:blipFill rotWithShape="1">
           <a:blip r:embed="rId2"/>
-          <a:srcRect t="16194" b="16194"/>
-          <a:stretch>
-            <a:fillRect/>
-          </a:stretch>
+          <a:srcRect l="40873" t="-561" r="256" b="20952"/>
+          <a:stretch/>
         </p:blipFill>
         <p:spPr>
           <a:xfrm>
-            <a:off x="4831606" y="-1276351"/>
+            <a:off x="7014368" y="-1276351"/>
             <a:ext cx="9063832" cy="9193212"/>
           </a:xfrm>
         </p:spPr>
@@ -20434,7 +20444,7 @@
           <a:p>
             <a:r>
               <a:rPr lang="en-US" dirty="0"/>
-              <a:t>Lesson 13</a:t>
+              <a:t>Lesson 12</a:t>
             </a:r>
           </a:p>
         </p:txBody>
@@ -20472,7 +20482,7 @@
             </a:pPr>
             <a:r>
               <a:rPr lang="en-US" dirty="0"/>
-              <a:t>Preventing Bugs</a:t>
+              <a:t>Handling Errors</a:t>
             </a:r>
           </a:p>
         </p:txBody>
@@ -20480,21 +20490,21 @@
     </p:spTree>
     <p:extLst>
       <p:ext uri="{BB962C8B-B14F-4D97-AF65-F5344CB8AC3E}">
-        <p14:creationId xmlns:p14="http://schemas.microsoft.com/office/powerpoint/2010/main" val="479623129"/>
+        <p14:creationId xmlns:p14="http://schemas.microsoft.com/office/powerpoint/2010/main" val="837109256"/>
       </p:ext>
     </p:extLst>
   </p:cSld>
   <p:clrMapOvr>
     <a:masterClrMapping/>
   </p:clrMapOvr>
-  <mc:AlternateContent xmlns:mc="http://schemas.openxmlformats.org/markup-compatibility/2006" xmlns:p14="http://schemas.microsoft.com/office/powerpoint/2010/main">
-    <mc:Choice Requires="p14">
-      <p:transition spd="slow" p14:dur="1250" advTm="2000">
+  <mc:AlternateContent xmlns:mc="http://schemas.openxmlformats.org/markup-compatibility/2006">
+    <mc:Choice xmlns:p14="http://schemas.microsoft.com/office/powerpoint/2010/main" Requires="p14">
+      <p:transition spd="slow" p14:dur="1250">
         <p14:flip dir="r"/>
       </p:transition>
     </mc:Choice>
-    <mc:Fallback xmlns="">
-      <p:transition spd="slow" advTm="2000">
+    <mc:Fallback>
+      <p:transition spd="slow">
         <p:fade/>
       </p:transition>
     </mc:Fallback>
@@ -20524,7 +20534,7 @@
           <p:cNvPr id="4" name="Picture Placeholder 3">
             <a:extLst>
               <a:ext uri="{FF2B5EF4-FFF2-40B4-BE49-F238E27FC236}">
-                <a16:creationId xmlns:a16="http://schemas.microsoft.com/office/drawing/2014/main" id="{71546D5D-9B0F-4486-B807-6D96A4146254}"/>
+                <a16:creationId xmlns:a16="http://schemas.microsoft.com/office/drawing/2014/main" id="{5498D730-A74A-4FFE-B019-83033997997B}"/>
               </a:ext>
             </a:extLst>
           </p:cNvPr>
@@ -20537,12 +20547,17 @@
         </p:nvPicPr>
         <p:blipFill>
           <a:blip r:embed="rId2"/>
-          <a:srcRect l="13025" r="13025"/>
+          <a:srcRect t="16194" b="16194"/>
           <a:stretch>
             <a:fillRect/>
           </a:stretch>
         </p:blipFill>
-        <p:spPr/>
+        <p:spPr>
+          <a:xfrm>
+            <a:off x="4831606" y="-1276351"/>
+            <a:ext cx="9063832" cy="9193212"/>
+          </a:xfrm>
+        </p:spPr>
       </p:pic>
       <p:sp>
         <p:nvSpPr>
@@ -20572,7 +20587,7 @@
           <a:p>
             <a:r>
               <a:rPr lang="en-US" dirty="0"/>
-              <a:t>Lesson 14</a:t>
+              <a:t>Lesson 13</a:t>
             </a:r>
           </a:p>
         </p:txBody>
@@ -20610,7 +20625,7 @@
             </a:pPr>
             <a:r>
               <a:rPr lang="en-US" dirty="0"/>
-              <a:t>Defining Classes</a:t>
+              <a:t>Preventing Bugs</a:t>
             </a:r>
           </a:p>
         </p:txBody>
@@ -20618,21 +20633,21 @@
     </p:spTree>
     <p:extLst>
       <p:ext uri="{BB962C8B-B14F-4D97-AF65-F5344CB8AC3E}">
-        <p14:creationId xmlns:p14="http://schemas.microsoft.com/office/powerpoint/2010/main" val="187124869"/>
+        <p14:creationId xmlns:p14="http://schemas.microsoft.com/office/powerpoint/2010/main" val="479623129"/>
       </p:ext>
     </p:extLst>
   </p:cSld>
   <p:clrMapOvr>
     <a:masterClrMapping/>
   </p:clrMapOvr>
-  <mc:AlternateContent xmlns:mc="http://schemas.openxmlformats.org/markup-compatibility/2006" xmlns:p14="http://schemas.microsoft.com/office/powerpoint/2010/main">
-    <mc:Choice Requires="p14">
-      <p:transition spd="slow" p14:dur="1250" advTm="2000">
+  <mc:AlternateContent xmlns:mc="http://schemas.openxmlformats.org/markup-compatibility/2006">
+    <mc:Choice xmlns:p14="http://schemas.microsoft.com/office/powerpoint/2010/main" Requires="p14">
+      <p:transition spd="slow" p14:dur="1250">
         <p14:flip dir="r"/>
       </p:transition>
     </mc:Choice>
-    <mc:Fallback xmlns="">
-      <p:transition spd="slow" advTm="2000">
+    <mc:Fallback>
+      <p:transition spd="slow">
         <p:fade/>
       </p:transition>
     </mc:Fallback>
@@ -20662,7 +20677,7 @@
           <p:cNvPr id="4" name="Picture Placeholder 3">
             <a:extLst>
               <a:ext uri="{FF2B5EF4-FFF2-40B4-BE49-F238E27FC236}">
-                <a16:creationId xmlns:a16="http://schemas.microsoft.com/office/drawing/2014/main" id="{322A13A7-D685-4C47-9FD0-58FBF07B2C71}"/>
+                <a16:creationId xmlns:a16="http://schemas.microsoft.com/office/drawing/2014/main" id="{71546D5D-9B0F-4486-B807-6D96A4146254}"/>
               </a:ext>
             </a:extLst>
           </p:cNvPr>
@@ -20675,7 +20690,7 @@
         </p:nvPicPr>
         <p:blipFill>
           <a:blip r:embed="rId2"/>
-          <a:srcRect l="18263" r="18263"/>
+          <a:srcRect l="13025" r="13025"/>
           <a:stretch>
             <a:fillRect/>
           </a:stretch>
@@ -20710,7 +20725,7 @@
           <a:p>
             <a:r>
               <a:rPr lang="en-US" dirty="0"/>
-              <a:t>Lesson 15</a:t>
+              <a:t>Lesson 14</a:t>
             </a:r>
           </a:p>
         </p:txBody>
@@ -20748,7 +20763,7 @@
             </a:pPr>
             <a:r>
               <a:rPr lang="en-US" dirty="0"/>
-              <a:t>Initializing Objects</a:t>
+              <a:t>Defining Classes</a:t>
             </a:r>
           </a:p>
         </p:txBody>
@@ -20756,21 +20771,21 @@
     </p:spTree>
     <p:extLst>
       <p:ext uri="{BB962C8B-B14F-4D97-AF65-F5344CB8AC3E}">
-        <p14:creationId xmlns:p14="http://schemas.microsoft.com/office/powerpoint/2010/main" val="593587069"/>
+        <p14:creationId xmlns:p14="http://schemas.microsoft.com/office/powerpoint/2010/main" val="187124869"/>
       </p:ext>
     </p:extLst>
   </p:cSld>
   <p:clrMapOvr>
     <a:masterClrMapping/>
   </p:clrMapOvr>
-  <mc:AlternateContent xmlns:mc="http://schemas.openxmlformats.org/markup-compatibility/2006" xmlns:p14="http://schemas.microsoft.com/office/powerpoint/2010/main">
-    <mc:Choice Requires="p14">
-      <p:transition spd="slow" p14:dur="1250" advTm="2000">
+  <mc:AlternateContent xmlns:mc="http://schemas.openxmlformats.org/markup-compatibility/2006">
+    <mc:Choice xmlns:p14="http://schemas.microsoft.com/office/powerpoint/2010/main" Requires="p14">
+      <p:transition spd="slow" p14:dur="1250">
         <p14:flip dir="r"/>
       </p:transition>
     </mc:Choice>
-    <mc:Fallback xmlns="">
-      <p:transition spd="slow" advTm="2000">
+    <mc:Fallback>
+      <p:transition spd="slow">
         <p:fade/>
       </p:transition>
     </mc:Fallback>
@@ -20899,14 +20914,14 @@
   <p:clrMapOvr>
     <a:masterClrMapping/>
   </p:clrMapOvr>
-  <mc:AlternateContent xmlns:mc="http://schemas.openxmlformats.org/markup-compatibility/2006" xmlns:p14="http://schemas.microsoft.com/office/powerpoint/2010/main">
-    <mc:Choice Requires="p14">
-      <p:transition spd="slow" p14:dur="1250" advTm="2000">
+  <mc:AlternateContent xmlns:mc="http://schemas.openxmlformats.org/markup-compatibility/2006">
+    <mc:Choice xmlns:p14="http://schemas.microsoft.com/office/powerpoint/2010/main" Requires="p14">
+      <p:transition spd="slow" p14:dur="1250">
         <p14:flip dir="r"/>
       </p:transition>
     </mc:Choice>
-    <mc:Fallback xmlns="">
-      <p:transition spd="slow" advTm="2000">
+    <mc:Fallback>
+      <p:transition spd="slow">
         <p:fade/>
       </p:transition>
     </mc:Fallback>
@@ -20936,7 +20951,7 @@
           <p:cNvPr id="4" name="Picture Placeholder 3">
             <a:extLst>
               <a:ext uri="{FF2B5EF4-FFF2-40B4-BE49-F238E27FC236}">
-                <a16:creationId xmlns:a16="http://schemas.microsoft.com/office/drawing/2014/main" id="{3F0DD061-A1DB-48E3-9E3D-50DE7F5F286C}"/>
+                <a16:creationId xmlns:a16="http://schemas.microsoft.com/office/drawing/2014/main" id="{322A13A7-D685-4C47-9FD0-58FBF07B2C71}"/>
               </a:ext>
             </a:extLst>
           </p:cNvPr>
@@ -20949,7 +20964,7 @@
         </p:nvPicPr>
         <p:blipFill>
           <a:blip r:embed="rId2"/>
-          <a:srcRect l="17133" r="17133"/>
+          <a:srcRect l="18263" r="18263"/>
           <a:stretch>
             <a:fillRect/>
           </a:stretch>
@@ -20984,7 +20999,7 @@
           <a:p>
             <a:r>
               <a:rPr lang="en-US" dirty="0"/>
-              <a:t>Lesson 16</a:t>
+              <a:t>Lesson 15</a:t>
             </a:r>
           </a:p>
         </p:txBody>
@@ -21022,7 +21037,7 @@
             </a:pPr>
             <a:r>
               <a:rPr lang="en-US" dirty="0"/>
-              <a:t>Fine-Tuning Classes</a:t>
+              <a:t>Initializing Objects</a:t>
             </a:r>
           </a:p>
         </p:txBody>
@@ -21030,21 +21045,21 @@
     </p:spTree>
     <p:extLst>
       <p:ext uri="{BB962C8B-B14F-4D97-AF65-F5344CB8AC3E}">
-        <p14:creationId xmlns:p14="http://schemas.microsoft.com/office/powerpoint/2010/main" val="662383641"/>
+        <p14:creationId xmlns:p14="http://schemas.microsoft.com/office/powerpoint/2010/main" val="593587069"/>
       </p:ext>
     </p:extLst>
   </p:cSld>
   <p:clrMapOvr>
     <a:masterClrMapping/>
   </p:clrMapOvr>
-  <mc:AlternateContent xmlns:mc="http://schemas.openxmlformats.org/markup-compatibility/2006" xmlns:p14="http://schemas.microsoft.com/office/powerpoint/2010/main">
-    <mc:Choice Requires="p14">
-      <p:transition spd="slow" p14:dur="1250" advTm="2000">
+  <mc:AlternateContent xmlns:mc="http://schemas.openxmlformats.org/markup-compatibility/2006">
+    <mc:Choice xmlns:p14="http://schemas.microsoft.com/office/powerpoint/2010/main" Requires="p14">
+      <p:transition spd="slow" p14:dur="1250">
         <p14:flip dir="r"/>
       </p:transition>
     </mc:Choice>
-    <mc:Fallback xmlns="">
-      <p:transition spd="slow" advTm="2000">
+    <mc:Fallback>
+      <p:transition spd="slow">
         <p:fade/>
       </p:transition>
     </mc:Fallback>
@@ -21074,7 +21089,7 @@
           <p:cNvPr id="4" name="Picture Placeholder 3">
             <a:extLst>
               <a:ext uri="{FF2B5EF4-FFF2-40B4-BE49-F238E27FC236}">
-                <a16:creationId xmlns:a16="http://schemas.microsoft.com/office/drawing/2014/main" id="{CF348E2F-8404-4D15-B607-7A76572144F7}"/>
+                <a16:creationId xmlns:a16="http://schemas.microsoft.com/office/drawing/2014/main" id="{3F0DD061-A1DB-48E3-9E3D-50DE7F5F286C}"/>
               </a:ext>
             </a:extLst>
           </p:cNvPr>
@@ -21087,17 +21102,12 @@
         </p:nvPicPr>
         <p:blipFill>
           <a:blip r:embed="rId2"/>
-          <a:srcRect l="16825" r="16825"/>
+          <a:srcRect l="17133" r="17133"/>
           <a:stretch>
             <a:fillRect/>
           </a:stretch>
         </p:blipFill>
-        <p:spPr>
-          <a:xfrm>
-            <a:off x="4743116" y="-1167606"/>
-            <a:ext cx="9063832" cy="9193212"/>
-          </a:xfrm>
-        </p:spPr>
+        <p:spPr/>
       </p:pic>
       <p:sp>
         <p:nvSpPr>
@@ -21127,7 +21137,7 @@
           <a:p>
             <a:r>
               <a:rPr lang="en-US" dirty="0"/>
-              <a:t>Lesson 17</a:t>
+              <a:t>Lesson 16</a:t>
             </a:r>
           </a:p>
         </p:txBody>
@@ -21165,7 +21175,7 @@
             </a:pPr>
             <a:r>
               <a:rPr lang="en-US" dirty="0"/>
-              <a:t>Overloading Operators</a:t>
+              <a:t>Fine-Tuning Classes</a:t>
             </a:r>
           </a:p>
         </p:txBody>
@@ -21173,21 +21183,21 @@
     </p:spTree>
     <p:extLst>
       <p:ext uri="{BB962C8B-B14F-4D97-AF65-F5344CB8AC3E}">
-        <p14:creationId xmlns:p14="http://schemas.microsoft.com/office/powerpoint/2010/main" val="432530578"/>
+        <p14:creationId xmlns:p14="http://schemas.microsoft.com/office/powerpoint/2010/main" val="662383641"/>
       </p:ext>
     </p:extLst>
   </p:cSld>
   <p:clrMapOvr>
     <a:masterClrMapping/>
   </p:clrMapOvr>
-  <mc:AlternateContent xmlns:mc="http://schemas.openxmlformats.org/markup-compatibility/2006" xmlns:p14="http://schemas.microsoft.com/office/powerpoint/2010/main">
-    <mc:Choice Requires="p14">
-      <p:transition spd="slow" p14:dur="1250" advTm="2000">
+  <mc:AlternateContent xmlns:mc="http://schemas.openxmlformats.org/markup-compatibility/2006">
+    <mc:Choice xmlns:p14="http://schemas.microsoft.com/office/powerpoint/2010/main" Requires="p14">
+      <p:transition spd="slow" p14:dur="1250">
         <p14:flip dir="r"/>
       </p:transition>
     </mc:Choice>
-    <mc:Fallback xmlns="">
-      <p:transition spd="slow" advTm="2000">
+    <mc:Fallback>
+      <p:transition spd="slow">
         <p:fade/>
       </p:transition>
     </mc:Fallback>
@@ -21217,7 +21227,7 @@
           <p:cNvPr id="4" name="Picture Placeholder 3">
             <a:extLst>
               <a:ext uri="{FF2B5EF4-FFF2-40B4-BE49-F238E27FC236}">
-                <a16:creationId xmlns:a16="http://schemas.microsoft.com/office/drawing/2014/main" id="{CD939774-683B-46AF-9262-B8D43310C9D1}"/>
+                <a16:creationId xmlns:a16="http://schemas.microsoft.com/office/drawing/2014/main" id="{CF348E2F-8404-4D15-B607-7A76572144F7}"/>
               </a:ext>
             </a:extLst>
           </p:cNvPr>
@@ -21230,7 +21240,7 @@
         </p:nvPicPr>
         <p:blipFill>
           <a:blip r:embed="rId2"/>
-          <a:srcRect l="12076" r="12076"/>
+          <a:srcRect l="16825" r="16825"/>
           <a:stretch>
             <a:fillRect/>
           </a:stretch>
@@ -21270,7 +21280,7 @@
           <a:p>
             <a:r>
               <a:rPr lang="en-US" dirty="0"/>
-              <a:t>Lesson 18</a:t>
+              <a:t>Lesson 17</a:t>
             </a:r>
           </a:p>
         </p:txBody>
@@ -21308,7 +21318,7 @@
             </a:pPr>
             <a:r>
               <a:rPr lang="en-US" dirty="0"/>
-              <a:t>Using Interfaces</a:t>
+              <a:t>Overloading Operators</a:t>
             </a:r>
           </a:p>
         </p:txBody>
@@ -21316,21 +21326,21 @@
     </p:spTree>
     <p:extLst>
       <p:ext uri="{BB962C8B-B14F-4D97-AF65-F5344CB8AC3E}">
-        <p14:creationId xmlns:p14="http://schemas.microsoft.com/office/powerpoint/2010/main" val="1560941405"/>
+        <p14:creationId xmlns:p14="http://schemas.microsoft.com/office/powerpoint/2010/main" val="432530578"/>
       </p:ext>
     </p:extLst>
   </p:cSld>
   <p:clrMapOvr>
     <a:masterClrMapping/>
   </p:clrMapOvr>
-  <mc:AlternateContent xmlns:mc="http://schemas.openxmlformats.org/markup-compatibility/2006" xmlns:p14="http://schemas.microsoft.com/office/powerpoint/2010/main">
-    <mc:Choice Requires="p14">
-      <p:transition spd="slow" p14:dur="1250" advTm="2000">
+  <mc:AlternateContent xmlns:mc="http://schemas.openxmlformats.org/markup-compatibility/2006">
+    <mc:Choice xmlns:p14="http://schemas.microsoft.com/office/powerpoint/2010/main" Requires="p14">
+      <p:transition spd="slow" p14:dur="1250">
         <p14:flip dir="r"/>
       </p:transition>
     </mc:Choice>
-    <mc:Fallback xmlns="">
-      <p:transition spd="slow" advTm="2000">
+    <mc:Fallback>
+      <p:transition spd="slow">
         <p:fade/>
       </p:transition>
     </mc:Fallback>
@@ -21360,7 +21370,7 @@
           <p:cNvPr id="4" name="Picture Placeholder 3">
             <a:extLst>
               <a:ext uri="{FF2B5EF4-FFF2-40B4-BE49-F238E27FC236}">
-                <a16:creationId xmlns:a16="http://schemas.microsoft.com/office/drawing/2014/main" id="{40CFE1B1-A7D7-4478-B6B1-5B398326D672}"/>
+                <a16:creationId xmlns:a16="http://schemas.microsoft.com/office/drawing/2014/main" id="{CD939774-683B-46AF-9262-B8D43310C9D1}"/>
               </a:ext>
             </a:extLst>
           </p:cNvPr>
@@ -21373,12 +21383,17 @@
         </p:nvPicPr>
         <p:blipFill>
           <a:blip r:embed="rId2"/>
-          <a:srcRect l="10071" r="10071"/>
+          <a:srcRect l="12076" r="12076"/>
           <a:stretch>
             <a:fillRect/>
           </a:stretch>
         </p:blipFill>
-        <p:spPr/>
+        <p:spPr>
+          <a:xfrm>
+            <a:off x="4743116" y="-1167606"/>
+            <a:ext cx="9063832" cy="9193212"/>
+          </a:xfrm>
+        </p:spPr>
       </p:pic>
       <p:sp>
         <p:nvSpPr>
@@ -21408,7 +21423,7 @@
           <a:p>
             <a:r>
               <a:rPr lang="en-US" dirty="0"/>
-              <a:t>Lesson 19</a:t>
+              <a:t>Lesson 18</a:t>
             </a:r>
           </a:p>
         </p:txBody>
@@ -21446,7 +21461,7 @@
             </a:pPr>
             <a:r>
               <a:rPr lang="en-US" dirty="0"/>
-              <a:t>Making Generic Classes</a:t>
+              <a:t>Using Interfaces</a:t>
             </a:r>
           </a:p>
         </p:txBody>
@@ -21454,21 +21469,21 @@
     </p:spTree>
     <p:extLst>
       <p:ext uri="{BB962C8B-B14F-4D97-AF65-F5344CB8AC3E}">
-        <p14:creationId xmlns:p14="http://schemas.microsoft.com/office/powerpoint/2010/main" val="1782809940"/>
+        <p14:creationId xmlns:p14="http://schemas.microsoft.com/office/powerpoint/2010/main" val="1560941405"/>
       </p:ext>
     </p:extLst>
   </p:cSld>
   <p:clrMapOvr>
     <a:masterClrMapping/>
   </p:clrMapOvr>
-  <mc:AlternateContent xmlns:mc="http://schemas.openxmlformats.org/markup-compatibility/2006" xmlns:p14="http://schemas.microsoft.com/office/powerpoint/2010/main">
-    <mc:Choice Requires="p14">
-      <p:transition spd="slow" p14:dur="1250" advTm="2000">
+  <mc:AlternateContent xmlns:mc="http://schemas.openxmlformats.org/markup-compatibility/2006">
+    <mc:Choice xmlns:p14="http://schemas.microsoft.com/office/powerpoint/2010/main" Requires="p14">
+      <p:transition spd="slow" p14:dur="1250">
         <p14:flip dir="r"/>
       </p:transition>
     </mc:Choice>
-    <mc:Fallback xmlns="">
-      <p:transition spd="slow" advTm="2000">
+    <mc:Fallback>
+      <p:transition spd="slow">
         <p:fade/>
       </p:transition>
     </mc:Fallback>
@@ -21498,7 +21513,7 @@
           <p:cNvPr id="4" name="Picture Placeholder 3">
             <a:extLst>
               <a:ext uri="{FF2B5EF4-FFF2-40B4-BE49-F238E27FC236}">
-                <a16:creationId xmlns:a16="http://schemas.microsoft.com/office/drawing/2014/main" id="{CD77BC9E-3D0D-4120-8C99-31F72FB0DB97}"/>
+                <a16:creationId xmlns:a16="http://schemas.microsoft.com/office/drawing/2014/main" id="{40CFE1B1-A7D7-4478-B6B1-5B398326D672}"/>
               </a:ext>
             </a:extLst>
           </p:cNvPr>
@@ -21511,17 +21526,12 @@
         </p:nvPicPr>
         <p:blipFill>
           <a:blip r:embed="rId2"/>
-          <a:srcRect l="699" r="699"/>
+          <a:srcRect l="10071" r="10071"/>
           <a:stretch>
             <a:fillRect/>
           </a:stretch>
         </p:blipFill>
-        <p:spPr>
-          <a:xfrm>
-            <a:off x="4831609" y="-1276351"/>
-            <a:ext cx="9063832" cy="9193212"/>
-          </a:xfrm>
-        </p:spPr>
+        <p:spPr/>
       </p:pic>
       <p:sp>
         <p:nvSpPr>
@@ -21551,7 +21561,7 @@
           <a:p>
             <a:r>
               <a:rPr lang="en-US" dirty="0"/>
-              <a:t>Lesson 20</a:t>
+              <a:t>Lesson 19</a:t>
             </a:r>
           </a:p>
         </p:txBody>
@@ -21589,7 +21599,7 @@
             </a:pPr>
             <a:r>
               <a:rPr lang="en-US" dirty="0"/>
-              <a:t>Windows Apps with XAML</a:t>
+              <a:t>Making Generic Classes</a:t>
             </a:r>
           </a:p>
         </p:txBody>
@@ -21597,21 +21607,21 @@
     </p:spTree>
     <p:extLst>
       <p:ext uri="{BB962C8B-B14F-4D97-AF65-F5344CB8AC3E}">
-        <p14:creationId xmlns:p14="http://schemas.microsoft.com/office/powerpoint/2010/main" val="3888143967"/>
+        <p14:creationId xmlns:p14="http://schemas.microsoft.com/office/powerpoint/2010/main" val="1782809940"/>
       </p:ext>
     </p:extLst>
   </p:cSld>
   <p:clrMapOvr>
     <a:masterClrMapping/>
   </p:clrMapOvr>
-  <mc:AlternateContent xmlns:mc="http://schemas.openxmlformats.org/markup-compatibility/2006" xmlns:p14="http://schemas.microsoft.com/office/powerpoint/2010/main">
-    <mc:Choice Requires="p14">
-      <p:transition spd="slow" p14:dur="1250" advTm="2000">
+  <mc:AlternateContent xmlns:mc="http://schemas.openxmlformats.org/markup-compatibility/2006">
+    <mc:Choice xmlns:p14="http://schemas.microsoft.com/office/powerpoint/2010/main" Requires="p14">
+      <p:transition spd="slow" p14:dur="1250">
         <p14:flip dir="r"/>
       </p:transition>
     </mc:Choice>
-    <mc:Fallback xmlns="">
-      <p:transition spd="slow" advTm="2000">
+    <mc:Fallback>
+      <p:transition spd="slow">
         <p:fade/>
       </p:transition>
     </mc:Fallback>
@@ -21641,7 +21651,7 @@
           <p:cNvPr id="4" name="Picture Placeholder 3">
             <a:extLst>
               <a:ext uri="{FF2B5EF4-FFF2-40B4-BE49-F238E27FC236}">
-                <a16:creationId xmlns:a16="http://schemas.microsoft.com/office/drawing/2014/main" id="{464C21FD-2E4B-432A-B91D-CF6AE207A3A7}"/>
+                <a16:creationId xmlns:a16="http://schemas.microsoft.com/office/drawing/2014/main" id="{CD77BC9E-3D0D-4120-8C99-31F72FB0DB97}"/>
               </a:ext>
             </a:extLst>
           </p:cNvPr>
@@ -21654,14 +21664,14 @@
         </p:nvPicPr>
         <p:blipFill>
           <a:blip r:embed="rId2"/>
-          <a:srcRect l="21293" r="21293"/>
+          <a:srcRect l="699" r="699"/>
           <a:stretch>
             <a:fillRect/>
           </a:stretch>
         </p:blipFill>
         <p:spPr>
           <a:xfrm>
-            <a:off x="4831610" y="-1276351"/>
+            <a:off x="4831609" y="-1276351"/>
             <a:ext cx="9063832" cy="9193212"/>
           </a:xfrm>
         </p:spPr>
@@ -21694,7 +21704,7 @@
           <a:p>
             <a:r>
               <a:rPr lang="en-US" dirty="0"/>
-              <a:t>Lesson 21</a:t>
+              <a:t>Lesson 20</a:t>
             </a:r>
           </a:p>
         </p:txBody>
@@ -21732,7 +21742,7 @@
             </a:pPr>
             <a:r>
               <a:rPr lang="en-US" dirty="0"/>
-              <a:t>System.IO</a:t>
+              <a:t>Windows Apps with XAML</a:t>
             </a:r>
           </a:p>
         </p:txBody>
@@ -21740,21 +21750,21 @@
     </p:spTree>
     <p:extLst>
       <p:ext uri="{BB962C8B-B14F-4D97-AF65-F5344CB8AC3E}">
-        <p14:creationId xmlns:p14="http://schemas.microsoft.com/office/powerpoint/2010/main" val="171045466"/>
+        <p14:creationId xmlns:p14="http://schemas.microsoft.com/office/powerpoint/2010/main" val="3888143967"/>
       </p:ext>
     </p:extLst>
   </p:cSld>
   <p:clrMapOvr>
     <a:masterClrMapping/>
   </p:clrMapOvr>
-  <mc:AlternateContent xmlns:mc="http://schemas.openxmlformats.org/markup-compatibility/2006" xmlns:p14="http://schemas.microsoft.com/office/powerpoint/2010/main">
-    <mc:Choice Requires="p14">
-      <p:transition spd="slow" p14:dur="1250" advTm="2000">
+  <mc:AlternateContent xmlns:mc="http://schemas.openxmlformats.org/markup-compatibility/2006">
+    <mc:Choice xmlns:p14="http://schemas.microsoft.com/office/powerpoint/2010/main" Requires="p14">
+      <p:transition spd="slow" p14:dur="1250">
         <p14:flip dir="r"/>
       </p:transition>
     </mc:Choice>
-    <mc:Fallback xmlns="">
-      <p:transition spd="slow" advTm="2000">
+    <mc:Fallback>
+      <p:transition spd="slow">
         <p:fade/>
       </p:transition>
     </mc:Fallback>
@@ -21784,7 +21794,7 @@
           <p:cNvPr id="4" name="Picture Placeholder 3">
             <a:extLst>
               <a:ext uri="{FF2B5EF4-FFF2-40B4-BE49-F238E27FC236}">
-                <a16:creationId xmlns:a16="http://schemas.microsoft.com/office/drawing/2014/main" id="{D095E459-51F9-472B-8FE6-9BFC39330CBA}"/>
+                <a16:creationId xmlns:a16="http://schemas.microsoft.com/office/drawing/2014/main" id="{464C21FD-2E4B-432A-B91D-CF6AE207A3A7}"/>
               </a:ext>
             </a:extLst>
           </p:cNvPr>
@@ -21797,12 +21807,17 @@
         </p:nvPicPr>
         <p:blipFill>
           <a:blip r:embed="rId2"/>
-          <a:srcRect t="4080" b="4080"/>
+          <a:srcRect l="21293" r="21293"/>
           <a:stretch>
             <a:fillRect/>
           </a:stretch>
         </p:blipFill>
-        <p:spPr/>
+        <p:spPr>
+          <a:xfrm>
+            <a:off x="4831610" y="-1276351"/>
+            <a:ext cx="9063832" cy="9193212"/>
+          </a:xfrm>
+        </p:spPr>
       </p:pic>
       <p:sp>
         <p:nvSpPr>
@@ -21832,7 +21847,7 @@
           <a:p>
             <a:r>
               <a:rPr lang="en-US" dirty="0"/>
-              <a:t>Lesson 22</a:t>
+              <a:t>Lesson 21</a:t>
             </a:r>
           </a:p>
         </p:txBody>
@@ -21870,7 +21885,7 @@
             </a:pPr>
             <a:r>
               <a:rPr lang="en-US" dirty="0"/>
-              <a:t>Programming Databases</a:t>
+              <a:t>System.IO</a:t>
             </a:r>
           </a:p>
         </p:txBody>
@@ -21878,21 +21893,21 @@
     </p:spTree>
     <p:extLst>
       <p:ext uri="{BB962C8B-B14F-4D97-AF65-F5344CB8AC3E}">
-        <p14:creationId xmlns:p14="http://schemas.microsoft.com/office/powerpoint/2010/main" val="3062775636"/>
+        <p14:creationId xmlns:p14="http://schemas.microsoft.com/office/powerpoint/2010/main" val="171045466"/>
       </p:ext>
     </p:extLst>
   </p:cSld>
   <p:clrMapOvr>
     <a:masterClrMapping/>
   </p:clrMapOvr>
-  <mc:AlternateContent xmlns:mc="http://schemas.openxmlformats.org/markup-compatibility/2006" xmlns:p14="http://schemas.microsoft.com/office/powerpoint/2010/main">
-    <mc:Choice Requires="p14">
-      <p:transition spd="slow" p14:dur="1250" advTm="2000">
+  <mc:AlternateContent xmlns:mc="http://schemas.openxmlformats.org/markup-compatibility/2006">
+    <mc:Choice xmlns:p14="http://schemas.microsoft.com/office/powerpoint/2010/main" Requires="p14">
+      <p:transition spd="slow" p14:dur="1250">
         <p14:flip dir="r"/>
       </p:transition>
     </mc:Choice>
-    <mc:Fallback xmlns="">
-      <p:transition spd="slow" advTm="2000">
+    <mc:Fallback>
+      <p:transition spd="slow">
         <p:fade/>
       </p:transition>
     </mc:Fallback>
@@ -21922,7 +21937,7 @@
           <p:cNvPr id="4" name="Picture Placeholder 3">
             <a:extLst>
               <a:ext uri="{FF2B5EF4-FFF2-40B4-BE49-F238E27FC236}">
-                <a16:creationId xmlns:a16="http://schemas.microsoft.com/office/drawing/2014/main" id="{B9BFDE3A-3AD5-4BB0-977A-29CBD5947C18}"/>
+                <a16:creationId xmlns:a16="http://schemas.microsoft.com/office/drawing/2014/main" id="{D095E459-51F9-472B-8FE6-9BFC39330CBA}"/>
               </a:ext>
             </a:extLst>
           </p:cNvPr>
@@ -21935,17 +21950,12 @@
         </p:nvPicPr>
         <p:blipFill>
           <a:blip r:embed="rId2"/>
-          <a:srcRect l="18982" r="18982"/>
+          <a:srcRect t="4080" b="4080"/>
           <a:stretch>
             <a:fillRect/>
           </a:stretch>
         </p:blipFill>
-        <p:spPr>
-          <a:xfrm>
-            <a:off x="4802111" y="-1276351"/>
-            <a:ext cx="9063832" cy="9193212"/>
-          </a:xfrm>
-        </p:spPr>
+        <p:spPr/>
       </p:pic>
       <p:sp>
         <p:nvSpPr>
@@ -21975,7 +21985,7 @@
           <a:p>
             <a:r>
               <a:rPr lang="en-US" dirty="0"/>
-              <a:t>Lesson 23</a:t>
+              <a:t>Lesson 22</a:t>
             </a:r>
           </a:p>
         </p:txBody>
@@ -22013,7 +22023,7 @@
             </a:pPr>
             <a:r>
               <a:rPr lang="en-US" dirty="0"/>
-              <a:t>LINQ to Objects</a:t>
+              <a:t>Programming Databases</a:t>
             </a:r>
           </a:p>
         </p:txBody>
@@ -22021,21 +22031,21 @@
     </p:spTree>
     <p:extLst>
       <p:ext uri="{BB962C8B-B14F-4D97-AF65-F5344CB8AC3E}">
-        <p14:creationId xmlns:p14="http://schemas.microsoft.com/office/powerpoint/2010/main" val="384631692"/>
+        <p14:creationId xmlns:p14="http://schemas.microsoft.com/office/powerpoint/2010/main" val="3062775636"/>
       </p:ext>
     </p:extLst>
   </p:cSld>
   <p:clrMapOvr>
     <a:masterClrMapping/>
   </p:clrMapOvr>
-  <mc:AlternateContent xmlns:mc="http://schemas.openxmlformats.org/markup-compatibility/2006" xmlns:p14="http://schemas.microsoft.com/office/powerpoint/2010/main">
-    <mc:Choice Requires="p14">
-      <p:transition spd="slow" p14:dur="1250" advTm="2000">
+  <mc:AlternateContent xmlns:mc="http://schemas.openxmlformats.org/markup-compatibility/2006">
+    <mc:Choice xmlns:p14="http://schemas.microsoft.com/office/powerpoint/2010/main" Requires="p14">
+      <p:transition spd="slow" p14:dur="1250">
         <p14:flip dir="r"/>
       </p:transition>
     </mc:Choice>
-    <mc:Fallback xmlns="">
-      <p:transition spd="slow" advTm="2000">
+    <mc:Fallback>
+      <p:transition spd="slow">
         <p:fade/>
       </p:transition>
     </mc:Fallback>
@@ -22065,6 +22075,149 @@
           <p:cNvPr id="4" name="Picture Placeholder 3">
             <a:extLst>
               <a:ext uri="{FF2B5EF4-FFF2-40B4-BE49-F238E27FC236}">
+                <a16:creationId xmlns:a16="http://schemas.microsoft.com/office/drawing/2014/main" id="{B9BFDE3A-3AD5-4BB0-977A-29CBD5947C18}"/>
+              </a:ext>
+            </a:extLst>
+          </p:cNvPr>
+          <p:cNvPicPr>
+            <a:picLocks noGrp="1" noChangeAspect="1"/>
+          </p:cNvPicPr>
+          <p:nvPr>
+            <p:ph type="pic" sz="quarter" idx="10"/>
+          </p:nvPr>
+        </p:nvPicPr>
+        <p:blipFill>
+          <a:blip r:embed="rId2"/>
+          <a:srcRect l="18982" r="18982"/>
+          <a:stretch>
+            <a:fillRect/>
+          </a:stretch>
+        </p:blipFill>
+        <p:spPr>
+          <a:xfrm>
+            <a:off x="4802111" y="-1276351"/>
+            <a:ext cx="9063832" cy="9193212"/>
+          </a:xfrm>
+        </p:spPr>
+      </p:pic>
+      <p:sp>
+        <p:nvSpPr>
+          <p:cNvPr id="2" name="Title 1">
+            <a:extLst>
+              <a:ext uri="{FF2B5EF4-FFF2-40B4-BE49-F238E27FC236}">
+                <a16:creationId xmlns:a16="http://schemas.microsoft.com/office/drawing/2014/main" id="{B2A8B21D-766A-4354-B054-43C814C7440B}"/>
+              </a:ext>
+            </a:extLst>
+          </p:cNvPr>
+          <p:cNvSpPr>
+            <a:spLocks noGrp="1"/>
+          </p:cNvSpPr>
+          <p:nvPr>
+            <p:ph type="title" idx="4294967295"/>
+          </p:nvPr>
+        </p:nvSpPr>
+        <p:spPr>
+          <a:xfrm>
+            <a:off x="0" y="1709738"/>
+            <a:ext cx="10515600" cy="2852737"/>
+          </a:xfrm>
+        </p:spPr>
+        <p:txBody>
+          <a:bodyPr/>
+          <a:lstStyle/>
+          <a:p>
+            <a:r>
+              <a:rPr lang="en-US" dirty="0"/>
+              <a:t>Lesson 23</a:t>
+            </a:r>
+          </a:p>
+        </p:txBody>
+      </p:sp>
+      <p:sp>
+        <p:nvSpPr>
+          <p:cNvPr id="3" name="Text Placeholder 2">
+            <a:extLst>
+              <a:ext uri="{FF2B5EF4-FFF2-40B4-BE49-F238E27FC236}">
+                <a16:creationId xmlns:a16="http://schemas.microsoft.com/office/drawing/2014/main" id="{551AA14F-63AB-40DA-A2E5-77B9ECBA8D3C}"/>
+              </a:ext>
+            </a:extLst>
+          </p:cNvPr>
+          <p:cNvSpPr>
+            <a:spLocks noGrp="1"/>
+          </p:cNvSpPr>
+          <p:nvPr>
+            <p:ph type="body" idx="4294967295"/>
+          </p:nvPr>
+        </p:nvSpPr>
+        <p:spPr>
+          <a:xfrm>
+            <a:off x="0" y="4589463"/>
+            <a:ext cx="7014368" cy="1500187"/>
+          </a:xfrm>
+        </p:spPr>
+        <p:txBody>
+          <a:bodyPr>
+            <a:normAutofit/>
+          </a:bodyPr>
+          <a:lstStyle/>
+          <a:p>
+            <a:pPr marL="0" indent="0">
+              <a:buNone/>
+            </a:pPr>
+            <a:r>
+              <a:rPr lang="en-US" dirty="0"/>
+              <a:t>LINQ to Objects</a:t>
+            </a:r>
+          </a:p>
+        </p:txBody>
+      </p:sp>
+    </p:spTree>
+    <p:extLst>
+      <p:ext uri="{BB962C8B-B14F-4D97-AF65-F5344CB8AC3E}">
+        <p14:creationId xmlns:p14="http://schemas.microsoft.com/office/powerpoint/2010/main" val="384631692"/>
+      </p:ext>
+    </p:extLst>
+  </p:cSld>
+  <p:clrMapOvr>
+    <a:masterClrMapping/>
+  </p:clrMapOvr>
+  <mc:AlternateContent xmlns:mc="http://schemas.openxmlformats.org/markup-compatibility/2006">
+    <mc:Choice xmlns:p14="http://schemas.microsoft.com/office/powerpoint/2010/main" Requires="p14">
+      <p:transition spd="slow" p14:dur="1250">
+        <p14:flip dir="r"/>
+      </p:transition>
+    </mc:Choice>
+    <mc:Fallback>
+      <p:transition spd="slow">
+        <p:fade/>
+      </p:transition>
+    </mc:Fallback>
+  </mc:AlternateContent>
+</p:sld>
+</file>
+
+<file path=ppt/slides/slide29.xml><?xml version="1.0" encoding="utf-8"?>
+<p:sld xmlns:a="http://schemas.openxmlformats.org/drawingml/2006/main" xmlns:r="http://schemas.openxmlformats.org/officeDocument/2006/relationships" xmlns:p="http://schemas.openxmlformats.org/presentationml/2006/main">
+  <p:cSld>
+    <p:spTree>
+      <p:nvGrpSpPr>
+        <p:cNvPr id="1" name=""/>
+        <p:cNvGrpSpPr/>
+        <p:nvPr/>
+      </p:nvGrpSpPr>
+      <p:grpSpPr>
+        <a:xfrm>
+          <a:off x="0" y="0"/>
+          <a:ext cx="0" cy="0"/>
+          <a:chOff x="0" y="0"/>
+          <a:chExt cx="0" cy="0"/>
+        </a:xfrm>
+      </p:grpSpPr>
+      <p:pic>
+        <p:nvPicPr>
+          <p:cNvPr id="4" name="Picture Placeholder 3">
+            <a:extLst>
+              <a:ext uri="{FF2B5EF4-FFF2-40B4-BE49-F238E27FC236}">
                 <a16:creationId xmlns:a16="http://schemas.microsoft.com/office/drawing/2014/main" id="{FB4C5B47-D1F1-4F06-AD84-30DD0CB87BCB}"/>
               </a:ext>
             </a:extLst>
@@ -22171,14 +22324,14 @@
   <p:clrMapOvr>
     <a:masterClrMapping/>
   </p:clrMapOvr>
-  <mc:AlternateContent xmlns:mc="http://schemas.openxmlformats.org/markup-compatibility/2006" xmlns:p14="http://schemas.microsoft.com/office/powerpoint/2010/main">
-    <mc:Choice Requires="p14">
-      <p:transition spd="slow" p14:dur="1250" advTm="2000">
+  <mc:AlternateContent xmlns:mc="http://schemas.openxmlformats.org/markup-compatibility/2006">
+    <mc:Choice xmlns:p14="http://schemas.microsoft.com/office/powerpoint/2010/main" Requires="p14">
+      <p:transition spd="slow" p14:dur="1250">
         <p14:flip dir="r"/>
       </p:transition>
     </mc:Choice>
-    <mc:Fallback xmlns="">
-      <p:transition spd="slow" advTm="2000">
+    <mc:Fallback>
+      <p:transition spd="slow">
         <p:fade/>
       </p:transition>
     </mc:Fallback>
@@ -22205,134 +22358,37 @@
       </p:grpSpPr>
       <p:pic>
         <p:nvPicPr>
-          <p:cNvPr id="8" name="Picture Placeholder 7">
+          <p:cNvPr id="3" name="Picture 2">
             <a:extLst>
               <a:ext uri="{FF2B5EF4-FFF2-40B4-BE49-F238E27FC236}">
-                <a16:creationId xmlns:a16="http://schemas.microsoft.com/office/drawing/2014/main" id="{CABD3A5B-2263-4153-8E6B-BA79BA906718}"/>
+                <a16:creationId xmlns:a16="http://schemas.microsoft.com/office/drawing/2014/main" id="{580352B0-E402-490E-90EE-52EC18EB49C5}"/>
               </a:ext>
             </a:extLst>
           </p:cNvPr>
           <p:cNvPicPr>
-            <a:picLocks noGrp="1" noChangeAspect="1"/>
+            <a:picLocks noChangeAspect="1"/>
           </p:cNvPicPr>
-          <p:nvPr>
-            <p:ph type="pic" sz="quarter" idx="10"/>
-          </p:nvPr>
+          <p:nvPr/>
         </p:nvPicPr>
         <p:blipFill rotWithShape="1">
           <a:blip r:embed="rId2"/>
-          <a:srcRect l="13260" t="9820" r="31713" b="6466"/>
+          <a:srcRect l="7199" t="14462" b="3283"/>
           <a:stretch/>
         </p:blipFill>
         <p:spPr>
           <a:xfrm>
-            <a:off x="4227471" y="-1421351"/>
-            <a:ext cx="9564180" cy="9700702"/>
+            <a:off x="1349633" y="1672516"/>
+            <a:ext cx="10296430" cy="3235362"/>
           </a:xfrm>
+          <a:prstGeom prst="rect">
+            <a:avLst/>
+          </a:prstGeom>
         </p:spPr>
       </p:pic>
-      <p:sp>
-        <p:nvSpPr>
-          <p:cNvPr id="2" name="Title 1">
-            <a:extLst>
-              <a:ext uri="{FF2B5EF4-FFF2-40B4-BE49-F238E27FC236}">
-                <a16:creationId xmlns:a16="http://schemas.microsoft.com/office/drawing/2014/main" id="{B2A8B21D-766A-4354-B054-43C814C7440B}"/>
-              </a:ext>
-            </a:extLst>
-          </p:cNvPr>
-          <p:cNvSpPr>
-            <a:spLocks noGrp="1"/>
-          </p:cNvSpPr>
-          <p:nvPr>
-            <p:ph type="title" idx="4294967295"/>
-          </p:nvPr>
-        </p:nvSpPr>
-        <p:spPr>
-          <a:xfrm>
-            <a:off x="0" y="1709738"/>
-            <a:ext cx="10515600" cy="2852737"/>
-          </a:xfrm>
-        </p:spPr>
-        <p:txBody>
-          <a:bodyPr/>
-          <a:lstStyle/>
-          <a:p>
-            <a:r>
-              <a:rPr lang="en-US" dirty="0"/>
-              <a:t>Lesson 1</a:t>
-            </a:r>
-          </a:p>
-        </p:txBody>
-      </p:sp>
-      <p:sp>
-        <p:nvSpPr>
-          <p:cNvPr id="3" name="Text Placeholder 2">
-            <a:extLst>
-              <a:ext uri="{FF2B5EF4-FFF2-40B4-BE49-F238E27FC236}">
-                <a16:creationId xmlns:a16="http://schemas.microsoft.com/office/drawing/2014/main" id="{551AA14F-63AB-40DA-A2E5-77B9ECBA8D3C}"/>
-              </a:ext>
-            </a:extLst>
-          </p:cNvPr>
-          <p:cNvSpPr>
-            <a:spLocks noGrp="1"/>
-          </p:cNvSpPr>
-          <p:nvPr>
-            <p:ph type="body" idx="4294967295"/>
-          </p:nvPr>
-        </p:nvSpPr>
-        <p:spPr>
-          <a:xfrm>
-            <a:off x="0" y="4589463"/>
-            <a:ext cx="7014368" cy="1500187"/>
-          </a:xfrm>
-        </p:spPr>
-        <p:txBody>
-          <a:bodyPr>
-            <a:normAutofit fontScale="92500" lnSpcReduction="10000"/>
-          </a:bodyPr>
-          <a:lstStyle/>
-          <a:p>
-            <a:pPr marL="0" indent="0">
-              <a:buNone/>
-            </a:pPr>
-            <a:r>
-              <a:rPr lang="en-US" dirty="0"/>
-              <a:t>Introducing C# and .NET</a:t>
-            </a:r>
-          </a:p>
-          <a:p>
-            <a:pPr marL="457200" lvl="1" indent="0">
-              <a:buNone/>
-            </a:pPr>
-            <a:r>
-              <a:rPr lang="en-US" dirty="0"/>
-              <a:t>.NET</a:t>
-            </a:r>
-          </a:p>
-          <a:p>
-            <a:pPr marL="457200" lvl="1" indent="0">
-              <a:buNone/>
-            </a:pPr>
-            <a:r>
-              <a:rPr lang="en-US" dirty="0"/>
-              <a:t>C#</a:t>
-            </a:r>
-          </a:p>
-          <a:p>
-            <a:pPr marL="457200" lvl="1" indent="0">
-              <a:buNone/>
-            </a:pPr>
-            <a:r>
-              <a:rPr lang="en-US" dirty="0"/>
-              <a:t>Development Tools</a:t>
-            </a:r>
-          </a:p>
-        </p:txBody>
-      </p:sp>
     </p:spTree>
     <p:extLst>
       <p:ext uri="{BB962C8B-B14F-4D97-AF65-F5344CB8AC3E}">
-        <p14:creationId xmlns:p14="http://schemas.microsoft.com/office/powerpoint/2010/main" val="4197562091"/>
+        <p14:creationId xmlns:p14="http://schemas.microsoft.com/office/powerpoint/2010/main" val="4026219981"/>
       </p:ext>
     </p:extLst>
   </p:cSld>
@@ -22373,6 +22429,174 @@
       </p:grpSpPr>
       <p:pic>
         <p:nvPicPr>
+          <p:cNvPr id="8" name="Picture Placeholder 7">
+            <a:extLst>
+              <a:ext uri="{FF2B5EF4-FFF2-40B4-BE49-F238E27FC236}">
+                <a16:creationId xmlns:a16="http://schemas.microsoft.com/office/drawing/2014/main" id="{CABD3A5B-2263-4153-8E6B-BA79BA906718}"/>
+              </a:ext>
+            </a:extLst>
+          </p:cNvPr>
+          <p:cNvPicPr>
+            <a:picLocks noGrp="1" noChangeAspect="1"/>
+          </p:cNvPicPr>
+          <p:nvPr>
+            <p:ph type="pic" sz="quarter" idx="10"/>
+          </p:nvPr>
+        </p:nvPicPr>
+        <p:blipFill rotWithShape="1">
+          <a:blip r:embed="rId2"/>
+          <a:srcRect l="13260" t="9820" r="31713" b="6466"/>
+          <a:stretch/>
+        </p:blipFill>
+        <p:spPr>
+          <a:xfrm>
+            <a:off x="4227471" y="-1421351"/>
+            <a:ext cx="9564180" cy="9700702"/>
+          </a:xfrm>
+        </p:spPr>
+      </p:pic>
+      <p:sp>
+        <p:nvSpPr>
+          <p:cNvPr id="2" name="Title 1">
+            <a:extLst>
+              <a:ext uri="{FF2B5EF4-FFF2-40B4-BE49-F238E27FC236}">
+                <a16:creationId xmlns:a16="http://schemas.microsoft.com/office/drawing/2014/main" id="{B2A8B21D-766A-4354-B054-43C814C7440B}"/>
+              </a:ext>
+            </a:extLst>
+          </p:cNvPr>
+          <p:cNvSpPr>
+            <a:spLocks noGrp="1"/>
+          </p:cNvSpPr>
+          <p:nvPr>
+            <p:ph type="title" idx="4294967295"/>
+          </p:nvPr>
+        </p:nvSpPr>
+        <p:spPr>
+          <a:xfrm>
+            <a:off x="0" y="1709738"/>
+            <a:ext cx="10515600" cy="2852737"/>
+          </a:xfrm>
+        </p:spPr>
+        <p:txBody>
+          <a:bodyPr/>
+          <a:lstStyle/>
+          <a:p>
+            <a:r>
+              <a:rPr lang="en-US" dirty="0"/>
+              <a:t>Lesson 1</a:t>
+            </a:r>
+          </a:p>
+        </p:txBody>
+      </p:sp>
+      <p:sp>
+        <p:nvSpPr>
+          <p:cNvPr id="3" name="Text Placeholder 2">
+            <a:extLst>
+              <a:ext uri="{FF2B5EF4-FFF2-40B4-BE49-F238E27FC236}">
+                <a16:creationId xmlns:a16="http://schemas.microsoft.com/office/drawing/2014/main" id="{551AA14F-63AB-40DA-A2E5-77B9ECBA8D3C}"/>
+              </a:ext>
+            </a:extLst>
+          </p:cNvPr>
+          <p:cNvSpPr>
+            <a:spLocks noGrp="1"/>
+          </p:cNvSpPr>
+          <p:nvPr>
+            <p:ph type="body" idx="4294967295"/>
+          </p:nvPr>
+        </p:nvSpPr>
+        <p:spPr>
+          <a:xfrm>
+            <a:off x="0" y="4589463"/>
+            <a:ext cx="7014368" cy="1500187"/>
+          </a:xfrm>
+        </p:spPr>
+        <p:txBody>
+          <a:bodyPr>
+            <a:normAutofit fontScale="92500" lnSpcReduction="10000"/>
+          </a:bodyPr>
+          <a:lstStyle/>
+          <a:p>
+            <a:pPr marL="0" indent="0">
+              <a:buNone/>
+            </a:pPr>
+            <a:r>
+              <a:rPr lang="en-US" dirty="0"/>
+              <a:t>Introducing C# and .NET</a:t>
+            </a:r>
+          </a:p>
+          <a:p>
+            <a:pPr marL="457200" lvl="1" indent="0">
+              <a:buNone/>
+            </a:pPr>
+            <a:r>
+              <a:rPr lang="en-US" dirty="0"/>
+              <a:t>.NET</a:t>
+            </a:r>
+          </a:p>
+          <a:p>
+            <a:pPr marL="457200" lvl="1" indent="0">
+              <a:buNone/>
+            </a:pPr>
+            <a:r>
+              <a:rPr lang="en-US" dirty="0"/>
+              <a:t>C#</a:t>
+            </a:r>
+          </a:p>
+          <a:p>
+            <a:pPr marL="457200" lvl="1" indent="0">
+              <a:buNone/>
+            </a:pPr>
+            <a:r>
+              <a:rPr lang="en-US" dirty="0"/>
+              <a:t>Development Tools</a:t>
+            </a:r>
+          </a:p>
+        </p:txBody>
+      </p:sp>
+    </p:spTree>
+    <p:extLst>
+      <p:ext uri="{BB962C8B-B14F-4D97-AF65-F5344CB8AC3E}">
+        <p14:creationId xmlns:p14="http://schemas.microsoft.com/office/powerpoint/2010/main" val="4197562091"/>
+      </p:ext>
+    </p:extLst>
+  </p:cSld>
+  <p:clrMapOvr>
+    <a:masterClrMapping/>
+  </p:clrMapOvr>
+  <mc:AlternateContent xmlns:mc="http://schemas.openxmlformats.org/markup-compatibility/2006">
+    <mc:Choice xmlns:p14="http://schemas.microsoft.com/office/powerpoint/2010/main" Requires="p14">
+      <p:transition spd="slow" p14:dur="1250">
+        <p14:flip dir="r"/>
+      </p:transition>
+    </mc:Choice>
+    <mc:Fallback>
+      <p:transition spd="slow">
+        <p:fade/>
+      </p:transition>
+    </mc:Fallback>
+  </mc:AlternateContent>
+</p:sld>
+</file>
+
+<file path=ppt/slides/slide5.xml><?xml version="1.0" encoding="utf-8"?>
+<p:sld xmlns:a="http://schemas.openxmlformats.org/drawingml/2006/main" xmlns:r="http://schemas.openxmlformats.org/officeDocument/2006/relationships" xmlns:p="http://schemas.openxmlformats.org/presentationml/2006/main">
+  <p:cSld>
+    <p:spTree>
+      <p:nvGrpSpPr>
+        <p:cNvPr id="1" name=""/>
+        <p:cNvGrpSpPr/>
+        <p:nvPr/>
+      </p:nvGrpSpPr>
+      <p:grpSpPr>
+        <a:xfrm>
+          <a:off x="0" y="0"/>
+          <a:ext cx="0" cy="0"/>
+          <a:chOff x="0" y="0"/>
+          <a:chExt cx="0" cy="0"/>
+        </a:xfrm>
+      </p:grpSpPr>
+      <p:pic>
+        <p:nvPicPr>
           <p:cNvPr id="4" name="Picture Placeholder 3">
             <a:extLst>
               <a:ext uri="{FF2B5EF4-FFF2-40B4-BE49-F238E27FC236}">
@@ -22477,14 +22701,14 @@
   <p:clrMapOvr>
     <a:masterClrMapping/>
   </p:clrMapOvr>
-  <mc:AlternateContent xmlns:mc="http://schemas.openxmlformats.org/markup-compatibility/2006" xmlns:p14="http://schemas.microsoft.com/office/powerpoint/2010/main">
-    <mc:Choice Requires="p14">
-      <p:transition spd="slow" p14:dur="1250" advTm="2000">
+  <mc:AlternateContent xmlns:mc="http://schemas.openxmlformats.org/markup-compatibility/2006">
+    <mc:Choice xmlns:p14="http://schemas.microsoft.com/office/powerpoint/2010/main" Requires="p14">
+      <p:transition spd="slow" p14:dur="1250">
         <p14:flip dir="r"/>
       </p:transition>
     </mc:Choice>
-    <mc:Fallback xmlns="">
-      <p:transition spd="slow" advTm="2000">
+    <mc:Fallback>
+      <p:transition spd="slow">
         <p:fade/>
       </p:transition>
     </mc:Fallback>
@@ -22492,7 +22716,7 @@
 </p:sld>
 </file>
 
-<file path=ppt/slides/slide5.xml><?xml version="1.0" encoding="utf-8"?>
+<file path=ppt/slides/slide6.xml><?xml version="1.0" encoding="utf-8"?>
 <p:sld xmlns:a="http://schemas.openxmlformats.org/drawingml/2006/main" xmlns:r="http://schemas.openxmlformats.org/officeDocument/2006/relationships" xmlns:p="http://schemas.openxmlformats.org/presentationml/2006/main">
   <p:cSld>
     <p:spTree>
@@ -23784,14 +24008,14 @@
   <p:clrMapOvr>
     <a:masterClrMapping/>
   </p:clrMapOvr>
-  <mc:AlternateContent xmlns:mc="http://schemas.openxmlformats.org/markup-compatibility/2006" xmlns:p14="http://schemas.microsoft.com/office/powerpoint/2010/main">
-    <mc:Choice Requires="p14">
-      <p:transition spd="slow" p14:dur="1250" advTm="2000">
+  <mc:AlternateContent xmlns:mc="http://schemas.openxmlformats.org/markup-compatibility/2006">
+    <mc:Choice xmlns:p14="http://schemas.microsoft.com/office/powerpoint/2010/main" Requires="p14">
+      <p:transition spd="slow" p14:dur="1250">
         <p14:flip dir="r"/>
       </p:transition>
     </mc:Choice>
-    <mc:Fallback xmlns="">
-      <p:transition spd="slow" advTm="2000">
+    <mc:Fallback>
+      <p:transition spd="slow">
         <p:fade/>
       </p:transition>
     </mc:Fallback>
@@ -23799,7 +24023,7 @@
 </p:sld>
 </file>
 
-<file path=ppt/slides/slide6.xml><?xml version="1.0" encoding="utf-8"?>
+<file path=ppt/slides/slide7.xml><?xml version="1.0" encoding="utf-8"?>
 <p:sld xmlns:a="http://schemas.openxmlformats.org/drawingml/2006/main" xmlns:r="http://schemas.openxmlformats.org/officeDocument/2006/relationships" xmlns:p="http://schemas.openxmlformats.org/presentationml/2006/main">
   <p:cSld>
     <p:spTree>
@@ -24405,7 +24629,7 @@
 </p:sld>
 </file>
 
-<file path=ppt/slides/slide7.xml><?xml version="1.0" encoding="utf-8"?>
+<file path=ppt/slides/slide8.xml><?xml version="1.0" encoding="utf-8"?>
 <p:sld xmlns:a="http://schemas.openxmlformats.org/drawingml/2006/main" xmlns:r="http://schemas.openxmlformats.org/officeDocument/2006/relationships" xmlns:p="http://schemas.openxmlformats.org/presentationml/2006/main">
   <p:cSld>
     <p:spTree>
@@ -24528,152 +24752,14 @@
   <p:clrMapOvr>
     <a:masterClrMapping/>
   </p:clrMapOvr>
-  <mc:AlternateContent xmlns:mc="http://schemas.openxmlformats.org/markup-compatibility/2006" xmlns:p14="http://schemas.microsoft.com/office/powerpoint/2010/main">
-    <mc:Choice Requires="p14">
-      <p:transition spd="slow" p14:dur="1250" advTm="2000">
+  <mc:AlternateContent xmlns:mc="http://schemas.openxmlformats.org/markup-compatibility/2006">
+    <mc:Choice xmlns:p14="http://schemas.microsoft.com/office/powerpoint/2010/main" Requires="p14">
+      <p:transition spd="slow" p14:dur="1250">
         <p14:flip dir="r"/>
       </p:transition>
     </mc:Choice>
-    <mc:Fallback xmlns="">
-      <p:transition spd="slow" advTm="2000">
-        <p:fade/>
-      </p:transition>
-    </mc:Fallback>
-  </mc:AlternateContent>
-</p:sld>
-</file>
-
-<file path=ppt/slides/slide8.xml><?xml version="1.0" encoding="utf-8"?>
-<p:sld xmlns:a="http://schemas.openxmlformats.org/drawingml/2006/main" xmlns:r="http://schemas.openxmlformats.org/officeDocument/2006/relationships" xmlns:p="http://schemas.openxmlformats.org/presentationml/2006/main">
-  <p:cSld>
-    <p:spTree>
-      <p:nvGrpSpPr>
-        <p:cNvPr id="1" name=""/>
-        <p:cNvGrpSpPr/>
-        <p:nvPr/>
-      </p:nvGrpSpPr>
-      <p:grpSpPr>
-        <a:xfrm>
-          <a:off x="0" y="0"/>
-          <a:ext cx="0" cy="0"/>
-          <a:chOff x="0" y="0"/>
-          <a:chExt cx="0" cy="0"/>
-        </a:xfrm>
-      </p:grpSpPr>
-      <p:pic>
-        <p:nvPicPr>
-          <p:cNvPr id="4" name="Picture Placeholder 3">
-            <a:extLst>
-              <a:ext uri="{FF2B5EF4-FFF2-40B4-BE49-F238E27FC236}">
-                <a16:creationId xmlns:a16="http://schemas.microsoft.com/office/drawing/2014/main" id="{1A66767F-6F55-4F1C-89A3-E9A106BC0918}"/>
-              </a:ext>
-            </a:extLst>
-          </p:cNvPr>
-          <p:cNvPicPr>
-            <a:picLocks noGrp="1" noChangeAspect="1"/>
-          </p:cNvPicPr>
-          <p:nvPr>
-            <p:ph type="pic" sz="quarter" idx="10"/>
-          </p:nvPr>
-        </p:nvPicPr>
-        <p:blipFill>
-          <a:blip r:embed="rId2"/>
-          <a:srcRect l="17133" r="17133"/>
-          <a:stretch>
-            <a:fillRect/>
-          </a:stretch>
-        </p:blipFill>
-        <p:spPr/>
-      </p:pic>
-      <p:sp>
-        <p:nvSpPr>
-          <p:cNvPr id="2" name="Title 1">
-            <a:extLst>
-              <a:ext uri="{FF2B5EF4-FFF2-40B4-BE49-F238E27FC236}">
-                <a16:creationId xmlns:a16="http://schemas.microsoft.com/office/drawing/2014/main" id="{B2A8B21D-766A-4354-B054-43C814C7440B}"/>
-              </a:ext>
-            </a:extLst>
-          </p:cNvPr>
-          <p:cNvSpPr>
-            <a:spLocks noGrp="1"/>
-          </p:cNvSpPr>
-          <p:nvPr>
-            <p:ph type="title" idx="4294967295"/>
-          </p:nvPr>
-        </p:nvSpPr>
-        <p:spPr>
-          <a:xfrm>
-            <a:off x="0" y="1709738"/>
-            <a:ext cx="10515600" cy="2852737"/>
-          </a:xfrm>
-        </p:spPr>
-        <p:txBody>
-          <a:bodyPr/>
-          <a:lstStyle/>
-          <a:p>
-            <a:r>
-              <a:rPr lang="en-US" dirty="0"/>
-              <a:t>Lesson 4</a:t>
-            </a:r>
-          </a:p>
-        </p:txBody>
-      </p:sp>
-      <p:sp>
-        <p:nvSpPr>
-          <p:cNvPr id="3" name="Text Placeholder 2">
-            <a:extLst>
-              <a:ext uri="{FF2B5EF4-FFF2-40B4-BE49-F238E27FC236}">
-                <a16:creationId xmlns:a16="http://schemas.microsoft.com/office/drawing/2014/main" id="{551AA14F-63AB-40DA-A2E5-77B9ECBA8D3C}"/>
-              </a:ext>
-            </a:extLst>
-          </p:cNvPr>
-          <p:cNvSpPr>
-            <a:spLocks noGrp="1"/>
-          </p:cNvSpPr>
-          <p:nvPr>
-            <p:ph type="body" idx="4294967295"/>
-          </p:nvPr>
-        </p:nvSpPr>
-        <p:spPr>
-          <a:xfrm>
-            <a:off x="0" y="4589463"/>
-            <a:ext cx="7014368" cy="1500187"/>
-          </a:xfrm>
-        </p:spPr>
-        <p:txBody>
-          <a:bodyPr>
-            <a:normAutofit/>
-          </a:bodyPr>
-          <a:lstStyle/>
-          <a:p>
-            <a:pPr marL="0" indent="0">
-              <a:buNone/>
-            </a:pPr>
-            <a:r>
-              <a:rPr lang="en-US" dirty="0"/>
-              <a:t>Scope</a:t>
-            </a:r>
-          </a:p>
-        </p:txBody>
-      </p:sp>
-    </p:spTree>
-    <p:extLst>
-      <p:ext uri="{BB962C8B-B14F-4D97-AF65-F5344CB8AC3E}">
-        <p14:creationId xmlns:p14="http://schemas.microsoft.com/office/powerpoint/2010/main" val="337890428"/>
-      </p:ext>
-    </p:extLst>
-  </p:cSld>
-  <p:clrMapOvr>
-    <a:masterClrMapping/>
-  </p:clrMapOvr>
-  <mc:AlternateContent xmlns:mc="http://schemas.openxmlformats.org/markup-compatibility/2006" xmlns:p14="http://schemas.microsoft.com/office/powerpoint/2010/main">
-    <mc:Choice Requires="p14">
-      <p:transition spd="slow" p14:dur="1250" advTm="2000">
-        <p14:flip dir="r"/>
-      </p:transition>
-    </mc:Choice>
-    <mc:Fallback xmlns="">
-      <p:transition spd="slow" advTm="2000">
+    <mc:Fallback>
+      <p:transition spd="slow">
         <p:fade/>
       </p:transition>
     </mc:Fallback>
@@ -24703,7 +24789,7 @@
           <p:cNvPr id="4" name="Picture Placeholder 3">
             <a:extLst>
               <a:ext uri="{FF2B5EF4-FFF2-40B4-BE49-F238E27FC236}">
-                <a16:creationId xmlns:a16="http://schemas.microsoft.com/office/drawing/2014/main" id="{6E3F5DAB-7304-40F1-AF3F-603B5ABD5215}"/>
+                <a16:creationId xmlns:a16="http://schemas.microsoft.com/office/drawing/2014/main" id="{1A66767F-6F55-4F1C-89A3-E9A106BC0918}"/>
               </a:ext>
             </a:extLst>
           </p:cNvPr>
@@ -24714,17 +24800,14 @@
             <p:ph type="pic" sz="quarter" idx="10"/>
           </p:nvPr>
         </p:nvPicPr>
-        <p:blipFill rotWithShape="1">
+        <p:blipFill>
           <a:blip r:embed="rId2"/>
-          <a:srcRect t="2003" r="34266" b="-2003"/>
-          <a:stretch/>
+          <a:srcRect l="17133" r="17133"/>
+          <a:stretch>
+            <a:fillRect/>
+          </a:stretch>
         </p:blipFill>
-        <p:spPr>
-          <a:xfrm>
-            <a:off x="7014368" y="-1276351"/>
-            <a:ext cx="9063832" cy="9193212"/>
-          </a:xfrm>
-        </p:spPr>
+        <p:spPr/>
       </p:pic>
       <p:sp>
         <p:nvSpPr>
@@ -24754,7 +24837,7 @@
           <a:p>
             <a:r>
               <a:rPr lang="en-US" dirty="0"/>
-              <a:t>Lesson 5</a:t>
+              <a:t>Lesson 4</a:t>
             </a:r>
           </a:p>
         </p:txBody>
@@ -24792,7 +24875,7 @@
             </a:pPr>
             <a:r>
               <a:rPr lang="en-US" dirty="0"/>
-              <a:t>Strings</a:t>
+              <a:t>Scope</a:t>
             </a:r>
           </a:p>
         </p:txBody>
@@ -24800,21 +24883,21 @@
     </p:spTree>
     <p:extLst>
       <p:ext uri="{BB962C8B-B14F-4D97-AF65-F5344CB8AC3E}">
-        <p14:creationId xmlns:p14="http://schemas.microsoft.com/office/powerpoint/2010/main" val="3915960176"/>
+        <p14:creationId xmlns:p14="http://schemas.microsoft.com/office/powerpoint/2010/main" val="337890428"/>
       </p:ext>
     </p:extLst>
   </p:cSld>
   <p:clrMapOvr>
     <a:masterClrMapping/>
   </p:clrMapOvr>
-  <mc:AlternateContent xmlns:mc="http://schemas.openxmlformats.org/markup-compatibility/2006" xmlns:p14="http://schemas.microsoft.com/office/powerpoint/2010/main">
-    <mc:Choice Requires="p14">
-      <p:transition spd="slow" p14:dur="1250" advTm="2000">
+  <mc:AlternateContent xmlns:mc="http://schemas.openxmlformats.org/markup-compatibility/2006">
+    <mc:Choice xmlns:p14="http://schemas.microsoft.com/office/powerpoint/2010/main" Requires="p14">
+      <p:transition spd="slow" p14:dur="1250">
         <p14:flip dir="r"/>
       </p:transition>
     </mc:Choice>
-    <mc:Fallback xmlns="">
-      <p:transition spd="slow" advTm="2000">
+    <mc:Fallback>
+      <p:transition spd="slow">
         <p:fade/>
       </p:transition>
     </mc:Fallback>

</xml_diff>